<commit_message>
Added JPA demo project
</commit_message>
<xml_diff>
--- a/Spring Boot.pptx
+++ b/Spring Boot.pptx
@@ -3897,7 +3897,7 @@
         <p:spPr/>
         <p:txBody>
           <a:bodyPr>
-            <a:normAutofit lnSpcReduction="10000"/>
+            <a:normAutofit/>
           </a:bodyPr>
           <a:lstStyle/>
           <a:p>
@@ -3907,24 +3907,11 @@
             </a:r>
           </a:p>
           <a:p>
-            <a:pPr lvl="1"/>
-            <a:r>
-              <a:rPr lang="en-US" dirty="0" smtClean="0"/>
-              <a:t>What is REST?</a:t>
-            </a:r>
-          </a:p>
-          <a:p>
-            <a:pPr lvl="1"/>
-            <a:r>
-              <a:rPr lang="en-US" dirty="0" smtClean="0"/>
-              <a:t>Why use it?</a:t>
-            </a:r>
-          </a:p>
-          <a:p>
-            <a:r>
-              <a:rPr lang="en-US" dirty="0" smtClean="0"/>
+            <a:r>
+              <a:rPr lang="en-US" smtClean="0"/>
               <a:t>Micro-services</a:t>
             </a:r>
+            <a:endParaRPr lang="en-US" dirty="0" smtClean="0"/>
           </a:p>
           <a:p>
             <a:r>
@@ -5038,7 +5025,7 @@
   <a:extraClrSchemeLst/>
   <a:extLst>
     <a:ext uri="{05A4C25C-085E-4340-85A3-A5531E510DB2}">
-      <thm15:themeFamily xmlns:thm15="http://schemas.microsoft.com/office/thememl/2012/main" xmlns="" name="Office Theme" id="{62F939B6-93AF-4DB8-9C6B-D6C7DFDC589F}" vid="{4A3C46E8-61CC-4603-A589-7422A47A8E4A}"/>
+      <thm15:themeFamily xmlns="" xmlns:thm15="http://schemas.microsoft.com/office/thememl/2012/main" name="Office Theme" id="{62F939B6-93AF-4DB8-9C6B-D6C7DFDC589F}" vid="{4A3C46E8-61CC-4603-A589-7422A47A8E4A}"/>
     </a:ext>
   </a:extLst>
 </a:theme>
@@ -5299,7 +5286,7 @@
   <a:extraClrSchemeLst/>
   <a:extLst>
     <a:ext uri="{05A4C25C-085E-4340-85A3-A5531E510DB2}">
-      <thm15:themeFamily xmlns:thm15="http://schemas.microsoft.com/office/thememl/2012/main" xmlns="" name="Office Theme" id="{62F939B6-93AF-4DB8-9C6B-D6C7DFDC589F}" vid="{4A3C46E8-61CC-4603-A589-7422A47A8E4A}"/>
+      <thm15:themeFamily xmlns="" xmlns:thm15="http://schemas.microsoft.com/office/thememl/2012/main" name="Office Theme" id="{62F939B6-93AF-4DB8-9C6B-D6C7DFDC589F}" vid="{4A3C46E8-61CC-4603-A589-7422A47A8E4A}"/>
     </a:ext>
   </a:extLst>
 </a:theme>
@@ -5560,7 +5547,7 @@
   <a:extraClrSchemeLst/>
   <a:extLst>
     <a:ext uri="{05A4C25C-085E-4340-85A3-A5531E510DB2}">
-      <thm15:themeFamily xmlns:thm15="http://schemas.microsoft.com/office/thememl/2012/main" xmlns="" name="Office Theme" id="{62F939B6-93AF-4DB8-9C6B-D6C7DFDC589F}" vid="{4A3C46E8-61CC-4603-A589-7422A47A8E4A}"/>
+      <thm15:themeFamily xmlns="" xmlns:thm15="http://schemas.microsoft.com/office/thememl/2012/main" name="Office Theme" id="{62F939B6-93AF-4DB8-9C6B-D6C7DFDC589F}" vid="{4A3C46E8-61CC-4603-A589-7422A47A8E4A}"/>
     </a:ext>
   </a:extLst>
 </a:theme>

</xml_diff>

<commit_message>
Updated PPT with little bit of REST
</commit_message>
<xml_diff>
--- a/Spring Boot.pptx
+++ b/Spring Boot.pptx
@@ -5,21 +5,25 @@
     <p:sldMasterId id="2147483648" r:id="rId1"/>
   </p:sldMasterIdLst>
   <p:notesMasterIdLst>
-    <p:notesMasterId r:id="rId11"/>
+    <p:notesMasterId r:id="rId15"/>
   </p:notesMasterIdLst>
   <p:handoutMasterIdLst>
-    <p:handoutMasterId r:id="rId12"/>
+    <p:handoutMasterId r:id="rId16"/>
   </p:handoutMasterIdLst>
   <p:sldIdLst>
     <p:sldId id="256" r:id="rId2"/>
     <p:sldId id="257" r:id="rId3"/>
     <p:sldId id="258" r:id="rId4"/>
-    <p:sldId id="259" r:id="rId5"/>
-    <p:sldId id="262" r:id="rId6"/>
-    <p:sldId id="260" r:id="rId7"/>
-    <p:sldId id="261" r:id="rId8"/>
-    <p:sldId id="263" r:id="rId9"/>
-    <p:sldId id="264" r:id="rId10"/>
+    <p:sldId id="267" r:id="rId5"/>
+    <p:sldId id="265" r:id="rId6"/>
+    <p:sldId id="268" r:id="rId7"/>
+    <p:sldId id="266" r:id="rId8"/>
+    <p:sldId id="259" r:id="rId9"/>
+    <p:sldId id="262" r:id="rId10"/>
+    <p:sldId id="260" r:id="rId11"/>
+    <p:sldId id="261" r:id="rId12"/>
+    <p:sldId id="263" r:id="rId13"/>
+    <p:sldId id="264" r:id="rId14"/>
   </p:sldIdLst>
   <p:sldSz cx="12192000" cy="6858000"/>
   <p:notesSz cx="6858000" cy="9144000"/>
@@ -118,6 +122,25 @@
       </a:defRPr>
     </a:lvl9pPr>
   </p:defaultTextStyle>
+  <p:extLst>
+    <p:ext uri="{EFAFB233-063F-42B5-8137-9DF3F51BA10A}">
+      <p15:sldGuideLst xmlns:p15="http://schemas.microsoft.com/office/powerpoint/2012/main" xmlns="">
+        <p15:guide id="1" orient="horz" pos="2160">
+          <p15:clr>
+            <a:srgbClr val="A4A3A4"/>
+          </p15:clr>
+        </p15:guide>
+        <p15:guide id="2" pos="3840">
+          <p15:clr>
+            <a:srgbClr val="A4A3A4"/>
+          </p15:clr>
+        </p15:guide>
+      </p15:sldGuideLst>
+    </p:ext>
+    <p:ext uri="{2D200454-40CA-4A62-9FC3-DE9A4176ACB9}">
+      <p15:notesGuideLst xmlns:p15="http://schemas.microsoft.com/office/powerpoint/2012/main" xmlns=""/>
+    </p:ext>
+  </p:extLst>
 </p:presentation>
 </file>
 
@@ -203,7 +226,7 @@
           <a:p>
             <a:fld id="{7B2C7FEA-B7FB-4AAC-85C3-2BC7C9E6B196}" type="datetimeFigureOut">
               <a:rPr lang="en-US" smtClean="0"/>
-              <a:t>3/14/2015</a:t>
+              <a:t>3/15/2015</a:t>
             </a:fld>
             <a:endParaRPr lang="en-US" dirty="0"/>
           </a:p>
@@ -368,7 +391,7 @@
           <a:p>
             <a:fld id="{98CE4EFE-6887-4330-98E2-9EA0AF676C64}" type="datetimeFigureOut">
               <a:rPr lang="en-US" smtClean="0"/>
-              <a:t>3/14/2015</a:t>
+              <a:t>3/15/2015</a:t>
             </a:fld>
             <a:endParaRPr lang="en-US" dirty="0"/>
           </a:p>
@@ -680,14 +703,6 @@
           <a:bodyPr/>
           <a:lstStyle/>
           <a:p>
-            <a:r>
-              <a:rPr lang="en-US" b="1" dirty="0" smtClean="0"/>
-              <a:t>component</a:t>
-            </a:r>
-            <a:r>
-              <a:rPr lang="en-US" dirty="0" smtClean="0"/>
-              <a:t> is a unit of software that is independently replaceable and upgradeable.</a:t>
-            </a:r>
             <a:endParaRPr lang="en-US" dirty="0"/>
           </a:p>
         </p:txBody>
@@ -709,7 +724,7 @@
           <a:p>
             <a:fld id="{9F9FB9DD-7CF9-4A0C-8C7F-91FD9EF34B36}" type="slidenum">
               <a:rPr lang="en-US" smtClean="0"/>
-              <a:t>5</a:t>
+              <a:t>3</a:t>
             </a:fld>
             <a:endParaRPr lang="en-US" dirty="0"/>
           </a:p>
@@ -718,7 +733,7 @@
     </p:spTree>
     <p:extLst>
       <p:ext uri="{BB962C8B-B14F-4D97-AF65-F5344CB8AC3E}">
-        <p14:creationId xmlns:p14="http://schemas.microsoft.com/office/powerpoint/2010/main" val="2056578434"/>
+        <p14:creationId xmlns:p14="http://schemas.microsoft.com/office/powerpoint/2010/main" val="2110186832"/>
       </p:ext>
     </p:extLst>
   </p:cSld>
@@ -772,19 +787,6 @@
           <a:bodyPr/>
           <a:lstStyle/>
           <a:p>
-            <a:r>
-              <a:rPr lang="en-US" dirty="0" smtClean="0"/>
-              <a:t>Spring Boot makes it easy to create stand-alone, production-grade Spring based Applications that you can “just run”.  </a:t>
-            </a:r>
-          </a:p>
-          <a:p>
-            <a:endParaRPr lang="en-US" dirty="0" smtClean="0"/>
-          </a:p>
-          <a:p>
-            <a:r>
-              <a:rPr lang="en-US" dirty="0" smtClean="0"/>
-              <a:t>take an opinionated view</a:t>
-            </a:r>
             <a:endParaRPr lang="en-US" dirty="0"/>
           </a:p>
         </p:txBody>
@@ -806,7 +808,7 @@
           <a:p>
             <a:fld id="{9F9FB9DD-7CF9-4A0C-8C7F-91FD9EF34B36}" type="slidenum">
               <a:rPr lang="en-US" smtClean="0"/>
-              <a:t>7</a:t>
+              <a:t>4</a:t>
             </a:fld>
             <a:endParaRPr lang="en-US" dirty="0"/>
           </a:p>
@@ -815,7 +817,7 @@
     </p:spTree>
     <p:extLst>
       <p:ext uri="{BB962C8B-B14F-4D97-AF65-F5344CB8AC3E}">
-        <p14:creationId xmlns:p14="http://schemas.microsoft.com/office/powerpoint/2010/main" val="639032137"/>
+        <p14:creationId xmlns:p14="http://schemas.microsoft.com/office/powerpoint/2010/main" val="2110186832"/>
       </p:ext>
     </p:extLst>
   </p:cSld>
@@ -869,6 +871,447 @@
           <a:bodyPr/>
           <a:lstStyle/>
           <a:p>
+            <a:endParaRPr lang="en-US" dirty="0"/>
+          </a:p>
+        </p:txBody>
+      </p:sp>
+      <p:sp>
+        <p:nvSpPr>
+          <p:cNvPr id="4" name="Slide Number Placeholder 3"/>
+          <p:cNvSpPr>
+            <a:spLocks noGrp="1"/>
+          </p:cNvSpPr>
+          <p:nvPr>
+            <p:ph type="sldNum" sz="quarter" idx="10"/>
+          </p:nvPr>
+        </p:nvSpPr>
+        <p:spPr/>
+        <p:txBody>
+          <a:bodyPr/>
+          <a:lstStyle/>
+          <a:p>
+            <a:fld id="{9F9FB9DD-7CF9-4A0C-8C7F-91FD9EF34B36}" type="slidenum">
+              <a:rPr lang="en-US" smtClean="0"/>
+              <a:t>5</a:t>
+            </a:fld>
+            <a:endParaRPr lang="en-US" dirty="0"/>
+          </a:p>
+        </p:txBody>
+      </p:sp>
+    </p:spTree>
+    <p:extLst>
+      <p:ext uri="{BB962C8B-B14F-4D97-AF65-F5344CB8AC3E}">
+        <p14:creationId xmlns:p14="http://schemas.microsoft.com/office/powerpoint/2010/main" val="1321528369"/>
+      </p:ext>
+    </p:extLst>
+  </p:cSld>
+  <p:clrMapOvr>
+    <a:masterClrMapping/>
+  </p:clrMapOvr>
+</p:notes>
+</file>
+
+<file path=ppt/notesSlides/notesSlide4.xml><?xml version="1.0" encoding="utf-8"?>
+<p:notes xmlns:a="http://schemas.openxmlformats.org/drawingml/2006/main" xmlns:r="http://schemas.openxmlformats.org/officeDocument/2006/relationships" xmlns:p="http://schemas.openxmlformats.org/presentationml/2006/main">
+  <p:cSld>
+    <p:spTree>
+      <p:nvGrpSpPr>
+        <p:cNvPr id="1" name=""/>
+        <p:cNvGrpSpPr/>
+        <p:nvPr/>
+      </p:nvGrpSpPr>
+      <p:grpSpPr>
+        <a:xfrm>
+          <a:off x="0" y="0"/>
+          <a:ext cx="0" cy="0"/>
+          <a:chOff x="0" y="0"/>
+          <a:chExt cx="0" cy="0"/>
+        </a:xfrm>
+      </p:grpSpPr>
+      <p:sp>
+        <p:nvSpPr>
+          <p:cNvPr id="2" name="Slide Image Placeholder 1"/>
+          <p:cNvSpPr>
+            <a:spLocks noGrp="1" noRot="1" noChangeAspect="1"/>
+          </p:cNvSpPr>
+          <p:nvPr>
+            <p:ph type="sldImg"/>
+          </p:nvPr>
+        </p:nvSpPr>
+        <p:spPr/>
+      </p:sp>
+      <p:sp>
+        <p:nvSpPr>
+          <p:cNvPr id="3" name="Notes Placeholder 2"/>
+          <p:cNvSpPr>
+            <a:spLocks noGrp="1"/>
+          </p:cNvSpPr>
+          <p:nvPr>
+            <p:ph type="body" idx="1"/>
+          </p:nvPr>
+        </p:nvSpPr>
+        <p:spPr/>
+        <p:txBody>
+          <a:bodyPr/>
+          <a:lstStyle/>
+          <a:p>
+            <a:endParaRPr lang="en-US" dirty="0"/>
+          </a:p>
+        </p:txBody>
+      </p:sp>
+      <p:sp>
+        <p:nvSpPr>
+          <p:cNvPr id="4" name="Slide Number Placeholder 3"/>
+          <p:cNvSpPr>
+            <a:spLocks noGrp="1"/>
+          </p:cNvSpPr>
+          <p:nvPr>
+            <p:ph type="sldNum" sz="quarter" idx="10"/>
+          </p:nvPr>
+        </p:nvSpPr>
+        <p:spPr/>
+        <p:txBody>
+          <a:bodyPr/>
+          <a:lstStyle/>
+          <a:p>
+            <a:fld id="{9F9FB9DD-7CF9-4A0C-8C7F-91FD9EF34B36}" type="slidenum">
+              <a:rPr lang="en-US" smtClean="0"/>
+              <a:t>6</a:t>
+            </a:fld>
+            <a:endParaRPr lang="en-US" dirty="0"/>
+          </a:p>
+        </p:txBody>
+      </p:sp>
+    </p:spTree>
+    <p:extLst>
+      <p:ext uri="{BB962C8B-B14F-4D97-AF65-F5344CB8AC3E}">
+        <p14:creationId xmlns:p14="http://schemas.microsoft.com/office/powerpoint/2010/main" val="2110186832"/>
+      </p:ext>
+    </p:extLst>
+  </p:cSld>
+  <p:clrMapOvr>
+    <a:masterClrMapping/>
+  </p:clrMapOvr>
+</p:notes>
+</file>
+
+<file path=ppt/notesSlides/notesSlide5.xml><?xml version="1.0" encoding="utf-8"?>
+<p:notes xmlns:a="http://schemas.openxmlformats.org/drawingml/2006/main" xmlns:r="http://schemas.openxmlformats.org/officeDocument/2006/relationships" xmlns:p="http://schemas.openxmlformats.org/presentationml/2006/main">
+  <p:cSld>
+    <p:spTree>
+      <p:nvGrpSpPr>
+        <p:cNvPr id="1" name=""/>
+        <p:cNvGrpSpPr/>
+        <p:nvPr/>
+      </p:nvGrpSpPr>
+      <p:grpSpPr>
+        <a:xfrm>
+          <a:off x="0" y="0"/>
+          <a:ext cx="0" cy="0"/>
+          <a:chOff x="0" y="0"/>
+          <a:chExt cx="0" cy="0"/>
+        </a:xfrm>
+      </p:grpSpPr>
+      <p:sp>
+        <p:nvSpPr>
+          <p:cNvPr id="2" name="Slide Image Placeholder 1"/>
+          <p:cNvSpPr>
+            <a:spLocks noGrp="1" noRot="1" noChangeAspect="1"/>
+          </p:cNvSpPr>
+          <p:nvPr>
+            <p:ph type="sldImg"/>
+          </p:nvPr>
+        </p:nvSpPr>
+        <p:spPr/>
+      </p:sp>
+      <p:sp>
+        <p:nvSpPr>
+          <p:cNvPr id="3" name="Notes Placeholder 2"/>
+          <p:cNvSpPr>
+            <a:spLocks noGrp="1"/>
+          </p:cNvSpPr>
+          <p:nvPr>
+            <p:ph type="body" idx="1"/>
+          </p:nvPr>
+        </p:nvSpPr>
+        <p:spPr/>
+        <p:txBody>
+          <a:bodyPr/>
+          <a:lstStyle/>
+          <a:p>
+            <a:endParaRPr lang="en-US" dirty="0"/>
+          </a:p>
+        </p:txBody>
+      </p:sp>
+      <p:sp>
+        <p:nvSpPr>
+          <p:cNvPr id="4" name="Slide Number Placeholder 3"/>
+          <p:cNvSpPr>
+            <a:spLocks noGrp="1"/>
+          </p:cNvSpPr>
+          <p:nvPr>
+            <p:ph type="sldNum" sz="quarter" idx="10"/>
+          </p:nvPr>
+        </p:nvSpPr>
+        <p:spPr/>
+        <p:txBody>
+          <a:bodyPr/>
+          <a:lstStyle/>
+          <a:p>
+            <a:fld id="{9F9FB9DD-7CF9-4A0C-8C7F-91FD9EF34B36}" type="slidenum">
+              <a:rPr lang="en-US" smtClean="0"/>
+              <a:t>7</a:t>
+            </a:fld>
+            <a:endParaRPr lang="en-US" dirty="0"/>
+          </a:p>
+        </p:txBody>
+      </p:sp>
+    </p:spTree>
+    <p:extLst>
+      <p:ext uri="{BB962C8B-B14F-4D97-AF65-F5344CB8AC3E}">
+        <p14:creationId xmlns:p14="http://schemas.microsoft.com/office/powerpoint/2010/main" val="2110186832"/>
+      </p:ext>
+    </p:extLst>
+  </p:cSld>
+  <p:clrMapOvr>
+    <a:masterClrMapping/>
+  </p:clrMapOvr>
+</p:notes>
+</file>
+
+<file path=ppt/notesSlides/notesSlide6.xml><?xml version="1.0" encoding="utf-8"?>
+<p:notes xmlns:a="http://schemas.openxmlformats.org/drawingml/2006/main" xmlns:r="http://schemas.openxmlformats.org/officeDocument/2006/relationships" xmlns:p="http://schemas.openxmlformats.org/presentationml/2006/main">
+  <p:cSld>
+    <p:spTree>
+      <p:nvGrpSpPr>
+        <p:cNvPr id="1" name=""/>
+        <p:cNvGrpSpPr/>
+        <p:nvPr/>
+      </p:nvGrpSpPr>
+      <p:grpSpPr>
+        <a:xfrm>
+          <a:off x="0" y="0"/>
+          <a:ext cx="0" cy="0"/>
+          <a:chOff x="0" y="0"/>
+          <a:chExt cx="0" cy="0"/>
+        </a:xfrm>
+      </p:grpSpPr>
+      <p:sp>
+        <p:nvSpPr>
+          <p:cNvPr id="2" name="Slide Image Placeholder 1"/>
+          <p:cNvSpPr>
+            <a:spLocks noGrp="1" noRot="1" noChangeAspect="1"/>
+          </p:cNvSpPr>
+          <p:nvPr>
+            <p:ph type="sldImg"/>
+          </p:nvPr>
+        </p:nvSpPr>
+        <p:spPr/>
+      </p:sp>
+      <p:sp>
+        <p:nvSpPr>
+          <p:cNvPr id="3" name="Notes Placeholder 2"/>
+          <p:cNvSpPr>
+            <a:spLocks noGrp="1"/>
+          </p:cNvSpPr>
+          <p:nvPr>
+            <p:ph type="body" idx="1"/>
+          </p:nvPr>
+        </p:nvSpPr>
+        <p:spPr/>
+        <p:txBody>
+          <a:bodyPr/>
+          <a:lstStyle/>
+          <a:p>
+            <a:r>
+              <a:rPr lang="en-US" b="1" dirty="0" smtClean="0"/>
+              <a:t>component</a:t>
+            </a:r>
+            <a:r>
+              <a:rPr lang="en-US" dirty="0" smtClean="0"/>
+              <a:t> is a unit of software that is independently replaceable and upgradeable.</a:t>
+            </a:r>
+            <a:endParaRPr lang="en-US" dirty="0"/>
+          </a:p>
+        </p:txBody>
+      </p:sp>
+      <p:sp>
+        <p:nvSpPr>
+          <p:cNvPr id="4" name="Slide Number Placeholder 3"/>
+          <p:cNvSpPr>
+            <a:spLocks noGrp="1"/>
+          </p:cNvSpPr>
+          <p:nvPr>
+            <p:ph type="sldNum" sz="quarter" idx="10"/>
+          </p:nvPr>
+        </p:nvSpPr>
+        <p:spPr/>
+        <p:txBody>
+          <a:bodyPr/>
+          <a:lstStyle/>
+          <a:p>
+            <a:fld id="{9F9FB9DD-7CF9-4A0C-8C7F-91FD9EF34B36}" type="slidenum">
+              <a:rPr lang="en-US" smtClean="0"/>
+              <a:t>9</a:t>
+            </a:fld>
+            <a:endParaRPr lang="en-US" dirty="0"/>
+          </a:p>
+        </p:txBody>
+      </p:sp>
+    </p:spTree>
+    <p:extLst>
+      <p:ext uri="{BB962C8B-B14F-4D97-AF65-F5344CB8AC3E}">
+        <p14:creationId xmlns:p14="http://schemas.microsoft.com/office/powerpoint/2010/main" val="2056578434"/>
+      </p:ext>
+    </p:extLst>
+  </p:cSld>
+  <p:clrMapOvr>
+    <a:masterClrMapping/>
+  </p:clrMapOvr>
+</p:notes>
+</file>
+
+<file path=ppt/notesSlides/notesSlide7.xml><?xml version="1.0" encoding="utf-8"?>
+<p:notes xmlns:a="http://schemas.openxmlformats.org/drawingml/2006/main" xmlns:r="http://schemas.openxmlformats.org/officeDocument/2006/relationships" xmlns:p="http://schemas.openxmlformats.org/presentationml/2006/main">
+  <p:cSld>
+    <p:spTree>
+      <p:nvGrpSpPr>
+        <p:cNvPr id="1" name=""/>
+        <p:cNvGrpSpPr/>
+        <p:nvPr/>
+      </p:nvGrpSpPr>
+      <p:grpSpPr>
+        <a:xfrm>
+          <a:off x="0" y="0"/>
+          <a:ext cx="0" cy="0"/>
+          <a:chOff x="0" y="0"/>
+          <a:chExt cx="0" cy="0"/>
+        </a:xfrm>
+      </p:grpSpPr>
+      <p:sp>
+        <p:nvSpPr>
+          <p:cNvPr id="2" name="Slide Image Placeholder 1"/>
+          <p:cNvSpPr>
+            <a:spLocks noGrp="1" noRot="1" noChangeAspect="1"/>
+          </p:cNvSpPr>
+          <p:nvPr>
+            <p:ph type="sldImg"/>
+          </p:nvPr>
+        </p:nvSpPr>
+        <p:spPr/>
+      </p:sp>
+      <p:sp>
+        <p:nvSpPr>
+          <p:cNvPr id="3" name="Notes Placeholder 2"/>
+          <p:cNvSpPr>
+            <a:spLocks noGrp="1"/>
+          </p:cNvSpPr>
+          <p:nvPr>
+            <p:ph type="body" idx="1"/>
+          </p:nvPr>
+        </p:nvSpPr>
+        <p:spPr/>
+        <p:txBody>
+          <a:bodyPr/>
+          <a:lstStyle/>
+          <a:p>
+            <a:r>
+              <a:rPr lang="en-US" dirty="0" smtClean="0"/>
+              <a:t>Spring Boot makes it easy to create stand-alone, production-grade Spring based Applications that you can “just run”.  </a:t>
+            </a:r>
+          </a:p>
+          <a:p>
+            <a:endParaRPr lang="en-US" dirty="0" smtClean="0"/>
+          </a:p>
+          <a:p>
+            <a:r>
+              <a:rPr lang="en-US" dirty="0" smtClean="0"/>
+              <a:t>take an opinionated view</a:t>
+            </a:r>
+            <a:endParaRPr lang="en-US" dirty="0"/>
+          </a:p>
+        </p:txBody>
+      </p:sp>
+      <p:sp>
+        <p:nvSpPr>
+          <p:cNvPr id="4" name="Slide Number Placeholder 3"/>
+          <p:cNvSpPr>
+            <a:spLocks noGrp="1"/>
+          </p:cNvSpPr>
+          <p:nvPr>
+            <p:ph type="sldNum" sz="quarter" idx="10"/>
+          </p:nvPr>
+        </p:nvSpPr>
+        <p:spPr/>
+        <p:txBody>
+          <a:bodyPr/>
+          <a:lstStyle/>
+          <a:p>
+            <a:fld id="{9F9FB9DD-7CF9-4A0C-8C7F-91FD9EF34B36}" type="slidenum">
+              <a:rPr lang="en-US" smtClean="0"/>
+              <a:t>11</a:t>
+            </a:fld>
+            <a:endParaRPr lang="en-US" dirty="0"/>
+          </a:p>
+        </p:txBody>
+      </p:sp>
+    </p:spTree>
+    <p:extLst>
+      <p:ext uri="{BB962C8B-B14F-4D97-AF65-F5344CB8AC3E}">
+        <p14:creationId xmlns:p14="http://schemas.microsoft.com/office/powerpoint/2010/main" val="639032137"/>
+      </p:ext>
+    </p:extLst>
+  </p:cSld>
+  <p:clrMapOvr>
+    <a:masterClrMapping/>
+  </p:clrMapOvr>
+</p:notes>
+</file>
+
+<file path=ppt/notesSlides/notesSlide8.xml><?xml version="1.0" encoding="utf-8"?>
+<p:notes xmlns:a="http://schemas.openxmlformats.org/drawingml/2006/main" xmlns:r="http://schemas.openxmlformats.org/officeDocument/2006/relationships" xmlns:p="http://schemas.openxmlformats.org/presentationml/2006/main">
+  <p:cSld>
+    <p:spTree>
+      <p:nvGrpSpPr>
+        <p:cNvPr id="1" name=""/>
+        <p:cNvGrpSpPr/>
+        <p:nvPr/>
+      </p:nvGrpSpPr>
+      <p:grpSpPr>
+        <a:xfrm>
+          <a:off x="0" y="0"/>
+          <a:ext cx="0" cy="0"/>
+          <a:chOff x="0" y="0"/>
+          <a:chExt cx="0" cy="0"/>
+        </a:xfrm>
+      </p:grpSpPr>
+      <p:sp>
+        <p:nvSpPr>
+          <p:cNvPr id="2" name="Slide Image Placeholder 1"/>
+          <p:cNvSpPr>
+            <a:spLocks noGrp="1" noRot="1" noChangeAspect="1"/>
+          </p:cNvSpPr>
+          <p:nvPr>
+            <p:ph type="sldImg"/>
+          </p:nvPr>
+        </p:nvSpPr>
+        <p:spPr/>
+      </p:sp>
+      <p:sp>
+        <p:nvSpPr>
+          <p:cNvPr id="3" name="Notes Placeholder 2"/>
+          <p:cNvSpPr>
+            <a:spLocks noGrp="1"/>
+          </p:cNvSpPr>
+          <p:nvPr>
+            <p:ph type="body" idx="1"/>
+          </p:nvPr>
+        </p:nvSpPr>
+        <p:spPr/>
+        <p:txBody>
+          <a:bodyPr/>
+          <a:lstStyle/>
+          <a:p>
             <a:r>
               <a:rPr lang="en-US" dirty="0" smtClean="0"/>
               <a:t>Example:</a:t>
@@ -894,7 +1337,7 @@
           <a:p>
             <a:fld id="{9F9FB9DD-7CF9-4A0C-8C7F-91FD9EF34B36}" type="slidenum">
               <a:rPr lang="en-US" smtClean="0"/>
-              <a:t>8</a:t>
+              <a:t>12</a:t>
             </a:fld>
             <a:endParaRPr lang="en-US" dirty="0"/>
           </a:p>
@@ -1044,7 +1487,7 @@
           <a:p>
             <a:fld id="{F2C87F99-6566-47F3-94EA-E945E3B61FD1}" type="datetimeFigureOut">
               <a:rPr lang="en-US" smtClean="0"/>
-              <a:t>3/14/2015</a:t>
+              <a:t>3/15/2015</a:t>
             </a:fld>
             <a:endParaRPr lang="en-US" dirty="0"/>
           </a:p>
@@ -1214,7 +1657,7 @@
           <a:p>
             <a:fld id="{F2C87F99-6566-47F3-94EA-E945E3B61FD1}" type="datetimeFigureOut">
               <a:rPr lang="en-US" smtClean="0"/>
-              <a:t>3/14/2015</a:t>
+              <a:t>3/15/2015</a:t>
             </a:fld>
             <a:endParaRPr lang="en-US" dirty="0"/>
           </a:p>
@@ -1394,7 +1837,7 @@
           <a:p>
             <a:fld id="{F2C87F99-6566-47F3-94EA-E945E3B61FD1}" type="datetimeFigureOut">
               <a:rPr lang="en-US" smtClean="0"/>
-              <a:t>3/14/2015</a:t>
+              <a:t>3/15/2015</a:t>
             </a:fld>
             <a:endParaRPr lang="en-US" dirty="0"/>
           </a:p>
@@ -1564,7 +2007,7 @@
           <a:p>
             <a:fld id="{F2C87F99-6566-47F3-94EA-E945E3B61FD1}" type="datetimeFigureOut">
               <a:rPr lang="en-US" smtClean="0"/>
-              <a:t>3/14/2015</a:t>
+              <a:t>3/15/2015</a:t>
             </a:fld>
             <a:endParaRPr lang="en-US" dirty="0"/>
           </a:p>
@@ -1810,7 +2253,7 @@
           <a:p>
             <a:fld id="{F2C87F99-6566-47F3-94EA-E945E3B61FD1}" type="datetimeFigureOut">
               <a:rPr lang="en-US" smtClean="0"/>
-              <a:t>3/14/2015</a:t>
+              <a:t>3/15/2015</a:t>
             </a:fld>
             <a:endParaRPr lang="en-US" dirty="0"/>
           </a:p>
@@ -2042,7 +2485,7 @@
           <a:p>
             <a:fld id="{F2C87F99-6566-47F3-94EA-E945E3B61FD1}" type="datetimeFigureOut">
               <a:rPr lang="en-US" smtClean="0"/>
-              <a:t>3/14/2015</a:t>
+              <a:t>3/15/2015</a:t>
             </a:fld>
             <a:endParaRPr lang="en-US" dirty="0"/>
           </a:p>
@@ -2409,7 +2852,7 @@
           <a:p>
             <a:fld id="{F2C87F99-6566-47F3-94EA-E945E3B61FD1}" type="datetimeFigureOut">
               <a:rPr lang="en-US" smtClean="0"/>
-              <a:t>3/14/2015</a:t>
+              <a:t>3/15/2015</a:t>
             </a:fld>
             <a:endParaRPr lang="en-US" dirty="0"/>
           </a:p>
@@ -2527,7 +2970,7 @@
           <a:p>
             <a:fld id="{F2C87F99-6566-47F3-94EA-E945E3B61FD1}" type="datetimeFigureOut">
               <a:rPr lang="en-US" smtClean="0"/>
-              <a:t>3/14/2015</a:t>
+              <a:t>3/15/2015</a:t>
             </a:fld>
             <a:endParaRPr lang="en-US" dirty="0"/>
           </a:p>
@@ -2622,7 +3065,7 @@
           <a:p>
             <a:fld id="{F2C87F99-6566-47F3-94EA-E945E3B61FD1}" type="datetimeFigureOut">
               <a:rPr lang="en-US" smtClean="0"/>
-              <a:t>3/14/2015</a:t>
+              <a:t>3/15/2015</a:t>
             </a:fld>
             <a:endParaRPr lang="en-US" dirty="0"/>
           </a:p>
@@ -2899,7 +3342,7 @@
           <a:p>
             <a:fld id="{F2C87F99-6566-47F3-94EA-E945E3B61FD1}" type="datetimeFigureOut">
               <a:rPr lang="en-US" smtClean="0"/>
-              <a:t>3/14/2015</a:t>
+              <a:t>3/15/2015</a:t>
             </a:fld>
             <a:endParaRPr lang="en-US" dirty="0"/>
           </a:p>
@@ -3152,7 +3595,7 @@
           <a:p>
             <a:fld id="{F2C87F99-6566-47F3-94EA-E945E3B61FD1}" type="datetimeFigureOut">
               <a:rPr lang="en-US" smtClean="0"/>
-              <a:t>3/14/2015</a:t>
+              <a:t>3/15/2015</a:t>
             </a:fld>
             <a:endParaRPr lang="en-US" dirty="0"/>
           </a:p>
@@ -3365,7 +3808,7 @@
           <a:p>
             <a:fld id="{F2C87F99-6566-47F3-94EA-E945E3B61FD1}" type="datetimeFigureOut">
               <a:rPr lang="en-US" smtClean="0"/>
-              <a:t>3/14/2015</a:t>
+              <a:t>3/15/2015</a:t>
             </a:fld>
             <a:endParaRPr lang="en-US" dirty="0"/>
           </a:p>
@@ -3844,6 +4287,458 @@
 </p:sld>
 </file>
 
+<file path=ppt/slides/slide10.xml><?xml version="1.0" encoding="utf-8"?>
+<p:sld xmlns:a="http://schemas.openxmlformats.org/drawingml/2006/main" xmlns:r="http://schemas.openxmlformats.org/officeDocument/2006/relationships" xmlns:p="http://schemas.openxmlformats.org/presentationml/2006/main">
+  <p:cSld>
+    <p:spTree>
+      <p:nvGrpSpPr>
+        <p:cNvPr id="1" name=""/>
+        <p:cNvGrpSpPr/>
+        <p:nvPr/>
+      </p:nvGrpSpPr>
+      <p:grpSpPr>
+        <a:xfrm>
+          <a:off x="0" y="0"/>
+          <a:ext cx="0" cy="0"/>
+          <a:chOff x="0" y="0"/>
+          <a:chExt cx="0" cy="0"/>
+        </a:xfrm>
+      </p:grpSpPr>
+      <p:sp>
+        <p:nvSpPr>
+          <p:cNvPr id="2" name="Title 1"/>
+          <p:cNvSpPr>
+            <a:spLocks noGrp="1"/>
+          </p:cNvSpPr>
+          <p:nvPr>
+            <p:ph type="title"/>
+          </p:nvPr>
+        </p:nvSpPr>
+        <p:spPr/>
+        <p:txBody>
+          <a:bodyPr/>
+          <a:lstStyle/>
+          <a:p>
+            <a:r>
+              <a:rPr lang="en-US" dirty="0" smtClean="0"/>
+              <a:t>Spring Framework</a:t>
+            </a:r>
+            <a:endParaRPr lang="en-US" dirty="0"/>
+          </a:p>
+        </p:txBody>
+      </p:sp>
+      <p:sp>
+        <p:nvSpPr>
+          <p:cNvPr id="3" name="Content Placeholder 2"/>
+          <p:cNvSpPr>
+            <a:spLocks noGrp="1"/>
+          </p:cNvSpPr>
+          <p:nvPr>
+            <p:ph idx="1"/>
+          </p:nvPr>
+        </p:nvSpPr>
+        <p:spPr/>
+        <p:txBody>
+          <a:bodyPr>
+            <a:normAutofit/>
+          </a:bodyPr>
+          <a:lstStyle/>
+          <a:p>
+            <a:r>
+              <a:rPr lang="en-US" dirty="0" smtClean="0"/>
+              <a:t>REST principles</a:t>
+            </a:r>
+          </a:p>
+          <a:p>
+            <a:endParaRPr lang="en-US" dirty="0" smtClean="0"/>
+          </a:p>
+          <a:p>
+            <a:endParaRPr lang="en-US" dirty="0"/>
+          </a:p>
+        </p:txBody>
+      </p:sp>
+    </p:spTree>
+    <p:extLst>
+      <p:ext uri="{BB962C8B-B14F-4D97-AF65-F5344CB8AC3E}">
+        <p14:creationId xmlns:p14="http://schemas.microsoft.com/office/powerpoint/2010/main" val="2201538371"/>
+      </p:ext>
+    </p:extLst>
+  </p:cSld>
+  <p:clrMapOvr>
+    <a:masterClrMapping/>
+  </p:clrMapOvr>
+</p:sld>
+</file>
+
+<file path=ppt/slides/slide11.xml><?xml version="1.0" encoding="utf-8"?>
+<p:sld xmlns:a="http://schemas.openxmlformats.org/drawingml/2006/main" xmlns:r="http://schemas.openxmlformats.org/officeDocument/2006/relationships" xmlns:p="http://schemas.openxmlformats.org/presentationml/2006/main">
+  <p:cSld>
+    <p:spTree>
+      <p:nvGrpSpPr>
+        <p:cNvPr id="1" name=""/>
+        <p:cNvGrpSpPr/>
+        <p:nvPr/>
+      </p:nvGrpSpPr>
+      <p:grpSpPr>
+        <a:xfrm>
+          <a:off x="0" y="0"/>
+          <a:ext cx="0" cy="0"/>
+          <a:chOff x="0" y="0"/>
+          <a:chExt cx="0" cy="0"/>
+        </a:xfrm>
+      </p:grpSpPr>
+      <p:sp>
+        <p:nvSpPr>
+          <p:cNvPr id="2" name="Title 1"/>
+          <p:cNvSpPr>
+            <a:spLocks noGrp="1"/>
+          </p:cNvSpPr>
+          <p:nvPr>
+            <p:ph type="title"/>
+          </p:nvPr>
+        </p:nvSpPr>
+        <p:spPr/>
+        <p:txBody>
+          <a:bodyPr/>
+          <a:lstStyle/>
+          <a:p>
+            <a:endParaRPr lang="en-US" dirty="0"/>
+          </a:p>
+        </p:txBody>
+      </p:sp>
+      <p:sp>
+        <p:nvSpPr>
+          <p:cNvPr id="3" name="Content Placeholder 2"/>
+          <p:cNvSpPr>
+            <a:spLocks noGrp="1"/>
+          </p:cNvSpPr>
+          <p:nvPr>
+            <p:ph idx="1"/>
+          </p:nvPr>
+        </p:nvSpPr>
+        <p:spPr/>
+        <p:txBody>
+          <a:bodyPr>
+            <a:normAutofit/>
+          </a:bodyPr>
+          <a:lstStyle/>
+          <a:p>
+            <a:pPr marL="0" indent="0">
+              <a:buNone/>
+            </a:pPr>
+            <a:endParaRPr lang="en-US" dirty="0" smtClean="0"/>
+          </a:p>
+          <a:p>
+            <a:pPr marL="0" indent="0">
+              <a:buNone/>
+            </a:pPr>
+            <a:endParaRPr lang="en-US" dirty="0"/>
+          </a:p>
+          <a:p>
+            <a:pPr marL="0" indent="0">
+              <a:buNone/>
+            </a:pPr>
+            <a:endParaRPr lang="en-US" dirty="0" smtClean="0"/>
+          </a:p>
+          <a:p>
+            <a:pPr marL="0" indent="0">
+              <a:buNone/>
+            </a:pPr>
+            <a:r>
+              <a:rPr lang="en-US" dirty="0" smtClean="0"/>
+              <a:t>Primary goals:</a:t>
+            </a:r>
+          </a:p>
+          <a:p>
+            <a:r>
+              <a:rPr lang="en-US" dirty="0" smtClean="0">
+                <a:effectLst/>
+              </a:rPr>
+              <a:t>Rapid development</a:t>
+            </a:r>
+          </a:p>
+          <a:p>
+            <a:r>
+              <a:rPr lang="en-US" dirty="0" smtClean="0">
+                <a:effectLst/>
+              </a:rPr>
+              <a:t>Opinionated out of the box</a:t>
+            </a:r>
+          </a:p>
+          <a:p>
+            <a:r>
+              <a:rPr lang="en-US" dirty="0" smtClean="0">
+                <a:effectLst/>
+              </a:rPr>
+              <a:t>Provide a range of non-functional features</a:t>
+            </a:r>
+          </a:p>
+          <a:p>
+            <a:r>
+              <a:rPr lang="en-US" dirty="0" smtClean="0">
+                <a:effectLst/>
+              </a:rPr>
+              <a:t>No requirement for XML configuration.</a:t>
+            </a:r>
+          </a:p>
+          <a:p>
+            <a:endParaRPr lang="en-US" dirty="0"/>
+          </a:p>
+        </p:txBody>
+      </p:sp>
+      <p:pic>
+        <p:nvPicPr>
+          <p:cNvPr id="4" name="Picture 3"/>
+          <p:cNvPicPr>
+            <a:picLocks noChangeAspect="1"/>
+          </p:cNvPicPr>
+          <p:nvPr/>
+        </p:nvPicPr>
+        <p:blipFill>
+          <a:blip r:embed="rId3"/>
+          <a:stretch>
+            <a:fillRect/>
+          </a:stretch>
+        </p:blipFill>
+        <p:spPr>
+          <a:xfrm>
+            <a:off x="733425" y="365125"/>
+            <a:ext cx="10620375" cy="2324100"/>
+          </a:xfrm>
+          <a:prstGeom prst="rect">
+            <a:avLst/>
+          </a:prstGeom>
+        </p:spPr>
+      </p:pic>
+    </p:spTree>
+    <p:extLst>
+      <p:ext uri="{BB962C8B-B14F-4D97-AF65-F5344CB8AC3E}">
+        <p14:creationId xmlns:p14="http://schemas.microsoft.com/office/powerpoint/2010/main" val="1278708812"/>
+      </p:ext>
+    </p:extLst>
+  </p:cSld>
+  <p:clrMapOvr>
+    <a:masterClrMapping/>
+  </p:clrMapOvr>
+</p:sld>
+</file>
+
+<file path=ppt/slides/slide12.xml><?xml version="1.0" encoding="utf-8"?>
+<p:sld xmlns:a="http://schemas.openxmlformats.org/drawingml/2006/main" xmlns:r="http://schemas.openxmlformats.org/officeDocument/2006/relationships" xmlns:p="http://schemas.openxmlformats.org/presentationml/2006/main">
+  <p:cSld>
+    <p:spTree>
+      <p:nvGrpSpPr>
+        <p:cNvPr id="1" name=""/>
+        <p:cNvGrpSpPr/>
+        <p:nvPr/>
+      </p:nvGrpSpPr>
+      <p:grpSpPr>
+        <a:xfrm>
+          <a:off x="0" y="0"/>
+          <a:ext cx="0" cy="0"/>
+          <a:chOff x="0" y="0"/>
+          <a:chExt cx="0" cy="0"/>
+        </a:xfrm>
+      </p:grpSpPr>
+      <p:sp>
+        <p:nvSpPr>
+          <p:cNvPr id="2" name="Title 1"/>
+          <p:cNvSpPr>
+            <a:spLocks noGrp="1"/>
+          </p:cNvSpPr>
+          <p:nvPr>
+            <p:ph type="title"/>
+          </p:nvPr>
+        </p:nvSpPr>
+        <p:spPr/>
+        <p:txBody>
+          <a:bodyPr/>
+          <a:lstStyle/>
+          <a:p>
+            <a:r>
+              <a:rPr lang="en-US" dirty="0" smtClean="0"/>
+              <a:t>Convention over Configuration</a:t>
+            </a:r>
+            <a:endParaRPr lang="en-US" dirty="0"/>
+          </a:p>
+        </p:txBody>
+      </p:sp>
+      <p:sp>
+        <p:nvSpPr>
+          <p:cNvPr id="3" name="Content Placeholder 2"/>
+          <p:cNvSpPr>
+            <a:spLocks noGrp="1"/>
+          </p:cNvSpPr>
+          <p:nvPr>
+            <p:ph idx="1"/>
+          </p:nvPr>
+        </p:nvSpPr>
+        <p:spPr/>
+        <p:txBody>
+          <a:bodyPr>
+            <a:normAutofit/>
+          </a:bodyPr>
+          <a:lstStyle/>
+          <a:p>
+            <a:pPr marL="0" indent="0">
+              <a:buNone/>
+            </a:pPr>
+            <a:endParaRPr lang="en-US" dirty="0" smtClean="0"/>
+          </a:p>
+          <a:p>
+            <a:r>
+              <a:rPr lang="en-US" dirty="0" smtClean="0"/>
+              <a:t>DRY Principle – Do not repeat yourself!</a:t>
+            </a:r>
+          </a:p>
+          <a:p>
+            <a:r>
+              <a:rPr lang="en-US" smtClean="0"/>
+              <a:t>Start with </a:t>
+            </a:r>
+            <a:r>
+              <a:rPr lang="en-US" dirty="0" smtClean="0"/>
+              <a:t>sensible defaults</a:t>
+            </a:r>
+          </a:p>
+          <a:p>
+            <a:r>
+              <a:rPr lang="en-US" dirty="0" smtClean="0"/>
+              <a:t>You should only have to configure something to use it for customization (non default setting).</a:t>
+            </a:r>
+          </a:p>
+          <a:p>
+            <a:pPr marL="0" indent="0">
+              <a:buNone/>
+            </a:pPr>
+            <a:endParaRPr lang="en-US" dirty="0" smtClean="0"/>
+          </a:p>
+          <a:p>
+            <a:pPr marL="0" indent="0">
+              <a:buNone/>
+            </a:pPr>
+            <a:r>
+              <a:rPr lang="en-US" dirty="0" smtClean="0"/>
+              <a:t>Example: Did you include </a:t>
+            </a:r>
+            <a:r>
+              <a:rPr lang="en-US" dirty="0" err="1"/>
+              <a:t>L</a:t>
+            </a:r>
+            <a:r>
+              <a:rPr lang="en-US" dirty="0" err="1" smtClean="0"/>
+              <a:t>ogback</a:t>
+            </a:r>
+            <a:r>
+              <a:rPr lang="en-US" dirty="0" smtClean="0"/>
+              <a:t> in the </a:t>
+            </a:r>
+            <a:r>
+              <a:rPr lang="en-US" dirty="0" err="1" smtClean="0"/>
+              <a:t>classpath</a:t>
+            </a:r>
+            <a:r>
+              <a:rPr lang="en-US" dirty="0" smtClean="0"/>
+              <a:t>? Spring Boot will assume that you want to use it and will attempt to configure it. </a:t>
+            </a:r>
+          </a:p>
+          <a:p>
+            <a:pPr marL="0" indent="0">
+              <a:buNone/>
+            </a:pPr>
+            <a:endParaRPr lang="en-US" dirty="0"/>
+          </a:p>
+        </p:txBody>
+      </p:sp>
+    </p:spTree>
+    <p:extLst>
+      <p:ext uri="{BB962C8B-B14F-4D97-AF65-F5344CB8AC3E}">
+        <p14:creationId xmlns:p14="http://schemas.microsoft.com/office/powerpoint/2010/main" val="3682208326"/>
+      </p:ext>
+    </p:extLst>
+  </p:cSld>
+  <p:clrMapOvr>
+    <a:masterClrMapping/>
+  </p:clrMapOvr>
+</p:sld>
+</file>
+
+<file path=ppt/slides/slide13.xml><?xml version="1.0" encoding="utf-8"?>
+<p:sld xmlns:a="http://schemas.openxmlformats.org/drawingml/2006/main" xmlns:r="http://schemas.openxmlformats.org/officeDocument/2006/relationships" xmlns:p="http://schemas.openxmlformats.org/presentationml/2006/main">
+  <p:cSld>
+    <p:spTree>
+      <p:nvGrpSpPr>
+        <p:cNvPr id="1" name=""/>
+        <p:cNvGrpSpPr/>
+        <p:nvPr/>
+      </p:nvGrpSpPr>
+      <p:grpSpPr>
+        <a:xfrm>
+          <a:off x="0" y="0"/>
+          <a:ext cx="0" cy="0"/>
+          <a:chOff x="0" y="0"/>
+          <a:chExt cx="0" cy="0"/>
+        </a:xfrm>
+      </p:grpSpPr>
+      <p:sp>
+        <p:nvSpPr>
+          <p:cNvPr id="2" name="Title 1"/>
+          <p:cNvSpPr>
+            <a:spLocks noGrp="1"/>
+          </p:cNvSpPr>
+          <p:nvPr>
+            <p:ph type="title"/>
+          </p:nvPr>
+        </p:nvSpPr>
+        <p:spPr/>
+        <p:txBody>
+          <a:bodyPr/>
+          <a:lstStyle/>
+          <a:p>
+            <a:r>
+              <a:rPr lang="en-US" dirty="0" smtClean="0"/>
+              <a:t>Hello world </a:t>
+            </a:r>
+            <a:r>
+              <a:rPr lang="en-US" smtClean="0"/>
+              <a:t>with Spring Boot</a:t>
+            </a:r>
+            <a:endParaRPr lang="en-US"/>
+          </a:p>
+        </p:txBody>
+      </p:sp>
+      <p:sp>
+        <p:nvSpPr>
+          <p:cNvPr id="3" name="Content Placeholder 2"/>
+          <p:cNvSpPr>
+            <a:spLocks noGrp="1"/>
+          </p:cNvSpPr>
+          <p:nvPr>
+            <p:ph idx="1"/>
+          </p:nvPr>
+        </p:nvSpPr>
+        <p:spPr/>
+        <p:txBody>
+          <a:bodyPr/>
+          <a:lstStyle/>
+          <a:p>
+            <a:endParaRPr lang="en-US"/>
+          </a:p>
+        </p:txBody>
+      </p:sp>
+    </p:spTree>
+    <p:extLst>
+      <p:ext uri="{BB962C8B-B14F-4D97-AF65-F5344CB8AC3E}">
+        <p14:creationId xmlns:p14="http://schemas.microsoft.com/office/powerpoint/2010/main" val="2043375816"/>
+      </p:ext>
+    </p:extLst>
+  </p:cSld>
+  <p:clrMapOvr>
+    <a:masterClrMapping/>
+  </p:clrMapOvr>
+</p:sld>
+</file>
+
 <file path=ppt/slides/slide2.xml><?xml version="1.0" encoding="utf-8"?>
 <p:sld xmlns:a="http://schemas.openxmlformats.org/drawingml/2006/main" xmlns:r="http://schemas.openxmlformats.org/officeDocument/2006/relationships" xmlns:p="http://schemas.openxmlformats.org/presentationml/2006/main">
   <p:cSld>
@@ -4014,7 +4909,35 @@
           <a:p>
             <a:r>
               <a:rPr lang="en-US" dirty="0" smtClean="0"/>
-              <a:t>REST architectural style</a:t>
+              <a:t>REST </a:t>
+            </a:r>
+            <a:r>
+              <a:rPr lang="en-US" dirty="0" smtClean="0"/>
+              <a:t>– </a:t>
+            </a:r>
+            <a:r>
+              <a:rPr lang="en-US" b="1" dirty="0"/>
+              <a:t>Re</a:t>
+            </a:r>
+            <a:r>
+              <a:rPr lang="en-US" dirty="0"/>
+              <a:t>presentational </a:t>
+            </a:r>
+            <a:r>
+              <a:rPr lang="en-US" b="1" dirty="0"/>
+              <a:t>S</a:t>
+            </a:r>
+            <a:r>
+              <a:rPr lang="en-US" dirty="0"/>
+              <a:t>tate </a:t>
+            </a:r>
+            <a:r>
+              <a:rPr lang="en-US" b="1" dirty="0"/>
+              <a:t>T</a:t>
+            </a:r>
+            <a:r>
+              <a:rPr lang="en-US" dirty="0"/>
+              <a:t>ransfer</a:t>
             </a:r>
             <a:endParaRPr lang="en-US" dirty="0"/>
           </a:p>
@@ -4030,23 +4953,102 @@
             <p:ph idx="1"/>
           </p:nvPr>
         </p:nvSpPr>
-        <p:spPr/>
+        <p:spPr>
+          <a:xfrm>
+            <a:off x="838200" y="1287887"/>
+            <a:ext cx="11023242" cy="4889076"/>
+          </a:xfrm>
+        </p:spPr>
         <p:txBody>
           <a:bodyPr>
             <a:normAutofit/>
           </a:bodyPr>
           <a:lstStyle/>
           <a:p>
+            <a:pPr marL="0" indent="0">
+              <a:buNone/>
+            </a:pPr>
+            <a:endParaRPr lang="en-US" b="1" dirty="0" smtClean="0"/>
+          </a:p>
+          <a:p>
             <a:r>
               <a:rPr lang="en-US" dirty="0" smtClean="0"/>
-              <a:t>REST principles</a:t>
-            </a:r>
-          </a:p>
-          <a:p>
-            <a:endParaRPr lang="en-US" dirty="0" smtClean="0"/>
-          </a:p>
-          <a:p>
-            <a:endParaRPr lang="en-US" dirty="0"/>
+              <a:t>Introduced in Roy Fielding’s dissertation submitted to UC, Irvine in 2000</a:t>
+            </a:r>
+          </a:p>
+          <a:p>
+            <a:r>
+              <a:rPr lang="en-US" dirty="0" smtClean="0"/>
+              <a:t>It’s an </a:t>
+            </a:r>
+            <a:r>
+              <a:rPr lang="en-US" dirty="0"/>
+              <a:t>architecture style for designing networked applications</a:t>
+            </a:r>
+            <a:r>
+              <a:rPr lang="en-US" dirty="0" smtClean="0"/>
+              <a:t>. It’s not a protocol, standard or a framework</a:t>
+            </a:r>
+          </a:p>
+          <a:p>
+            <a:r>
+              <a:rPr lang="en-US" dirty="0" smtClean="0"/>
+              <a:t>Resource-based – REST API is all about “things” or “resources” as opposed to “actions” (as verbs/methods/actions  in SOAP)</a:t>
+            </a:r>
+          </a:p>
+          <a:p>
+            <a:r>
+              <a:rPr lang="en-US" dirty="0" smtClean="0"/>
+              <a:t>Representations – Typically JSON/XML or could be anything that represents a part or the whole of the resource state</a:t>
+            </a:r>
+          </a:p>
+        </p:txBody>
+      </p:sp>
+      <p:sp>
+        <p:nvSpPr>
+          <p:cNvPr id="4" name="TextBox 3"/>
+          <p:cNvSpPr txBox="1"/>
+          <p:nvPr/>
+        </p:nvSpPr>
+        <p:spPr>
+          <a:xfrm>
+            <a:off x="914400" y="6284889"/>
+            <a:ext cx="3515932" cy="276999"/>
+          </a:xfrm>
+          <a:prstGeom prst="rect">
+            <a:avLst/>
+          </a:prstGeom>
+          <a:noFill/>
+        </p:spPr>
+        <p:txBody>
+          <a:bodyPr wrap="square" rtlCol="0">
+            <a:spAutoFit/>
+          </a:bodyPr>
+          <a:lstStyle/>
+          <a:p>
+            <a:r>
+              <a:rPr lang="en-US" sz="1200" i="1" dirty="0" smtClean="0"/>
+              <a:t>Ref</a:t>
+            </a:r>
+            <a:r>
+              <a:rPr lang="en-US" sz="1200" i="1" dirty="0" smtClean="0">
+                <a:hlinkClick r:id="rId3"/>
+              </a:rPr>
+              <a:t>: </a:t>
+            </a:r>
+            <a:r>
+              <a:rPr lang="en-US" sz="1200" i="1" dirty="0" smtClean="0">
+                <a:hlinkClick r:id="rId4"/>
+              </a:rPr>
+              <a:t>What is REST anyway? – Todd </a:t>
+            </a:r>
+            <a:r>
+              <a:rPr lang="en-US" sz="1200" i="1" dirty="0" err="1" smtClean="0">
+                <a:hlinkClick r:id="rId4"/>
+              </a:rPr>
+              <a:t>Fredrich</a:t>
+            </a:r>
+            <a:endParaRPr lang="en-US" sz="1200" i="1" dirty="0"/>
           </a:p>
         </p:txBody>
       </p:sp>
@@ -4097,7 +5099,15 @@
           <a:p>
             <a:r>
               <a:rPr lang="en-US" dirty="0" smtClean="0"/>
-              <a:t>Micro-services architectural style</a:t>
+              <a:t>REST </a:t>
+            </a:r>
+            <a:r>
+              <a:rPr lang="en-US" dirty="0" smtClean="0"/>
+              <a:t>– </a:t>
+            </a:r>
+            <a:r>
+              <a:rPr lang="en-US" b="1" dirty="0" smtClean="0"/>
+              <a:t>Constraints</a:t>
             </a:r>
             <a:endParaRPr lang="en-US" dirty="0"/>
           </a:p>
@@ -4113,43 +5123,205 @@
             <p:ph idx="1"/>
           </p:nvPr>
         </p:nvSpPr>
-        <p:spPr/>
+        <p:spPr>
+          <a:xfrm>
+            <a:off x="838199" y="1287887"/>
+            <a:ext cx="10881575" cy="4889076"/>
+          </a:xfrm>
+        </p:spPr>
         <p:txBody>
           <a:bodyPr>
-            <a:normAutofit/>
+            <a:normAutofit fontScale="92500" lnSpcReduction="10000"/>
           </a:bodyPr>
           <a:lstStyle/>
           <a:p>
-            <a:pPr marL="0" indent="0" algn="ctr">
+            <a:pPr marL="0" indent="0">
               <a:buNone/>
             </a:pPr>
-            <a:r>
-              <a:rPr lang="en-US" i="1" dirty="0" smtClean="0"/>
-              <a:t>Developing a single application as a suite of small services, each running in its own process and communicating with lightweight mechanisms, often an HTTP resource API. </a:t>
-            </a:r>
-          </a:p>
-          <a:p>
+            <a:endParaRPr lang="en-US" b="1" dirty="0" smtClean="0"/>
+          </a:p>
+          <a:p>
+            <a:r>
+              <a:rPr lang="en-US" dirty="0" smtClean="0"/>
+              <a:t>Constraints:</a:t>
+            </a:r>
+          </a:p>
+          <a:p>
+            <a:pPr lvl="1"/>
+            <a:r>
+              <a:rPr lang="en-US" b="1" dirty="0" smtClean="0"/>
+              <a:t>Uniform interface </a:t>
+            </a:r>
+            <a:r>
+              <a:rPr lang="en-US" dirty="0" smtClean="0"/>
+              <a:t>– Decouple client/server implementations using Standards . Interface is standardized across all components through principle of “generality” (Example: Use URIs to identify resources, HTTP methods for manipulation, self descriptive messages to client and </a:t>
+            </a:r>
+            <a:r>
+              <a:rPr lang="en-US" dirty="0"/>
+              <a:t>Hypermedia as the engine of application </a:t>
+            </a:r>
+            <a:r>
+              <a:rPr lang="en-US" dirty="0" smtClean="0"/>
+              <a:t>state </a:t>
+            </a:r>
+            <a:r>
+              <a:rPr lang="en-US" dirty="0" err="1" smtClean="0"/>
+              <a:t>i.e</a:t>
+            </a:r>
+            <a:r>
+              <a:rPr lang="en-US" dirty="0" smtClean="0"/>
+              <a:t> HATEOAS)</a:t>
+            </a:r>
+          </a:p>
+          <a:p>
+            <a:pPr lvl="1"/>
+            <a:r>
+              <a:rPr lang="en-US" b="1" dirty="0" smtClean="0"/>
+              <a:t>Stateless</a:t>
+            </a:r>
+            <a:r>
+              <a:rPr lang="en-US" dirty="0" smtClean="0"/>
+              <a:t> – Server maintains no client state (</a:t>
+            </a:r>
+            <a:r>
+              <a:rPr lang="en-US" dirty="0" smtClean="0"/>
+              <a:t>Each message has enough info/context for the server to process a message)</a:t>
+            </a:r>
             <a:endParaRPr lang="en-US" dirty="0" smtClean="0"/>
           </a:p>
           <a:p>
-            <a:endParaRPr lang="en-US" dirty="0"/>
-          </a:p>
-          <a:p>
-            <a:pPr marL="0" indent="0">
-              <a:buNone/>
-            </a:pPr>
+            <a:pPr lvl="1"/>
+            <a:r>
+              <a:rPr lang="en-US" b="1" dirty="0" smtClean="0"/>
+              <a:t>Client-server </a:t>
+            </a:r>
             <a:r>
               <a:rPr lang="en-US" dirty="0" smtClean="0"/>
-              <a:t>Reference: http://martinfowler.com/articles/microservices.html</a:t>
-            </a:r>
-            <a:endParaRPr lang="en-US" dirty="0"/>
+              <a:t>– Separation of concerns and a Uniform interface is the link</a:t>
+            </a:r>
+          </a:p>
+          <a:p>
+            <a:pPr lvl="1"/>
+            <a:r>
+              <a:rPr lang="en-US" b="1" dirty="0" smtClean="0"/>
+              <a:t>Cacheable</a:t>
+            </a:r>
+            <a:r>
+              <a:rPr lang="en-US" dirty="0" smtClean="0"/>
+              <a:t> –Server responses are Cacheable where appropriate to counter network latency/performance issues. Could be implicit/explicit/pre-negotiated</a:t>
+            </a:r>
+          </a:p>
+          <a:p>
+            <a:pPr lvl="1"/>
+            <a:r>
+              <a:rPr lang="en-US" b="1" dirty="0" smtClean="0"/>
+              <a:t>Layered system </a:t>
+            </a:r>
+            <a:r>
+              <a:rPr lang="en-US" dirty="0" smtClean="0"/>
+              <a:t>– Components are layered. </a:t>
+            </a:r>
+          </a:p>
+          <a:p>
+            <a:pPr lvl="1"/>
+            <a:r>
+              <a:rPr lang="en-US" b="1" dirty="0" smtClean="0"/>
+              <a:t>Code on demand (</a:t>
+            </a:r>
+            <a:r>
+              <a:rPr lang="en-US" dirty="0" smtClean="0"/>
+              <a:t>Optional</a:t>
+            </a:r>
+            <a:r>
+              <a:rPr lang="en-US" b="1" dirty="0" smtClean="0"/>
+              <a:t>)– </a:t>
+            </a:r>
+            <a:r>
+              <a:rPr lang="en-US" dirty="0" smtClean="0"/>
+              <a:t>Service can temporarily extend client like Java applets, Executable </a:t>
+            </a:r>
+            <a:r>
+              <a:rPr lang="en-US" dirty="0" err="1" smtClean="0"/>
+              <a:t>javascript</a:t>
+            </a:r>
+            <a:r>
+              <a:rPr lang="en-US" dirty="0" smtClean="0"/>
+              <a:t> snippets etc.</a:t>
+            </a:r>
+            <a:endParaRPr lang="en-US" b="1" dirty="0"/>
+          </a:p>
+        </p:txBody>
+      </p:sp>
+      <p:sp>
+        <p:nvSpPr>
+          <p:cNvPr id="4" name="TextBox 3"/>
+          <p:cNvSpPr txBox="1"/>
+          <p:nvPr/>
+        </p:nvSpPr>
+        <p:spPr>
+          <a:xfrm>
+            <a:off x="914400" y="6284889"/>
+            <a:ext cx="8667482" cy="461665"/>
+          </a:xfrm>
+          <a:prstGeom prst="rect">
+            <a:avLst/>
+          </a:prstGeom>
+          <a:noFill/>
+        </p:spPr>
+        <p:txBody>
+          <a:bodyPr wrap="square" rtlCol="0">
+            <a:spAutoFit/>
+          </a:bodyPr>
+          <a:lstStyle/>
+          <a:p>
+            <a:r>
+              <a:rPr lang="en-US" sz="1200" i="1" dirty="0" smtClean="0"/>
+              <a:t>Ref</a:t>
+            </a:r>
+            <a:r>
+              <a:rPr lang="en-US" sz="1200" i="1" dirty="0" smtClean="0">
+                <a:hlinkClick r:id="rId3"/>
+              </a:rPr>
+              <a:t>: </a:t>
+            </a:r>
+            <a:r>
+              <a:rPr lang="en-US" sz="1200" i="1" dirty="0" smtClean="0">
+                <a:hlinkClick r:id="rId4"/>
+              </a:rPr>
+              <a:t>What is REST anyway? – Todd </a:t>
+            </a:r>
+            <a:r>
+              <a:rPr lang="en-US" sz="1200" i="1" dirty="0" err="1" smtClean="0">
+                <a:hlinkClick r:id="rId4"/>
+              </a:rPr>
+              <a:t>Fredrich</a:t>
+            </a:r>
+            <a:r>
+              <a:rPr lang="en-US" sz="1200" i="1" dirty="0" smtClean="0"/>
+              <a:t>, </a:t>
+            </a:r>
+          </a:p>
+          <a:p>
+            <a:r>
+              <a:rPr lang="en-US" sz="1200" i="1" dirty="0" smtClean="0">
+                <a:hlinkClick r:id="rId5"/>
+              </a:rPr>
+              <a:t>REST – </a:t>
+            </a:r>
+            <a:r>
+              <a:rPr lang="en-US" sz="1200" i="1" dirty="0" smtClean="0">
+                <a:hlinkClick r:id="rId5"/>
+              </a:rPr>
+              <a:t>What is meant by uniform interface</a:t>
+            </a:r>
+            <a:endParaRPr lang="en-US" sz="1200" i="1" dirty="0"/>
           </a:p>
         </p:txBody>
       </p:sp>
     </p:spTree>
     <p:extLst>
       <p:ext uri="{BB962C8B-B14F-4D97-AF65-F5344CB8AC3E}">
-        <p14:creationId xmlns:p14="http://schemas.microsoft.com/office/powerpoint/2010/main" val="1433475006"/>
+        <p14:creationId xmlns:p14="http://schemas.microsoft.com/office/powerpoint/2010/main" val="1072542201"/>
       </p:ext>
     </p:extLst>
   </p:cSld>
@@ -4193,122 +5365,76 @@
           <a:p>
             <a:r>
               <a:rPr lang="en-US" dirty="0" smtClean="0"/>
-              <a:t>Micro-services architectural style</a:t>
-            </a:r>
-            <a:endParaRPr lang="en-US" dirty="0"/>
-          </a:p>
-        </p:txBody>
-      </p:sp>
-      <p:sp>
-        <p:nvSpPr>
-          <p:cNvPr id="3" name="Content Placeholder 2"/>
-          <p:cNvSpPr>
-            <a:spLocks noGrp="1"/>
-          </p:cNvSpPr>
+              <a:t>REST </a:t>
+            </a:r>
+            <a:r>
+              <a:rPr lang="en-US" dirty="0" smtClean="0"/>
+              <a:t>– Richardson’s Maturity Model</a:t>
+            </a:r>
+            <a:endParaRPr lang="en-US" dirty="0"/>
+          </a:p>
+        </p:txBody>
+      </p:sp>
+      <p:pic>
+        <p:nvPicPr>
+          <p:cNvPr id="1026" name="Picture 2"/>
+          <p:cNvPicPr>
+            <a:picLocks noGrp="1" noChangeAspect="1" noChangeArrowheads="1"/>
+          </p:cNvPicPr>
           <p:nvPr>
             <p:ph idx="1"/>
           </p:nvPr>
-        </p:nvSpPr>
-        <p:spPr/>
-        <p:txBody>
-          <a:bodyPr>
-            <a:normAutofit fontScale="55000" lnSpcReduction="20000"/>
-          </a:bodyPr>
-          <a:lstStyle/>
-          <a:p>
-            <a:pPr marL="0" indent="0">
-              <a:buNone/>
-            </a:pPr>
-            <a:r>
-              <a:rPr lang="en-US" dirty="0" smtClean="0"/>
-              <a:t>Characteristics:</a:t>
-            </a:r>
-          </a:p>
-          <a:p>
-            <a:r>
-              <a:rPr lang="en-US" b="1" dirty="0" smtClean="0"/>
-              <a:t>Componentization via Services</a:t>
-            </a:r>
-          </a:p>
-          <a:p>
-            <a:r>
-              <a:rPr lang="en-US" b="1" dirty="0" smtClean="0"/>
-              <a:t>Organized around Business Capabilities</a:t>
-            </a:r>
-          </a:p>
-          <a:p>
-            <a:r>
-              <a:rPr lang="en-US" b="1" dirty="0" smtClean="0"/>
-              <a:t>Products not Projects</a:t>
-            </a:r>
-          </a:p>
-          <a:p>
-            <a:r>
-              <a:rPr lang="en-US" b="1" dirty="0" smtClean="0"/>
-              <a:t>Smart endpoints and dumb pipes</a:t>
-            </a:r>
-          </a:p>
-          <a:p>
-            <a:r>
-              <a:rPr lang="en-US" b="1" dirty="0" smtClean="0"/>
-              <a:t>Decentralized Governance</a:t>
-            </a:r>
-          </a:p>
-          <a:p>
-            <a:r>
-              <a:rPr lang="en-US" b="1" dirty="0" smtClean="0"/>
-              <a:t>Decentralized Data Management</a:t>
-            </a:r>
-          </a:p>
-          <a:p>
-            <a:r>
-              <a:rPr lang="en-US" b="1" dirty="0" smtClean="0"/>
-              <a:t>Infrastructure Automation</a:t>
-            </a:r>
-          </a:p>
-          <a:p>
-            <a:r>
-              <a:rPr lang="en-US" b="1" dirty="0" smtClean="0"/>
-              <a:t>Design for failure</a:t>
-            </a:r>
-          </a:p>
-          <a:p>
-            <a:r>
-              <a:rPr lang="en-US" b="1" dirty="0" smtClean="0"/>
-              <a:t>Evolutionary Design</a:t>
-            </a:r>
-          </a:p>
-          <a:p>
-            <a:endParaRPr lang="en-US" b="1" dirty="0" smtClean="0"/>
-          </a:p>
-          <a:p>
-            <a:pPr marL="0" indent="0">
-              <a:buNone/>
-            </a:pPr>
-            <a:endParaRPr lang="en-US" dirty="0" smtClean="0"/>
-          </a:p>
-          <a:p>
-            <a:endParaRPr lang="en-US" dirty="0" smtClean="0"/>
-          </a:p>
-          <a:p>
-            <a:endParaRPr lang="en-US" dirty="0"/>
-          </a:p>
-          <a:p>
-            <a:pPr marL="0" indent="0">
-              <a:buNone/>
-            </a:pPr>
-            <a:r>
-              <a:rPr lang="en-US" dirty="0" smtClean="0"/>
-              <a:t>Reference: http://martinfowler.com/articles/microservices.html</a:t>
-            </a:r>
-            <a:endParaRPr lang="en-US" dirty="0"/>
-          </a:p>
-        </p:txBody>
-      </p:sp>
+        </p:nvPicPr>
+        <p:blipFill>
+          <a:blip r:embed="rId3">
+            <a:extLst>
+              <a:ext uri="{28A0092B-C50C-407E-A947-70E740481C1C}">
+                <a14:useLocalDpi xmlns:a14="http://schemas.microsoft.com/office/drawing/2010/main" val="0"/>
+              </a:ext>
+            </a:extLst>
+          </a:blip>
+          <a:srcRect/>
+          <a:stretch>
+            <a:fillRect/>
+          </a:stretch>
+        </p:blipFill>
+        <p:spPr bwMode="auto">
+          <a:xfrm>
+            <a:off x="2040477" y="1867436"/>
+            <a:ext cx="6825715" cy="4036604"/>
+          </a:xfrm>
+          <a:prstGeom prst="rect">
+            <a:avLst/>
+          </a:prstGeom>
+          <a:noFill/>
+          <a:ln>
+            <a:noFill/>
+          </a:ln>
+          <a:extLst>
+            <a:ext uri="{909E8E84-426E-40DD-AFC4-6F175D3DCCD1}">
+              <a14:hiddenFill xmlns:a14="http://schemas.microsoft.com/office/drawing/2010/main">
+                <a:solidFill>
+                  <a:schemeClr val="accent1"/>
+                </a:solidFill>
+              </a14:hiddenFill>
+            </a:ext>
+            <a:ext uri="{91240B29-F687-4F45-9708-019B960494DF}">
+              <a14:hiddenLine xmlns:a14="http://schemas.microsoft.com/office/drawing/2010/main" w="9525">
+                <a:solidFill>
+                  <a:schemeClr val="tx1"/>
+                </a:solidFill>
+                <a:miter lim="800000"/>
+                <a:headEnd/>
+                <a:tailEnd/>
+              </a14:hiddenLine>
+            </a:ext>
+          </a:extLst>
+        </p:spPr>
+      </p:pic>
     </p:spTree>
     <p:extLst>
       <p:ext uri="{BB962C8B-B14F-4D97-AF65-F5344CB8AC3E}">
-        <p14:creationId xmlns:p14="http://schemas.microsoft.com/office/powerpoint/2010/main" val="3712099602"/>
+        <p14:creationId xmlns:p14="http://schemas.microsoft.com/office/powerpoint/2010/main" val="1298778722"/>
       </p:ext>
     </p:extLst>
   </p:cSld>
@@ -4351,8 +5477,8 @@
           <a:lstStyle/>
           <a:p>
             <a:r>
-              <a:rPr lang="en-US" dirty="0" smtClean="0"/>
-              <a:t>Spring Framework</a:t>
+              <a:rPr lang="en-US" smtClean="0"/>
+              <a:t>REST</a:t>
             </a:r>
             <a:endParaRPr lang="en-US" dirty="0"/>
           </a:p>
@@ -4368,30 +5494,318 @@
             <p:ph idx="1"/>
           </p:nvPr>
         </p:nvSpPr>
-        <p:spPr/>
+        <p:spPr>
+          <a:xfrm>
+            <a:off x="334851" y="1287887"/>
+            <a:ext cx="11384923" cy="4889076"/>
+          </a:xfrm>
+        </p:spPr>
         <p:txBody>
           <a:bodyPr>
             <a:normAutofit/>
           </a:bodyPr>
           <a:lstStyle/>
           <a:p>
+            <a:pPr marL="0" indent="0">
+              <a:buNone/>
+            </a:pPr>
+            <a:r>
+              <a:rPr lang="en-US" b="1" dirty="0" smtClean="0"/>
+              <a:t>Hypermedia </a:t>
+            </a:r>
+            <a:r>
+              <a:rPr lang="en-US" b="1" dirty="0"/>
+              <a:t>as the </a:t>
+            </a:r>
+            <a:r>
+              <a:rPr lang="en-US" b="1" dirty="0" smtClean="0"/>
+              <a:t>engine </a:t>
+            </a:r>
+            <a:r>
+              <a:rPr lang="en-US" b="1" dirty="0"/>
+              <a:t>of application state </a:t>
+            </a:r>
             <a:r>
               <a:rPr lang="en-US" dirty="0" smtClean="0"/>
-              <a:t>REST principles</a:t>
-            </a:r>
-          </a:p>
-          <a:p>
-            <a:endParaRPr lang="en-US" dirty="0" smtClean="0"/>
-          </a:p>
-          <a:p>
-            <a:endParaRPr lang="en-US" dirty="0"/>
+              <a:t>(</a:t>
+            </a:r>
+            <a:r>
+              <a:rPr lang="en-US" b="1" dirty="0" smtClean="0"/>
+              <a:t>HATEOAS</a:t>
+            </a:r>
+            <a:r>
+              <a:rPr lang="en-US" dirty="0" smtClean="0"/>
+              <a:t>)</a:t>
+            </a:r>
+          </a:p>
+          <a:p>
+            <a:r>
+              <a:rPr lang="en-US" dirty="0" smtClean="0"/>
+              <a:t>A </a:t>
+            </a:r>
+            <a:r>
+              <a:rPr lang="en-US" dirty="0"/>
+              <a:t>hypermedia-driven site provides information to navigate the site's </a:t>
+            </a:r>
+            <a:r>
+              <a:rPr lang="en-US" dirty="0">
+                <a:hlinkClick r:id="rId3"/>
+              </a:rPr>
+              <a:t>REST</a:t>
+            </a:r>
+            <a:r>
+              <a:rPr lang="en-US" dirty="0"/>
+              <a:t> interfaces dynamically by including hypermedia links with the responses.</a:t>
+            </a:r>
+            <a:endParaRPr lang="en-US" dirty="0"/>
+          </a:p>
+        </p:txBody>
+      </p:sp>
+      <p:sp>
+        <p:nvSpPr>
+          <p:cNvPr id="4" name="TextBox 3"/>
+          <p:cNvSpPr txBox="1"/>
+          <p:nvPr/>
+        </p:nvSpPr>
+        <p:spPr>
+          <a:xfrm>
+            <a:off x="103031" y="6581001"/>
+            <a:ext cx="8667482" cy="276999"/>
+          </a:xfrm>
+          <a:prstGeom prst="rect">
+            <a:avLst/>
+          </a:prstGeom>
+          <a:noFill/>
+        </p:spPr>
+        <p:txBody>
+          <a:bodyPr wrap="square" rtlCol="0">
+            <a:spAutoFit/>
+          </a:bodyPr>
+          <a:lstStyle/>
+          <a:p>
+            <a:r>
+              <a:rPr lang="en-US" sz="1200" i="1" dirty="0" smtClean="0"/>
+              <a:t>Ref</a:t>
+            </a:r>
+            <a:r>
+              <a:rPr lang="en-US" sz="1200" i="1" dirty="0" smtClean="0">
+                <a:hlinkClick r:id="rId4"/>
+              </a:rPr>
+              <a:t>: </a:t>
+            </a:r>
+            <a:r>
+              <a:rPr lang="en-US" sz="1200" i="1" dirty="0" smtClean="0"/>
+              <a:t> </a:t>
+            </a:r>
+            <a:r>
+              <a:rPr lang="en-US" sz="1200" i="1" dirty="0" smtClean="0">
+                <a:hlinkClick r:id="rId5"/>
+              </a:rPr>
+              <a:t>Understanding </a:t>
+            </a:r>
+            <a:r>
+              <a:rPr lang="en-US" sz="1200" i="1" dirty="0" smtClean="0">
+                <a:hlinkClick r:id="rId5"/>
+              </a:rPr>
+              <a:t>HATEOAS</a:t>
+            </a:r>
+            <a:endParaRPr lang="en-US" sz="1200" i="1" dirty="0"/>
+          </a:p>
+        </p:txBody>
+      </p:sp>
+      <p:pic>
+        <p:nvPicPr>
+          <p:cNvPr id="2051" name="Picture 3"/>
+          <p:cNvPicPr>
+            <a:picLocks noChangeAspect="1" noChangeArrowheads="1"/>
+          </p:cNvPicPr>
+          <p:nvPr/>
+        </p:nvPicPr>
+        <p:blipFill>
+          <a:blip r:embed="rId6">
+            <a:extLst>
+              <a:ext uri="{28A0092B-C50C-407E-A947-70E740481C1C}">
+                <a14:useLocalDpi xmlns:a14="http://schemas.microsoft.com/office/drawing/2010/main" val="0"/>
+              </a:ext>
+            </a:extLst>
+          </a:blip>
+          <a:srcRect/>
+          <a:stretch>
+            <a:fillRect/>
+          </a:stretch>
+        </p:blipFill>
+        <p:spPr bwMode="auto">
+          <a:xfrm>
+            <a:off x="423125" y="3896262"/>
+            <a:ext cx="3695700" cy="971550"/>
+          </a:xfrm>
+          <a:prstGeom prst="rect">
+            <a:avLst/>
+          </a:prstGeom>
+          <a:noFill/>
+          <a:ln>
+            <a:noFill/>
+          </a:ln>
+          <a:extLst>
+            <a:ext uri="{909E8E84-426E-40DD-AFC4-6F175D3DCCD1}">
+              <a14:hiddenFill xmlns:a14="http://schemas.microsoft.com/office/drawing/2010/main">
+                <a:solidFill>
+                  <a:schemeClr val="accent1"/>
+                </a:solidFill>
+              </a14:hiddenFill>
+            </a:ext>
+            <a:ext uri="{91240B29-F687-4F45-9708-019B960494DF}">
+              <a14:hiddenLine xmlns:a14="http://schemas.microsoft.com/office/drawing/2010/main" w="9525">
+                <a:solidFill>
+                  <a:schemeClr val="tx1"/>
+                </a:solidFill>
+                <a:miter lim="800000"/>
+                <a:headEnd/>
+                <a:tailEnd/>
+              </a14:hiddenLine>
+            </a:ext>
+          </a:extLst>
+        </p:spPr>
+      </p:pic>
+      <p:pic>
+        <p:nvPicPr>
+          <p:cNvPr id="2054" name="Picture 6"/>
+          <p:cNvPicPr>
+            <a:picLocks noChangeAspect="1" noChangeArrowheads="1"/>
+          </p:cNvPicPr>
+          <p:nvPr/>
+        </p:nvPicPr>
+        <p:blipFill>
+          <a:blip r:embed="rId7">
+            <a:extLst>
+              <a:ext uri="{28A0092B-C50C-407E-A947-70E740481C1C}">
+                <a14:useLocalDpi xmlns:a14="http://schemas.microsoft.com/office/drawing/2010/main" val="0"/>
+              </a:ext>
+            </a:extLst>
+          </a:blip>
+          <a:srcRect/>
+          <a:stretch>
+            <a:fillRect/>
+          </a:stretch>
+        </p:blipFill>
+        <p:spPr bwMode="auto">
+          <a:xfrm>
+            <a:off x="5266587" y="3488061"/>
+            <a:ext cx="4981575" cy="3286125"/>
+          </a:xfrm>
+          <a:prstGeom prst="rect">
+            <a:avLst/>
+          </a:prstGeom>
+          <a:noFill/>
+          <a:ln>
+            <a:noFill/>
+          </a:ln>
+          <a:extLst>
+            <a:ext uri="{909E8E84-426E-40DD-AFC4-6F175D3DCCD1}">
+              <a14:hiddenFill xmlns:a14="http://schemas.microsoft.com/office/drawing/2010/main">
+                <a:solidFill>
+                  <a:schemeClr val="accent1"/>
+                </a:solidFill>
+              </a14:hiddenFill>
+            </a:ext>
+            <a:ext uri="{91240B29-F687-4F45-9708-019B960494DF}">
+              <a14:hiddenLine xmlns:a14="http://schemas.microsoft.com/office/drawing/2010/main" w="9525">
+                <a:solidFill>
+                  <a:schemeClr val="tx1"/>
+                </a:solidFill>
+                <a:miter lim="800000"/>
+                <a:headEnd/>
+                <a:tailEnd/>
+              </a14:hiddenLine>
+            </a:ext>
+          </a:extLst>
+        </p:spPr>
+      </p:pic>
+      <p:sp>
+        <p:nvSpPr>
+          <p:cNvPr id="5" name="TextBox 4"/>
+          <p:cNvSpPr txBox="1"/>
+          <p:nvPr/>
+        </p:nvSpPr>
+        <p:spPr>
+          <a:xfrm>
+            <a:off x="1074514" y="3090929"/>
+            <a:ext cx="1720201" cy="369332"/>
+          </a:xfrm>
+          <a:prstGeom prst="rect">
+            <a:avLst/>
+          </a:prstGeom>
+          <a:noFill/>
+        </p:spPr>
+        <p:txBody>
+          <a:bodyPr wrap="square" rtlCol="0">
+            <a:spAutoFit/>
+          </a:bodyPr>
+          <a:lstStyle/>
+          <a:p>
+            <a:r>
+              <a:rPr lang="en-US" b="1" dirty="0" smtClean="0">
+                <a:solidFill>
+                  <a:srgbClr val="FF0000"/>
+                </a:solidFill>
+              </a:rPr>
+              <a:t>No Hypermedia</a:t>
+            </a:r>
+            <a:endParaRPr lang="en-US" b="1" dirty="0">
+              <a:solidFill>
+                <a:srgbClr val="FF0000"/>
+              </a:solidFill>
+            </a:endParaRPr>
+          </a:p>
+        </p:txBody>
+      </p:sp>
+      <p:sp>
+        <p:nvSpPr>
+          <p:cNvPr id="11" name="TextBox 10"/>
+          <p:cNvSpPr txBox="1"/>
+          <p:nvPr/>
+        </p:nvSpPr>
+        <p:spPr>
+          <a:xfrm>
+            <a:off x="5885645" y="2869874"/>
+            <a:ext cx="4362517" cy="646331"/>
+          </a:xfrm>
+          <a:prstGeom prst="rect">
+            <a:avLst/>
+          </a:prstGeom>
+          <a:noFill/>
+        </p:spPr>
+        <p:txBody>
+          <a:bodyPr wrap="square" rtlCol="0">
+            <a:spAutoFit/>
+          </a:bodyPr>
+          <a:lstStyle/>
+          <a:p>
+            <a:pPr algn="ctr"/>
+            <a:r>
+              <a:rPr lang="en-US" b="1" dirty="0" smtClean="0">
+                <a:solidFill>
+                  <a:schemeClr val="accent6">
+                    <a:lumMod val="75000"/>
+                  </a:schemeClr>
+                </a:solidFill>
+              </a:rPr>
+              <a:t>Helping client to navigate the API with Hypermedia links</a:t>
+            </a:r>
+            <a:endParaRPr lang="en-US" b="1" dirty="0">
+              <a:solidFill>
+                <a:schemeClr val="accent6">
+                  <a:lumMod val="75000"/>
+                </a:schemeClr>
+              </a:solidFill>
+            </a:endParaRPr>
           </a:p>
         </p:txBody>
       </p:sp>
     </p:spTree>
     <p:extLst>
       <p:ext uri="{BB962C8B-B14F-4D97-AF65-F5344CB8AC3E}">
-        <p14:creationId xmlns:p14="http://schemas.microsoft.com/office/powerpoint/2010/main" val="2201538371"/>
+        <p14:creationId xmlns:p14="http://schemas.microsoft.com/office/powerpoint/2010/main" val="697125298"/>
       </p:ext>
     </p:extLst>
   </p:cSld>
@@ -4433,6 +5847,10 @@
           <a:bodyPr/>
           <a:lstStyle/>
           <a:p>
+            <a:r>
+              <a:rPr lang="en-US" dirty="0" smtClean="0"/>
+              <a:t>REST architectural style - Drivers</a:t>
+            </a:r>
             <a:endParaRPr lang="en-US" dirty="0"/>
           </a:p>
         </p:txBody>
@@ -4457,94 +5875,117 @@
             <a:pPr marL="0" indent="0">
               <a:buNone/>
             </a:pPr>
+            <a:r>
+              <a:rPr lang="en-US" dirty="0" smtClean="0"/>
+              <a:t>Heterogeneous </a:t>
+            </a:r>
+            <a:r>
+              <a:rPr lang="en-US" dirty="0" smtClean="0"/>
+              <a:t>Interoperability &amp; Rise of Mobile</a:t>
+            </a:r>
+          </a:p>
+          <a:p>
+            <a:pPr lvl="1"/>
+            <a:r>
+              <a:rPr lang="en-US" dirty="0" smtClean="0"/>
+              <a:t>Service (API) providers cannot make any assumptions about the client platforms. </a:t>
+            </a:r>
+          </a:p>
+          <a:p>
+            <a:pPr lvl="1"/>
+            <a:r>
+              <a:rPr lang="en-US" dirty="0"/>
+              <a:t>The client could be a browser, a mobile device running any OS, </a:t>
+            </a:r>
+            <a:r>
+              <a:rPr lang="en-US" dirty="0" smtClean="0"/>
+              <a:t>a GPS navigator, automotive system or anything else</a:t>
+            </a:r>
+          </a:p>
+          <a:p>
+            <a:pPr lvl="1"/>
+            <a:r>
+              <a:rPr lang="en-US" dirty="0" smtClean="0"/>
+              <a:t>Clients and Services need to evolve independently. </a:t>
+            </a:r>
+          </a:p>
+          <a:p>
+            <a:pPr lvl="1"/>
+            <a:r>
+              <a:rPr lang="en-US" dirty="0" smtClean="0"/>
+              <a:t>Each Client could be running a unique native OS and could be deployed at varied times independent of the Service</a:t>
+            </a:r>
+          </a:p>
+          <a:p>
+            <a:pPr lvl="1"/>
+            <a:r>
+              <a:rPr lang="en-US" dirty="0" smtClean="0"/>
+              <a:t>Latency issues, performance, reliability are major issues for Mobile </a:t>
+            </a:r>
+            <a:r>
+              <a:rPr lang="en-US" dirty="0" smtClean="0"/>
+              <a:t>platforms</a:t>
+            </a:r>
+          </a:p>
+          <a:p>
+            <a:pPr lvl="1"/>
+            <a:r>
+              <a:rPr lang="en-US" dirty="0" smtClean="0"/>
+              <a:t>Horizontal Scalability – It is critical to build a scalable architecture in order to take advantage of a scalable infrastructure</a:t>
+            </a:r>
             <a:endParaRPr lang="en-US" dirty="0" smtClean="0"/>
           </a:p>
           <a:p>
-            <a:pPr marL="0" indent="0">
-              <a:buNone/>
-            </a:pPr>
-            <a:endParaRPr lang="en-US" dirty="0"/>
-          </a:p>
-          <a:p>
-            <a:pPr marL="0" indent="0">
-              <a:buNone/>
-            </a:pPr>
-            <a:endParaRPr lang="en-US" dirty="0" smtClean="0"/>
-          </a:p>
-          <a:p>
-            <a:pPr marL="0" indent="0">
-              <a:buNone/>
-            </a:pPr>
-            <a:r>
-              <a:rPr lang="en-US" dirty="0" smtClean="0"/>
-              <a:t>Primary goals:</a:t>
-            </a:r>
-          </a:p>
-          <a:p>
-            <a:r>
-              <a:rPr lang="en-US" dirty="0" smtClean="0">
-                <a:effectLst/>
-              </a:rPr>
-              <a:t>Rapid development</a:t>
-            </a:r>
-          </a:p>
-          <a:p>
-            <a:r>
-              <a:rPr lang="en-US" dirty="0" smtClean="0">
-                <a:effectLst/>
-              </a:rPr>
-              <a:t>Opinionated out of the box</a:t>
-            </a:r>
-          </a:p>
-          <a:p>
-            <a:r>
-              <a:rPr lang="en-US" dirty="0" smtClean="0">
-                <a:effectLst/>
-              </a:rPr>
-              <a:t>Provide a range of non-functional features</a:t>
-            </a:r>
-          </a:p>
-          <a:p>
-            <a:r>
-              <a:rPr lang="en-US" dirty="0" smtClean="0">
-                <a:effectLst/>
-              </a:rPr>
-              <a:t>No requirement for XML configuration.</a:t>
-            </a:r>
-          </a:p>
-          <a:p>
-            <a:endParaRPr lang="en-US" dirty="0"/>
-          </a:p>
-        </p:txBody>
-      </p:sp>
-      <p:pic>
-        <p:nvPicPr>
-          <p:cNvPr id="4" name="Picture 3"/>
-          <p:cNvPicPr>
-            <a:picLocks noChangeAspect="1"/>
-          </p:cNvPicPr>
+            <a:endParaRPr lang="en-US" dirty="0"/>
+          </a:p>
+        </p:txBody>
+      </p:sp>
+      <p:sp>
+        <p:nvSpPr>
+          <p:cNvPr id="4" name="TextBox 3"/>
+          <p:cNvSpPr txBox="1"/>
           <p:nvPr/>
-        </p:nvPicPr>
-        <p:blipFill>
-          <a:blip r:embed="rId3"/>
-          <a:stretch>
-            <a:fillRect/>
-          </a:stretch>
-        </p:blipFill>
+        </p:nvSpPr>
         <p:spPr>
           <a:xfrm>
-            <a:off x="733425" y="365125"/>
-            <a:ext cx="10620375" cy="2324100"/>
+            <a:off x="8281116" y="6423389"/>
+            <a:ext cx="3515932" cy="276999"/>
           </a:xfrm>
           <a:prstGeom prst="rect">
             <a:avLst/>
           </a:prstGeom>
+          <a:noFill/>
         </p:spPr>
-      </p:pic>
+        <p:txBody>
+          <a:bodyPr wrap="square" rtlCol="0">
+            <a:spAutoFit/>
+          </a:bodyPr>
+          <a:lstStyle/>
+          <a:p>
+            <a:r>
+              <a:rPr lang="en-US" sz="1200" i="1" dirty="0" smtClean="0"/>
+              <a:t>Ref</a:t>
+            </a:r>
+            <a:r>
+              <a:rPr lang="en-US" sz="1200" i="1" dirty="0" smtClean="0">
+                <a:hlinkClick r:id="rId3"/>
+              </a:rPr>
+              <a:t>: REST fundamentals – Howard </a:t>
+            </a:r>
+            <a:r>
+              <a:rPr lang="en-US" sz="1200" i="1" dirty="0" err="1" smtClean="0">
+                <a:hlinkClick r:id="rId3"/>
+              </a:rPr>
+              <a:t>Dierking</a:t>
+            </a:r>
+            <a:endParaRPr lang="en-US" sz="1200" i="1" dirty="0"/>
+          </a:p>
+        </p:txBody>
+      </p:sp>
     </p:spTree>
     <p:extLst>
       <p:ext uri="{BB962C8B-B14F-4D97-AF65-F5344CB8AC3E}">
-        <p14:creationId xmlns:p14="http://schemas.microsoft.com/office/powerpoint/2010/main" val="1278708812"/>
+        <p14:creationId xmlns:p14="http://schemas.microsoft.com/office/powerpoint/2010/main" val="1907703282"/>
       </p:ext>
     </p:extLst>
   </p:cSld>
@@ -4588,7 +6029,7 @@
           <a:p>
             <a:r>
               <a:rPr lang="en-US" dirty="0" smtClean="0"/>
-              <a:t>Convention over Configuration</a:t>
+              <a:t>Micro-services architectural style</a:t>
             </a:r>
             <a:endParaRPr lang="en-US" dirty="0"/>
           </a:p>
@@ -4611,72 +6052,28 @@
           </a:bodyPr>
           <a:lstStyle/>
           <a:p>
+            <a:pPr marL="0" indent="0" algn="ctr">
+              <a:buNone/>
+            </a:pPr>
+            <a:r>
+              <a:rPr lang="en-US" i="1" dirty="0" smtClean="0"/>
+              <a:t>Developing a single application as a suite of small services, each running in its own process and communicating with lightweight mechanisms, often an HTTP resource API. </a:t>
+            </a:r>
+          </a:p>
+          <a:p>
+            <a:endParaRPr lang="en-US" dirty="0" smtClean="0"/>
+          </a:p>
+          <a:p>
+            <a:endParaRPr lang="en-US" dirty="0"/>
+          </a:p>
+          <a:p>
             <a:pPr marL="0" indent="0">
               <a:buNone/>
             </a:pPr>
-            <a:endParaRPr lang="en-US" dirty="0" smtClean="0"/>
-          </a:p>
-          <a:p>
             <a:r>
               <a:rPr lang="en-US" dirty="0" smtClean="0"/>
-              <a:t>DRY Principle – Do not repeat yourself!</a:t>
-            </a:r>
-          </a:p>
-          <a:p>
-            <a:r>
-              <a:rPr lang="en-US" smtClean="0"/>
-              <a:t>Start with </a:t>
-            </a:r>
-            <a:r>
-              <a:rPr lang="en-US" dirty="0" smtClean="0"/>
-              <a:t>sensible defaults</a:t>
-            </a:r>
-          </a:p>
-          <a:p>
-            <a:r>
-              <a:rPr lang="en-US" dirty="0" smtClean="0"/>
-              <a:t>You should only have to configure something to use it for customization (non default setting).</a:t>
-            </a:r>
-          </a:p>
-          <a:p>
-            <a:pPr marL="0" indent="0">
-              <a:buNone/>
-            </a:pPr>
-            <a:endParaRPr lang="en-US" dirty="0" smtClean="0"/>
-          </a:p>
-          <a:p>
-            <a:pPr marL="0" indent="0">
-              <a:buNone/>
-            </a:pPr>
-            <a:r>
-              <a:rPr lang="en-US" dirty="0" smtClean="0"/>
-              <a:t>Example: Did you include </a:t>
-            </a:r>
-            <a:r>
-              <a:rPr lang="en-US" dirty="0" err="1"/>
-              <a:t>L</a:t>
-            </a:r>
-            <a:r>
-              <a:rPr lang="en-US" dirty="0" err="1" smtClean="0"/>
-              <a:t>ogback</a:t>
-            </a:r>
-            <a:r>
-              <a:rPr lang="en-US" dirty="0" smtClean="0"/>
-              <a:t> in the </a:t>
-            </a:r>
-            <a:r>
-              <a:rPr lang="en-US" dirty="0" err="1" smtClean="0"/>
-              <a:t>classpath</a:t>
-            </a:r>
-            <a:r>
-              <a:rPr lang="en-US" dirty="0" smtClean="0"/>
-              <a:t>? Spring Boot will assume that you want to use it and will attempt to configure it. </a:t>
-            </a:r>
-          </a:p>
-          <a:p>
-            <a:pPr marL="0" indent="0">
-              <a:buNone/>
-            </a:pPr>
+              <a:t>Reference: http://martinfowler.com/articles/microservices.html</a:t>
+            </a:r>
             <a:endParaRPr lang="en-US" dirty="0"/>
           </a:p>
         </p:txBody>
@@ -4684,7 +6081,7 @@
     </p:spTree>
     <p:extLst>
       <p:ext uri="{BB962C8B-B14F-4D97-AF65-F5344CB8AC3E}">
-        <p14:creationId xmlns:p14="http://schemas.microsoft.com/office/powerpoint/2010/main" val="3682208326"/>
+        <p14:creationId xmlns:p14="http://schemas.microsoft.com/office/powerpoint/2010/main" val="1433475006"/>
       </p:ext>
     </p:extLst>
   </p:cSld>
@@ -4728,13 +6125,9 @@
           <a:p>
             <a:r>
               <a:rPr lang="en-US" dirty="0" smtClean="0"/>
-              <a:t>Hello world </a:t>
-            </a:r>
-            <a:r>
-              <a:rPr lang="en-US" smtClean="0"/>
-              <a:t>with Spring Boot</a:t>
-            </a:r>
-            <a:endParaRPr lang="en-US"/>
+              <a:t>Micro-services architectural style</a:t>
+            </a:r>
+            <a:endParaRPr lang="en-US" dirty="0"/>
           </a:p>
         </p:txBody>
       </p:sp>
@@ -4750,17 +6143,104 @@
         </p:nvSpPr>
         <p:spPr/>
         <p:txBody>
-          <a:bodyPr/>
-          <a:lstStyle/>
-          <a:p>
-            <a:endParaRPr lang="en-US"/>
+          <a:bodyPr>
+            <a:normAutofit fontScale="55000" lnSpcReduction="20000"/>
+          </a:bodyPr>
+          <a:lstStyle/>
+          <a:p>
+            <a:pPr marL="0" indent="0">
+              <a:buNone/>
+            </a:pPr>
+            <a:r>
+              <a:rPr lang="en-US" dirty="0" smtClean="0"/>
+              <a:t>Characteristics:</a:t>
+            </a:r>
+          </a:p>
+          <a:p>
+            <a:r>
+              <a:rPr lang="en-US" b="1" dirty="0" smtClean="0"/>
+              <a:t>Componentization via Services</a:t>
+            </a:r>
+          </a:p>
+          <a:p>
+            <a:r>
+              <a:rPr lang="en-US" b="1" dirty="0" smtClean="0"/>
+              <a:t>Organized around Business Capabilities</a:t>
+            </a:r>
+          </a:p>
+          <a:p>
+            <a:r>
+              <a:rPr lang="en-US" b="1" dirty="0" smtClean="0"/>
+              <a:t>Products not Projects</a:t>
+            </a:r>
+          </a:p>
+          <a:p>
+            <a:r>
+              <a:rPr lang="en-US" b="1" dirty="0" smtClean="0"/>
+              <a:t>Smart endpoints and dumb pipes</a:t>
+            </a:r>
+          </a:p>
+          <a:p>
+            <a:r>
+              <a:rPr lang="en-US" b="1" dirty="0" smtClean="0"/>
+              <a:t>Decentralized Governance</a:t>
+            </a:r>
+          </a:p>
+          <a:p>
+            <a:r>
+              <a:rPr lang="en-US" b="1" dirty="0" smtClean="0"/>
+              <a:t>Decentralized Data Management</a:t>
+            </a:r>
+          </a:p>
+          <a:p>
+            <a:r>
+              <a:rPr lang="en-US" b="1" dirty="0" smtClean="0"/>
+              <a:t>Infrastructure Automation</a:t>
+            </a:r>
+          </a:p>
+          <a:p>
+            <a:r>
+              <a:rPr lang="en-US" b="1" dirty="0" smtClean="0"/>
+              <a:t>Design for failure</a:t>
+            </a:r>
+          </a:p>
+          <a:p>
+            <a:r>
+              <a:rPr lang="en-US" b="1" dirty="0" smtClean="0"/>
+              <a:t>Evolutionary Design</a:t>
+            </a:r>
+          </a:p>
+          <a:p>
+            <a:endParaRPr lang="en-US" b="1" dirty="0" smtClean="0"/>
+          </a:p>
+          <a:p>
+            <a:pPr marL="0" indent="0">
+              <a:buNone/>
+            </a:pPr>
+            <a:endParaRPr lang="en-US" dirty="0" smtClean="0"/>
+          </a:p>
+          <a:p>
+            <a:endParaRPr lang="en-US" dirty="0" smtClean="0"/>
+          </a:p>
+          <a:p>
+            <a:endParaRPr lang="en-US" dirty="0"/>
+          </a:p>
+          <a:p>
+            <a:pPr marL="0" indent="0">
+              <a:buNone/>
+            </a:pPr>
+            <a:r>
+              <a:rPr lang="en-US" dirty="0" smtClean="0"/>
+              <a:t>Reference: http://martinfowler.com/articles/microservices.html</a:t>
+            </a:r>
+            <a:endParaRPr lang="en-US" dirty="0"/>
           </a:p>
         </p:txBody>
       </p:sp>
     </p:spTree>
     <p:extLst>
       <p:ext uri="{BB962C8B-B14F-4D97-AF65-F5344CB8AC3E}">
-        <p14:creationId xmlns:p14="http://schemas.microsoft.com/office/powerpoint/2010/main" val="2043375816"/>
+        <p14:creationId xmlns:p14="http://schemas.microsoft.com/office/powerpoint/2010/main" val="3712099602"/>
       </p:ext>
     </p:extLst>
   </p:cSld>
@@ -5025,7 +6505,7 @@
   <a:extraClrSchemeLst/>
   <a:extLst>
     <a:ext uri="{05A4C25C-085E-4340-85A3-A5531E510DB2}">
-      <thm15:themeFamily xmlns="" xmlns:thm15="http://schemas.microsoft.com/office/thememl/2012/main" name="Office Theme" id="{62F939B6-93AF-4DB8-9C6B-D6C7DFDC589F}" vid="{4A3C46E8-61CC-4603-A589-7422A47A8E4A}"/>
+      <thm15:themeFamily xmlns:thm15="http://schemas.microsoft.com/office/thememl/2012/main" xmlns="" name="Office Theme" id="{62F939B6-93AF-4DB8-9C6B-D6C7DFDC589F}" vid="{4A3C46E8-61CC-4603-A589-7422A47A8E4A}"/>
     </a:ext>
   </a:extLst>
 </a:theme>
@@ -5286,7 +6766,7 @@
   <a:extraClrSchemeLst/>
   <a:extLst>
     <a:ext uri="{05A4C25C-085E-4340-85A3-A5531E510DB2}">
-      <thm15:themeFamily xmlns="" xmlns:thm15="http://schemas.microsoft.com/office/thememl/2012/main" name="Office Theme" id="{62F939B6-93AF-4DB8-9C6B-D6C7DFDC589F}" vid="{4A3C46E8-61CC-4603-A589-7422A47A8E4A}"/>
+      <thm15:themeFamily xmlns:thm15="http://schemas.microsoft.com/office/thememl/2012/main" xmlns="" name="Office Theme" id="{62F939B6-93AF-4DB8-9C6B-D6C7DFDC589F}" vid="{4A3C46E8-61CC-4603-A589-7422A47A8E4A}"/>
     </a:ext>
   </a:extLst>
 </a:theme>
@@ -5547,7 +7027,7 @@
   <a:extraClrSchemeLst/>
   <a:extLst>
     <a:ext uri="{05A4C25C-085E-4340-85A3-A5531E510DB2}">
-      <thm15:themeFamily xmlns="" xmlns:thm15="http://schemas.microsoft.com/office/thememl/2012/main" name="Office Theme" id="{62F939B6-93AF-4DB8-9C6B-D6C7DFDC589F}" vid="{4A3C46E8-61CC-4603-A589-7422A47A8E4A}"/>
+      <thm15:themeFamily xmlns:thm15="http://schemas.microsoft.com/office/thememl/2012/main" xmlns="" name="Office Theme" id="{62F939B6-93AF-4DB8-9C6B-D6C7DFDC589F}" vid="{4A3C46E8-61CC-4603-A589-7422A47A8E4A}"/>
     </a:ext>
   </a:extLst>
 </a:theme>

</xml_diff>

<commit_message>
Updated REST in PPT
</commit_message>
<xml_diff>
--- a/Spring Boot.pptx
+++ b/Spring Boot.pptx
@@ -5,25 +5,27 @@
     <p:sldMasterId id="2147483648" r:id="rId1"/>
   </p:sldMasterIdLst>
   <p:notesMasterIdLst>
-    <p:notesMasterId r:id="rId15"/>
+    <p:notesMasterId r:id="rId17"/>
   </p:notesMasterIdLst>
   <p:handoutMasterIdLst>
-    <p:handoutMasterId r:id="rId16"/>
+    <p:handoutMasterId r:id="rId18"/>
   </p:handoutMasterIdLst>
   <p:sldIdLst>
     <p:sldId id="256" r:id="rId2"/>
     <p:sldId id="257" r:id="rId3"/>
     <p:sldId id="258" r:id="rId4"/>
-    <p:sldId id="267" r:id="rId5"/>
-    <p:sldId id="265" r:id="rId6"/>
-    <p:sldId id="268" r:id="rId7"/>
-    <p:sldId id="266" r:id="rId8"/>
-    <p:sldId id="259" r:id="rId9"/>
-    <p:sldId id="262" r:id="rId10"/>
-    <p:sldId id="260" r:id="rId11"/>
-    <p:sldId id="261" r:id="rId12"/>
-    <p:sldId id="263" r:id="rId13"/>
-    <p:sldId id="264" r:id="rId14"/>
+    <p:sldId id="266" r:id="rId5"/>
+    <p:sldId id="269" r:id="rId6"/>
+    <p:sldId id="267" r:id="rId7"/>
+    <p:sldId id="265" r:id="rId8"/>
+    <p:sldId id="268" r:id="rId9"/>
+    <p:sldId id="270" r:id="rId10"/>
+    <p:sldId id="259" r:id="rId11"/>
+    <p:sldId id="262" r:id="rId12"/>
+    <p:sldId id="260" r:id="rId13"/>
+    <p:sldId id="261" r:id="rId14"/>
+    <p:sldId id="263" r:id="rId15"/>
+    <p:sldId id="264" r:id="rId16"/>
   </p:sldIdLst>
   <p:sldSz cx="12192000" cy="6858000"/>
   <p:notesSz cx="6858000" cy="9144000"/>
@@ -124,7 +126,7 @@
   </p:defaultTextStyle>
   <p:extLst>
     <p:ext uri="{EFAFB233-063F-42B5-8137-9DF3F51BA10A}">
-      <p15:sldGuideLst xmlns:p15="http://schemas.microsoft.com/office/powerpoint/2012/main" xmlns="">
+      <p15:sldGuideLst xmlns="" xmlns:p15="http://schemas.microsoft.com/office/powerpoint/2012/main">
         <p15:guide id="1" orient="horz" pos="2160">
           <p15:clr>
             <a:srgbClr val="A4A3A4"/>
@@ -138,7 +140,7 @@
       </p15:sldGuideLst>
     </p:ext>
     <p:ext uri="{2D200454-40CA-4A62-9FC3-DE9A4176ACB9}">
-      <p15:notesGuideLst xmlns:p15="http://schemas.microsoft.com/office/powerpoint/2012/main" xmlns=""/>
+      <p15:notesGuideLst xmlns="" xmlns:p15="http://schemas.microsoft.com/office/powerpoint/2012/main"/>
     </p:ext>
   </p:extLst>
 </p:presentation>
@@ -743,6 +745,94 @@
 </p:notes>
 </file>
 
+<file path=ppt/notesSlides/notesSlide10.xml><?xml version="1.0" encoding="utf-8"?>
+<p:notes xmlns:a="http://schemas.openxmlformats.org/drawingml/2006/main" xmlns:r="http://schemas.openxmlformats.org/officeDocument/2006/relationships" xmlns:p="http://schemas.openxmlformats.org/presentationml/2006/main">
+  <p:cSld>
+    <p:spTree>
+      <p:nvGrpSpPr>
+        <p:cNvPr id="1" name=""/>
+        <p:cNvGrpSpPr/>
+        <p:nvPr/>
+      </p:nvGrpSpPr>
+      <p:grpSpPr>
+        <a:xfrm>
+          <a:off x="0" y="0"/>
+          <a:ext cx="0" cy="0"/>
+          <a:chOff x="0" y="0"/>
+          <a:chExt cx="0" cy="0"/>
+        </a:xfrm>
+      </p:grpSpPr>
+      <p:sp>
+        <p:nvSpPr>
+          <p:cNvPr id="2" name="Slide Image Placeholder 1"/>
+          <p:cNvSpPr>
+            <a:spLocks noGrp="1" noRot="1" noChangeAspect="1"/>
+          </p:cNvSpPr>
+          <p:nvPr>
+            <p:ph type="sldImg"/>
+          </p:nvPr>
+        </p:nvSpPr>
+        <p:spPr/>
+      </p:sp>
+      <p:sp>
+        <p:nvSpPr>
+          <p:cNvPr id="3" name="Notes Placeholder 2"/>
+          <p:cNvSpPr>
+            <a:spLocks noGrp="1"/>
+          </p:cNvSpPr>
+          <p:nvPr>
+            <p:ph type="body" idx="1"/>
+          </p:nvPr>
+        </p:nvSpPr>
+        <p:spPr/>
+        <p:txBody>
+          <a:bodyPr/>
+          <a:lstStyle/>
+          <a:p>
+            <a:r>
+              <a:rPr lang="en-US" dirty="0" smtClean="0"/>
+              <a:t>Example:</a:t>
+            </a:r>
+            <a:endParaRPr lang="en-US" dirty="0"/>
+          </a:p>
+        </p:txBody>
+      </p:sp>
+      <p:sp>
+        <p:nvSpPr>
+          <p:cNvPr id="4" name="Slide Number Placeholder 3"/>
+          <p:cNvSpPr>
+            <a:spLocks noGrp="1"/>
+          </p:cNvSpPr>
+          <p:nvPr>
+            <p:ph type="sldNum" sz="quarter" idx="10"/>
+          </p:nvPr>
+        </p:nvSpPr>
+        <p:spPr/>
+        <p:txBody>
+          <a:bodyPr/>
+          <a:lstStyle/>
+          <a:p>
+            <a:fld id="{9F9FB9DD-7CF9-4A0C-8C7F-91FD9EF34B36}" type="slidenum">
+              <a:rPr lang="en-US" smtClean="0"/>
+              <a:t>14</a:t>
+            </a:fld>
+            <a:endParaRPr lang="en-US" dirty="0"/>
+          </a:p>
+        </p:txBody>
+      </p:sp>
+    </p:spTree>
+    <p:extLst>
+      <p:ext uri="{BB962C8B-B14F-4D97-AF65-F5344CB8AC3E}">
+        <p14:creationId xmlns:p14="http://schemas.microsoft.com/office/powerpoint/2010/main" val="3644509374"/>
+      </p:ext>
+    </p:extLst>
+  </p:cSld>
+  <p:clrMapOvr>
+    <a:masterClrMapping/>
+  </p:clrMapOvr>
+</p:notes>
+</file>
+
 <file path=ppt/notesSlides/notesSlide2.xml><?xml version="1.0" encoding="utf-8"?>
 <p:notes xmlns:a="http://schemas.openxmlformats.org/drawingml/2006/main" xmlns:r="http://schemas.openxmlformats.org/officeDocument/2006/relationships" xmlns:p="http://schemas.openxmlformats.org/presentationml/2006/main">
   <p:cSld>
@@ -901,7 +991,7 @@
     </p:spTree>
     <p:extLst>
       <p:ext uri="{BB962C8B-B14F-4D97-AF65-F5344CB8AC3E}">
-        <p14:creationId xmlns:p14="http://schemas.microsoft.com/office/powerpoint/2010/main" val="1321528369"/>
+        <p14:creationId xmlns:p14="http://schemas.microsoft.com/office/powerpoint/2010/main" val="2110186832"/>
       </p:ext>
     </p:extLst>
   </p:cSld>
@@ -1039,6 +1129,80 @@
           <a:bodyPr/>
           <a:lstStyle/>
           <a:p>
+            <a:pPr marL="0" marR="0" lvl="0" indent="0" algn="l" defTabSz="914400" rtl="0" eaLnBrk="1" fontAlgn="auto" latinLnBrk="0" hangingPunct="1">
+              <a:lnSpc>
+                <a:spcPct val="100000"/>
+              </a:lnSpc>
+              <a:spcBef>
+                <a:spcPts val="0"/>
+              </a:spcBef>
+              <a:spcAft>
+                <a:spcPts val="0"/>
+              </a:spcAft>
+              <a:buClrTx/>
+              <a:buSzTx/>
+              <a:buFontTx/>
+              <a:buNone/>
+              <a:tabLst/>
+              <a:defRPr/>
+            </a:pPr>
+            <a:r>
+              <a:rPr lang="en-US" altLang="en-US" dirty="0" smtClean="0">
+                <a:ea typeface="Times New Roman" pitchFamily="18" charset="0"/>
+              </a:rPr>
+              <a:t>You could call SOAP a </a:t>
+            </a:r>
+            <a:r>
+              <a:rPr lang="en-US" altLang="en-US" b="1" dirty="0" smtClean="0">
+                <a:ea typeface="Times New Roman" pitchFamily="18" charset="0"/>
+              </a:rPr>
+              <a:t>Level 0</a:t>
+            </a:r>
+            <a:r>
+              <a:rPr lang="en-US" altLang="en-US" dirty="0" smtClean="0">
+                <a:ea typeface="Times New Roman" pitchFamily="18" charset="0"/>
+              </a:rPr>
+              <a:t> technology. It uses HTTP, but as a transport. It’s worth mentioning that you could also use SOAP </a:t>
+            </a:r>
+            <a:r>
+              <a:rPr lang="en-US" altLang="en-US" dirty="0" smtClean="0">
+                <a:ea typeface="Times New Roman" pitchFamily="18" charset="0"/>
+                <a:hlinkClick r:id="rId3"/>
+              </a:rPr>
+              <a:t>on top of something like JMS</a:t>
+            </a:r>
+            <a:r>
+              <a:rPr lang="en-US" altLang="en-US" dirty="0" smtClean="0">
+                <a:ea typeface="Times New Roman" pitchFamily="18" charset="0"/>
+              </a:rPr>
+              <a:t> with no HTTP at all. SOAP, thus, is </a:t>
+            </a:r>
+            <a:r>
+              <a:rPr lang="en-US" altLang="en-US" i="1" dirty="0" smtClean="0">
+                <a:ea typeface="Times New Roman" pitchFamily="18" charset="0"/>
+              </a:rPr>
+              <a:t>not</a:t>
+            </a:r>
+            <a:r>
+              <a:rPr lang="en-US" altLang="en-US" dirty="0" smtClean="0">
+                <a:ea typeface="Times New Roman" pitchFamily="18" charset="0"/>
+              </a:rPr>
+              <a:t> RESTful. It’s only just HTTP-aware.</a:t>
+            </a:r>
+            <a:endParaRPr kumimoji="0" lang="en-US" altLang="en-US" b="0" i="0" u="none" strike="noStrike" cap="none" normalizeH="0" baseline="0" dirty="0" smtClean="0">
+              <a:ln>
+                <a:noFill/>
+              </a:ln>
+              <a:solidFill>
+                <a:schemeClr val="tx1"/>
+              </a:solidFill>
+              <a:effectLst/>
+              <a:latin typeface="Arial" pitchFamily="34" charset="0"/>
+              <a:ea typeface="Times New Roman" pitchFamily="18" charset="0"/>
+              <a:cs typeface="Arial" pitchFamily="34" charset="0"/>
+            </a:endParaRPr>
+          </a:p>
+          <a:p>
             <a:endParaRPr lang="en-US" dirty="0"/>
           </a:p>
         </p:txBody>
@@ -1069,7 +1233,7 @@
     </p:spTree>
     <p:extLst>
       <p:ext uri="{BB962C8B-B14F-4D97-AF65-F5344CB8AC3E}">
-        <p14:creationId xmlns:p14="http://schemas.microsoft.com/office/powerpoint/2010/main" val="2110186832"/>
+        <p14:creationId xmlns:p14="http://schemas.microsoft.com/office/powerpoint/2010/main" val="1321528369"/>
       </p:ext>
     </p:extLst>
   </p:cSld>
@@ -1123,14 +1287,6 @@
           <a:bodyPr/>
           <a:lstStyle/>
           <a:p>
-            <a:r>
-              <a:rPr lang="en-US" b="1" dirty="0" smtClean="0"/>
-              <a:t>component</a:t>
-            </a:r>
-            <a:r>
-              <a:rPr lang="en-US" dirty="0" smtClean="0"/>
-              <a:t> is a unit of software that is independently replaceable and upgradeable.</a:t>
-            </a:r>
             <a:endParaRPr lang="en-US" dirty="0"/>
           </a:p>
         </p:txBody>
@@ -1152,7 +1308,7 @@
           <a:p>
             <a:fld id="{9F9FB9DD-7CF9-4A0C-8C7F-91FD9EF34B36}" type="slidenum">
               <a:rPr lang="en-US" smtClean="0"/>
-              <a:t>9</a:t>
+              <a:t>8</a:t>
             </a:fld>
             <a:endParaRPr lang="en-US" dirty="0"/>
           </a:p>
@@ -1161,7 +1317,7 @@
     </p:spTree>
     <p:extLst>
       <p:ext uri="{BB962C8B-B14F-4D97-AF65-F5344CB8AC3E}">
-        <p14:creationId xmlns:p14="http://schemas.microsoft.com/office/powerpoint/2010/main" val="2056578434"/>
+        <p14:creationId xmlns:p14="http://schemas.microsoft.com/office/powerpoint/2010/main" val="2110186832"/>
       </p:ext>
     </p:extLst>
   </p:cSld>
@@ -1215,19 +1371,6 @@
           <a:bodyPr/>
           <a:lstStyle/>
           <a:p>
-            <a:r>
-              <a:rPr lang="en-US" dirty="0" smtClean="0"/>
-              <a:t>Spring Boot makes it easy to create stand-alone, production-grade Spring based Applications that you can “just run”.  </a:t>
-            </a:r>
-          </a:p>
-          <a:p>
-            <a:endParaRPr lang="en-US" dirty="0" smtClean="0"/>
-          </a:p>
-          <a:p>
-            <a:r>
-              <a:rPr lang="en-US" dirty="0" smtClean="0"/>
-              <a:t>take an opinionated view</a:t>
-            </a:r>
             <a:endParaRPr lang="en-US" dirty="0"/>
           </a:p>
         </p:txBody>
@@ -1249,7 +1392,7 @@
           <a:p>
             <a:fld id="{9F9FB9DD-7CF9-4A0C-8C7F-91FD9EF34B36}" type="slidenum">
               <a:rPr lang="en-US" smtClean="0"/>
-              <a:t>11</a:t>
+              <a:t>9</a:t>
             </a:fld>
             <a:endParaRPr lang="en-US" dirty="0"/>
           </a:p>
@@ -1258,7 +1401,7 @@
     </p:spTree>
     <p:extLst>
       <p:ext uri="{BB962C8B-B14F-4D97-AF65-F5344CB8AC3E}">
-        <p14:creationId xmlns:p14="http://schemas.microsoft.com/office/powerpoint/2010/main" val="639032137"/>
+        <p14:creationId xmlns:p14="http://schemas.microsoft.com/office/powerpoint/2010/main" val="2110186832"/>
       </p:ext>
     </p:extLst>
   </p:cSld>
@@ -1313,8 +1456,12 @@
           <a:lstStyle/>
           <a:p>
             <a:r>
+              <a:rPr lang="en-US" b="1" dirty="0" smtClean="0"/>
+              <a:t>component</a:t>
+            </a:r>
+            <a:r>
               <a:rPr lang="en-US" dirty="0" smtClean="0"/>
-              <a:t>Example:</a:t>
+              <a:t> is a unit of software that is independently replaceable and upgradeable.</a:t>
             </a:r>
             <a:endParaRPr lang="en-US" dirty="0"/>
           </a:p>
@@ -1337,7 +1484,7 @@
           <a:p>
             <a:fld id="{9F9FB9DD-7CF9-4A0C-8C7F-91FD9EF34B36}" type="slidenum">
               <a:rPr lang="en-US" smtClean="0"/>
-              <a:t>12</a:t>
+              <a:t>11</a:t>
             </a:fld>
             <a:endParaRPr lang="en-US" dirty="0"/>
           </a:p>
@@ -1346,7 +1493,104 @@
     </p:spTree>
     <p:extLst>
       <p:ext uri="{BB962C8B-B14F-4D97-AF65-F5344CB8AC3E}">
-        <p14:creationId xmlns:p14="http://schemas.microsoft.com/office/powerpoint/2010/main" val="3644509374"/>
+        <p14:creationId xmlns:p14="http://schemas.microsoft.com/office/powerpoint/2010/main" val="2056578434"/>
+      </p:ext>
+    </p:extLst>
+  </p:cSld>
+  <p:clrMapOvr>
+    <a:masterClrMapping/>
+  </p:clrMapOvr>
+</p:notes>
+</file>
+
+<file path=ppt/notesSlides/notesSlide9.xml><?xml version="1.0" encoding="utf-8"?>
+<p:notes xmlns:a="http://schemas.openxmlformats.org/drawingml/2006/main" xmlns:r="http://schemas.openxmlformats.org/officeDocument/2006/relationships" xmlns:p="http://schemas.openxmlformats.org/presentationml/2006/main">
+  <p:cSld>
+    <p:spTree>
+      <p:nvGrpSpPr>
+        <p:cNvPr id="1" name=""/>
+        <p:cNvGrpSpPr/>
+        <p:nvPr/>
+      </p:nvGrpSpPr>
+      <p:grpSpPr>
+        <a:xfrm>
+          <a:off x="0" y="0"/>
+          <a:ext cx="0" cy="0"/>
+          <a:chOff x="0" y="0"/>
+          <a:chExt cx="0" cy="0"/>
+        </a:xfrm>
+      </p:grpSpPr>
+      <p:sp>
+        <p:nvSpPr>
+          <p:cNvPr id="2" name="Slide Image Placeholder 1"/>
+          <p:cNvSpPr>
+            <a:spLocks noGrp="1" noRot="1" noChangeAspect="1"/>
+          </p:cNvSpPr>
+          <p:nvPr>
+            <p:ph type="sldImg"/>
+          </p:nvPr>
+        </p:nvSpPr>
+        <p:spPr/>
+      </p:sp>
+      <p:sp>
+        <p:nvSpPr>
+          <p:cNvPr id="3" name="Notes Placeholder 2"/>
+          <p:cNvSpPr>
+            <a:spLocks noGrp="1"/>
+          </p:cNvSpPr>
+          <p:nvPr>
+            <p:ph type="body" idx="1"/>
+          </p:nvPr>
+        </p:nvSpPr>
+        <p:spPr/>
+        <p:txBody>
+          <a:bodyPr/>
+          <a:lstStyle/>
+          <a:p>
+            <a:r>
+              <a:rPr lang="en-US" dirty="0" smtClean="0"/>
+              <a:t>Spring Boot makes it easy to create stand-alone, production-grade Spring based Applications that you can “just run”.  </a:t>
+            </a:r>
+          </a:p>
+          <a:p>
+            <a:endParaRPr lang="en-US" dirty="0" smtClean="0"/>
+          </a:p>
+          <a:p>
+            <a:r>
+              <a:rPr lang="en-US" dirty="0" smtClean="0"/>
+              <a:t>take an opinionated view</a:t>
+            </a:r>
+            <a:endParaRPr lang="en-US" dirty="0"/>
+          </a:p>
+        </p:txBody>
+      </p:sp>
+      <p:sp>
+        <p:nvSpPr>
+          <p:cNvPr id="4" name="Slide Number Placeholder 3"/>
+          <p:cNvSpPr>
+            <a:spLocks noGrp="1"/>
+          </p:cNvSpPr>
+          <p:nvPr>
+            <p:ph type="sldNum" sz="quarter" idx="10"/>
+          </p:nvPr>
+        </p:nvSpPr>
+        <p:spPr/>
+        <p:txBody>
+          <a:bodyPr/>
+          <a:lstStyle/>
+          <a:p>
+            <a:fld id="{9F9FB9DD-7CF9-4A0C-8C7F-91FD9EF34B36}" type="slidenum">
+              <a:rPr lang="en-US" smtClean="0"/>
+              <a:t>13</a:t>
+            </a:fld>
+            <a:endParaRPr lang="en-US" dirty="0"/>
+          </a:p>
+        </p:txBody>
+      </p:sp>
+    </p:spTree>
+    <p:extLst>
+      <p:ext uri="{BB962C8B-B14F-4D97-AF65-F5344CB8AC3E}">
+        <p14:creationId xmlns:p14="http://schemas.microsoft.com/office/powerpoint/2010/main" val="639032137"/>
       </p:ext>
     </p:extLst>
   </p:cSld>
@@ -4230,7 +4474,7 @@
           <a:p>
             <a:r>
               <a:rPr lang="en-US" dirty="0" smtClean="0"/>
-              <a:t>Spring Boot</a:t>
+              <a:t>Micro Services, REST and Spring Boot</a:t>
             </a:r>
             <a:endParaRPr lang="en-US" dirty="0"/>
           </a:p>
@@ -4321,6 +4565,303 @@
           <a:p>
             <a:r>
               <a:rPr lang="en-US" dirty="0" smtClean="0"/>
+              <a:t>Micro-service</a:t>
+            </a:r>
+            <a:endParaRPr lang="en-US" dirty="0"/>
+          </a:p>
+        </p:txBody>
+      </p:sp>
+      <p:sp>
+        <p:nvSpPr>
+          <p:cNvPr id="3" name="Content Placeholder 2"/>
+          <p:cNvSpPr>
+            <a:spLocks noGrp="1"/>
+          </p:cNvSpPr>
+          <p:nvPr>
+            <p:ph idx="1"/>
+          </p:nvPr>
+        </p:nvSpPr>
+        <p:spPr/>
+        <p:txBody>
+          <a:bodyPr>
+            <a:normAutofit/>
+          </a:bodyPr>
+          <a:lstStyle/>
+          <a:p>
+            <a:pPr marL="0" indent="0" algn="ctr">
+              <a:buNone/>
+            </a:pPr>
+            <a:r>
+              <a:rPr lang="en-US" i="1" dirty="0" smtClean="0"/>
+              <a:t>Developing a single application as a suite of small services, each running in its own process and communicating with lightweight mechanisms, often an HTTP resource API. </a:t>
+            </a:r>
+          </a:p>
+          <a:p>
+            <a:endParaRPr lang="en-US" dirty="0" smtClean="0"/>
+          </a:p>
+          <a:p>
+            <a:endParaRPr lang="en-US" dirty="0"/>
+          </a:p>
+        </p:txBody>
+      </p:sp>
+      <p:sp>
+        <p:nvSpPr>
+          <p:cNvPr id="4" name="TextBox 3"/>
+          <p:cNvSpPr txBox="1"/>
+          <p:nvPr/>
+        </p:nvSpPr>
+        <p:spPr>
+          <a:xfrm>
+            <a:off x="103031" y="6581001"/>
+            <a:ext cx="8667482" cy="276999"/>
+          </a:xfrm>
+          <a:prstGeom prst="rect">
+            <a:avLst/>
+          </a:prstGeom>
+          <a:noFill/>
+        </p:spPr>
+        <p:txBody>
+          <a:bodyPr wrap="square" rtlCol="0">
+            <a:spAutoFit/>
+          </a:bodyPr>
+          <a:lstStyle/>
+          <a:p>
+            <a:r>
+              <a:rPr lang="en-US" sz="1200" i="1" dirty="0" smtClean="0"/>
+              <a:t>Ref</a:t>
+            </a:r>
+            <a:r>
+              <a:rPr lang="en-US" sz="1200" i="1" dirty="0" smtClean="0">
+                <a:hlinkClick r:id="rId2"/>
+              </a:rPr>
+              <a:t>: </a:t>
+            </a:r>
+            <a:r>
+              <a:rPr lang="en-US" sz="1200" i="1" dirty="0" smtClean="0"/>
+              <a:t> </a:t>
+            </a:r>
+            <a:r>
+              <a:rPr lang="en-US" sz="1200" i="1" dirty="0" smtClean="0">
+                <a:hlinkClick r:id="rId3"/>
+              </a:rPr>
+              <a:t>Microservices – Martin </a:t>
+            </a:r>
+            <a:r>
+              <a:rPr lang="en-US" sz="1200" i="1" dirty="0" err="1" smtClean="0">
+                <a:hlinkClick r:id="rId3"/>
+              </a:rPr>
+              <a:t>Folwer</a:t>
+            </a:r>
+            <a:endParaRPr lang="en-US" sz="1200" i="1" dirty="0"/>
+          </a:p>
+        </p:txBody>
+      </p:sp>
+    </p:spTree>
+    <p:extLst>
+      <p:ext uri="{BB962C8B-B14F-4D97-AF65-F5344CB8AC3E}">
+        <p14:creationId xmlns:p14="http://schemas.microsoft.com/office/powerpoint/2010/main" val="1433475006"/>
+      </p:ext>
+    </p:extLst>
+  </p:cSld>
+  <p:clrMapOvr>
+    <a:masterClrMapping/>
+  </p:clrMapOvr>
+</p:sld>
+</file>
+
+<file path=ppt/slides/slide11.xml><?xml version="1.0" encoding="utf-8"?>
+<p:sld xmlns:a="http://schemas.openxmlformats.org/drawingml/2006/main" xmlns:r="http://schemas.openxmlformats.org/officeDocument/2006/relationships" xmlns:p="http://schemas.openxmlformats.org/presentationml/2006/main">
+  <p:cSld>
+    <p:spTree>
+      <p:nvGrpSpPr>
+        <p:cNvPr id="1" name=""/>
+        <p:cNvGrpSpPr/>
+        <p:nvPr/>
+      </p:nvGrpSpPr>
+      <p:grpSpPr>
+        <a:xfrm>
+          <a:off x="0" y="0"/>
+          <a:ext cx="0" cy="0"/>
+          <a:chOff x="0" y="0"/>
+          <a:chExt cx="0" cy="0"/>
+        </a:xfrm>
+      </p:grpSpPr>
+      <p:sp>
+        <p:nvSpPr>
+          <p:cNvPr id="2" name="Title 1"/>
+          <p:cNvSpPr>
+            <a:spLocks noGrp="1"/>
+          </p:cNvSpPr>
+          <p:nvPr>
+            <p:ph type="title"/>
+          </p:nvPr>
+        </p:nvSpPr>
+        <p:spPr/>
+        <p:txBody>
+          <a:bodyPr/>
+          <a:lstStyle/>
+          <a:p>
+            <a:r>
+              <a:rPr lang="en-US" dirty="0" smtClean="0"/>
+              <a:t>Micro-services architectural style</a:t>
+            </a:r>
+            <a:endParaRPr lang="en-US" dirty="0"/>
+          </a:p>
+        </p:txBody>
+      </p:sp>
+      <p:sp>
+        <p:nvSpPr>
+          <p:cNvPr id="3" name="Content Placeholder 2"/>
+          <p:cNvSpPr>
+            <a:spLocks noGrp="1"/>
+          </p:cNvSpPr>
+          <p:nvPr>
+            <p:ph idx="1"/>
+          </p:nvPr>
+        </p:nvSpPr>
+        <p:spPr/>
+        <p:txBody>
+          <a:bodyPr>
+            <a:normAutofit fontScale="55000" lnSpcReduction="20000"/>
+          </a:bodyPr>
+          <a:lstStyle/>
+          <a:p>
+            <a:pPr marL="0" indent="0">
+              <a:buNone/>
+            </a:pPr>
+            <a:r>
+              <a:rPr lang="en-US" dirty="0" smtClean="0"/>
+              <a:t>Characteristics:</a:t>
+            </a:r>
+          </a:p>
+          <a:p>
+            <a:r>
+              <a:rPr lang="en-US" b="1" dirty="0" smtClean="0"/>
+              <a:t>Componentization via Services</a:t>
+            </a:r>
+          </a:p>
+          <a:p>
+            <a:r>
+              <a:rPr lang="en-US" b="1" dirty="0" smtClean="0"/>
+              <a:t>Organized around Business Capabilities</a:t>
+            </a:r>
+          </a:p>
+          <a:p>
+            <a:r>
+              <a:rPr lang="en-US" b="1" dirty="0" smtClean="0"/>
+              <a:t>Products not Projects</a:t>
+            </a:r>
+          </a:p>
+          <a:p>
+            <a:r>
+              <a:rPr lang="en-US" b="1" dirty="0" smtClean="0"/>
+              <a:t>Smart endpoints and dumb pipes</a:t>
+            </a:r>
+          </a:p>
+          <a:p>
+            <a:r>
+              <a:rPr lang="en-US" b="1" dirty="0" smtClean="0"/>
+              <a:t>Decentralized Governance</a:t>
+            </a:r>
+          </a:p>
+          <a:p>
+            <a:r>
+              <a:rPr lang="en-US" b="1" dirty="0" smtClean="0"/>
+              <a:t>Decentralized Data Management</a:t>
+            </a:r>
+          </a:p>
+          <a:p>
+            <a:r>
+              <a:rPr lang="en-US" b="1" dirty="0" smtClean="0"/>
+              <a:t>Infrastructure Automation</a:t>
+            </a:r>
+          </a:p>
+          <a:p>
+            <a:r>
+              <a:rPr lang="en-US" b="1" dirty="0" smtClean="0"/>
+              <a:t>Design for failure</a:t>
+            </a:r>
+          </a:p>
+          <a:p>
+            <a:r>
+              <a:rPr lang="en-US" b="1" dirty="0" smtClean="0"/>
+              <a:t>Evolutionary Design</a:t>
+            </a:r>
+          </a:p>
+          <a:p>
+            <a:endParaRPr lang="en-US" b="1" dirty="0" smtClean="0"/>
+          </a:p>
+          <a:p>
+            <a:pPr marL="0" indent="0">
+              <a:buNone/>
+            </a:pPr>
+            <a:endParaRPr lang="en-US" dirty="0" smtClean="0"/>
+          </a:p>
+          <a:p>
+            <a:endParaRPr lang="en-US" dirty="0" smtClean="0"/>
+          </a:p>
+          <a:p>
+            <a:endParaRPr lang="en-US" dirty="0"/>
+          </a:p>
+          <a:p>
+            <a:pPr marL="0" indent="0">
+              <a:buNone/>
+            </a:pPr>
+            <a:r>
+              <a:rPr lang="en-US" dirty="0" smtClean="0"/>
+              <a:t>Reference: http://martinfowler.com/articles/microservices.html</a:t>
+            </a:r>
+            <a:endParaRPr lang="en-US" dirty="0"/>
+          </a:p>
+        </p:txBody>
+      </p:sp>
+    </p:spTree>
+    <p:extLst>
+      <p:ext uri="{BB962C8B-B14F-4D97-AF65-F5344CB8AC3E}">
+        <p14:creationId xmlns:p14="http://schemas.microsoft.com/office/powerpoint/2010/main" val="3712099602"/>
+      </p:ext>
+    </p:extLst>
+  </p:cSld>
+  <p:clrMapOvr>
+    <a:masterClrMapping/>
+  </p:clrMapOvr>
+</p:sld>
+</file>
+
+<file path=ppt/slides/slide12.xml><?xml version="1.0" encoding="utf-8"?>
+<p:sld xmlns:a="http://schemas.openxmlformats.org/drawingml/2006/main" xmlns:r="http://schemas.openxmlformats.org/officeDocument/2006/relationships" xmlns:p="http://schemas.openxmlformats.org/presentationml/2006/main">
+  <p:cSld>
+    <p:spTree>
+      <p:nvGrpSpPr>
+        <p:cNvPr id="1" name=""/>
+        <p:cNvGrpSpPr/>
+        <p:nvPr/>
+      </p:nvGrpSpPr>
+      <p:grpSpPr>
+        <a:xfrm>
+          <a:off x="0" y="0"/>
+          <a:ext cx="0" cy="0"/>
+          <a:chOff x="0" y="0"/>
+          <a:chExt cx="0" cy="0"/>
+        </a:xfrm>
+      </p:grpSpPr>
+      <p:sp>
+        <p:nvSpPr>
+          <p:cNvPr id="2" name="Title 1"/>
+          <p:cNvSpPr>
+            <a:spLocks noGrp="1"/>
+          </p:cNvSpPr>
+          <p:nvPr>
+            <p:ph type="title"/>
+          </p:nvPr>
+        </p:nvSpPr>
+        <p:spPr/>
+        <p:txBody>
+          <a:bodyPr/>
+          <a:lstStyle/>
+          <a:p>
+            <a:r>
+              <a:rPr lang="en-US" dirty="0" smtClean="0"/>
               <a:t>Spring Framework</a:t>
             </a:r>
             <a:endParaRPr lang="en-US" dirty="0"/>
@@ -4370,7 +4911,7 @@
 </p:sld>
 </file>
 
-<file path=ppt/slides/slide11.xml><?xml version="1.0" encoding="utf-8"?>
+<file path=ppt/slides/slide13.xml><?xml version="1.0" encoding="utf-8"?>
 <p:sld xmlns:a="http://schemas.openxmlformats.org/drawingml/2006/main" xmlns:r="http://schemas.openxmlformats.org/officeDocument/2006/relationships" xmlns:p="http://schemas.openxmlformats.org/presentationml/2006/main">
   <p:cSld>
     <p:spTree>
@@ -4523,7 +5064,7 @@
 </p:sld>
 </file>
 
-<file path=ppt/slides/slide12.xml><?xml version="1.0" encoding="utf-8"?>
+<file path=ppt/slides/slide14.xml><?xml version="1.0" encoding="utf-8"?>
 <p:sld xmlns:a="http://schemas.openxmlformats.org/drawingml/2006/main" xmlns:r="http://schemas.openxmlformats.org/officeDocument/2006/relationships" xmlns:p="http://schemas.openxmlformats.org/presentationml/2006/main">
   <p:cSld>
     <p:spTree>
@@ -4663,7 +5204,7 @@
 </p:sld>
 </file>
 
-<file path=ppt/slides/slide13.xml><?xml version="1.0" encoding="utf-8"?>
+<file path=ppt/slides/slide15.xml><?xml version="1.0" encoding="utf-8"?>
 <p:sld xmlns:a="http://schemas.openxmlformats.org/drawingml/2006/main" xmlns:r="http://schemas.openxmlformats.org/officeDocument/2006/relationships" xmlns:p="http://schemas.openxmlformats.org/presentationml/2006/main">
   <p:cSld>
     <p:spTree>
@@ -4909,11 +5450,7 @@
           <a:p>
             <a:r>
               <a:rPr lang="en-US" dirty="0" smtClean="0"/>
-              <a:t>REST </a:t>
-            </a:r>
-            <a:r>
-              <a:rPr lang="en-US" dirty="0" smtClean="0"/>
-              <a:t>– </a:t>
+              <a:t>REST – </a:t>
             </a:r>
             <a:r>
               <a:rPr lang="en-US" b="1" dirty="0"/>
@@ -4939,7 +5476,6 @@
               <a:rPr lang="en-US" dirty="0"/>
               <a:t>ransfer</a:t>
             </a:r>
-            <a:endParaRPr lang="en-US" dirty="0"/>
           </a:p>
         </p:txBody>
       </p:sp>
@@ -4999,8 +5535,19 @@
           <a:p>
             <a:r>
               <a:rPr lang="en-US" dirty="0" smtClean="0"/>
-              <a:t>Representations – Typically JSON/XML or could be anything that represents a part or the whole of the resource state</a:t>
-            </a:r>
+              <a:t>Representations – Typically JSON/XML or could be anything that represents a part or the whole of the resource </a:t>
+            </a:r>
+            <a:r>
+              <a:rPr lang="en-US" dirty="0" smtClean="0"/>
+              <a:t>state</a:t>
+            </a:r>
+          </a:p>
+          <a:p>
+            <a:r>
+              <a:rPr lang="en-US" dirty="0" smtClean="0"/>
+              <a:t>Not tied to HTTP, but most commonly associated with it</a:t>
+            </a:r>
+            <a:endParaRPr lang="en-US" dirty="0" smtClean="0"/>
           </a:p>
         </p:txBody>
       </p:sp>
@@ -5099,15 +5646,7 @@
           <a:p>
             <a:r>
               <a:rPr lang="en-US" dirty="0" smtClean="0"/>
-              <a:t>REST </a:t>
-            </a:r>
-            <a:r>
-              <a:rPr lang="en-US" dirty="0" smtClean="0"/>
-              <a:t>– </a:t>
-            </a:r>
-            <a:r>
-              <a:rPr lang="en-US" b="1" dirty="0" smtClean="0"/>
-              <a:t>Constraints</a:t>
+              <a:t>REST architectural style - Drivers</a:t>
             </a:r>
             <a:endParaRPr lang="en-US" dirty="0"/>
           </a:p>
@@ -5123,132 +5662,69 @@
             <p:ph idx="1"/>
           </p:nvPr>
         </p:nvSpPr>
-        <p:spPr>
-          <a:xfrm>
-            <a:off x="838199" y="1287887"/>
-            <a:ext cx="10881575" cy="4889076"/>
-          </a:xfrm>
-        </p:spPr>
+        <p:spPr/>
         <p:txBody>
           <a:bodyPr>
-            <a:normAutofit fontScale="92500" lnSpcReduction="10000"/>
+            <a:normAutofit/>
           </a:bodyPr>
           <a:lstStyle/>
           <a:p>
             <a:pPr marL="0" indent="0">
               <a:buNone/>
             </a:pPr>
-            <a:endParaRPr lang="en-US" b="1" dirty="0" smtClean="0"/>
-          </a:p>
-          <a:p>
             <a:r>
               <a:rPr lang="en-US" dirty="0" smtClean="0"/>
-              <a:t>Constraints:</a:t>
+              <a:t>Heterogeneous Interoperability &amp; Rise of Mobile</a:t>
             </a:r>
           </a:p>
           <a:p>
             <a:pPr lvl="1"/>
             <a:r>
-              <a:rPr lang="en-US" b="1" dirty="0" smtClean="0"/>
-              <a:t>Uniform interface </a:t>
-            </a:r>
-            <a:r>
               <a:rPr lang="en-US" dirty="0" smtClean="0"/>
-              <a:t>– Decouple client/server implementations using Standards . Interface is standardized across all components through principle of “generality” (Example: Use URIs to identify resources, HTTP methods for manipulation, self descriptive messages to client and </a:t>
-            </a:r>
+              <a:t>Service (API) providers cannot make any assumptions about the client platforms. </a:t>
+            </a:r>
+          </a:p>
+          <a:p>
+            <a:pPr lvl="1"/>
             <a:r>
               <a:rPr lang="en-US" dirty="0"/>
-              <a:t>Hypermedia as the engine of application </a:t>
+              <a:t>The client could be a browser, a mobile device running any OS, </a:t>
             </a:r>
             <a:r>
               <a:rPr lang="en-US" dirty="0" smtClean="0"/>
-              <a:t>state </a:t>
-            </a:r>
-            <a:r>
-              <a:rPr lang="en-US" dirty="0" err="1" smtClean="0"/>
-              <a:t>i.e</a:t>
-            </a:r>
+              <a:t>a GPS navigator, automotive system or anything else</a:t>
+            </a:r>
+          </a:p>
+          <a:p>
+            <a:pPr lvl="1"/>
             <a:r>
               <a:rPr lang="en-US" dirty="0" smtClean="0"/>
-              <a:t> HATEOAS)</a:t>
+              <a:t>Clients and Services need to evolve independently. </a:t>
             </a:r>
           </a:p>
           <a:p>
             <a:pPr lvl="1"/>
             <a:r>
-              <a:rPr lang="en-US" b="1" dirty="0" smtClean="0"/>
-              <a:t>Stateless</a:t>
-            </a:r>
-            <a:r>
               <a:rPr lang="en-US" dirty="0" smtClean="0"/>
-              <a:t> – Server maintains no client state (</a:t>
-            </a:r>
+              <a:t>Each Client could be running a unique native OS and could be deployed at varied times independent of the Service</a:t>
+            </a:r>
+          </a:p>
+          <a:p>
+            <a:pPr lvl="1"/>
             <a:r>
               <a:rPr lang="en-US" dirty="0" smtClean="0"/>
-              <a:t>Each message has enough info/context for the server to process a message)</a:t>
-            </a:r>
-            <a:endParaRPr lang="en-US" dirty="0" smtClean="0"/>
+              <a:t>Latency issues, performance, reliability are major issues for Mobile platforms</a:t>
+            </a:r>
           </a:p>
           <a:p>
             <a:pPr lvl="1"/>
             <a:r>
-              <a:rPr lang="en-US" b="1" dirty="0" smtClean="0"/>
-              <a:t>Client-server </a:t>
-            </a:r>
-            <a:r>
               <a:rPr lang="en-US" dirty="0" smtClean="0"/>
-              <a:t>– Separation of concerns and a Uniform interface is the link</a:t>
-            </a:r>
-          </a:p>
-          <a:p>
-            <a:pPr lvl="1"/>
-            <a:r>
-              <a:rPr lang="en-US" b="1" dirty="0" smtClean="0"/>
-              <a:t>Cacheable</a:t>
-            </a:r>
-            <a:r>
-              <a:rPr lang="en-US" dirty="0" smtClean="0"/>
-              <a:t> –Server responses are Cacheable where appropriate to counter network latency/performance issues. Could be implicit/explicit/pre-negotiated</a:t>
-            </a:r>
-          </a:p>
-          <a:p>
-            <a:pPr lvl="1"/>
-            <a:r>
-              <a:rPr lang="en-US" b="1" dirty="0" smtClean="0"/>
-              <a:t>Layered system </a:t>
-            </a:r>
-            <a:r>
-              <a:rPr lang="en-US" dirty="0" smtClean="0"/>
-              <a:t>– Components are layered. </a:t>
-            </a:r>
-          </a:p>
-          <a:p>
-            <a:pPr lvl="1"/>
-            <a:r>
-              <a:rPr lang="en-US" b="1" dirty="0" smtClean="0"/>
-              <a:t>Code on demand (</a:t>
-            </a:r>
-            <a:r>
-              <a:rPr lang="en-US" dirty="0" smtClean="0"/>
-              <a:t>Optional</a:t>
-            </a:r>
-            <a:r>
-              <a:rPr lang="en-US" b="1" dirty="0" smtClean="0"/>
-              <a:t>)– </a:t>
-            </a:r>
-            <a:r>
-              <a:rPr lang="en-US" dirty="0" smtClean="0"/>
-              <a:t>Service can temporarily extend client like Java applets, Executable </a:t>
-            </a:r>
-            <a:r>
-              <a:rPr lang="en-US" dirty="0" err="1" smtClean="0"/>
-              <a:t>javascript</a:t>
-            </a:r>
-            <a:r>
-              <a:rPr lang="en-US" dirty="0" smtClean="0"/>
-              <a:t> snippets etc.</a:t>
-            </a:r>
-            <a:endParaRPr lang="en-US" b="1" dirty="0"/>
+              <a:t>Horizontal Scalability – It is critical to build a scalable architecture in order to take advantage of a scalable infrastructure</a:t>
+            </a:r>
+          </a:p>
+          <a:p>
+            <a:endParaRPr lang="en-US" dirty="0"/>
           </a:p>
         </p:txBody>
       </p:sp>
@@ -5260,8 +5736,8 @@
         </p:nvSpPr>
         <p:spPr>
           <a:xfrm>
-            <a:off x="914400" y="6284889"/>
-            <a:ext cx="8667482" cy="461665"/>
+            <a:off x="8281116" y="6423389"/>
+            <a:ext cx="3515932" cy="276999"/>
           </a:xfrm>
           <a:prstGeom prst="rect">
             <a:avLst/>
@@ -5282,37 +5758,13 @@
               <a:rPr lang="en-US" sz="1200" i="1" dirty="0" smtClean="0">
                 <a:hlinkClick r:id="rId3"/>
               </a:rPr>
-              <a:t>: </a:t>
-            </a:r>
-            <a:r>
-              <a:rPr lang="en-US" sz="1200" i="1" dirty="0" smtClean="0">
-                <a:hlinkClick r:id="rId4"/>
+              <a:t>: REST fundamentals – Howard </a:t>
+            </a:r>
+            <a:r>
+              <a:rPr lang="en-US" sz="1200" i="1" dirty="0" err="1" smtClean="0">
+                <a:hlinkClick r:id="rId3"/>
               </a:rPr>
-              <a:t>What is REST anyway? – Todd </a:t>
-            </a:r>
-            <a:r>
-              <a:rPr lang="en-US" sz="1200" i="1" dirty="0" err="1" smtClean="0">
-                <a:hlinkClick r:id="rId4"/>
-              </a:rPr>
-              <a:t>Fredrich</a:t>
-            </a:r>
-            <a:r>
-              <a:rPr lang="en-US" sz="1200" i="1" dirty="0" smtClean="0"/>
-              <a:t>, </a:t>
-            </a:r>
-          </a:p>
-          <a:p>
-            <a:r>
-              <a:rPr lang="en-US" sz="1200" i="1" dirty="0" smtClean="0">
-                <a:hlinkClick r:id="rId5"/>
-              </a:rPr>
-              <a:t>REST – </a:t>
-            </a:r>
-            <a:r>
-              <a:rPr lang="en-US" sz="1200" i="1" dirty="0" smtClean="0">
-                <a:hlinkClick r:id="rId5"/>
-              </a:rPr>
-              <a:t>What is meant by uniform interface</a:t>
+              <a:t>Dierking</a:t>
             </a:r>
             <a:endParaRPr lang="en-US" sz="1200" i="1" dirty="0"/>
           </a:p>
@@ -5321,7 +5773,7 @@
     </p:spTree>
     <p:extLst>
       <p:ext uri="{BB962C8B-B14F-4D97-AF65-F5344CB8AC3E}">
-        <p14:creationId xmlns:p14="http://schemas.microsoft.com/office/powerpoint/2010/main" val="1072542201"/>
+        <p14:creationId xmlns:p14="http://schemas.microsoft.com/office/powerpoint/2010/main" val="1907703282"/>
       </p:ext>
     </p:extLst>
   </p:cSld>
@@ -5364,12 +5816,529 @@
           <a:lstStyle/>
           <a:p>
             <a:r>
+              <a:rPr lang="en-US" b="1" dirty="0" smtClean="0"/>
+              <a:t>How to derive REST style?</a:t>
+            </a:r>
+            <a:endParaRPr lang="en-US" dirty="0"/>
+          </a:p>
+        </p:txBody>
+      </p:sp>
+      <p:sp>
+        <p:nvSpPr>
+          <p:cNvPr id="3" name="Content Placeholder 2"/>
+          <p:cNvSpPr>
+            <a:spLocks noGrp="1"/>
+          </p:cNvSpPr>
+          <p:nvPr>
+            <p:ph idx="1"/>
+          </p:nvPr>
+        </p:nvSpPr>
+        <p:spPr>
+          <a:xfrm>
+            <a:off x="838200" y="1287887"/>
+            <a:ext cx="11353800" cy="4889076"/>
+          </a:xfrm>
+        </p:spPr>
+        <p:txBody>
+          <a:bodyPr>
+            <a:normAutofit/>
+          </a:bodyPr>
+          <a:lstStyle/>
+          <a:p>
+            <a:pPr marL="0" indent="0">
+              <a:buNone/>
+            </a:pPr>
+            <a:endParaRPr lang="en-US" b="1" dirty="0" smtClean="0"/>
+          </a:p>
+          <a:p>
+            <a:r>
               <a:rPr lang="en-US" dirty="0" smtClean="0"/>
-              <a:t>REST </a:t>
-            </a:r>
+              <a:t>Roy Fielding talks about two approaches to design</a:t>
+            </a:r>
+          </a:p>
+          <a:p>
+            <a:pPr lvl="1"/>
             <a:r>
               <a:rPr lang="en-US" dirty="0" smtClean="0"/>
-              <a:t>– Richardson’s Maturity Model</a:t>
+              <a:t>Start with a clean slate to reach the desired design goals </a:t>
+            </a:r>
+            <a:r>
+              <a:rPr lang="en-US" i="1" dirty="0" smtClean="0"/>
+              <a:t>(Emphasizes creativity and unbounded vision)</a:t>
+            </a:r>
+          </a:p>
+          <a:p>
+            <a:pPr lvl="1"/>
+            <a:r>
+              <a:rPr lang="en-US" dirty="0" smtClean="0"/>
+              <a:t>Start with the system needs as a whole, without constraints and then incrementally identify and apply constraints to elements of the system in order to differentiate the design space and allow forces that influence system behavior to flow naturally. </a:t>
+            </a:r>
+            <a:r>
+              <a:rPr lang="en-US" i="1" dirty="0" smtClean="0"/>
+              <a:t>(Emphasizes restraint and understanding of the system context)</a:t>
+            </a:r>
+          </a:p>
+          <a:p>
+            <a:pPr lvl="1"/>
+            <a:endParaRPr lang="en-US" i="1" dirty="0" smtClean="0"/>
+          </a:p>
+          <a:p>
+            <a:pPr lvl="1"/>
+            <a:endParaRPr lang="en-US" i="1" dirty="0"/>
+          </a:p>
+          <a:p>
+            <a:pPr marL="457200" lvl="1" indent="0" algn="ctr">
+              <a:buNone/>
+            </a:pPr>
+            <a:r>
+              <a:rPr lang="en-US" b="1" i="1" dirty="0" smtClean="0"/>
+              <a:t>REST is derived through the second approach by adding “Constraints” to the design</a:t>
+            </a:r>
+            <a:endParaRPr lang="en-US" b="1" i="1" dirty="0"/>
+          </a:p>
+        </p:txBody>
+      </p:sp>
+      <p:sp>
+        <p:nvSpPr>
+          <p:cNvPr id="4" name="TextBox 3"/>
+          <p:cNvSpPr txBox="1"/>
+          <p:nvPr/>
+        </p:nvSpPr>
+        <p:spPr>
+          <a:xfrm>
+            <a:off x="785611" y="6284889"/>
+            <a:ext cx="8281115" cy="276999"/>
+          </a:xfrm>
+          <a:prstGeom prst="rect">
+            <a:avLst/>
+          </a:prstGeom>
+          <a:noFill/>
+        </p:spPr>
+        <p:txBody>
+          <a:bodyPr wrap="square" rtlCol="0">
+            <a:spAutoFit/>
+          </a:bodyPr>
+          <a:lstStyle/>
+          <a:p>
+            <a:r>
+              <a:rPr lang="en-US" sz="1200" i="1" dirty="0" smtClean="0"/>
+              <a:t>Ref</a:t>
+            </a:r>
+            <a:r>
+              <a:rPr lang="en-US" sz="1200" i="1" dirty="0" smtClean="0">
+                <a:hlinkClick r:id="rId3"/>
+              </a:rPr>
+              <a:t>: </a:t>
+            </a:r>
+            <a:r>
+              <a:rPr lang="en-US" sz="1200" i="1" dirty="0" smtClean="0">
+                <a:hlinkClick r:id="rId4"/>
+              </a:rPr>
+              <a:t>Architectural Styles and the design of Network based Software Architectures – Roy Fielding</a:t>
+            </a:r>
+            <a:endParaRPr lang="en-US" sz="1200" i="1" dirty="0"/>
+          </a:p>
+        </p:txBody>
+      </p:sp>
+    </p:spTree>
+    <p:extLst>
+      <p:ext uri="{BB962C8B-B14F-4D97-AF65-F5344CB8AC3E}">
+        <p14:creationId xmlns:p14="http://schemas.microsoft.com/office/powerpoint/2010/main" val="2131087853"/>
+      </p:ext>
+    </p:extLst>
+  </p:cSld>
+  <p:clrMapOvr>
+    <a:masterClrMapping/>
+  </p:clrMapOvr>
+</p:sld>
+</file>
+
+<file path=ppt/slides/slide6.xml><?xml version="1.0" encoding="utf-8"?>
+<p:sld xmlns:a="http://schemas.openxmlformats.org/drawingml/2006/main" xmlns:r="http://schemas.openxmlformats.org/officeDocument/2006/relationships" xmlns:p="http://schemas.openxmlformats.org/presentationml/2006/main">
+  <p:cSld>
+    <p:spTree>
+      <p:nvGrpSpPr>
+        <p:cNvPr id="1" name=""/>
+        <p:cNvGrpSpPr/>
+        <p:nvPr/>
+      </p:nvGrpSpPr>
+      <p:grpSpPr>
+        <a:xfrm>
+          <a:off x="0" y="0"/>
+          <a:ext cx="0" cy="0"/>
+          <a:chOff x="0" y="0"/>
+          <a:chExt cx="0" cy="0"/>
+        </a:xfrm>
+      </p:grpSpPr>
+      <p:sp>
+        <p:nvSpPr>
+          <p:cNvPr id="2" name="Title 1"/>
+          <p:cNvSpPr>
+            <a:spLocks noGrp="1"/>
+          </p:cNvSpPr>
+          <p:nvPr>
+            <p:ph type="title"/>
+          </p:nvPr>
+        </p:nvSpPr>
+        <p:spPr/>
+        <p:txBody>
+          <a:bodyPr/>
+          <a:lstStyle/>
+          <a:p>
+            <a:r>
+              <a:rPr lang="en-US" dirty="0" smtClean="0"/>
+              <a:t>REST – </a:t>
+            </a:r>
+            <a:r>
+              <a:rPr lang="en-US" b="1" dirty="0" smtClean="0"/>
+              <a:t>Constraints</a:t>
+            </a:r>
+            <a:endParaRPr lang="en-US" dirty="0"/>
+          </a:p>
+        </p:txBody>
+      </p:sp>
+      <p:sp>
+        <p:nvSpPr>
+          <p:cNvPr id="3" name="Content Placeholder 2"/>
+          <p:cNvSpPr>
+            <a:spLocks noGrp="1"/>
+          </p:cNvSpPr>
+          <p:nvPr>
+            <p:ph idx="1"/>
+          </p:nvPr>
+        </p:nvSpPr>
+        <p:spPr>
+          <a:xfrm>
+            <a:off x="838199" y="1287886"/>
+            <a:ext cx="11353801" cy="5228823"/>
+          </a:xfrm>
+        </p:spPr>
+        <p:txBody>
+          <a:bodyPr>
+            <a:normAutofit fontScale="92500" lnSpcReduction="20000"/>
+          </a:bodyPr>
+          <a:lstStyle/>
+          <a:p>
+            <a:pPr marL="0" indent="0">
+              <a:buNone/>
+            </a:pPr>
+            <a:endParaRPr lang="en-US" b="1" dirty="0" smtClean="0"/>
+          </a:p>
+          <a:p>
+            <a:r>
+              <a:rPr lang="en-US" dirty="0" smtClean="0"/>
+              <a:t>Constraints:</a:t>
+            </a:r>
+          </a:p>
+          <a:p>
+            <a:pPr lvl="1"/>
+            <a:r>
+              <a:rPr lang="en-US" b="1" dirty="0" smtClean="0"/>
+              <a:t>Uniform interface </a:t>
+            </a:r>
+            <a:r>
+              <a:rPr lang="en-US" dirty="0" smtClean="0"/>
+              <a:t>– Decouple client/server implementations using Standards . Interface is standardized across all components through principle of “generality</a:t>
+            </a:r>
+            <a:r>
+              <a:rPr lang="en-US" dirty="0" smtClean="0"/>
+              <a:t>”</a:t>
+            </a:r>
+          </a:p>
+          <a:p>
+            <a:pPr lvl="2"/>
+            <a:r>
+              <a:rPr lang="en-US" sz="2400" dirty="0" smtClean="0"/>
+              <a:t> Example</a:t>
+            </a:r>
+            <a:r>
+              <a:rPr lang="en-US" sz="2400" dirty="0" smtClean="0"/>
+              <a:t>: </a:t>
+            </a:r>
+            <a:endParaRPr lang="en-US" sz="2400" dirty="0" smtClean="0"/>
+          </a:p>
+          <a:p>
+            <a:pPr lvl="3"/>
+            <a:r>
+              <a:rPr lang="en-US" sz="2200" dirty="0" smtClean="0"/>
+              <a:t>Use </a:t>
+            </a:r>
+            <a:r>
+              <a:rPr lang="en-US" sz="2200" dirty="0" smtClean="0"/>
+              <a:t>URIs to identify </a:t>
+            </a:r>
+            <a:r>
+              <a:rPr lang="en-US" sz="2200" dirty="0" smtClean="0"/>
+              <a:t>resources ( /user/6)</a:t>
+            </a:r>
+          </a:p>
+          <a:p>
+            <a:pPr lvl="3"/>
+            <a:r>
+              <a:rPr lang="en-US" sz="2200" dirty="0" smtClean="0"/>
+              <a:t>HTTP </a:t>
+            </a:r>
+            <a:r>
+              <a:rPr lang="en-US" sz="2200" dirty="0" smtClean="0"/>
+              <a:t>methods for manipulation, self descriptive messages to </a:t>
+            </a:r>
+            <a:r>
+              <a:rPr lang="en-US" sz="2200" dirty="0" smtClean="0"/>
+              <a:t>client (GET, DELETE, POST..)</a:t>
+            </a:r>
+          </a:p>
+          <a:p>
+            <a:pPr lvl="3"/>
+            <a:r>
+              <a:rPr lang="en-US" sz="2200" dirty="0" smtClean="0"/>
+              <a:t>HTTP headers to describe messages (Content-Type: application/</a:t>
+            </a:r>
+            <a:r>
+              <a:rPr lang="en-US" sz="2200" dirty="0" err="1" smtClean="0"/>
+              <a:t>json</a:t>
+            </a:r>
+            <a:r>
+              <a:rPr lang="en-US" sz="2200" dirty="0" smtClean="0"/>
+              <a:t>)</a:t>
+            </a:r>
+          </a:p>
+          <a:p>
+            <a:pPr lvl="3"/>
+            <a:r>
+              <a:rPr lang="en-US" sz="2200" dirty="0" smtClean="0"/>
+              <a:t>Hypermedia </a:t>
+            </a:r>
+            <a:r>
+              <a:rPr lang="en-US" sz="2200" dirty="0"/>
+              <a:t>as the engine of application </a:t>
+            </a:r>
+            <a:r>
+              <a:rPr lang="en-US" sz="2200" dirty="0" smtClean="0"/>
+              <a:t>state </a:t>
+            </a:r>
+            <a:r>
+              <a:rPr lang="en-US" sz="2200" dirty="0" err="1" smtClean="0"/>
+              <a:t>i.e</a:t>
+            </a:r>
+            <a:r>
+              <a:rPr lang="en-US" sz="2200" dirty="0" smtClean="0"/>
+              <a:t> </a:t>
+            </a:r>
+            <a:r>
+              <a:rPr lang="en-US" sz="2200" dirty="0" smtClean="0"/>
+              <a:t>HATEOAS</a:t>
+            </a:r>
+            <a:endParaRPr lang="en-US" sz="2200" dirty="0" smtClean="0"/>
+          </a:p>
+          <a:p>
+            <a:pPr lvl="1"/>
+            <a:r>
+              <a:rPr lang="en-US" b="1" dirty="0" smtClean="0"/>
+              <a:t>Stateless</a:t>
+            </a:r>
+            <a:r>
+              <a:rPr lang="en-US" dirty="0" smtClean="0"/>
+              <a:t> – Server maintains no client state (Each message has enough info/context for the server to process a message)</a:t>
+            </a:r>
+          </a:p>
+          <a:p>
+            <a:pPr lvl="1"/>
+            <a:r>
+              <a:rPr lang="en-US" b="1" dirty="0" smtClean="0"/>
+              <a:t>Client-server </a:t>
+            </a:r>
+            <a:r>
+              <a:rPr lang="en-US" dirty="0" smtClean="0"/>
+              <a:t>– Separation of concerns and a Uniform interface is the link</a:t>
+            </a:r>
+          </a:p>
+          <a:p>
+            <a:pPr lvl="1"/>
+            <a:r>
+              <a:rPr lang="en-US" b="1" dirty="0" smtClean="0"/>
+              <a:t>Cacheable</a:t>
+            </a:r>
+            <a:r>
+              <a:rPr lang="en-US" dirty="0" smtClean="0"/>
+              <a:t> –Server responses are Cacheable where appropriate to counter network latency/performance issues. Could be implicit/explicit/pre-negotiated</a:t>
+            </a:r>
+          </a:p>
+          <a:p>
+            <a:pPr lvl="1"/>
+            <a:r>
+              <a:rPr lang="en-US" b="1" dirty="0" smtClean="0"/>
+              <a:t>Layered system </a:t>
+            </a:r>
+            <a:r>
+              <a:rPr lang="en-US" dirty="0" smtClean="0"/>
+              <a:t>– Components are layered. </a:t>
+            </a:r>
+          </a:p>
+          <a:p>
+            <a:pPr lvl="1"/>
+            <a:r>
+              <a:rPr lang="en-US" b="1" dirty="0" smtClean="0"/>
+              <a:t>Code on demand (</a:t>
+            </a:r>
+            <a:r>
+              <a:rPr lang="en-US" dirty="0" smtClean="0"/>
+              <a:t>Optional</a:t>
+            </a:r>
+            <a:r>
+              <a:rPr lang="en-US" b="1" dirty="0" smtClean="0"/>
+              <a:t>)– </a:t>
+            </a:r>
+            <a:r>
+              <a:rPr lang="en-US" dirty="0" smtClean="0"/>
+              <a:t>Service can temporarily extend client like Java applets, Executable </a:t>
+            </a:r>
+            <a:r>
+              <a:rPr lang="en-US" dirty="0" err="1" smtClean="0"/>
+              <a:t>javascript</a:t>
+            </a:r>
+            <a:r>
+              <a:rPr lang="en-US" dirty="0" smtClean="0"/>
+              <a:t> snippets etc.</a:t>
+            </a:r>
+            <a:endParaRPr lang="en-US" b="1" dirty="0"/>
+          </a:p>
+        </p:txBody>
+      </p:sp>
+      <p:sp>
+        <p:nvSpPr>
+          <p:cNvPr id="4" name="TextBox 3"/>
+          <p:cNvSpPr txBox="1"/>
+          <p:nvPr/>
+        </p:nvSpPr>
+        <p:spPr>
+          <a:xfrm>
+            <a:off x="914400" y="6284889"/>
+            <a:ext cx="8667482" cy="646331"/>
+          </a:xfrm>
+          <a:prstGeom prst="rect">
+            <a:avLst/>
+          </a:prstGeom>
+          <a:noFill/>
+        </p:spPr>
+        <p:txBody>
+          <a:bodyPr wrap="square" rtlCol="0">
+            <a:spAutoFit/>
+          </a:bodyPr>
+          <a:lstStyle/>
+          <a:p>
+            <a:r>
+              <a:rPr lang="en-US" sz="1200" i="1" dirty="0" smtClean="0"/>
+              <a:t>Ref</a:t>
+            </a:r>
+            <a:r>
+              <a:rPr lang="en-US" sz="1200" i="1" dirty="0" smtClean="0">
+                <a:hlinkClick r:id="rId3"/>
+              </a:rPr>
+              <a:t>: </a:t>
+            </a:r>
+            <a:r>
+              <a:rPr lang="en-US" sz="1200" i="1" dirty="0" smtClean="0">
+                <a:hlinkClick r:id="rId4"/>
+              </a:rPr>
+              <a:t>What is REST anyway? – Todd </a:t>
+            </a:r>
+            <a:r>
+              <a:rPr lang="en-US" sz="1200" i="1" dirty="0" err="1" smtClean="0">
+                <a:hlinkClick r:id="rId4"/>
+              </a:rPr>
+              <a:t>Fredrich</a:t>
+            </a:r>
+            <a:r>
+              <a:rPr lang="en-US" sz="1200" i="1" dirty="0" smtClean="0"/>
+              <a:t>, </a:t>
+            </a:r>
+          </a:p>
+          <a:p>
+            <a:r>
+              <a:rPr lang="en-US" sz="1200" i="1" dirty="0" smtClean="0">
+                <a:hlinkClick r:id="rId5"/>
+              </a:rPr>
+              <a:t>REST – What is meant by uniform </a:t>
+            </a:r>
+            <a:r>
+              <a:rPr lang="en-US" sz="1200" i="1" dirty="0" smtClean="0">
+                <a:hlinkClick r:id="rId5"/>
+              </a:rPr>
+              <a:t>interface</a:t>
+            </a:r>
+            <a:endParaRPr lang="en-US" sz="1200" i="1" dirty="0" smtClean="0"/>
+          </a:p>
+          <a:p>
+            <a:r>
+              <a:rPr lang="en-US" sz="1200" i="1" dirty="0" smtClean="0">
+                <a:hlinkClick r:id="rId6"/>
+              </a:rPr>
+              <a:t>Creating REST-</a:t>
+            </a:r>
+            <a:r>
+              <a:rPr lang="en-US" sz="1200" i="1" dirty="0" err="1" smtClean="0">
+                <a:hlinkClick r:id="rId6"/>
+              </a:rPr>
+              <a:t>ful</a:t>
+            </a:r>
+            <a:r>
+              <a:rPr lang="en-US" sz="1200" i="1" dirty="0" smtClean="0">
+                <a:hlinkClick r:id="rId6"/>
+              </a:rPr>
+              <a:t>, Hypermedia based Microservices with Spring Boot</a:t>
+            </a:r>
+            <a:endParaRPr lang="en-US" sz="1200" i="1" dirty="0"/>
+          </a:p>
+        </p:txBody>
+      </p:sp>
+    </p:spTree>
+    <p:extLst>
+      <p:ext uri="{BB962C8B-B14F-4D97-AF65-F5344CB8AC3E}">
+        <p14:creationId xmlns:p14="http://schemas.microsoft.com/office/powerpoint/2010/main" val="1072542201"/>
+      </p:ext>
+    </p:extLst>
+  </p:cSld>
+  <p:clrMapOvr>
+    <a:masterClrMapping/>
+  </p:clrMapOvr>
+</p:sld>
+</file>
+
+<file path=ppt/slides/slide7.xml><?xml version="1.0" encoding="utf-8"?>
+<p:sld xmlns:a="http://schemas.openxmlformats.org/drawingml/2006/main" xmlns:r="http://schemas.openxmlformats.org/officeDocument/2006/relationships" xmlns:p="http://schemas.openxmlformats.org/presentationml/2006/main">
+  <p:cSld>
+    <p:spTree>
+      <p:nvGrpSpPr>
+        <p:cNvPr id="1" name=""/>
+        <p:cNvGrpSpPr/>
+        <p:nvPr/>
+      </p:nvGrpSpPr>
+      <p:grpSpPr>
+        <a:xfrm>
+          <a:off x="0" y="0"/>
+          <a:ext cx="0" cy="0"/>
+          <a:chOff x="0" y="0"/>
+          <a:chExt cx="0" cy="0"/>
+        </a:xfrm>
+      </p:grpSpPr>
+      <p:sp>
+        <p:nvSpPr>
+          <p:cNvPr id="2" name="Title 1"/>
+          <p:cNvSpPr>
+            <a:spLocks noGrp="1"/>
+          </p:cNvSpPr>
+          <p:nvPr>
+            <p:ph type="title"/>
+          </p:nvPr>
+        </p:nvSpPr>
+        <p:spPr/>
+        <p:txBody>
+          <a:bodyPr/>
+          <a:lstStyle/>
+          <a:p>
+            <a:r>
+              <a:rPr lang="en-US" dirty="0" smtClean="0"/>
+              <a:t>REST – Richardson’s Maturity Model</a:t>
             </a:r>
             <a:endParaRPr lang="en-US" dirty="0"/>
           </a:p>
@@ -5400,8 +6369,8 @@
         </p:blipFill>
         <p:spPr bwMode="auto">
           <a:xfrm>
-            <a:off x="2040477" y="1867436"/>
-            <a:ext cx="6825715" cy="4036604"/>
+            <a:off x="7199290" y="2710829"/>
+            <a:ext cx="4992710" cy="3586939"/>
           </a:xfrm>
           <a:prstGeom prst="rect">
             <a:avLst/>
@@ -5431,6 +6400,513 @@
           </a:extLst>
         </p:spPr>
       </p:pic>
+      <p:sp>
+        <p:nvSpPr>
+          <p:cNvPr id="9" name="Rectangle 5"/>
+          <p:cNvSpPr>
+            <a:spLocks noChangeArrowheads="1"/>
+          </p:cNvSpPr>
+          <p:nvPr/>
+        </p:nvSpPr>
+        <p:spPr bwMode="auto">
+          <a:xfrm>
+            <a:off x="257578" y="1567897"/>
+            <a:ext cx="7392473" cy="5324535"/>
+          </a:xfrm>
+          <a:prstGeom prst="rect">
+            <a:avLst/>
+          </a:prstGeom>
+          <a:noFill/>
+          <a:ln>
+            <a:noFill/>
+          </a:ln>
+          <a:effectLst/>
+          <a:extLst>
+            <a:ext uri="{909E8E84-426E-40DD-AFC4-6F175D3DCCD1}">
+              <a14:hiddenFill xmlns:a14="http://schemas.microsoft.com/office/drawing/2010/main">
+                <a:solidFill>
+                  <a:schemeClr val="accent1"/>
+                </a:solidFill>
+              </a14:hiddenFill>
+            </a:ext>
+            <a:ext uri="{91240B29-F687-4F45-9708-019B960494DF}">
+              <a14:hiddenLine xmlns:a14="http://schemas.microsoft.com/office/drawing/2010/main" w="9525">
+                <a:solidFill>
+                  <a:schemeClr val="tx1"/>
+                </a:solidFill>
+                <a:miter lim="800000"/>
+                <a:headEnd/>
+                <a:tailEnd/>
+              </a14:hiddenLine>
+            </a:ext>
+            <a:ext uri="{AF507438-7753-43E0-B8FC-AC1667EBCBE1}">
+              <a14:hiddenEffects xmlns:a14="http://schemas.microsoft.com/office/drawing/2010/main">
+                <a:effectLst>
+                  <a:outerShdw dist="35921" dir="2700000" algn="ctr" rotWithShape="0">
+                    <a:schemeClr val="bg2"/>
+                  </a:outerShdw>
+                </a:effectLst>
+              </a14:hiddenEffects>
+            </a:ext>
+          </a:extLst>
+        </p:spPr>
+        <p:txBody>
+          <a:bodyPr vert="horz" wrap="square" lIns="91440" tIns="45720" rIns="91440" bIns="45720" numCol="1" anchor="ctr" anchorCtr="0" compatLnSpc="1">
+            <a:prstTxWarp prst="textNoShape">
+              <a:avLst/>
+            </a:prstTxWarp>
+            <a:spAutoFit/>
+          </a:bodyPr>
+          <a:lstStyle>
+            <a:lvl1pPr fontAlgn="base">
+              <a:spcBef>
+                <a:spcPct val="0"/>
+              </a:spcBef>
+              <a:spcAft>
+                <a:spcPct val="0"/>
+              </a:spcAft>
+              <a:tabLst>
+                <a:tab pos="457200" algn="l"/>
+              </a:tabLst>
+              <a:defRPr>
+                <a:solidFill>
+                  <a:schemeClr val="tx1"/>
+                </a:solidFill>
+                <a:latin typeface="Arial" pitchFamily="34" charset="0"/>
+                <a:cs typeface="Arial" pitchFamily="34" charset="0"/>
+              </a:defRPr>
+            </a:lvl1pPr>
+            <a:lvl2pPr fontAlgn="base">
+              <a:spcBef>
+                <a:spcPct val="0"/>
+              </a:spcBef>
+              <a:spcAft>
+                <a:spcPct val="0"/>
+              </a:spcAft>
+              <a:tabLst>
+                <a:tab pos="457200" algn="l"/>
+              </a:tabLst>
+              <a:defRPr>
+                <a:solidFill>
+                  <a:schemeClr val="tx1"/>
+                </a:solidFill>
+                <a:latin typeface="Arial" pitchFamily="34" charset="0"/>
+                <a:cs typeface="Arial" pitchFamily="34" charset="0"/>
+              </a:defRPr>
+            </a:lvl2pPr>
+            <a:lvl3pPr fontAlgn="base">
+              <a:spcBef>
+                <a:spcPct val="0"/>
+              </a:spcBef>
+              <a:spcAft>
+                <a:spcPct val="0"/>
+              </a:spcAft>
+              <a:tabLst>
+                <a:tab pos="457200" algn="l"/>
+              </a:tabLst>
+              <a:defRPr>
+                <a:solidFill>
+                  <a:schemeClr val="tx1"/>
+                </a:solidFill>
+                <a:latin typeface="Arial" pitchFamily="34" charset="0"/>
+                <a:cs typeface="Arial" pitchFamily="34" charset="0"/>
+              </a:defRPr>
+            </a:lvl3pPr>
+            <a:lvl4pPr fontAlgn="base">
+              <a:spcBef>
+                <a:spcPct val="0"/>
+              </a:spcBef>
+              <a:spcAft>
+                <a:spcPct val="0"/>
+              </a:spcAft>
+              <a:tabLst>
+                <a:tab pos="457200" algn="l"/>
+              </a:tabLst>
+              <a:defRPr>
+                <a:solidFill>
+                  <a:schemeClr val="tx1"/>
+                </a:solidFill>
+                <a:latin typeface="Arial" pitchFamily="34" charset="0"/>
+                <a:cs typeface="Arial" pitchFamily="34" charset="0"/>
+              </a:defRPr>
+            </a:lvl4pPr>
+            <a:lvl5pPr fontAlgn="base">
+              <a:spcBef>
+                <a:spcPct val="0"/>
+              </a:spcBef>
+              <a:spcAft>
+                <a:spcPct val="0"/>
+              </a:spcAft>
+              <a:tabLst>
+                <a:tab pos="457200" algn="l"/>
+              </a:tabLst>
+              <a:defRPr>
+                <a:solidFill>
+                  <a:schemeClr val="tx1"/>
+                </a:solidFill>
+                <a:latin typeface="Arial" pitchFamily="34" charset="0"/>
+                <a:cs typeface="Arial" pitchFamily="34" charset="0"/>
+              </a:defRPr>
+            </a:lvl5pPr>
+            <a:lvl6pPr fontAlgn="base">
+              <a:spcBef>
+                <a:spcPct val="0"/>
+              </a:spcBef>
+              <a:spcAft>
+                <a:spcPct val="0"/>
+              </a:spcAft>
+              <a:tabLst>
+                <a:tab pos="457200" algn="l"/>
+              </a:tabLst>
+              <a:defRPr>
+                <a:solidFill>
+                  <a:schemeClr val="tx1"/>
+                </a:solidFill>
+                <a:latin typeface="Arial" pitchFamily="34" charset="0"/>
+                <a:cs typeface="Arial" pitchFamily="34" charset="0"/>
+              </a:defRPr>
+            </a:lvl6pPr>
+            <a:lvl7pPr fontAlgn="base">
+              <a:spcBef>
+                <a:spcPct val="0"/>
+              </a:spcBef>
+              <a:spcAft>
+                <a:spcPct val="0"/>
+              </a:spcAft>
+              <a:tabLst>
+                <a:tab pos="457200" algn="l"/>
+              </a:tabLst>
+              <a:defRPr>
+                <a:solidFill>
+                  <a:schemeClr val="tx1"/>
+                </a:solidFill>
+                <a:latin typeface="Arial" pitchFamily="34" charset="0"/>
+                <a:cs typeface="Arial" pitchFamily="34" charset="0"/>
+              </a:defRPr>
+            </a:lvl7pPr>
+            <a:lvl8pPr fontAlgn="base">
+              <a:spcBef>
+                <a:spcPct val="0"/>
+              </a:spcBef>
+              <a:spcAft>
+                <a:spcPct val="0"/>
+              </a:spcAft>
+              <a:tabLst>
+                <a:tab pos="457200" algn="l"/>
+              </a:tabLst>
+              <a:defRPr>
+                <a:solidFill>
+                  <a:schemeClr val="tx1"/>
+                </a:solidFill>
+                <a:latin typeface="Arial" pitchFamily="34" charset="0"/>
+                <a:cs typeface="Arial" pitchFamily="34" charset="0"/>
+              </a:defRPr>
+            </a:lvl8pPr>
+            <a:lvl9pPr fontAlgn="base">
+              <a:spcBef>
+                <a:spcPct val="0"/>
+              </a:spcBef>
+              <a:spcAft>
+                <a:spcPct val="0"/>
+              </a:spcAft>
+              <a:tabLst>
+                <a:tab pos="457200" algn="l"/>
+              </a:tabLst>
+              <a:defRPr>
+                <a:solidFill>
+                  <a:schemeClr val="tx1"/>
+                </a:solidFill>
+                <a:latin typeface="Arial" pitchFamily="34" charset="0"/>
+                <a:cs typeface="Arial" pitchFamily="34" charset="0"/>
+              </a:defRPr>
+            </a:lvl9pPr>
+          </a:lstStyle>
+          <a:p>
+            <a:pPr lvl="0" fontAlgn="auto">
+              <a:spcBef>
+                <a:spcPts val="0"/>
+              </a:spcBef>
+              <a:spcAft>
+                <a:spcPts val="0"/>
+              </a:spcAft>
+              <a:tabLst/>
+              <a:defRPr/>
+            </a:pPr>
+            <a:r>
+              <a:rPr kumimoji="0" lang="en-US" altLang="en-US" sz="2000" b="1" i="0" u="none" strike="noStrike" cap="none" normalizeH="0" baseline="0" dirty="0" smtClean="0">
+                <a:ln>
+                  <a:noFill/>
+                </a:ln>
+                <a:solidFill>
+                  <a:schemeClr val="tx1"/>
+                </a:solidFill>
+                <a:effectLst/>
+                <a:latin typeface="Arial" pitchFamily="34" charset="0"/>
+                <a:ea typeface="Times New Roman" pitchFamily="18" charset="0"/>
+                <a:cs typeface="Arial" pitchFamily="34" charset="0"/>
+              </a:rPr>
+              <a:t>Level 0</a:t>
+            </a:r>
+            <a:r>
+              <a:rPr kumimoji="0" lang="en-US" altLang="en-US" sz="2000" b="0" i="0" u="none" strike="noStrike" cap="none" normalizeH="0" baseline="0" dirty="0" smtClean="0">
+                <a:ln>
+                  <a:noFill/>
+                </a:ln>
+                <a:solidFill>
+                  <a:schemeClr val="tx1"/>
+                </a:solidFill>
+                <a:effectLst/>
+                <a:latin typeface="Arial" pitchFamily="34" charset="0"/>
+                <a:ea typeface="Times New Roman" pitchFamily="18" charset="0"/>
+                <a:cs typeface="Arial" pitchFamily="34" charset="0"/>
+              </a:rPr>
+              <a:t>: the Swamp of POX - at this level, we just use HTTP as a transport. </a:t>
+            </a:r>
+          </a:p>
+          <a:p>
+            <a:pPr fontAlgn="auto">
+              <a:spcBef>
+                <a:spcPts val="0"/>
+              </a:spcBef>
+              <a:spcAft>
+                <a:spcPts val="0"/>
+              </a:spcAft>
+              <a:tabLst/>
+              <a:defRPr/>
+            </a:pPr>
+            <a:r>
+              <a:rPr lang="en-US" sz="2000" b="1" dirty="0"/>
+              <a:t>Level 1</a:t>
+            </a:r>
+            <a:r>
+              <a:rPr lang="en-US" sz="2000" dirty="0"/>
+              <a:t>: Resources - at this level, a service might use HTTP URIs to distinguish between nouns, or entities, in the system. For example, you might route requests to /customers, /users, etc. XML-RPC is an </a:t>
+            </a:r>
+            <a:r>
+              <a:rPr lang="en-US" sz="2000" dirty="0" smtClean="0"/>
+              <a:t>example: </a:t>
+            </a:r>
+            <a:r>
+              <a:rPr lang="en-US" sz="2000" dirty="0"/>
+              <a:t>it uses HTTP, and it can use URIs to distinguish endpoints. Ultimately, though, XML-RPC is not RESTful: it’s using HTTP as a transport for something else (remote procedure calls</a:t>
+            </a:r>
+            <a:r>
+              <a:rPr lang="en-US" sz="2000" dirty="0" smtClean="0"/>
+              <a:t>).</a:t>
+            </a:r>
+            <a:endParaRPr kumimoji="0" lang="en-US" altLang="en-US" sz="2000" b="0" i="0" u="none" strike="noStrike" cap="none" normalizeH="0" baseline="0" dirty="0" smtClean="0">
+              <a:ln>
+                <a:noFill/>
+              </a:ln>
+              <a:solidFill>
+                <a:schemeClr val="tx1"/>
+              </a:solidFill>
+              <a:effectLst/>
+              <a:latin typeface="Arial" pitchFamily="34" charset="0"/>
+              <a:ea typeface="Times New Roman" pitchFamily="18" charset="0"/>
+              <a:cs typeface="Arial" pitchFamily="34" charset="0"/>
+            </a:endParaRPr>
+          </a:p>
+          <a:p>
+            <a:pPr marL="0" marR="0" lvl="0" indent="0" algn="l" defTabSz="914400" rtl="0" eaLnBrk="0" fontAlgn="base" latinLnBrk="0" hangingPunct="0">
+              <a:lnSpc>
+                <a:spcPct val="100000"/>
+              </a:lnSpc>
+              <a:spcBef>
+                <a:spcPct val="0"/>
+              </a:spcBef>
+              <a:spcAft>
+                <a:spcPct val="0"/>
+              </a:spcAft>
+              <a:buClrTx/>
+              <a:buSzTx/>
+              <a:tabLst>
+                <a:tab pos="457200" algn="l"/>
+              </a:tabLst>
+            </a:pPr>
+            <a:r>
+              <a:rPr kumimoji="0" lang="en-US" altLang="en-US" sz="2000" b="1" i="0" u="none" strike="noStrike" cap="none" normalizeH="0" baseline="0" dirty="0" smtClean="0">
+                <a:ln>
+                  <a:noFill/>
+                </a:ln>
+                <a:solidFill>
+                  <a:schemeClr val="tx1"/>
+                </a:solidFill>
+                <a:effectLst/>
+                <a:latin typeface="Arial" pitchFamily="34" charset="0"/>
+                <a:ea typeface="Times New Roman" pitchFamily="18" charset="0"/>
+                <a:cs typeface="Arial" pitchFamily="34" charset="0"/>
+              </a:rPr>
+              <a:t>Level 2</a:t>
+            </a:r>
+            <a:r>
+              <a:rPr kumimoji="0" lang="en-US" altLang="en-US" sz="2000" b="0" i="0" u="none" strike="noStrike" cap="none" normalizeH="0" baseline="0" dirty="0" smtClean="0">
+                <a:ln>
+                  <a:noFill/>
+                </a:ln>
+                <a:solidFill>
+                  <a:schemeClr val="tx1"/>
+                </a:solidFill>
+                <a:effectLst/>
+                <a:latin typeface="Arial" pitchFamily="34" charset="0"/>
+                <a:ea typeface="Times New Roman" pitchFamily="18" charset="0"/>
+                <a:cs typeface="Arial" pitchFamily="34" charset="0"/>
+              </a:rPr>
+              <a:t>: HTTP methods- this is the level you want to be at. If you do </a:t>
+            </a:r>
+            <a:r>
+              <a:rPr kumimoji="0" lang="en-US" altLang="en-US" sz="2000" b="1" i="0" u="none" strike="noStrike" cap="none" normalizeH="0" baseline="0" dirty="0" smtClean="0">
+                <a:ln>
+                  <a:noFill/>
+                </a:ln>
+                <a:solidFill>
+                  <a:schemeClr val="tx1"/>
+                </a:solidFill>
+                <a:effectLst/>
+                <a:latin typeface="Arial" pitchFamily="34" charset="0"/>
+                <a:ea typeface="Times New Roman" pitchFamily="18" charset="0"/>
+                <a:cs typeface="Arial" pitchFamily="34" charset="0"/>
+              </a:rPr>
+              <a:t>everything</a:t>
+            </a:r>
+            <a:r>
+              <a:rPr kumimoji="0" lang="en-US" altLang="en-US" sz="2000" b="0" i="0" u="none" strike="noStrike" cap="none" normalizeH="0" baseline="0" dirty="0" smtClean="0">
+                <a:ln>
+                  <a:noFill/>
+                </a:ln>
+                <a:solidFill>
+                  <a:schemeClr val="tx1"/>
+                </a:solidFill>
+                <a:effectLst/>
+                <a:latin typeface="Arial" pitchFamily="34" charset="0"/>
+                <a:ea typeface="Times New Roman" pitchFamily="18" charset="0"/>
+                <a:cs typeface="Arial" pitchFamily="34" charset="0"/>
+              </a:rPr>
+              <a:t> wrong with Spring MVC, you’ll probably still end up here. At this level, services take advantage of native HTTP qualities like headers, status codes, distinct URIs, and more. This is where we’ll start our journey.</a:t>
+            </a:r>
+          </a:p>
+          <a:p>
+            <a:pPr marL="0" marR="0" lvl="0" indent="0" algn="l" defTabSz="914400" rtl="0" eaLnBrk="0" fontAlgn="base" latinLnBrk="0" hangingPunct="0">
+              <a:lnSpc>
+                <a:spcPct val="100000"/>
+              </a:lnSpc>
+              <a:spcBef>
+                <a:spcPct val="0"/>
+              </a:spcBef>
+              <a:spcAft>
+                <a:spcPct val="0"/>
+              </a:spcAft>
+              <a:buClrTx/>
+              <a:buSzTx/>
+              <a:tabLst>
+                <a:tab pos="457200" algn="l"/>
+              </a:tabLst>
+            </a:pPr>
+            <a:r>
+              <a:rPr kumimoji="0" lang="en-US" altLang="en-US" sz="2000" b="1" i="0" u="none" strike="noStrike" cap="none" normalizeH="0" baseline="0" dirty="0" smtClean="0">
+                <a:ln>
+                  <a:noFill/>
+                </a:ln>
+                <a:solidFill>
+                  <a:schemeClr val="tx1"/>
+                </a:solidFill>
+                <a:effectLst/>
+                <a:latin typeface="Arial" pitchFamily="34" charset="0"/>
+                <a:ea typeface="Times New Roman" pitchFamily="18" charset="0"/>
+                <a:cs typeface="Arial" pitchFamily="34" charset="0"/>
+              </a:rPr>
+              <a:t>Level 3</a:t>
+            </a:r>
+            <a:r>
+              <a:rPr kumimoji="0" lang="en-US" altLang="en-US" sz="2000" b="0" i="0" u="none" strike="noStrike" cap="none" normalizeH="0" baseline="0" dirty="0" smtClean="0">
+                <a:ln>
+                  <a:noFill/>
+                </a:ln>
+                <a:solidFill>
+                  <a:schemeClr val="tx1"/>
+                </a:solidFill>
+                <a:effectLst/>
+                <a:latin typeface="Arial" pitchFamily="34" charset="0"/>
+                <a:ea typeface="Times New Roman" pitchFamily="18" charset="0"/>
+                <a:cs typeface="Arial" pitchFamily="34" charset="0"/>
+              </a:rPr>
+              <a:t>: Hypermedia Controls - This final level is where we</a:t>
+            </a:r>
+            <a:r>
+              <a:rPr kumimoji="0" lang="en-US" altLang="en-US" sz="2000" b="0" i="0" u="none" strike="noStrike" cap="none" normalizeH="0" dirty="0" smtClean="0">
+                <a:ln>
+                  <a:noFill/>
+                </a:ln>
+                <a:solidFill>
+                  <a:schemeClr val="tx1"/>
+                </a:solidFill>
+                <a:effectLst/>
+                <a:latin typeface="Arial" pitchFamily="34" charset="0"/>
+                <a:ea typeface="Times New Roman" pitchFamily="18" charset="0"/>
+                <a:cs typeface="Arial" pitchFamily="34" charset="0"/>
+              </a:rPr>
+              <a:t> should	</a:t>
+            </a:r>
+            <a:r>
+              <a:rPr kumimoji="0" lang="en-US" altLang="en-US" sz="2000" b="0" i="0" u="none" strike="noStrike" cap="none" normalizeH="0" baseline="0" dirty="0" smtClean="0">
+                <a:ln>
+                  <a:noFill/>
+                </a:ln>
+                <a:solidFill>
+                  <a:schemeClr val="tx1"/>
+                </a:solidFill>
+                <a:effectLst/>
+                <a:latin typeface="Arial" pitchFamily="34" charset="0"/>
+                <a:ea typeface="Times New Roman" pitchFamily="18" charset="0"/>
+                <a:cs typeface="Arial" pitchFamily="34" charset="0"/>
+              </a:rPr>
+              <a:t> strive to be. Hypermedia, as practiced using the </a:t>
+            </a:r>
+            <a:r>
+              <a:rPr kumimoji="0" lang="en-US" altLang="en-US" sz="2000" b="0" i="0" u="none" strike="noStrike" cap="none" normalizeH="0" baseline="0" dirty="0" smtClean="0">
+                <a:ln>
+                  <a:noFill/>
+                </a:ln>
+                <a:solidFill>
+                  <a:schemeClr val="tx1"/>
+                </a:solidFill>
+                <a:effectLst/>
+                <a:latin typeface="Arial" pitchFamily="34" charset="0"/>
+                <a:ea typeface="Times New Roman" pitchFamily="18" charset="0"/>
+                <a:cs typeface="Arial" pitchFamily="34" charset="0"/>
+                <a:hlinkClick r:id="rId4"/>
+              </a:rPr>
+              <a:t>HATEOAS</a:t>
+            </a:r>
+            <a:r>
+              <a:rPr kumimoji="0" lang="en-US" altLang="en-US" sz="2000" b="0" i="0" u="none" strike="noStrike" cap="none" normalizeH="0" baseline="0" dirty="0" smtClean="0">
+                <a:ln>
+                  <a:noFill/>
+                </a:ln>
+                <a:solidFill>
+                  <a:schemeClr val="tx1"/>
+                </a:solidFill>
+                <a:effectLst/>
+                <a:latin typeface="Arial" pitchFamily="34" charset="0"/>
+                <a:ea typeface="Times New Roman" pitchFamily="18" charset="0"/>
+                <a:cs typeface="Arial" pitchFamily="34" charset="0"/>
+              </a:rPr>
+              <a:t> </a:t>
+            </a:r>
+            <a:endParaRPr kumimoji="0" lang="en-US" altLang="en-US" sz="3200" b="0" i="0" u="none" strike="noStrike" cap="none" normalizeH="0" baseline="0" dirty="0" smtClean="0">
+              <a:ln>
+                <a:noFill/>
+              </a:ln>
+              <a:solidFill>
+                <a:schemeClr val="tx1"/>
+              </a:solidFill>
+              <a:effectLst/>
+              <a:latin typeface="Arial" pitchFamily="34" charset="0"/>
+              <a:cs typeface="Arial" pitchFamily="34" charset="0"/>
+            </a:endParaRPr>
+          </a:p>
+        </p:txBody>
+      </p:sp>
     </p:spTree>
     <p:extLst>
       <p:ext uri="{BB962C8B-B14F-4D97-AF65-F5344CB8AC3E}">
@@ -5441,10 +6917,17 @@
   <p:clrMapOvr>
     <a:masterClrMapping/>
   </p:clrMapOvr>
+  <p:timing>
+    <p:tnLst>
+      <p:par>
+        <p:cTn id="1" dur="indefinite" restart="never" nodeType="tmRoot"/>
+      </p:par>
+    </p:tnLst>
+  </p:timing>
 </p:sld>
 </file>
 
-<file path=ppt/slides/slide6.xml><?xml version="1.0" encoding="utf-8"?>
+<file path=ppt/slides/slide8.xml><?xml version="1.0" encoding="utf-8"?>
 <p:sld xmlns:a="http://schemas.openxmlformats.org/drawingml/2006/main" xmlns:r="http://schemas.openxmlformats.org/officeDocument/2006/relationships" xmlns:p="http://schemas.openxmlformats.org/presentationml/2006/main">
   <p:cSld>
     <p:spTree>
@@ -5557,7 +7040,6 @@
               <a:rPr lang="en-US" dirty="0"/>
               <a:t> interfaces dynamically by including hypermedia links with the responses.</a:t>
             </a:r>
-            <a:endParaRPr lang="en-US" dirty="0"/>
           </a:p>
         </p:txBody>
       </p:sp>
@@ -5601,13 +7083,7 @@
               <a:rPr lang="en-US" sz="1200" i="1" dirty="0" smtClean="0">
                 <a:hlinkClick r:id="rId5"/>
               </a:rPr>
-              <a:t>Understanding </a:t>
-            </a:r>
-            <a:r>
-              <a:rPr lang="en-US" sz="1200" i="1" dirty="0" smtClean="0">
-                <a:hlinkClick r:id="rId5"/>
-              </a:rPr>
-              <a:t>HATEOAS</a:t>
+              <a:t>Understanding HATEOAS</a:t>
             </a:r>
             <a:endParaRPr lang="en-US" sz="1200" i="1" dirty="0"/>
           </a:p>
@@ -5815,282 +7291,6 @@
 </p:sld>
 </file>
 
-<file path=ppt/slides/slide7.xml><?xml version="1.0" encoding="utf-8"?>
-<p:sld xmlns:a="http://schemas.openxmlformats.org/drawingml/2006/main" xmlns:r="http://schemas.openxmlformats.org/officeDocument/2006/relationships" xmlns:p="http://schemas.openxmlformats.org/presentationml/2006/main">
-  <p:cSld>
-    <p:spTree>
-      <p:nvGrpSpPr>
-        <p:cNvPr id="1" name=""/>
-        <p:cNvGrpSpPr/>
-        <p:nvPr/>
-      </p:nvGrpSpPr>
-      <p:grpSpPr>
-        <a:xfrm>
-          <a:off x="0" y="0"/>
-          <a:ext cx="0" cy="0"/>
-          <a:chOff x="0" y="0"/>
-          <a:chExt cx="0" cy="0"/>
-        </a:xfrm>
-      </p:grpSpPr>
-      <p:sp>
-        <p:nvSpPr>
-          <p:cNvPr id="2" name="Title 1"/>
-          <p:cNvSpPr>
-            <a:spLocks noGrp="1"/>
-          </p:cNvSpPr>
-          <p:nvPr>
-            <p:ph type="title"/>
-          </p:nvPr>
-        </p:nvSpPr>
-        <p:spPr/>
-        <p:txBody>
-          <a:bodyPr/>
-          <a:lstStyle/>
-          <a:p>
-            <a:r>
-              <a:rPr lang="en-US" dirty="0" smtClean="0"/>
-              <a:t>REST architectural style - Drivers</a:t>
-            </a:r>
-            <a:endParaRPr lang="en-US" dirty="0"/>
-          </a:p>
-        </p:txBody>
-      </p:sp>
-      <p:sp>
-        <p:nvSpPr>
-          <p:cNvPr id="3" name="Content Placeholder 2"/>
-          <p:cNvSpPr>
-            <a:spLocks noGrp="1"/>
-          </p:cNvSpPr>
-          <p:nvPr>
-            <p:ph idx="1"/>
-          </p:nvPr>
-        </p:nvSpPr>
-        <p:spPr/>
-        <p:txBody>
-          <a:bodyPr>
-            <a:normAutofit/>
-          </a:bodyPr>
-          <a:lstStyle/>
-          <a:p>
-            <a:pPr marL="0" indent="0">
-              <a:buNone/>
-            </a:pPr>
-            <a:r>
-              <a:rPr lang="en-US" dirty="0" smtClean="0"/>
-              <a:t>Heterogeneous </a:t>
-            </a:r>
-            <a:r>
-              <a:rPr lang="en-US" dirty="0" smtClean="0"/>
-              <a:t>Interoperability &amp; Rise of Mobile</a:t>
-            </a:r>
-          </a:p>
-          <a:p>
-            <a:pPr lvl="1"/>
-            <a:r>
-              <a:rPr lang="en-US" dirty="0" smtClean="0"/>
-              <a:t>Service (API) providers cannot make any assumptions about the client platforms. </a:t>
-            </a:r>
-          </a:p>
-          <a:p>
-            <a:pPr lvl="1"/>
-            <a:r>
-              <a:rPr lang="en-US" dirty="0"/>
-              <a:t>The client could be a browser, a mobile device running any OS, </a:t>
-            </a:r>
-            <a:r>
-              <a:rPr lang="en-US" dirty="0" smtClean="0"/>
-              <a:t>a GPS navigator, automotive system or anything else</a:t>
-            </a:r>
-          </a:p>
-          <a:p>
-            <a:pPr lvl="1"/>
-            <a:r>
-              <a:rPr lang="en-US" dirty="0" smtClean="0"/>
-              <a:t>Clients and Services need to evolve independently. </a:t>
-            </a:r>
-          </a:p>
-          <a:p>
-            <a:pPr lvl="1"/>
-            <a:r>
-              <a:rPr lang="en-US" dirty="0" smtClean="0"/>
-              <a:t>Each Client could be running a unique native OS and could be deployed at varied times independent of the Service</a:t>
-            </a:r>
-          </a:p>
-          <a:p>
-            <a:pPr lvl="1"/>
-            <a:r>
-              <a:rPr lang="en-US" dirty="0" smtClean="0"/>
-              <a:t>Latency issues, performance, reliability are major issues for Mobile </a:t>
-            </a:r>
-            <a:r>
-              <a:rPr lang="en-US" dirty="0" smtClean="0"/>
-              <a:t>platforms</a:t>
-            </a:r>
-          </a:p>
-          <a:p>
-            <a:pPr lvl="1"/>
-            <a:r>
-              <a:rPr lang="en-US" dirty="0" smtClean="0"/>
-              <a:t>Horizontal Scalability – It is critical to build a scalable architecture in order to take advantage of a scalable infrastructure</a:t>
-            </a:r>
-            <a:endParaRPr lang="en-US" dirty="0" smtClean="0"/>
-          </a:p>
-          <a:p>
-            <a:endParaRPr lang="en-US" dirty="0"/>
-          </a:p>
-        </p:txBody>
-      </p:sp>
-      <p:sp>
-        <p:nvSpPr>
-          <p:cNvPr id="4" name="TextBox 3"/>
-          <p:cNvSpPr txBox="1"/>
-          <p:nvPr/>
-        </p:nvSpPr>
-        <p:spPr>
-          <a:xfrm>
-            <a:off x="8281116" y="6423389"/>
-            <a:ext cx="3515932" cy="276999"/>
-          </a:xfrm>
-          <a:prstGeom prst="rect">
-            <a:avLst/>
-          </a:prstGeom>
-          <a:noFill/>
-        </p:spPr>
-        <p:txBody>
-          <a:bodyPr wrap="square" rtlCol="0">
-            <a:spAutoFit/>
-          </a:bodyPr>
-          <a:lstStyle/>
-          <a:p>
-            <a:r>
-              <a:rPr lang="en-US" sz="1200" i="1" dirty="0" smtClean="0"/>
-              <a:t>Ref</a:t>
-            </a:r>
-            <a:r>
-              <a:rPr lang="en-US" sz="1200" i="1" dirty="0" smtClean="0">
-                <a:hlinkClick r:id="rId3"/>
-              </a:rPr>
-              <a:t>: REST fundamentals – Howard </a:t>
-            </a:r>
-            <a:r>
-              <a:rPr lang="en-US" sz="1200" i="1" dirty="0" err="1" smtClean="0">
-                <a:hlinkClick r:id="rId3"/>
-              </a:rPr>
-              <a:t>Dierking</a:t>
-            </a:r>
-            <a:endParaRPr lang="en-US" sz="1200" i="1" dirty="0"/>
-          </a:p>
-        </p:txBody>
-      </p:sp>
-    </p:spTree>
-    <p:extLst>
-      <p:ext uri="{BB962C8B-B14F-4D97-AF65-F5344CB8AC3E}">
-        <p14:creationId xmlns:p14="http://schemas.microsoft.com/office/powerpoint/2010/main" val="1907703282"/>
-      </p:ext>
-    </p:extLst>
-  </p:cSld>
-  <p:clrMapOvr>
-    <a:masterClrMapping/>
-  </p:clrMapOvr>
-</p:sld>
-</file>
-
-<file path=ppt/slides/slide8.xml><?xml version="1.0" encoding="utf-8"?>
-<p:sld xmlns:a="http://schemas.openxmlformats.org/drawingml/2006/main" xmlns:r="http://schemas.openxmlformats.org/officeDocument/2006/relationships" xmlns:p="http://schemas.openxmlformats.org/presentationml/2006/main">
-  <p:cSld>
-    <p:spTree>
-      <p:nvGrpSpPr>
-        <p:cNvPr id="1" name=""/>
-        <p:cNvGrpSpPr/>
-        <p:nvPr/>
-      </p:nvGrpSpPr>
-      <p:grpSpPr>
-        <a:xfrm>
-          <a:off x="0" y="0"/>
-          <a:ext cx="0" cy="0"/>
-          <a:chOff x="0" y="0"/>
-          <a:chExt cx="0" cy="0"/>
-        </a:xfrm>
-      </p:grpSpPr>
-      <p:sp>
-        <p:nvSpPr>
-          <p:cNvPr id="2" name="Title 1"/>
-          <p:cNvSpPr>
-            <a:spLocks noGrp="1"/>
-          </p:cNvSpPr>
-          <p:nvPr>
-            <p:ph type="title"/>
-          </p:nvPr>
-        </p:nvSpPr>
-        <p:spPr/>
-        <p:txBody>
-          <a:bodyPr/>
-          <a:lstStyle/>
-          <a:p>
-            <a:r>
-              <a:rPr lang="en-US" dirty="0" smtClean="0"/>
-              <a:t>Micro-services architectural style</a:t>
-            </a:r>
-            <a:endParaRPr lang="en-US" dirty="0"/>
-          </a:p>
-        </p:txBody>
-      </p:sp>
-      <p:sp>
-        <p:nvSpPr>
-          <p:cNvPr id="3" name="Content Placeholder 2"/>
-          <p:cNvSpPr>
-            <a:spLocks noGrp="1"/>
-          </p:cNvSpPr>
-          <p:nvPr>
-            <p:ph idx="1"/>
-          </p:nvPr>
-        </p:nvSpPr>
-        <p:spPr/>
-        <p:txBody>
-          <a:bodyPr>
-            <a:normAutofit/>
-          </a:bodyPr>
-          <a:lstStyle/>
-          <a:p>
-            <a:pPr marL="0" indent="0" algn="ctr">
-              <a:buNone/>
-            </a:pPr>
-            <a:r>
-              <a:rPr lang="en-US" i="1" dirty="0" smtClean="0"/>
-              <a:t>Developing a single application as a suite of small services, each running in its own process and communicating with lightweight mechanisms, often an HTTP resource API. </a:t>
-            </a:r>
-          </a:p>
-          <a:p>
-            <a:endParaRPr lang="en-US" dirty="0" smtClean="0"/>
-          </a:p>
-          <a:p>
-            <a:endParaRPr lang="en-US" dirty="0"/>
-          </a:p>
-          <a:p>
-            <a:pPr marL="0" indent="0">
-              <a:buNone/>
-            </a:pPr>
-            <a:r>
-              <a:rPr lang="en-US" dirty="0" smtClean="0"/>
-              <a:t>Reference: http://martinfowler.com/articles/microservices.html</a:t>
-            </a:r>
-            <a:endParaRPr lang="en-US" dirty="0"/>
-          </a:p>
-        </p:txBody>
-      </p:sp>
-    </p:spTree>
-    <p:extLst>
-      <p:ext uri="{BB962C8B-B14F-4D97-AF65-F5344CB8AC3E}">
-        <p14:creationId xmlns:p14="http://schemas.microsoft.com/office/powerpoint/2010/main" val="1433475006"/>
-      </p:ext>
-    </p:extLst>
-  </p:cSld>
-  <p:clrMapOvr>
-    <a:masterClrMapping/>
-  </p:clrMapOvr>
-</p:sld>
-</file>
-
 <file path=ppt/slides/slide9.xml><?xml version="1.0" encoding="utf-8"?>
 <p:sld xmlns:a="http://schemas.openxmlformats.org/drawingml/2006/main" xmlns:r="http://schemas.openxmlformats.org/officeDocument/2006/relationships" xmlns:p="http://schemas.openxmlformats.org/presentationml/2006/main">
   <p:cSld>
@@ -6125,7 +7325,7 @@
           <a:p>
             <a:r>
               <a:rPr lang="en-US" dirty="0" smtClean="0"/>
-              <a:t>Micro-services architectural style</a:t>
+              <a:t>REST - CRUD</a:t>
             </a:r>
             <a:endParaRPr lang="en-US" dirty="0"/>
           </a:p>
@@ -6141,106 +7341,75 @@
             <p:ph idx="1"/>
           </p:nvPr>
         </p:nvSpPr>
-        <p:spPr/>
+        <p:spPr>
+          <a:xfrm>
+            <a:off x="334851" y="1287887"/>
+            <a:ext cx="11384923" cy="4889076"/>
+          </a:xfrm>
+        </p:spPr>
         <p:txBody>
           <a:bodyPr>
-            <a:normAutofit fontScale="55000" lnSpcReduction="20000"/>
+            <a:normAutofit/>
           </a:bodyPr>
           <a:lstStyle/>
           <a:p>
             <a:pPr marL="0" indent="0">
               <a:buNone/>
             </a:pPr>
-            <a:r>
-              <a:rPr lang="en-US" dirty="0" smtClean="0"/>
-              <a:t>Characteristics:</a:t>
-            </a:r>
-          </a:p>
-          <a:p>
-            <a:r>
-              <a:rPr lang="en-US" b="1" dirty="0" smtClean="0"/>
-              <a:t>Componentization via Services</a:t>
-            </a:r>
-          </a:p>
-          <a:p>
-            <a:r>
-              <a:rPr lang="en-US" b="1" dirty="0" smtClean="0"/>
-              <a:t>Organized around Business Capabilities</a:t>
-            </a:r>
-          </a:p>
-          <a:p>
-            <a:r>
-              <a:rPr lang="en-US" b="1" dirty="0" smtClean="0"/>
-              <a:t>Products not Projects</a:t>
-            </a:r>
-          </a:p>
-          <a:p>
-            <a:r>
-              <a:rPr lang="en-US" b="1" dirty="0" smtClean="0"/>
-              <a:t>Smart endpoints and dumb pipes</a:t>
-            </a:r>
-          </a:p>
-          <a:p>
-            <a:r>
-              <a:rPr lang="en-US" b="1" dirty="0" smtClean="0"/>
-              <a:t>Decentralized Governance</a:t>
-            </a:r>
-          </a:p>
-          <a:p>
-            <a:r>
-              <a:rPr lang="en-US" b="1" dirty="0" smtClean="0"/>
-              <a:t>Decentralized Data Management</a:t>
-            </a:r>
-          </a:p>
-          <a:p>
-            <a:r>
-              <a:rPr lang="en-US" b="1" dirty="0" smtClean="0"/>
-              <a:t>Infrastructure Automation</a:t>
-            </a:r>
-          </a:p>
-          <a:p>
-            <a:r>
-              <a:rPr lang="en-US" b="1" dirty="0" smtClean="0"/>
-              <a:t>Design for failure</a:t>
-            </a:r>
-          </a:p>
-          <a:p>
-            <a:r>
-              <a:rPr lang="en-US" b="1" dirty="0" smtClean="0"/>
-              <a:t>Evolutionary Design</a:t>
-            </a:r>
-          </a:p>
-          <a:p>
-            <a:endParaRPr lang="en-US" b="1" dirty="0" smtClean="0"/>
-          </a:p>
-          <a:p>
-            <a:pPr marL="0" indent="0">
-              <a:buNone/>
-            </a:pPr>
-            <a:endParaRPr lang="en-US" dirty="0" smtClean="0"/>
-          </a:p>
-          <a:p>
-            <a:endParaRPr lang="en-US" dirty="0" smtClean="0"/>
-          </a:p>
-          <a:p>
-            <a:endParaRPr lang="en-US" dirty="0"/>
-          </a:p>
-          <a:p>
-            <a:pPr marL="0" indent="0">
-              <a:buNone/>
-            </a:pPr>
-            <a:r>
-              <a:rPr lang="en-US" dirty="0" smtClean="0"/>
-              <a:t>Reference: http://martinfowler.com/articles/microservices.html</a:t>
-            </a:r>
-            <a:endParaRPr lang="en-US" dirty="0"/>
+            <a:endParaRPr lang="en-US" dirty="0"/>
+          </a:p>
+        </p:txBody>
+      </p:sp>
+      <p:sp>
+        <p:nvSpPr>
+          <p:cNvPr id="4" name="TextBox 3"/>
+          <p:cNvSpPr txBox="1"/>
+          <p:nvPr/>
+        </p:nvSpPr>
+        <p:spPr>
+          <a:xfrm>
+            <a:off x="103031" y="6581001"/>
+            <a:ext cx="8667482" cy="276999"/>
+          </a:xfrm>
+          <a:prstGeom prst="rect">
+            <a:avLst/>
+          </a:prstGeom>
+          <a:noFill/>
+        </p:spPr>
+        <p:txBody>
+          <a:bodyPr wrap="square" rtlCol="0">
+            <a:spAutoFit/>
+          </a:bodyPr>
+          <a:lstStyle/>
+          <a:p>
+            <a:r>
+              <a:rPr lang="en-US" sz="1200" i="1" dirty="0" smtClean="0"/>
+              <a:t>Ref</a:t>
+            </a:r>
+            <a:r>
+              <a:rPr lang="en-US" sz="1200" i="1" dirty="0" smtClean="0">
+                <a:hlinkClick r:id="rId3"/>
+              </a:rPr>
+              <a:t>: </a:t>
+            </a:r>
+            <a:r>
+              <a:rPr lang="en-US" sz="1200" i="1" dirty="0" smtClean="0"/>
+              <a:t> </a:t>
+            </a:r>
+            <a:r>
+              <a:rPr lang="en-US" sz="1200" i="1" dirty="0" smtClean="0">
+                <a:hlinkClick r:id="rId4"/>
+              </a:rPr>
+              <a:t>Understanding HATEOAS</a:t>
+            </a:r>
+            <a:endParaRPr lang="en-US" sz="1200" i="1" dirty="0"/>
           </a:p>
         </p:txBody>
       </p:sp>
     </p:spTree>
     <p:extLst>
       <p:ext uri="{BB962C8B-B14F-4D97-AF65-F5344CB8AC3E}">
-        <p14:creationId xmlns:p14="http://schemas.microsoft.com/office/powerpoint/2010/main" val="3712099602"/>
+        <p14:creationId xmlns:p14="http://schemas.microsoft.com/office/powerpoint/2010/main" val="1195776218"/>
       </p:ext>
     </p:extLst>
   </p:cSld>
@@ -6505,7 +7674,7 @@
   <a:extraClrSchemeLst/>
   <a:extLst>
     <a:ext uri="{05A4C25C-085E-4340-85A3-A5531E510DB2}">
-      <thm15:themeFamily xmlns:thm15="http://schemas.microsoft.com/office/thememl/2012/main" xmlns="" name="Office Theme" id="{62F939B6-93AF-4DB8-9C6B-D6C7DFDC589F}" vid="{4A3C46E8-61CC-4603-A589-7422A47A8E4A}"/>
+      <thm15:themeFamily xmlns="" xmlns:thm15="http://schemas.microsoft.com/office/thememl/2012/main" name="Office Theme" id="{62F939B6-93AF-4DB8-9C6B-D6C7DFDC589F}" vid="{4A3C46E8-61CC-4603-A589-7422A47A8E4A}"/>
     </a:ext>
   </a:extLst>
 </a:theme>
@@ -6766,7 +7935,7 @@
   <a:extraClrSchemeLst/>
   <a:extLst>
     <a:ext uri="{05A4C25C-085E-4340-85A3-A5531E510DB2}">
-      <thm15:themeFamily xmlns:thm15="http://schemas.microsoft.com/office/thememl/2012/main" xmlns="" name="Office Theme" id="{62F939B6-93AF-4DB8-9C6B-D6C7DFDC589F}" vid="{4A3C46E8-61CC-4603-A589-7422A47A8E4A}"/>
+      <thm15:themeFamily xmlns="" xmlns:thm15="http://schemas.microsoft.com/office/thememl/2012/main" name="Office Theme" id="{62F939B6-93AF-4DB8-9C6B-D6C7DFDC589F}" vid="{4A3C46E8-61CC-4603-A589-7422A47A8E4A}"/>
     </a:ext>
   </a:extLst>
 </a:theme>
@@ -7027,7 +8196,7 @@
   <a:extraClrSchemeLst/>
   <a:extLst>
     <a:ext uri="{05A4C25C-085E-4340-85A3-A5531E510DB2}">
-      <thm15:themeFamily xmlns:thm15="http://schemas.microsoft.com/office/thememl/2012/main" xmlns="" name="Office Theme" id="{62F939B6-93AF-4DB8-9C6B-D6C7DFDC589F}" vid="{4A3C46E8-61CC-4603-A589-7422A47A8E4A}"/>
+      <thm15:themeFamily xmlns="" xmlns:thm15="http://schemas.microsoft.com/office/thememl/2012/main" name="Office Theme" id="{62F939B6-93AF-4DB8-9C6B-D6C7DFDC589F}" vid="{4A3C46E8-61CC-4603-A589-7422A47A8E4A}"/>
     </a:ext>
   </a:extLst>
 </a:theme>

</xml_diff>

<commit_message>
Completed REST slides. Working on Microservices
</commit_message>
<xml_diff>
--- a/Spring Boot.pptx
+++ b/Spring Boot.pptx
@@ -5,10 +5,10 @@
     <p:sldMasterId id="2147483648" r:id="rId1"/>
   </p:sldMasterIdLst>
   <p:notesMasterIdLst>
-    <p:notesMasterId r:id="rId17"/>
+    <p:notesMasterId r:id="rId19"/>
   </p:notesMasterIdLst>
   <p:handoutMasterIdLst>
-    <p:handoutMasterId r:id="rId18"/>
+    <p:handoutMasterId r:id="rId20"/>
   </p:handoutMasterIdLst>
   <p:sldIdLst>
     <p:sldId id="256" r:id="rId2"/>
@@ -20,12 +20,14 @@
     <p:sldId id="265" r:id="rId8"/>
     <p:sldId id="268" r:id="rId9"/>
     <p:sldId id="270" r:id="rId10"/>
-    <p:sldId id="259" r:id="rId11"/>
-    <p:sldId id="262" r:id="rId12"/>
-    <p:sldId id="260" r:id="rId13"/>
-    <p:sldId id="261" r:id="rId14"/>
-    <p:sldId id="263" r:id="rId15"/>
-    <p:sldId id="264" r:id="rId16"/>
+    <p:sldId id="271" r:id="rId11"/>
+    <p:sldId id="259" r:id="rId12"/>
+    <p:sldId id="272" r:id="rId13"/>
+    <p:sldId id="262" r:id="rId14"/>
+    <p:sldId id="260" r:id="rId15"/>
+    <p:sldId id="261" r:id="rId16"/>
+    <p:sldId id="263" r:id="rId17"/>
+    <p:sldId id="264" r:id="rId18"/>
   </p:sldIdLst>
   <p:sldSz cx="12192000" cy="6858000"/>
   <p:notesSz cx="6858000" cy="9144000"/>
@@ -126,7 +128,7 @@
   </p:defaultTextStyle>
   <p:extLst>
     <p:ext uri="{EFAFB233-063F-42B5-8137-9DF3F51BA10A}">
-      <p15:sldGuideLst xmlns="" xmlns:p15="http://schemas.microsoft.com/office/powerpoint/2012/main">
+      <p15:sldGuideLst xmlns:p15="http://schemas.microsoft.com/office/powerpoint/2012/main" xmlns="">
         <p15:guide id="1" orient="horz" pos="2160">
           <p15:clr>
             <a:srgbClr val="A4A3A4"/>
@@ -140,7 +142,7 @@
       </p15:sldGuideLst>
     </p:ext>
     <p:ext uri="{2D200454-40CA-4A62-9FC3-DE9A4176ACB9}">
-      <p15:notesGuideLst xmlns="" xmlns:p15="http://schemas.microsoft.com/office/powerpoint/2012/main"/>
+      <p15:notesGuideLst xmlns:p15="http://schemas.microsoft.com/office/powerpoint/2012/main" xmlns=""/>
     </p:ext>
   </p:extLst>
 </p:presentation>
@@ -790,6 +792,195 @@
           <a:lstStyle/>
           <a:p>
             <a:r>
+              <a:rPr lang="en-US" b="1" dirty="0" smtClean="0"/>
+              <a:t>component</a:t>
+            </a:r>
+            <a:r>
+              <a:rPr lang="en-US" dirty="0" smtClean="0"/>
+              <a:t> is a unit of software that is independently replaceable and upgradeable.</a:t>
+            </a:r>
+            <a:endParaRPr lang="en-US" dirty="0"/>
+          </a:p>
+        </p:txBody>
+      </p:sp>
+      <p:sp>
+        <p:nvSpPr>
+          <p:cNvPr id="4" name="Slide Number Placeholder 3"/>
+          <p:cNvSpPr>
+            <a:spLocks noGrp="1"/>
+          </p:cNvSpPr>
+          <p:nvPr>
+            <p:ph type="sldNum" sz="quarter" idx="10"/>
+          </p:nvPr>
+        </p:nvSpPr>
+        <p:spPr/>
+        <p:txBody>
+          <a:bodyPr/>
+          <a:lstStyle/>
+          <a:p>
+            <a:fld id="{9F9FB9DD-7CF9-4A0C-8C7F-91FD9EF34B36}" type="slidenum">
+              <a:rPr lang="en-US" smtClean="0"/>
+              <a:t>13</a:t>
+            </a:fld>
+            <a:endParaRPr lang="en-US" dirty="0"/>
+          </a:p>
+        </p:txBody>
+      </p:sp>
+    </p:spTree>
+    <p:extLst>
+      <p:ext uri="{BB962C8B-B14F-4D97-AF65-F5344CB8AC3E}">
+        <p14:creationId xmlns:p14="http://schemas.microsoft.com/office/powerpoint/2010/main" val="2056578434"/>
+      </p:ext>
+    </p:extLst>
+  </p:cSld>
+  <p:clrMapOvr>
+    <a:masterClrMapping/>
+  </p:clrMapOvr>
+</p:notes>
+</file>
+
+<file path=ppt/notesSlides/notesSlide11.xml><?xml version="1.0" encoding="utf-8"?>
+<p:notes xmlns:a="http://schemas.openxmlformats.org/drawingml/2006/main" xmlns:r="http://schemas.openxmlformats.org/officeDocument/2006/relationships" xmlns:p="http://schemas.openxmlformats.org/presentationml/2006/main">
+  <p:cSld>
+    <p:spTree>
+      <p:nvGrpSpPr>
+        <p:cNvPr id="1" name=""/>
+        <p:cNvGrpSpPr/>
+        <p:nvPr/>
+      </p:nvGrpSpPr>
+      <p:grpSpPr>
+        <a:xfrm>
+          <a:off x="0" y="0"/>
+          <a:ext cx="0" cy="0"/>
+          <a:chOff x="0" y="0"/>
+          <a:chExt cx="0" cy="0"/>
+        </a:xfrm>
+      </p:grpSpPr>
+      <p:sp>
+        <p:nvSpPr>
+          <p:cNvPr id="2" name="Slide Image Placeholder 1"/>
+          <p:cNvSpPr>
+            <a:spLocks noGrp="1" noRot="1" noChangeAspect="1"/>
+          </p:cNvSpPr>
+          <p:nvPr>
+            <p:ph type="sldImg"/>
+          </p:nvPr>
+        </p:nvSpPr>
+        <p:spPr/>
+      </p:sp>
+      <p:sp>
+        <p:nvSpPr>
+          <p:cNvPr id="3" name="Notes Placeholder 2"/>
+          <p:cNvSpPr>
+            <a:spLocks noGrp="1"/>
+          </p:cNvSpPr>
+          <p:nvPr>
+            <p:ph type="body" idx="1"/>
+          </p:nvPr>
+        </p:nvSpPr>
+        <p:spPr/>
+        <p:txBody>
+          <a:bodyPr/>
+          <a:lstStyle/>
+          <a:p>
+            <a:r>
+              <a:rPr lang="en-US" dirty="0" smtClean="0"/>
+              <a:t>Spring Boot makes it easy to create stand-alone, production-grade Spring based Applications that you can “just run”.  </a:t>
+            </a:r>
+          </a:p>
+          <a:p>
+            <a:endParaRPr lang="en-US" dirty="0" smtClean="0"/>
+          </a:p>
+          <a:p>
+            <a:r>
+              <a:rPr lang="en-US" dirty="0" smtClean="0"/>
+              <a:t>take an opinionated view</a:t>
+            </a:r>
+            <a:endParaRPr lang="en-US" dirty="0"/>
+          </a:p>
+        </p:txBody>
+      </p:sp>
+      <p:sp>
+        <p:nvSpPr>
+          <p:cNvPr id="4" name="Slide Number Placeholder 3"/>
+          <p:cNvSpPr>
+            <a:spLocks noGrp="1"/>
+          </p:cNvSpPr>
+          <p:nvPr>
+            <p:ph type="sldNum" sz="quarter" idx="10"/>
+          </p:nvPr>
+        </p:nvSpPr>
+        <p:spPr/>
+        <p:txBody>
+          <a:bodyPr/>
+          <a:lstStyle/>
+          <a:p>
+            <a:fld id="{9F9FB9DD-7CF9-4A0C-8C7F-91FD9EF34B36}" type="slidenum">
+              <a:rPr lang="en-US" smtClean="0"/>
+              <a:t>15</a:t>
+            </a:fld>
+            <a:endParaRPr lang="en-US" dirty="0"/>
+          </a:p>
+        </p:txBody>
+      </p:sp>
+    </p:spTree>
+    <p:extLst>
+      <p:ext uri="{BB962C8B-B14F-4D97-AF65-F5344CB8AC3E}">
+        <p14:creationId xmlns:p14="http://schemas.microsoft.com/office/powerpoint/2010/main" val="639032137"/>
+      </p:ext>
+    </p:extLst>
+  </p:cSld>
+  <p:clrMapOvr>
+    <a:masterClrMapping/>
+  </p:clrMapOvr>
+</p:notes>
+</file>
+
+<file path=ppt/notesSlides/notesSlide12.xml><?xml version="1.0" encoding="utf-8"?>
+<p:notes xmlns:a="http://schemas.openxmlformats.org/drawingml/2006/main" xmlns:r="http://schemas.openxmlformats.org/officeDocument/2006/relationships" xmlns:p="http://schemas.openxmlformats.org/presentationml/2006/main">
+  <p:cSld>
+    <p:spTree>
+      <p:nvGrpSpPr>
+        <p:cNvPr id="1" name=""/>
+        <p:cNvGrpSpPr/>
+        <p:nvPr/>
+      </p:nvGrpSpPr>
+      <p:grpSpPr>
+        <a:xfrm>
+          <a:off x="0" y="0"/>
+          <a:ext cx="0" cy="0"/>
+          <a:chOff x="0" y="0"/>
+          <a:chExt cx="0" cy="0"/>
+        </a:xfrm>
+      </p:grpSpPr>
+      <p:sp>
+        <p:nvSpPr>
+          <p:cNvPr id="2" name="Slide Image Placeholder 1"/>
+          <p:cNvSpPr>
+            <a:spLocks noGrp="1" noRot="1" noChangeAspect="1"/>
+          </p:cNvSpPr>
+          <p:nvPr>
+            <p:ph type="sldImg"/>
+          </p:nvPr>
+        </p:nvSpPr>
+        <p:spPr/>
+      </p:sp>
+      <p:sp>
+        <p:nvSpPr>
+          <p:cNvPr id="3" name="Notes Placeholder 2"/>
+          <p:cNvSpPr>
+            <a:spLocks noGrp="1"/>
+          </p:cNvSpPr>
+          <p:nvPr>
+            <p:ph type="body" idx="1"/>
+          </p:nvPr>
+        </p:nvSpPr>
+        <p:spPr/>
+        <p:txBody>
+          <a:bodyPr/>
+          <a:lstStyle/>
+          <a:p>
+            <a:r>
               <a:rPr lang="en-US" dirty="0" smtClean="0"/>
               <a:t>Example:</a:t>
             </a:r>
@@ -814,7 +1005,7 @@
           <a:p>
             <a:fld id="{9F9FB9DD-7CF9-4A0C-8C7F-91FD9EF34B36}" type="slidenum">
               <a:rPr lang="en-US" smtClean="0"/>
-              <a:t>14</a:t>
+              <a:t>16</a:t>
             </a:fld>
             <a:endParaRPr lang="en-US" dirty="0"/>
           </a:p>
@@ -1455,14 +1646,6 @@
           <a:bodyPr/>
           <a:lstStyle/>
           <a:p>
-            <a:r>
-              <a:rPr lang="en-US" b="1" dirty="0" smtClean="0"/>
-              <a:t>component</a:t>
-            </a:r>
-            <a:r>
-              <a:rPr lang="en-US" dirty="0" smtClean="0"/>
-              <a:t> is a unit of software that is independently replaceable and upgradeable.</a:t>
-            </a:r>
             <a:endParaRPr lang="en-US" dirty="0"/>
           </a:p>
         </p:txBody>
@@ -1484,7 +1667,7 @@
           <a:p>
             <a:fld id="{9F9FB9DD-7CF9-4A0C-8C7F-91FD9EF34B36}" type="slidenum">
               <a:rPr lang="en-US" smtClean="0"/>
-              <a:t>11</a:t>
+              <a:t>10</a:t>
             </a:fld>
             <a:endParaRPr lang="en-US" dirty="0"/>
           </a:p>
@@ -1493,7 +1676,7 @@
     </p:spTree>
     <p:extLst>
       <p:ext uri="{BB962C8B-B14F-4D97-AF65-F5344CB8AC3E}">
-        <p14:creationId xmlns:p14="http://schemas.microsoft.com/office/powerpoint/2010/main" val="2056578434"/>
+        <p14:creationId xmlns:p14="http://schemas.microsoft.com/office/powerpoint/2010/main" val="2110186832"/>
       </p:ext>
     </p:extLst>
   </p:cSld>
@@ -1547,19 +1730,6 @@
           <a:bodyPr/>
           <a:lstStyle/>
           <a:p>
-            <a:r>
-              <a:rPr lang="en-US" dirty="0" smtClean="0"/>
-              <a:t>Spring Boot makes it easy to create stand-alone, production-grade Spring based Applications that you can “just run”.  </a:t>
-            </a:r>
-          </a:p>
-          <a:p>
-            <a:endParaRPr lang="en-US" dirty="0" smtClean="0"/>
-          </a:p>
-          <a:p>
-            <a:r>
-              <a:rPr lang="en-US" dirty="0" smtClean="0"/>
-              <a:t>take an opinionated view</a:t>
-            </a:r>
             <a:endParaRPr lang="en-US" dirty="0"/>
           </a:p>
         </p:txBody>
@@ -1581,7 +1751,7 @@
           <a:p>
             <a:fld id="{9F9FB9DD-7CF9-4A0C-8C7F-91FD9EF34B36}" type="slidenum">
               <a:rPr lang="en-US" smtClean="0"/>
-              <a:t>13</a:t>
+              <a:t>11</a:t>
             </a:fld>
             <a:endParaRPr lang="en-US" dirty="0"/>
           </a:p>
@@ -1590,7 +1760,7 @@
     </p:spTree>
     <p:extLst>
       <p:ext uri="{BB962C8B-B14F-4D97-AF65-F5344CB8AC3E}">
-        <p14:creationId xmlns:p14="http://schemas.microsoft.com/office/powerpoint/2010/main" val="639032137"/>
+        <p14:creationId xmlns:p14="http://schemas.microsoft.com/office/powerpoint/2010/main" val="4276762252"/>
       </p:ext>
     </p:extLst>
   </p:cSld>
@@ -4558,48 +4728,20 @@
             <p:ph type="title"/>
           </p:nvPr>
         </p:nvSpPr>
-        <p:spPr/>
+        <p:spPr>
+          <a:xfrm>
+            <a:off x="1" y="365125"/>
+            <a:ext cx="12192000" cy="981075"/>
+          </a:xfrm>
+        </p:spPr>
         <p:txBody>
           <a:bodyPr/>
           <a:lstStyle/>
           <a:p>
             <a:r>
               <a:rPr lang="en-US" dirty="0" smtClean="0"/>
-              <a:t>Micro-service</a:t>
-            </a:r>
-            <a:endParaRPr lang="en-US" dirty="0"/>
-          </a:p>
-        </p:txBody>
-      </p:sp>
-      <p:sp>
-        <p:nvSpPr>
-          <p:cNvPr id="3" name="Content Placeholder 2"/>
-          <p:cNvSpPr>
-            <a:spLocks noGrp="1"/>
-          </p:cNvSpPr>
-          <p:nvPr>
-            <p:ph idx="1"/>
-          </p:nvPr>
-        </p:nvSpPr>
-        <p:spPr/>
-        <p:txBody>
-          <a:bodyPr>
-            <a:normAutofit/>
-          </a:bodyPr>
-          <a:lstStyle/>
-          <a:p>
-            <a:pPr marL="0" indent="0" algn="ctr">
-              <a:buNone/>
-            </a:pPr>
-            <a:r>
-              <a:rPr lang="en-US" i="1" dirty="0" smtClean="0"/>
-              <a:t>Developing a single application as a suite of small services, each running in its own process and communicating with lightweight mechanisms, often an HTTP resource API. </a:t>
-            </a:r>
-          </a:p>
-          <a:p>
-            <a:endParaRPr lang="en-US" dirty="0" smtClean="0"/>
-          </a:p>
-          <a:p>
+              <a:t>HTTP status codes</a:t>
+            </a:r>
             <a:endParaRPr lang="en-US" dirty="0"/>
           </a:p>
         </p:txBody>
@@ -4628,38 +4770,853 @@
           <a:p>
             <a:r>
               <a:rPr lang="en-US" sz="1200" i="1" dirty="0" smtClean="0"/>
-              <a:t>Ref</a:t>
-            </a:r>
-            <a:r>
-              <a:rPr lang="en-US" sz="1200" i="1" dirty="0" smtClean="0">
-                <a:hlinkClick r:id="rId2"/>
-              </a:rPr>
-              <a:t>: </a:t>
-            </a:r>
-            <a:r>
-              <a:rPr lang="en-US" sz="1200" i="1" dirty="0" smtClean="0"/>
-              <a:t> </a:t>
+              <a:t>Ref: </a:t>
             </a:r>
             <a:r>
               <a:rPr lang="en-US" sz="1200" i="1" dirty="0" smtClean="0">
                 <a:hlinkClick r:id="rId3"/>
               </a:rPr>
-              <a:t>Microservices – Martin </a:t>
-            </a:r>
-            <a:r>
-              <a:rPr lang="en-US" sz="1200" i="1" dirty="0" err="1" smtClean="0">
-                <a:hlinkClick r:id="rId3"/>
-              </a:rPr>
-              <a:t>Folwer</a:t>
+              <a:t>HTTP 1.1</a:t>
             </a:r>
             <a:endParaRPr lang="en-US" sz="1200" i="1" dirty="0"/>
           </a:p>
         </p:txBody>
       </p:sp>
+      <p:graphicFrame>
+        <p:nvGraphicFramePr>
+          <p:cNvPr id="7" name="Table 6"/>
+          <p:cNvGraphicFramePr>
+            <a:graphicFrameLocks noGrp="1"/>
+          </p:cNvGraphicFramePr>
+          <p:nvPr>
+            <p:extLst>
+              <p:ext uri="{D42A27DB-BD31-4B8C-83A1-F6EECF244321}">
+                <p14:modId xmlns:p14="http://schemas.microsoft.com/office/powerpoint/2010/main" val="3886781647"/>
+              </p:ext>
+            </p:extLst>
+          </p:nvPr>
+        </p:nvGraphicFramePr>
+        <p:xfrm>
+          <a:off x="103030" y="1608666"/>
+          <a:ext cx="11720670" cy="2926080"/>
+        </p:xfrm>
+        <a:graphic>
+          <a:graphicData uri="http://schemas.openxmlformats.org/drawingml/2006/table">
+            <a:tbl>
+              <a:tblPr firstRow="1" bandRow="1">
+                <a:tableStyleId>{2D5ABB26-0587-4C30-8999-92F81FD0307C}</a:tableStyleId>
+              </a:tblPr>
+              <a:tblGrid>
+                <a:gridCol w="2119470"/>
+                <a:gridCol w="2761838"/>
+                <a:gridCol w="2440654"/>
+                <a:gridCol w="2440654"/>
+                <a:gridCol w="1958054"/>
+              </a:tblGrid>
+              <a:tr h="370840">
+                <a:tc>
+                  <a:txBody>
+                    <a:bodyPr/>
+                    <a:lstStyle/>
+                    <a:p>
+                      <a:pPr marL="0" marR="0" indent="0" algn="l" defTabSz="914400" rtl="0" eaLnBrk="1" fontAlgn="auto" latinLnBrk="0" hangingPunct="1">
+                        <a:lnSpc>
+                          <a:spcPct val="100000"/>
+                        </a:lnSpc>
+                        <a:spcBef>
+                          <a:spcPts val="0"/>
+                        </a:spcBef>
+                        <a:spcAft>
+                          <a:spcPts val="0"/>
+                        </a:spcAft>
+                        <a:buClrTx/>
+                        <a:buSzTx/>
+                        <a:buFontTx/>
+                        <a:buNone/>
+                        <a:tabLst/>
+                        <a:defRPr/>
+                      </a:pPr>
+                      <a:r>
+                        <a:rPr lang="en-US" dirty="0" smtClean="0"/>
+                        <a:t>1XX – Informational</a:t>
+                      </a:r>
+                    </a:p>
+                    <a:p>
+                      <a:endParaRPr lang="en-US" dirty="0"/>
+                    </a:p>
+                  </a:txBody>
+                  <a:tcPr>
+                    <a:lnL w="12700" cap="flat" cmpd="sng" algn="ctr">
+                      <a:solidFill>
+                        <a:schemeClr val="tx1"/>
+                      </a:solidFill>
+                      <a:prstDash val="solid"/>
+                      <a:round/>
+                      <a:headEnd type="none" w="med" len="med"/>
+                      <a:tailEnd type="none" w="med" len="med"/>
+                    </a:lnL>
+                    <a:lnR w="12700" cap="flat" cmpd="sng" algn="ctr">
+                      <a:solidFill>
+                        <a:schemeClr val="tx1"/>
+                      </a:solidFill>
+                      <a:prstDash val="solid"/>
+                      <a:round/>
+                      <a:headEnd type="none" w="med" len="med"/>
+                      <a:tailEnd type="none" w="med" len="med"/>
+                    </a:lnR>
+                    <a:lnT w="12700" cap="flat" cmpd="sng" algn="ctr">
+                      <a:solidFill>
+                        <a:schemeClr val="tx1"/>
+                      </a:solidFill>
+                      <a:prstDash val="solid"/>
+                      <a:round/>
+                      <a:headEnd type="none" w="med" len="med"/>
+                      <a:tailEnd type="none" w="med" len="med"/>
+                    </a:lnT>
+                    <a:lnB w="12700" cap="flat" cmpd="sng" algn="ctr">
+                      <a:solidFill>
+                        <a:schemeClr val="tx1"/>
+                      </a:solidFill>
+                      <a:prstDash val="solid"/>
+                      <a:round/>
+                      <a:headEnd type="none" w="med" len="med"/>
+                      <a:tailEnd type="none" w="med" len="med"/>
+                    </a:lnB>
+                  </a:tcPr>
+                </a:tc>
+                <a:tc>
+                  <a:txBody>
+                    <a:bodyPr/>
+                    <a:lstStyle/>
+                    <a:p>
+                      <a:r>
+                        <a:rPr lang="en-US" dirty="0" smtClean="0"/>
+                        <a:t>2XX – Success </a:t>
+                      </a:r>
+                      <a:endParaRPr lang="en-US" dirty="0"/>
+                    </a:p>
+                  </a:txBody>
+                  <a:tcPr>
+                    <a:lnL w="12700" cap="flat" cmpd="sng" algn="ctr">
+                      <a:solidFill>
+                        <a:schemeClr val="tx1"/>
+                      </a:solidFill>
+                      <a:prstDash val="solid"/>
+                      <a:round/>
+                      <a:headEnd type="none" w="med" len="med"/>
+                      <a:tailEnd type="none" w="med" len="med"/>
+                    </a:lnL>
+                    <a:lnR w="12700" cap="flat" cmpd="sng" algn="ctr">
+                      <a:solidFill>
+                        <a:schemeClr val="tx1"/>
+                      </a:solidFill>
+                      <a:prstDash val="solid"/>
+                      <a:round/>
+                      <a:headEnd type="none" w="med" len="med"/>
+                      <a:tailEnd type="none" w="med" len="med"/>
+                    </a:lnR>
+                    <a:lnT w="12700" cap="flat" cmpd="sng" algn="ctr">
+                      <a:solidFill>
+                        <a:schemeClr val="tx1"/>
+                      </a:solidFill>
+                      <a:prstDash val="solid"/>
+                      <a:round/>
+                      <a:headEnd type="none" w="med" len="med"/>
+                      <a:tailEnd type="none" w="med" len="med"/>
+                    </a:lnT>
+                    <a:lnB w="12700" cap="flat" cmpd="sng" algn="ctr">
+                      <a:solidFill>
+                        <a:schemeClr val="tx1"/>
+                      </a:solidFill>
+                      <a:prstDash val="solid"/>
+                      <a:round/>
+                      <a:headEnd type="none" w="med" len="med"/>
+                      <a:tailEnd type="none" w="med" len="med"/>
+                    </a:lnB>
+                  </a:tcPr>
+                </a:tc>
+                <a:tc>
+                  <a:txBody>
+                    <a:bodyPr/>
+                    <a:lstStyle/>
+                    <a:p>
+                      <a:r>
+                        <a:rPr lang="en-US" dirty="0" smtClean="0"/>
+                        <a:t>3XX – Redirection </a:t>
+                      </a:r>
+                      <a:endParaRPr lang="en-US" dirty="0"/>
+                    </a:p>
+                  </a:txBody>
+                  <a:tcPr>
+                    <a:lnL w="12700" cap="flat" cmpd="sng" algn="ctr">
+                      <a:solidFill>
+                        <a:schemeClr val="tx1"/>
+                      </a:solidFill>
+                      <a:prstDash val="solid"/>
+                      <a:round/>
+                      <a:headEnd type="none" w="med" len="med"/>
+                      <a:tailEnd type="none" w="med" len="med"/>
+                    </a:lnL>
+                    <a:lnR w="12700" cap="flat" cmpd="sng" algn="ctr">
+                      <a:solidFill>
+                        <a:schemeClr val="tx1"/>
+                      </a:solidFill>
+                      <a:prstDash val="solid"/>
+                      <a:round/>
+                      <a:headEnd type="none" w="med" len="med"/>
+                      <a:tailEnd type="none" w="med" len="med"/>
+                    </a:lnR>
+                    <a:lnT w="12700" cap="flat" cmpd="sng" algn="ctr">
+                      <a:solidFill>
+                        <a:schemeClr val="tx1"/>
+                      </a:solidFill>
+                      <a:prstDash val="solid"/>
+                      <a:round/>
+                      <a:headEnd type="none" w="med" len="med"/>
+                      <a:tailEnd type="none" w="med" len="med"/>
+                    </a:lnT>
+                    <a:lnB w="12700" cap="flat" cmpd="sng" algn="ctr">
+                      <a:solidFill>
+                        <a:schemeClr val="tx1"/>
+                      </a:solidFill>
+                      <a:prstDash val="solid"/>
+                      <a:round/>
+                      <a:headEnd type="none" w="med" len="med"/>
+                      <a:tailEnd type="none" w="med" len="med"/>
+                    </a:lnB>
+                  </a:tcPr>
+                </a:tc>
+                <a:tc>
+                  <a:txBody>
+                    <a:bodyPr/>
+                    <a:lstStyle/>
+                    <a:p>
+                      <a:r>
+                        <a:rPr lang="en-US" dirty="0" smtClean="0"/>
+                        <a:t>4XX – Client Error </a:t>
+                      </a:r>
+                      <a:endParaRPr lang="en-US" dirty="0"/>
+                    </a:p>
+                  </a:txBody>
+                  <a:tcPr>
+                    <a:lnL w="12700" cap="flat" cmpd="sng" algn="ctr">
+                      <a:solidFill>
+                        <a:schemeClr val="tx1"/>
+                      </a:solidFill>
+                      <a:prstDash val="solid"/>
+                      <a:round/>
+                      <a:headEnd type="none" w="med" len="med"/>
+                      <a:tailEnd type="none" w="med" len="med"/>
+                    </a:lnL>
+                    <a:lnR w="12700" cap="flat" cmpd="sng" algn="ctr">
+                      <a:solidFill>
+                        <a:schemeClr val="tx1"/>
+                      </a:solidFill>
+                      <a:prstDash val="solid"/>
+                      <a:round/>
+                      <a:headEnd type="none" w="med" len="med"/>
+                      <a:tailEnd type="none" w="med" len="med"/>
+                    </a:lnR>
+                    <a:lnT w="12700" cap="flat" cmpd="sng" algn="ctr">
+                      <a:solidFill>
+                        <a:schemeClr val="tx1"/>
+                      </a:solidFill>
+                      <a:prstDash val="solid"/>
+                      <a:round/>
+                      <a:headEnd type="none" w="med" len="med"/>
+                      <a:tailEnd type="none" w="med" len="med"/>
+                    </a:lnT>
+                    <a:lnB w="12700" cap="flat" cmpd="sng" algn="ctr">
+                      <a:solidFill>
+                        <a:schemeClr val="tx1"/>
+                      </a:solidFill>
+                      <a:prstDash val="solid"/>
+                      <a:round/>
+                      <a:headEnd type="none" w="med" len="med"/>
+                      <a:tailEnd type="none" w="med" len="med"/>
+                    </a:lnB>
+                  </a:tcPr>
+                </a:tc>
+                <a:tc>
+                  <a:txBody>
+                    <a:bodyPr/>
+                    <a:lstStyle/>
+                    <a:p>
+                      <a:r>
+                        <a:rPr lang="en-US" dirty="0" smtClean="0"/>
+                        <a:t>5XX – Server Error </a:t>
+                      </a:r>
+                      <a:endParaRPr lang="en-US" dirty="0"/>
+                    </a:p>
+                  </a:txBody>
+                  <a:tcPr>
+                    <a:lnL w="12700" cap="flat" cmpd="sng" algn="ctr">
+                      <a:solidFill>
+                        <a:schemeClr val="tx1"/>
+                      </a:solidFill>
+                      <a:prstDash val="solid"/>
+                      <a:round/>
+                      <a:headEnd type="none" w="med" len="med"/>
+                      <a:tailEnd type="none" w="med" len="med"/>
+                    </a:lnL>
+                    <a:lnR w="12700" cap="flat" cmpd="sng" algn="ctr">
+                      <a:solidFill>
+                        <a:schemeClr val="tx1"/>
+                      </a:solidFill>
+                      <a:prstDash val="solid"/>
+                      <a:round/>
+                      <a:headEnd type="none" w="med" len="med"/>
+                      <a:tailEnd type="none" w="med" len="med"/>
+                    </a:lnR>
+                    <a:lnT w="12700" cap="flat" cmpd="sng" algn="ctr">
+                      <a:solidFill>
+                        <a:schemeClr val="tx1"/>
+                      </a:solidFill>
+                      <a:prstDash val="solid"/>
+                      <a:round/>
+                      <a:headEnd type="none" w="med" len="med"/>
+                      <a:tailEnd type="none" w="med" len="med"/>
+                    </a:lnT>
+                    <a:lnB w="12700" cap="flat" cmpd="sng" algn="ctr">
+                      <a:solidFill>
+                        <a:schemeClr val="tx1"/>
+                      </a:solidFill>
+                      <a:prstDash val="solid"/>
+                      <a:round/>
+                      <a:headEnd type="none" w="med" len="med"/>
+                      <a:tailEnd type="none" w="med" len="med"/>
+                    </a:lnB>
+                  </a:tcPr>
+                </a:tc>
+              </a:tr>
+              <a:tr h="370840">
+                <a:tc>
+                  <a:txBody>
+                    <a:bodyPr/>
+                    <a:lstStyle/>
+                    <a:p>
+                      <a:r>
+                        <a:rPr lang="en-US" dirty="0" smtClean="0"/>
+                        <a:t>100 Continue</a:t>
+                      </a:r>
+                    </a:p>
+                    <a:p>
+                      <a:r>
+                        <a:rPr lang="en-US" dirty="0" smtClean="0"/>
+                        <a:t>102</a:t>
+                      </a:r>
+                      <a:r>
+                        <a:rPr lang="en-US" baseline="0" dirty="0" smtClean="0"/>
+                        <a:t> Processing</a:t>
+                      </a:r>
+                      <a:endParaRPr lang="en-US" dirty="0"/>
+                    </a:p>
+                  </a:txBody>
+                  <a:tcPr>
+                    <a:lnL w="12700" cap="flat" cmpd="sng" algn="ctr">
+                      <a:solidFill>
+                        <a:schemeClr val="tx1"/>
+                      </a:solidFill>
+                      <a:prstDash val="solid"/>
+                      <a:round/>
+                      <a:headEnd type="none" w="med" len="med"/>
+                      <a:tailEnd type="none" w="med" len="med"/>
+                    </a:lnL>
+                    <a:lnR w="12700" cap="flat" cmpd="sng" algn="ctr">
+                      <a:solidFill>
+                        <a:schemeClr val="tx1"/>
+                      </a:solidFill>
+                      <a:prstDash val="solid"/>
+                      <a:round/>
+                      <a:headEnd type="none" w="med" len="med"/>
+                      <a:tailEnd type="none" w="med" len="med"/>
+                    </a:lnR>
+                    <a:lnT w="12700" cap="flat" cmpd="sng" algn="ctr">
+                      <a:solidFill>
+                        <a:schemeClr val="tx1"/>
+                      </a:solidFill>
+                      <a:prstDash val="solid"/>
+                      <a:round/>
+                      <a:headEnd type="none" w="med" len="med"/>
+                      <a:tailEnd type="none" w="med" len="med"/>
+                    </a:lnT>
+                    <a:lnB w="12700" cap="flat" cmpd="sng" algn="ctr">
+                      <a:solidFill>
+                        <a:schemeClr val="tx1"/>
+                      </a:solidFill>
+                      <a:prstDash val="solid"/>
+                      <a:round/>
+                      <a:headEnd type="none" w="med" len="med"/>
+                      <a:tailEnd type="none" w="med" len="med"/>
+                    </a:lnB>
+                  </a:tcPr>
+                </a:tc>
+                <a:tc>
+                  <a:txBody>
+                    <a:bodyPr/>
+                    <a:lstStyle/>
+                    <a:p>
+                      <a:r>
+                        <a:rPr lang="en-US" dirty="0" smtClean="0"/>
+                        <a:t>200 OK</a:t>
+                      </a:r>
+                    </a:p>
+                    <a:p>
+                      <a:r>
+                        <a:rPr lang="en-US" dirty="0" smtClean="0"/>
+                        <a:t>201 Created</a:t>
+                      </a:r>
+                    </a:p>
+                    <a:p>
+                      <a:r>
+                        <a:rPr lang="en-US" dirty="0" smtClean="0"/>
+                        <a:t>202 Accepted</a:t>
+                      </a:r>
+                      <a:endParaRPr lang="en-US" dirty="0"/>
+                    </a:p>
+                  </a:txBody>
+                  <a:tcPr>
+                    <a:lnL w="12700" cap="flat" cmpd="sng" algn="ctr">
+                      <a:solidFill>
+                        <a:schemeClr val="tx1"/>
+                      </a:solidFill>
+                      <a:prstDash val="solid"/>
+                      <a:round/>
+                      <a:headEnd type="none" w="med" len="med"/>
+                      <a:tailEnd type="none" w="med" len="med"/>
+                    </a:lnL>
+                    <a:lnR w="12700" cap="flat" cmpd="sng" algn="ctr">
+                      <a:solidFill>
+                        <a:schemeClr val="tx1"/>
+                      </a:solidFill>
+                      <a:prstDash val="solid"/>
+                      <a:round/>
+                      <a:headEnd type="none" w="med" len="med"/>
+                      <a:tailEnd type="none" w="med" len="med"/>
+                    </a:lnR>
+                    <a:lnT w="12700" cap="flat" cmpd="sng" algn="ctr">
+                      <a:solidFill>
+                        <a:schemeClr val="tx1"/>
+                      </a:solidFill>
+                      <a:prstDash val="solid"/>
+                      <a:round/>
+                      <a:headEnd type="none" w="med" len="med"/>
+                      <a:tailEnd type="none" w="med" len="med"/>
+                    </a:lnT>
+                    <a:lnB w="12700" cap="flat" cmpd="sng" algn="ctr">
+                      <a:solidFill>
+                        <a:schemeClr val="tx1"/>
+                      </a:solidFill>
+                      <a:prstDash val="solid"/>
+                      <a:round/>
+                      <a:headEnd type="none" w="med" len="med"/>
+                      <a:tailEnd type="none" w="med" len="med"/>
+                    </a:lnB>
+                  </a:tcPr>
+                </a:tc>
+                <a:tc>
+                  <a:txBody>
+                    <a:bodyPr/>
+                    <a:lstStyle/>
+                    <a:p>
+                      <a:pPr marL="0" marR="0" indent="0" algn="l" defTabSz="914400" rtl="0" eaLnBrk="1" fontAlgn="auto" latinLnBrk="0" hangingPunct="1">
+                        <a:lnSpc>
+                          <a:spcPct val="100000"/>
+                        </a:lnSpc>
+                        <a:spcBef>
+                          <a:spcPts val="0"/>
+                        </a:spcBef>
+                        <a:spcAft>
+                          <a:spcPts val="0"/>
+                        </a:spcAft>
+                        <a:buClrTx/>
+                        <a:buSzTx/>
+                        <a:buFontTx/>
+                        <a:buNone/>
+                        <a:tabLst/>
+                        <a:defRPr/>
+                      </a:pPr>
+                      <a:r>
+                        <a:rPr lang="en-US" dirty="0" smtClean="0"/>
+                        <a:t>301 Moved Permanently</a:t>
+                      </a:r>
+                    </a:p>
+                    <a:p>
+                      <a:pPr marL="0" marR="0" indent="0" algn="l" defTabSz="914400" rtl="0" eaLnBrk="1" fontAlgn="auto" latinLnBrk="0" hangingPunct="1">
+                        <a:lnSpc>
+                          <a:spcPct val="100000"/>
+                        </a:lnSpc>
+                        <a:spcBef>
+                          <a:spcPts val="0"/>
+                        </a:spcBef>
+                        <a:spcAft>
+                          <a:spcPts val="0"/>
+                        </a:spcAft>
+                        <a:buClrTx/>
+                        <a:buSzTx/>
+                        <a:buFontTx/>
+                        <a:buNone/>
+                        <a:tabLst/>
+                        <a:defRPr/>
+                      </a:pPr>
+                      <a:r>
+                        <a:rPr lang="en-US" dirty="0" smtClean="0"/>
+                        <a:t>302 Found</a:t>
+                      </a:r>
+                    </a:p>
+                    <a:p>
+                      <a:pPr marL="0" marR="0" indent="0" algn="l" defTabSz="914400" rtl="0" eaLnBrk="1" fontAlgn="auto" latinLnBrk="0" hangingPunct="1">
+                        <a:lnSpc>
+                          <a:spcPct val="100000"/>
+                        </a:lnSpc>
+                        <a:spcBef>
+                          <a:spcPts val="0"/>
+                        </a:spcBef>
+                        <a:spcAft>
+                          <a:spcPts val="0"/>
+                        </a:spcAft>
+                        <a:buClrTx/>
+                        <a:buSzTx/>
+                        <a:buFontTx/>
+                        <a:buNone/>
+                        <a:tabLst/>
+                        <a:defRPr/>
+                      </a:pPr>
+                      <a:r>
+                        <a:rPr lang="en-US" dirty="0" smtClean="0"/>
+                        <a:t>304 Not Modified</a:t>
+                      </a:r>
+                    </a:p>
+                    <a:p>
+                      <a:endParaRPr lang="en-US" dirty="0"/>
+                    </a:p>
+                  </a:txBody>
+                  <a:tcPr>
+                    <a:lnL w="12700" cap="flat" cmpd="sng" algn="ctr">
+                      <a:solidFill>
+                        <a:schemeClr val="tx1"/>
+                      </a:solidFill>
+                      <a:prstDash val="solid"/>
+                      <a:round/>
+                      <a:headEnd type="none" w="med" len="med"/>
+                      <a:tailEnd type="none" w="med" len="med"/>
+                    </a:lnL>
+                    <a:lnR w="12700" cap="flat" cmpd="sng" algn="ctr">
+                      <a:solidFill>
+                        <a:schemeClr val="tx1"/>
+                      </a:solidFill>
+                      <a:prstDash val="solid"/>
+                      <a:round/>
+                      <a:headEnd type="none" w="med" len="med"/>
+                      <a:tailEnd type="none" w="med" len="med"/>
+                    </a:lnR>
+                    <a:lnT w="12700" cap="flat" cmpd="sng" algn="ctr">
+                      <a:solidFill>
+                        <a:schemeClr val="tx1"/>
+                      </a:solidFill>
+                      <a:prstDash val="solid"/>
+                      <a:round/>
+                      <a:headEnd type="none" w="med" len="med"/>
+                      <a:tailEnd type="none" w="med" len="med"/>
+                    </a:lnT>
+                    <a:lnB w="12700" cap="flat" cmpd="sng" algn="ctr">
+                      <a:solidFill>
+                        <a:schemeClr val="tx1"/>
+                      </a:solidFill>
+                      <a:prstDash val="solid"/>
+                      <a:round/>
+                      <a:headEnd type="none" w="med" len="med"/>
+                      <a:tailEnd type="none" w="med" len="med"/>
+                    </a:lnB>
+                  </a:tcPr>
+                </a:tc>
+                <a:tc>
+                  <a:txBody>
+                    <a:bodyPr/>
+                    <a:lstStyle/>
+                    <a:p>
+                      <a:pPr marL="0" marR="0" indent="0" algn="l" defTabSz="914400" rtl="0" eaLnBrk="1" fontAlgn="auto" latinLnBrk="0" hangingPunct="1">
+                        <a:lnSpc>
+                          <a:spcPct val="100000"/>
+                        </a:lnSpc>
+                        <a:spcBef>
+                          <a:spcPts val="0"/>
+                        </a:spcBef>
+                        <a:spcAft>
+                          <a:spcPts val="0"/>
+                        </a:spcAft>
+                        <a:buClrTx/>
+                        <a:buSzTx/>
+                        <a:buFontTx/>
+                        <a:buNone/>
+                        <a:tabLst/>
+                        <a:defRPr/>
+                      </a:pPr>
+                      <a:r>
+                        <a:rPr lang="en-US" dirty="0" smtClean="0"/>
+                        <a:t>400 Bad Request</a:t>
+                      </a:r>
+                    </a:p>
+                    <a:p>
+                      <a:pPr marL="0" marR="0" indent="0" algn="l" defTabSz="914400" rtl="0" eaLnBrk="1" fontAlgn="auto" latinLnBrk="0" hangingPunct="1">
+                        <a:lnSpc>
+                          <a:spcPct val="100000"/>
+                        </a:lnSpc>
+                        <a:spcBef>
+                          <a:spcPts val="0"/>
+                        </a:spcBef>
+                        <a:spcAft>
+                          <a:spcPts val="0"/>
+                        </a:spcAft>
+                        <a:buClrTx/>
+                        <a:buSzTx/>
+                        <a:buFontTx/>
+                        <a:buNone/>
+                        <a:tabLst/>
+                        <a:defRPr/>
+                      </a:pPr>
+                      <a:r>
+                        <a:rPr lang="en-US" dirty="0" smtClean="0"/>
+                        <a:t>401 Unauthorized</a:t>
+                      </a:r>
+                    </a:p>
+                    <a:p>
+                      <a:pPr marL="0" marR="0" indent="0" algn="l" defTabSz="914400" rtl="0" eaLnBrk="1" fontAlgn="auto" latinLnBrk="0" hangingPunct="1">
+                        <a:lnSpc>
+                          <a:spcPct val="100000"/>
+                        </a:lnSpc>
+                        <a:spcBef>
+                          <a:spcPts val="0"/>
+                        </a:spcBef>
+                        <a:spcAft>
+                          <a:spcPts val="0"/>
+                        </a:spcAft>
+                        <a:buClrTx/>
+                        <a:buSzTx/>
+                        <a:buFontTx/>
+                        <a:buNone/>
+                        <a:tabLst/>
+                        <a:defRPr/>
+                      </a:pPr>
+                      <a:r>
+                        <a:rPr lang="en-US" dirty="0" smtClean="0"/>
+                        <a:t>403 Forbidden</a:t>
+                      </a:r>
+                    </a:p>
+                    <a:p>
+                      <a:pPr marL="0" marR="0" indent="0" algn="l" defTabSz="914400" rtl="0" eaLnBrk="1" fontAlgn="auto" latinLnBrk="0" hangingPunct="1">
+                        <a:lnSpc>
+                          <a:spcPct val="100000"/>
+                        </a:lnSpc>
+                        <a:spcBef>
+                          <a:spcPts val="0"/>
+                        </a:spcBef>
+                        <a:spcAft>
+                          <a:spcPts val="0"/>
+                        </a:spcAft>
+                        <a:buClrTx/>
+                        <a:buSzTx/>
+                        <a:buFontTx/>
+                        <a:buNone/>
+                        <a:tabLst/>
+                        <a:defRPr/>
+                      </a:pPr>
+                      <a:r>
+                        <a:rPr lang="en-US" dirty="0" smtClean="0"/>
+                        <a:t>404 Not Found</a:t>
+                      </a:r>
+                    </a:p>
+                    <a:p>
+                      <a:pPr marL="0" marR="0" indent="0" algn="l" defTabSz="914400" rtl="0" eaLnBrk="1" fontAlgn="auto" latinLnBrk="0" hangingPunct="1">
+                        <a:lnSpc>
+                          <a:spcPct val="100000"/>
+                        </a:lnSpc>
+                        <a:spcBef>
+                          <a:spcPts val="0"/>
+                        </a:spcBef>
+                        <a:spcAft>
+                          <a:spcPts val="0"/>
+                        </a:spcAft>
+                        <a:buClrTx/>
+                        <a:buSzTx/>
+                        <a:buFontTx/>
+                        <a:buNone/>
+                        <a:tabLst/>
+                        <a:defRPr/>
+                      </a:pPr>
+                      <a:r>
+                        <a:rPr lang="en-US" dirty="0" smtClean="0"/>
+                        <a:t>405 – Method Not Allowed</a:t>
+                      </a:r>
+                    </a:p>
+                    <a:p>
+                      <a:endParaRPr lang="en-US" dirty="0"/>
+                    </a:p>
+                  </a:txBody>
+                  <a:tcPr>
+                    <a:lnL w="12700" cap="flat" cmpd="sng" algn="ctr">
+                      <a:solidFill>
+                        <a:schemeClr val="tx1"/>
+                      </a:solidFill>
+                      <a:prstDash val="solid"/>
+                      <a:round/>
+                      <a:headEnd type="none" w="med" len="med"/>
+                      <a:tailEnd type="none" w="med" len="med"/>
+                    </a:lnL>
+                    <a:lnR w="12700" cap="flat" cmpd="sng" algn="ctr">
+                      <a:solidFill>
+                        <a:schemeClr val="tx1"/>
+                      </a:solidFill>
+                      <a:prstDash val="solid"/>
+                      <a:round/>
+                      <a:headEnd type="none" w="med" len="med"/>
+                      <a:tailEnd type="none" w="med" len="med"/>
+                    </a:lnR>
+                    <a:lnT w="12700" cap="flat" cmpd="sng" algn="ctr">
+                      <a:solidFill>
+                        <a:schemeClr val="tx1"/>
+                      </a:solidFill>
+                      <a:prstDash val="solid"/>
+                      <a:round/>
+                      <a:headEnd type="none" w="med" len="med"/>
+                      <a:tailEnd type="none" w="med" len="med"/>
+                    </a:lnT>
+                    <a:lnB w="12700" cap="flat" cmpd="sng" algn="ctr">
+                      <a:solidFill>
+                        <a:schemeClr val="tx1"/>
+                      </a:solidFill>
+                      <a:prstDash val="solid"/>
+                      <a:round/>
+                      <a:headEnd type="none" w="med" len="med"/>
+                      <a:tailEnd type="none" w="med" len="med"/>
+                    </a:lnB>
+                  </a:tcPr>
+                </a:tc>
+                <a:tc>
+                  <a:txBody>
+                    <a:bodyPr/>
+                    <a:lstStyle/>
+                    <a:p>
+                      <a:pPr marL="0" marR="0" indent="0" algn="l" defTabSz="914400" rtl="0" eaLnBrk="1" fontAlgn="auto" latinLnBrk="0" hangingPunct="1">
+                        <a:lnSpc>
+                          <a:spcPct val="100000"/>
+                        </a:lnSpc>
+                        <a:spcBef>
+                          <a:spcPts val="0"/>
+                        </a:spcBef>
+                        <a:spcAft>
+                          <a:spcPts val="0"/>
+                        </a:spcAft>
+                        <a:buClrTx/>
+                        <a:buSzTx/>
+                        <a:buFontTx/>
+                        <a:buNone/>
+                        <a:tabLst/>
+                        <a:defRPr/>
+                      </a:pPr>
+                      <a:r>
+                        <a:rPr lang="en-US" dirty="0" smtClean="0"/>
+                        <a:t>500 Internal Server Error</a:t>
+                      </a:r>
+                    </a:p>
+                    <a:p>
+                      <a:pPr marL="0" marR="0" indent="0" algn="l" defTabSz="914400" rtl="0" eaLnBrk="1" fontAlgn="auto" latinLnBrk="0" hangingPunct="1">
+                        <a:lnSpc>
+                          <a:spcPct val="100000"/>
+                        </a:lnSpc>
+                        <a:spcBef>
+                          <a:spcPts val="0"/>
+                        </a:spcBef>
+                        <a:spcAft>
+                          <a:spcPts val="0"/>
+                        </a:spcAft>
+                        <a:buClrTx/>
+                        <a:buSzTx/>
+                        <a:buFontTx/>
+                        <a:buNone/>
+                        <a:tabLst/>
+                        <a:defRPr/>
+                      </a:pPr>
+                      <a:r>
+                        <a:rPr lang="en-US" dirty="0" smtClean="0"/>
+                        <a:t>501 Not Implemented 502 Bad Gateway</a:t>
+                      </a:r>
+                    </a:p>
+                    <a:p>
+                      <a:pPr marL="0" marR="0" indent="0" algn="l" defTabSz="914400" rtl="0" eaLnBrk="1" fontAlgn="auto" latinLnBrk="0" hangingPunct="1">
+                        <a:lnSpc>
+                          <a:spcPct val="100000"/>
+                        </a:lnSpc>
+                        <a:spcBef>
+                          <a:spcPts val="0"/>
+                        </a:spcBef>
+                        <a:spcAft>
+                          <a:spcPts val="0"/>
+                        </a:spcAft>
+                        <a:buClrTx/>
+                        <a:buSzTx/>
+                        <a:buFontTx/>
+                        <a:buNone/>
+                        <a:tabLst/>
+                        <a:defRPr/>
+                      </a:pPr>
+                      <a:r>
+                        <a:rPr lang="en-US" dirty="0" smtClean="0"/>
+                        <a:t>503 Service Unavailable</a:t>
+                      </a:r>
+                    </a:p>
+                    <a:p>
+                      <a:endParaRPr lang="en-US" dirty="0"/>
+                    </a:p>
+                  </a:txBody>
+                  <a:tcPr>
+                    <a:lnL w="12700" cap="flat" cmpd="sng" algn="ctr">
+                      <a:solidFill>
+                        <a:schemeClr val="tx1"/>
+                      </a:solidFill>
+                      <a:prstDash val="solid"/>
+                      <a:round/>
+                      <a:headEnd type="none" w="med" len="med"/>
+                      <a:tailEnd type="none" w="med" len="med"/>
+                    </a:lnL>
+                    <a:lnR w="12700" cap="flat" cmpd="sng" algn="ctr">
+                      <a:solidFill>
+                        <a:schemeClr val="tx1"/>
+                      </a:solidFill>
+                      <a:prstDash val="solid"/>
+                      <a:round/>
+                      <a:headEnd type="none" w="med" len="med"/>
+                      <a:tailEnd type="none" w="med" len="med"/>
+                    </a:lnR>
+                    <a:lnT w="12700" cap="flat" cmpd="sng" algn="ctr">
+                      <a:solidFill>
+                        <a:schemeClr val="tx1"/>
+                      </a:solidFill>
+                      <a:prstDash val="solid"/>
+                      <a:round/>
+                      <a:headEnd type="none" w="med" len="med"/>
+                      <a:tailEnd type="none" w="med" len="med"/>
+                    </a:lnT>
+                    <a:lnB w="12700" cap="flat" cmpd="sng" algn="ctr">
+                      <a:solidFill>
+                        <a:schemeClr val="tx1"/>
+                      </a:solidFill>
+                      <a:prstDash val="solid"/>
+                      <a:round/>
+                      <a:headEnd type="none" w="med" len="med"/>
+                      <a:tailEnd type="none" w="med" len="med"/>
+                    </a:lnB>
+                  </a:tcPr>
+                </a:tc>
+              </a:tr>
+            </a:tbl>
+          </a:graphicData>
+        </a:graphic>
+      </p:graphicFrame>
     </p:spTree>
     <p:extLst>
       <p:ext uri="{BB962C8B-B14F-4D97-AF65-F5344CB8AC3E}">
-        <p14:creationId xmlns:p14="http://schemas.microsoft.com/office/powerpoint/2010/main" val="1433475006"/>
+        <p14:creationId xmlns:p14="http://schemas.microsoft.com/office/powerpoint/2010/main" val="417063745"/>
       </p:ext>
     </p:extLst>
   </p:cSld>
@@ -4703,128 +5660,589 @@
           <a:p>
             <a:r>
               <a:rPr lang="en-US" dirty="0" smtClean="0"/>
-              <a:t>Micro-services architectural style</a:t>
+              <a:t>Monolithic nightmares </a:t>
             </a:r>
             <a:endParaRPr lang="en-US" dirty="0"/>
           </a:p>
         </p:txBody>
       </p:sp>
-      <p:sp>
-        <p:nvSpPr>
-          <p:cNvPr id="3" name="Content Placeholder 2"/>
-          <p:cNvSpPr>
-            <a:spLocks noGrp="1"/>
-          </p:cNvSpPr>
-          <p:nvPr>
-            <p:ph idx="1"/>
-          </p:nvPr>
-        </p:nvSpPr>
-        <p:spPr/>
-        <p:txBody>
-          <a:bodyPr>
-            <a:normAutofit fontScale="55000" lnSpcReduction="20000"/>
+      <p:pic>
+        <p:nvPicPr>
+          <p:cNvPr id="1033" name="Picture 9" descr="https://openclipart.org/image/800px/svg_to_png/20369/thilakarathna-Computer.png"/>
+          <p:cNvPicPr>
+            <a:picLocks noChangeAspect="1" noChangeArrowheads="1"/>
+          </p:cNvPicPr>
+          <p:nvPr/>
+        </p:nvPicPr>
+        <p:blipFill>
+          <a:blip r:embed="rId3" cstate="print">
+            <a:extLst>
+              <a:ext uri="{28A0092B-C50C-407E-A947-70E740481C1C}">
+                <a14:useLocalDpi xmlns:a14="http://schemas.microsoft.com/office/drawing/2010/main" val="0"/>
+              </a:ext>
+            </a:extLst>
+          </a:blip>
+          <a:srcRect/>
+          <a:stretch>
+            <a:fillRect/>
+          </a:stretch>
+        </p:blipFill>
+        <p:spPr bwMode="auto">
+          <a:xfrm>
+            <a:off x="265877" y="4209267"/>
+            <a:ext cx="2586163" cy="2560104"/>
+          </a:xfrm>
+          <a:prstGeom prst="rect">
+            <a:avLst/>
+          </a:prstGeom>
+          <a:noFill/>
+          <a:extLst>
+            <a:ext uri="{909E8E84-426E-40DD-AFC4-6F175D3DCCD1}">
+              <a14:hiddenFill xmlns:a14="http://schemas.microsoft.com/office/drawing/2010/main">
+                <a:solidFill>
+                  <a:srgbClr val="FFFFFF"/>
+                </a:solidFill>
+              </a14:hiddenFill>
+            </a:ext>
+          </a:extLst>
+        </p:spPr>
+      </p:pic>
+      <p:pic>
+        <p:nvPicPr>
+          <p:cNvPr id="1035" name="Picture 11" descr="http://www.innovationfiles.org/wp-content/uploads/2013/06/firefox_logo-only_RGB.png"/>
+          <p:cNvPicPr>
+            <a:picLocks noChangeAspect="1" noChangeArrowheads="1"/>
+          </p:cNvPicPr>
+          <p:nvPr/>
+        </p:nvPicPr>
+        <p:blipFill>
+          <a:blip r:embed="rId4" cstate="print">
+            <a:extLst>
+              <a:ext uri="{28A0092B-C50C-407E-A947-70E740481C1C}">
+                <a14:useLocalDpi xmlns:a14="http://schemas.microsoft.com/office/drawing/2010/main" val="0"/>
+              </a:ext>
+            </a:extLst>
+          </a:blip>
+          <a:srcRect/>
+          <a:stretch>
+            <a:fillRect/>
+          </a:stretch>
+        </p:blipFill>
+        <p:spPr bwMode="auto">
+          <a:xfrm>
+            <a:off x="271910" y="4531093"/>
+            <a:ext cx="903742" cy="866880"/>
+          </a:xfrm>
+          <a:prstGeom prst="rect">
+            <a:avLst/>
+          </a:prstGeom>
+          <a:noFill/>
+          <a:extLst>
+            <a:ext uri="{909E8E84-426E-40DD-AFC4-6F175D3DCCD1}">
+              <a14:hiddenFill xmlns:a14="http://schemas.microsoft.com/office/drawing/2010/main">
+                <a:solidFill>
+                  <a:srgbClr val="FFFFFF"/>
+                </a:solidFill>
+              </a14:hiddenFill>
+            </a:ext>
+          </a:extLst>
+        </p:spPr>
+      </p:pic>
+      <p:pic>
+        <p:nvPicPr>
+          <p:cNvPr id="1037" name="Picture 13" descr="http://assets.hunterunited.com.au/images/Chromev2.png"/>
+          <p:cNvPicPr>
+            <a:picLocks noChangeAspect="1" noChangeArrowheads="1"/>
+          </p:cNvPicPr>
+          <p:nvPr/>
+        </p:nvPicPr>
+        <p:blipFill>
+          <a:blip r:embed="rId5" cstate="print">
+            <a:extLst>
+              <a:ext uri="{28A0092B-C50C-407E-A947-70E740481C1C}">
+                <a14:useLocalDpi xmlns:a14="http://schemas.microsoft.com/office/drawing/2010/main" val="0"/>
+              </a:ext>
+            </a:extLst>
+          </a:blip>
+          <a:srcRect/>
+          <a:stretch>
+            <a:fillRect/>
+          </a:stretch>
+        </p:blipFill>
+        <p:spPr bwMode="auto">
+          <a:xfrm>
+            <a:off x="1175652" y="4631902"/>
+            <a:ext cx="712102" cy="712102"/>
+          </a:xfrm>
+          <a:prstGeom prst="rect">
+            <a:avLst/>
+          </a:prstGeom>
+          <a:noFill/>
+          <a:extLst>
+            <a:ext uri="{909E8E84-426E-40DD-AFC4-6F175D3DCCD1}">
+              <a14:hiddenFill xmlns:a14="http://schemas.microsoft.com/office/drawing/2010/main">
+                <a:solidFill>
+                  <a:srgbClr val="FFFFFF"/>
+                </a:solidFill>
+              </a14:hiddenFill>
+            </a:ext>
+          </a:extLst>
+        </p:spPr>
+      </p:pic>
+      <p:pic>
+        <p:nvPicPr>
+          <p:cNvPr id="1039" name="Picture 15" descr="http://freepngimages.com/wp-content/uploads/2014/04/Internet_Explorer_7_Logo_2.png"/>
+          <p:cNvPicPr>
+            <a:picLocks noChangeAspect="1" noChangeArrowheads="1"/>
+          </p:cNvPicPr>
+          <p:nvPr/>
+        </p:nvPicPr>
+        <p:blipFill>
+          <a:blip r:embed="rId6" cstate="print">
+            <a:extLst>
+              <a:ext uri="{28A0092B-C50C-407E-A947-70E740481C1C}">
+                <a14:useLocalDpi xmlns:a14="http://schemas.microsoft.com/office/drawing/2010/main" val="0"/>
+              </a:ext>
+            </a:extLst>
+          </a:blip>
+          <a:srcRect/>
+          <a:stretch>
+            <a:fillRect/>
+          </a:stretch>
+        </p:blipFill>
+        <p:spPr bwMode="auto">
+          <a:xfrm>
+            <a:off x="1887754" y="4581893"/>
+            <a:ext cx="812387" cy="816080"/>
+          </a:xfrm>
+          <a:prstGeom prst="rect">
+            <a:avLst/>
+          </a:prstGeom>
+          <a:noFill/>
+          <a:extLst>
+            <a:ext uri="{909E8E84-426E-40DD-AFC4-6F175D3DCCD1}">
+              <a14:hiddenFill xmlns:a14="http://schemas.microsoft.com/office/drawing/2010/main">
+                <a:solidFill>
+                  <a:srgbClr val="FFFFFF"/>
+                </a:solidFill>
+              </a14:hiddenFill>
+            </a:ext>
+          </a:extLst>
+        </p:spPr>
+      </p:pic>
+      <p:sp>
+        <p:nvSpPr>
+          <p:cNvPr id="9" name="Rectangle 8"/>
+          <p:cNvSpPr/>
+          <p:nvPr/>
+        </p:nvSpPr>
+        <p:spPr>
+          <a:xfrm>
+            <a:off x="6335490" y="1463036"/>
+            <a:ext cx="5617029" cy="3931920"/>
+          </a:xfrm>
+          <a:prstGeom prst="rect">
+            <a:avLst/>
+          </a:prstGeom>
+          <a:solidFill>
+            <a:srgbClr val="00B050"/>
+          </a:solidFill>
+          <a:effectLst>
+            <a:softEdge rad="31750"/>
+          </a:effectLst>
+        </p:spPr>
+        <p:style>
+          <a:lnRef idx="2">
+            <a:schemeClr val="accent1">
+              <a:shade val="50000"/>
+            </a:schemeClr>
+          </a:lnRef>
+          <a:fillRef idx="1">
+            <a:schemeClr val="accent1"/>
+          </a:fillRef>
+          <a:effectRef idx="0">
+            <a:schemeClr val="accent1"/>
+          </a:effectRef>
+          <a:fontRef idx="minor">
+            <a:schemeClr val="lt1"/>
+          </a:fontRef>
+        </p:style>
+        <p:txBody>
+          <a:bodyPr rtlCol="0" anchor="ctr"/>
+          <a:lstStyle/>
+          <a:p>
+            <a:pPr algn="ctr"/>
+            <a:endParaRPr lang="en-US"/>
+          </a:p>
+        </p:txBody>
+      </p:sp>
+      <p:sp>
+        <p:nvSpPr>
+          <p:cNvPr id="10" name="Rectangle 9"/>
+          <p:cNvSpPr/>
+          <p:nvPr/>
+        </p:nvSpPr>
+        <p:spPr>
+          <a:xfrm>
+            <a:off x="6544494" y="2215271"/>
+            <a:ext cx="1593669" cy="2155371"/>
+          </a:xfrm>
+          <a:prstGeom prst="rect">
+            <a:avLst/>
+          </a:prstGeom>
+          <a:solidFill>
+            <a:srgbClr val="FFC000"/>
+          </a:solidFill>
+          <a:effectLst>
+            <a:softEdge rad="31750"/>
+          </a:effectLst>
+        </p:spPr>
+        <p:style>
+          <a:lnRef idx="2">
+            <a:schemeClr val="accent1">
+              <a:shade val="50000"/>
+            </a:schemeClr>
+          </a:lnRef>
+          <a:fillRef idx="1">
+            <a:schemeClr val="accent1"/>
+          </a:fillRef>
+          <a:effectRef idx="0">
+            <a:schemeClr val="accent1"/>
+          </a:effectRef>
+          <a:fontRef idx="minor">
+            <a:schemeClr val="lt1"/>
+          </a:fontRef>
+        </p:style>
+        <p:txBody>
+          <a:bodyPr rtlCol="0" anchor="ctr"/>
+          <a:lstStyle/>
+          <a:p>
+            <a:pPr algn="ctr"/>
+            <a:endParaRPr lang="en-US"/>
+          </a:p>
+        </p:txBody>
+      </p:sp>
+      <p:sp>
+        <p:nvSpPr>
+          <p:cNvPr id="11" name="TextBox 10"/>
+          <p:cNvSpPr txBox="1"/>
+          <p:nvPr/>
+        </p:nvSpPr>
+        <p:spPr>
+          <a:xfrm>
+            <a:off x="7126883" y="1658979"/>
+            <a:ext cx="4480557" cy="369332"/>
+          </a:xfrm>
+          <a:prstGeom prst="rect">
+            <a:avLst/>
+          </a:prstGeom>
+          <a:noFill/>
+        </p:spPr>
+        <p:txBody>
+          <a:bodyPr wrap="square" rtlCol="0">
+            <a:spAutoFit/>
           </a:bodyPr>
           <a:lstStyle/>
           <a:p>
-            <a:pPr marL="0" indent="0">
-              <a:buNone/>
-            </a:pPr>
             <a:r>
               <a:rPr lang="en-US" dirty="0" smtClean="0"/>
-              <a:t>Characteristics:</a:t>
-            </a:r>
-          </a:p>
+              <a:t>A typical Java Web App with Spring MVC</a:t>
+            </a:r>
+            <a:endParaRPr lang="en-US" dirty="0"/>
+          </a:p>
+        </p:txBody>
+      </p:sp>
+      <p:sp>
+        <p:nvSpPr>
+          <p:cNvPr id="12" name="TextBox 11"/>
+          <p:cNvSpPr txBox="1"/>
+          <p:nvPr/>
+        </p:nvSpPr>
+        <p:spPr>
+          <a:xfrm>
+            <a:off x="6622871" y="2975881"/>
+            <a:ext cx="1436914" cy="646331"/>
+          </a:xfrm>
+          <a:prstGeom prst="rect">
+            <a:avLst/>
+          </a:prstGeom>
+          <a:noFill/>
+        </p:spPr>
+        <p:txBody>
+          <a:bodyPr wrap="square" rtlCol="0">
+            <a:spAutoFit/>
+          </a:bodyPr>
+          <a:lstStyle/>
           <a:p>
             <a:r>
               <a:rPr lang="en-US" b="1" dirty="0" smtClean="0"/>
-              <a:t>Componentization via Services</a:t>
+              <a:t>Controllers</a:t>
             </a:r>
           </a:p>
           <a:p>
             <a:r>
               <a:rPr lang="en-US" b="1" dirty="0" smtClean="0"/>
-              <a:t>Organized around Business Capabilities</a:t>
-            </a:r>
-          </a:p>
-          <a:p>
+              <a:t>(</a:t>
+            </a:r>
+            <a:r>
+              <a:rPr lang="en-US" b="1" dirty="0" err="1" smtClean="0"/>
+              <a:t>Endpints</a:t>
+            </a:r>
             <a:r>
               <a:rPr lang="en-US" b="1" dirty="0" smtClean="0"/>
-              <a:t>Products not Projects</a:t>
-            </a:r>
-          </a:p>
+              <a:t>)</a:t>
+            </a:r>
+            <a:endParaRPr lang="en-US" b="1" dirty="0"/>
+          </a:p>
+        </p:txBody>
+      </p:sp>
+      <p:sp>
+        <p:nvSpPr>
+          <p:cNvPr id="21" name="Rectangle 20"/>
+          <p:cNvSpPr/>
+          <p:nvPr/>
+        </p:nvSpPr>
+        <p:spPr>
+          <a:xfrm>
+            <a:off x="8353698" y="2230790"/>
+            <a:ext cx="1593669" cy="2155371"/>
+          </a:xfrm>
+          <a:prstGeom prst="rect">
+            <a:avLst/>
+          </a:prstGeom>
+          <a:solidFill>
+            <a:srgbClr val="FFC000"/>
+          </a:solidFill>
+          <a:effectLst>
+            <a:softEdge rad="31750"/>
+          </a:effectLst>
+        </p:spPr>
+        <p:style>
+          <a:lnRef idx="2">
+            <a:schemeClr val="accent1">
+              <a:shade val="50000"/>
+            </a:schemeClr>
+          </a:lnRef>
+          <a:fillRef idx="1">
+            <a:schemeClr val="accent1"/>
+          </a:fillRef>
+          <a:effectRef idx="0">
+            <a:schemeClr val="accent1"/>
+          </a:effectRef>
+          <a:fontRef idx="minor">
+            <a:schemeClr val="lt1"/>
+          </a:fontRef>
+        </p:style>
+        <p:txBody>
+          <a:bodyPr rtlCol="0" anchor="ctr"/>
+          <a:lstStyle/>
+          <a:p>
+            <a:pPr algn="ctr"/>
+            <a:endParaRPr lang="en-US"/>
+          </a:p>
+        </p:txBody>
+      </p:sp>
+      <p:sp>
+        <p:nvSpPr>
+          <p:cNvPr id="22" name="Rectangle 21"/>
+          <p:cNvSpPr/>
+          <p:nvPr/>
+        </p:nvSpPr>
+        <p:spPr>
+          <a:xfrm>
+            <a:off x="10119363" y="2230790"/>
+            <a:ext cx="1593669" cy="2155371"/>
+          </a:xfrm>
+          <a:prstGeom prst="rect">
+            <a:avLst/>
+          </a:prstGeom>
+          <a:solidFill>
+            <a:srgbClr val="FFC000"/>
+          </a:solidFill>
+          <a:effectLst>
+            <a:softEdge rad="31750"/>
+          </a:effectLst>
+        </p:spPr>
+        <p:style>
+          <a:lnRef idx="2">
+            <a:schemeClr val="accent1">
+              <a:shade val="50000"/>
+            </a:schemeClr>
+          </a:lnRef>
+          <a:fillRef idx="1">
+            <a:schemeClr val="accent1"/>
+          </a:fillRef>
+          <a:effectRef idx="0">
+            <a:schemeClr val="accent1"/>
+          </a:effectRef>
+          <a:fontRef idx="minor">
+            <a:schemeClr val="lt1"/>
+          </a:fontRef>
+        </p:style>
+        <p:txBody>
+          <a:bodyPr rtlCol="0" anchor="ctr"/>
+          <a:lstStyle/>
+          <a:p>
+            <a:pPr algn="ctr"/>
+            <a:endParaRPr lang="en-US"/>
+          </a:p>
+        </p:txBody>
+      </p:sp>
+      <p:sp>
+        <p:nvSpPr>
+          <p:cNvPr id="23" name="Rectangle 22"/>
+          <p:cNvSpPr/>
+          <p:nvPr/>
+        </p:nvSpPr>
+        <p:spPr>
+          <a:xfrm>
+            <a:off x="7289076" y="4640012"/>
+            <a:ext cx="3921038" cy="504908"/>
+          </a:xfrm>
+          <a:prstGeom prst="rect">
+            <a:avLst/>
+          </a:prstGeom>
+          <a:solidFill>
+            <a:srgbClr val="FFFF00"/>
+          </a:solidFill>
+          <a:effectLst>
+            <a:softEdge rad="31750"/>
+          </a:effectLst>
+        </p:spPr>
+        <p:style>
+          <a:lnRef idx="2">
+            <a:schemeClr val="accent1">
+              <a:shade val="50000"/>
+            </a:schemeClr>
+          </a:lnRef>
+          <a:fillRef idx="1">
+            <a:schemeClr val="accent1"/>
+          </a:fillRef>
+          <a:effectRef idx="0">
+            <a:schemeClr val="accent1"/>
+          </a:effectRef>
+          <a:fontRef idx="minor">
+            <a:schemeClr val="lt1"/>
+          </a:fontRef>
+        </p:style>
+        <p:txBody>
+          <a:bodyPr rtlCol="0" anchor="ctr"/>
+          <a:lstStyle/>
+          <a:p>
+            <a:pPr algn="ctr"/>
+            <a:endParaRPr lang="en-US"/>
+          </a:p>
+        </p:txBody>
+      </p:sp>
+      <p:sp>
+        <p:nvSpPr>
+          <p:cNvPr id="13" name="TextBox 12"/>
+          <p:cNvSpPr txBox="1"/>
+          <p:nvPr/>
+        </p:nvSpPr>
+        <p:spPr>
+          <a:xfrm>
+            <a:off x="8739051" y="4716336"/>
+            <a:ext cx="1293223" cy="369332"/>
+          </a:xfrm>
+          <a:prstGeom prst="rect">
+            <a:avLst/>
+          </a:prstGeom>
+          <a:noFill/>
+        </p:spPr>
+        <p:txBody>
+          <a:bodyPr wrap="square" rtlCol="0">
+            <a:spAutoFit/>
+          </a:bodyPr>
+          <a:lstStyle/>
           <a:p>
             <a:r>
               <a:rPr lang="en-US" b="1" dirty="0" smtClean="0"/>
-              <a:t>Smart endpoints and dumb pipes</a:t>
-            </a:r>
-          </a:p>
+              <a:t>Model</a:t>
+            </a:r>
+            <a:endParaRPr lang="en-US" b="1" dirty="0"/>
+          </a:p>
+        </p:txBody>
+      </p:sp>
+      <p:sp>
+        <p:nvSpPr>
+          <p:cNvPr id="28" name="TextBox 27"/>
+          <p:cNvSpPr txBox="1"/>
+          <p:nvPr/>
+        </p:nvSpPr>
+        <p:spPr>
+          <a:xfrm>
+            <a:off x="8432075" y="2969790"/>
+            <a:ext cx="1436914" cy="646331"/>
+          </a:xfrm>
+          <a:prstGeom prst="rect">
+            <a:avLst/>
+          </a:prstGeom>
+          <a:noFill/>
+        </p:spPr>
+        <p:txBody>
+          <a:bodyPr wrap="square" rtlCol="0">
+            <a:spAutoFit/>
+          </a:bodyPr>
+          <a:lstStyle/>
           <a:p>
             <a:r>
               <a:rPr lang="en-US" b="1" dirty="0" smtClean="0"/>
-              <a:t>Decentralized Governance</a:t>
-            </a:r>
-          </a:p>
+              <a:t>Service Layer</a:t>
+            </a:r>
+          </a:p>
+          <a:p>
+            <a:endParaRPr lang="en-US" b="1" dirty="0"/>
+          </a:p>
+        </p:txBody>
+      </p:sp>
+      <p:sp>
+        <p:nvSpPr>
+          <p:cNvPr id="29" name="TextBox 28"/>
+          <p:cNvSpPr txBox="1"/>
+          <p:nvPr/>
+        </p:nvSpPr>
+        <p:spPr>
+          <a:xfrm>
+            <a:off x="10197740" y="2985309"/>
+            <a:ext cx="1436914" cy="369332"/>
+          </a:xfrm>
+          <a:prstGeom prst="rect">
+            <a:avLst/>
+          </a:prstGeom>
+          <a:noFill/>
+        </p:spPr>
+        <p:txBody>
+          <a:bodyPr wrap="square" rtlCol="0">
+            <a:spAutoFit/>
+          </a:bodyPr>
+          <a:lstStyle/>
           <a:p>
             <a:r>
               <a:rPr lang="en-US" b="1" dirty="0" smtClean="0"/>
-              <a:t>Decentralized Data Management</a:t>
-            </a:r>
-          </a:p>
-          <a:p>
-            <a:r>
-              <a:rPr lang="en-US" b="1" dirty="0" smtClean="0"/>
-              <a:t>Infrastructure Automation</a:t>
-            </a:r>
-          </a:p>
-          <a:p>
-            <a:r>
-              <a:rPr lang="en-US" b="1" dirty="0" smtClean="0"/>
-              <a:t>Design for failure</a:t>
-            </a:r>
-          </a:p>
-          <a:p>
-            <a:r>
-              <a:rPr lang="en-US" b="1" dirty="0" smtClean="0"/>
-              <a:t>Evolutionary Design</a:t>
-            </a:r>
-          </a:p>
-          <a:p>
-            <a:endParaRPr lang="en-US" b="1" dirty="0" smtClean="0"/>
-          </a:p>
-          <a:p>
-            <a:pPr marL="0" indent="0">
-              <a:buNone/>
-            </a:pPr>
-            <a:endParaRPr lang="en-US" dirty="0" smtClean="0"/>
-          </a:p>
-          <a:p>
-            <a:endParaRPr lang="en-US" dirty="0" smtClean="0"/>
-          </a:p>
-          <a:p>
-            <a:endParaRPr lang="en-US" dirty="0"/>
-          </a:p>
-          <a:p>
-            <a:pPr marL="0" indent="0">
-              <a:buNone/>
-            </a:pPr>
-            <a:r>
-              <a:rPr lang="en-US" dirty="0" smtClean="0"/>
-              <a:t>Reference: http://martinfowler.com/articles/microservices.html</a:t>
-            </a:r>
-            <a:endParaRPr lang="en-US" dirty="0"/>
+              <a:t>DAO Layer</a:t>
+            </a:r>
+            <a:endParaRPr lang="en-US" b="1" dirty="0"/>
           </a:p>
         </p:txBody>
       </p:sp>
     </p:spTree>
     <p:extLst>
       <p:ext uri="{BB962C8B-B14F-4D97-AF65-F5344CB8AC3E}">
-        <p14:creationId xmlns:p14="http://schemas.microsoft.com/office/powerpoint/2010/main" val="3712099602"/>
+        <p14:creationId xmlns:p14="http://schemas.microsoft.com/office/powerpoint/2010/main" val="1433475006"/>
       </p:ext>
     </p:extLst>
   </p:cSld>
   <p:clrMapOvr>
     <a:masterClrMapping/>
   </p:clrMapOvr>
+  <p:timing>
+    <p:tnLst>
+      <p:par>
+        <p:cTn id="1" dur="indefinite" restart="never" nodeType="tmRoot"/>
+      </p:par>
+    </p:tnLst>
+  </p:timing>
 </p:sld>
 </file>
 
@@ -4862,6 +6280,303 @@
           <a:p>
             <a:r>
               <a:rPr lang="en-US" dirty="0" smtClean="0"/>
+              <a:t>Micro-service</a:t>
+            </a:r>
+            <a:endParaRPr lang="en-US" dirty="0"/>
+          </a:p>
+        </p:txBody>
+      </p:sp>
+      <p:sp>
+        <p:nvSpPr>
+          <p:cNvPr id="3" name="Content Placeholder 2"/>
+          <p:cNvSpPr>
+            <a:spLocks noGrp="1"/>
+          </p:cNvSpPr>
+          <p:nvPr>
+            <p:ph idx="1"/>
+          </p:nvPr>
+        </p:nvSpPr>
+        <p:spPr/>
+        <p:txBody>
+          <a:bodyPr>
+            <a:normAutofit/>
+          </a:bodyPr>
+          <a:lstStyle/>
+          <a:p>
+            <a:pPr marL="0" indent="0" algn="ctr">
+              <a:buNone/>
+            </a:pPr>
+            <a:r>
+              <a:rPr lang="en-US" i="1" dirty="0" smtClean="0"/>
+              <a:t>Developing a single application as a suite of small services, each running in its own process and communicating with lightweight mechanisms, often an HTTP resource API. </a:t>
+            </a:r>
+          </a:p>
+          <a:p>
+            <a:endParaRPr lang="en-US" dirty="0" smtClean="0"/>
+          </a:p>
+          <a:p>
+            <a:endParaRPr lang="en-US" dirty="0"/>
+          </a:p>
+        </p:txBody>
+      </p:sp>
+      <p:sp>
+        <p:nvSpPr>
+          <p:cNvPr id="4" name="TextBox 3"/>
+          <p:cNvSpPr txBox="1"/>
+          <p:nvPr/>
+        </p:nvSpPr>
+        <p:spPr>
+          <a:xfrm>
+            <a:off x="103031" y="6581001"/>
+            <a:ext cx="8667482" cy="276999"/>
+          </a:xfrm>
+          <a:prstGeom prst="rect">
+            <a:avLst/>
+          </a:prstGeom>
+          <a:noFill/>
+        </p:spPr>
+        <p:txBody>
+          <a:bodyPr wrap="square" rtlCol="0">
+            <a:spAutoFit/>
+          </a:bodyPr>
+          <a:lstStyle/>
+          <a:p>
+            <a:r>
+              <a:rPr lang="en-US" sz="1200" i="1" dirty="0" smtClean="0"/>
+              <a:t>Ref</a:t>
+            </a:r>
+            <a:r>
+              <a:rPr lang="en-US" sz="1200" i="1" dirty="0" smtClean="0">
+                <a:hlinkClick r:id="rId2"/>
+              </a:rPr>
+              <a:t>: </a:t>
+            </a:r>
+            <a:r>
+              <a:rPr lang="en-US" sz="1200" i="1" dirty="0" smtClean="0"/>
+              <a:t> </a:t>
+            </a:r>
+            <a:r>
+              <a:rPr lang="en-US" sz="1200" i="1" dirty="0" smtClean="0">
+                <a:hlinkClick r:id="rId3"/>
+              </a:rPr>
+              <a:t>Microservices – Martin </a:t>
+            </a:r>
+            <a:r>
+              <a:rPr lang="en-US" sz="1200" i="1" dirty="0" err="1" smtClean="0">
+                <a:hlinkClick r:id="rId3"/>
+              </a:rPr>
+              <a:t>Folwer</a:t>
+            </a:r>
+            <a:endParaRPr lang="en-US" sz="1200" i="1" dirty="0"/>
+          </a:p>
+        </p:txBody>
+      </p:sp>
+    </p:spTree>
+    <p:extLst>
+      <p:ext uri="{BB962C8B-B14F-4D97-AF65-F5344CB8AC3E}">
+        <p14:creationId xmlns:p14="http://schemas.microsoft.com/office/powerpoint/2010/main" val="327481939"/>
+      </p:ext>
+    </p:extLst>
+  </p:cSld>
+  <p:clrMapOvr>
+    <a:masterClrMapping/>
+  </p:clrMapOvr>
+</p:sld>
+</file>
+
+<file path=ppt/slides/slide13.xml><?xml version="1.0" encoding="utf-8"?>
+<p:sld xmlns:a="http://schemas.openxmlformats.org/drawingml/2006/main" xmlns:r="http://schemas.openxmlformats.org/officeDocument/2006/relationships" xmlns:p="http://schemas.openxmlformats.org/presentationml/2006/main">
+  <p:cSld>
+    <p:spTree>
+      <p:nvGrpSpPr>
+        <p:cNvPr id="1" name=""/>
+        <p:cNvGrpSpPr/>
+        <p:nvPr/>
+      </p:nvGrpSpPr>
+      <p:grpSpPr>
+        <a:xfrm>
+          <a:off x="0" y="0"/>
+          <a:ext cx="0" cy="0"/>
+          <a:chOff x="0" y="0"/>
+          <a:chExt cx="0" cy="0"/>
+        </a:xfrm>
+      </p:grpSpPr>
+      <p:sp>
+        <p:nvSpPr>
+          <p:cNvPr id="2" name="Title 1"/>
+          <p:cNvSpPr>
+            <a:spLocks noGrp="1"/>
+          </p:cNvSpPr>
+          <p:nvPr>
+            <p:ph type="title"/>
+          </p:nvPr>
+        </p:nvSpPr>
+        <p:spPr/>
+        <p:txBody>
+          <a:bodyPr/>
+          <a:lstStyle/>
+          <a:p>
+            <a:r>
+              <a:rPr lang="en-US" dirty="0" smtClean="0"/>
+              <a:t>Micro-services architectural style</a:t>
+            </a:r>
+            <a:endParaRPr lang="en-US" dirty="0"/>
+          </a:p>
+        </p:txBody>
+      </p:sp>
+      <p:sp>
+        <p:nvSpPr>
+          <p:cNvPr id="3" name="Content Placeholder 2"/>
+          <p:cNvSpPr>
+            <a:spLocks noGrp="1"/>
+          </p:cNvSpPr>
+          <p:nvPr>
+            <p:ph idx="1"/>
+          </p:nvPr>
+        </p:nvSpPr>
+        <p:spPr/>
+        <p:txBody>
+          <a:bodyPr>
+            <a:normAutofit fontScale="55000" lnSpcReduction="20000"/>
+          </a:bodyPr>
+          <a:lstStyle/>
+          <a:p>
+            <a:pPr marL="0" indent="0">
+              <a:buNone/>
+            </a:pPr>
+            <a:r>
+              <a:rPr lang="en-US" dirty="0" smtClean="0"/>
+              <a:t>Characteristics:</a:t>
+            </a:r>
+          </a:p>
+          <a:p>
+            <a:r>
+              <a:rPr lang="en-US" b="1" dirty="0" smtClean="0"/>
+              <a:t>Componentization via Services</a:t>
+            </a:r>
+          </a:p>
+          <a:p>
+            <a:r>
+              <a:rPr lang="en-US" b="1" dirty="0" smtClean="0"/>
+              <a:t>Organized around Business Capabilities</a:t>
+            </a:r>
+          </a:p>
+          <a:p>
+            <a:r>
+              <a:rPr lang="en-US" b="1" dirty="0" smtClean="0"/>
+              <a:t>Products not Projects</a:t>
+            </a:r>
+          </a:p>
+          <a:p>
+            <a:r>
+              <a:rPr lang="en-US" b="1" dirty="0" smtClean="0"/>
+              <a:t>Smart endpoints and dumb pipes</a:t>
+            </a:r>
+          </a:p>
+          <a:p>
+            <a:r>
+              <a:rPr lang="en-US" b="1" dirty="0" smtClean="0"/>
+              <a:t>Decentralized Governance</a:t>
+            </a:r>
+          </a:p>
+          <a:p>
+            <a:r>
+              <a:rPr lang="en-US" b="1" dirty="0" smtClean="0"/>
+              <a:t>Decentralized Data Management</a:t>
+            </a:r>
+          </a:p>
+          <a:p>
+            <a:r>
+              <a:rPr lang="en-US" b="1" dirty="0" smtClean="0"/>
+              <a:t>Infrastructure Automation</a:t>
+            </a:r>
+          </a:p>
+          <a:p>
+            <a:r>
+              <a:rPr lang="en-US" b="1" dirty="0" smtClean="0"/>
+              <a:t>Design for failure</a:t>
+            </a:r>
+          </a:p>
+          <a:p>
+            <a:r>
+              <a:rPr lang="en-US" b="1" dirty="0" smtClean="0"/>
+              <a:t>Evolutionary Design</a:t>
+            </a:r>
+          </a:p>
+          <a:p>
+            <a:endParaRPr lang="en-US" b="1" dirty="0" smtClean="0"/>
+          </a:p>
+          <a:p>
+            <a:pPr marL="0" indent="0">
+              <a:buNone/>
+            </a:pPr>
+            <a:endParaRPr lang="en-US" dirty="0" smtClean="0"/>
+          </a:p>
+          <a:p>
+            <a:endParaRPr lang="en-US" dirty="0" smtClean="0"/>
+          </a:p>
+          <a:p>
+            <a:endParaRPr lang="en-US" dirty="0"/>
+          </a:p>
+          <a:p>
+            <a:pPr marL="0" indent="0">
+              <a:buNone/>
+            </a:pPr>
+            <a:r>
+              <a:rPr lang="en-US" dirty="0" smtClean="0"/>
+              <a:t>Reference: http://martinfowler.com/articles/microservices.html</a:t>
+            </a:r>
+            <a:endParaRPr lang="en-US" dirty="0"/>
+          </a:p>
+        </p:txBody>
+      </p:sp>
+    </p:spTree>
+    <p:extLst>
+      <p:ext uri="{BB962C8B-B14F-4D97-AF65-F5344CB8AC3E}">
+        <p14:creationId xmlns:p14="http://schemas.microsoft.com/office/powerpoint/2010/main" val="3712099602"/>
+      </p:ext>
+    </p:extLst>
+  </p:cSld>
+  <p:clrMapOvr>
+    <a:masterClrMapping/>
+  </p:clrMapOvr>
+</p:sld>
+</file>
+
+<file path=ppt/slides/slide14.xml><?xml version="1.0" encoding="utf-8"?>
+<p:sld xmlns:a="http://schemas.openxmlformats.org/drawingml/2006/main" xmlns:r="http://schemas.openxmlformats.org/officeDocument/2006/relationships" xmlns:p="http://schemas.openxmlformats.org/presentationml/2006/main">
+  <p:cSld>
+    <p:spTree>
+      <p:nvGrpSpPr>
+        <p:cNvPr id="1" name=""/>
+        <p:cNvGrpSpPr/>
+        <p:nvPr/>
+      </p:nvGrpSpPr>
+      <p:grpSpPr>
+        <a:xfrm>
+          <a:off x="0" y="0"/>
+          <a:ext cx="0" cy="0"/>
+          <a:chOff x="0" y="0"/>
+          <a:chExt cx="0" cy="0"/>
+        </a:xfrm>
+      </p:grpSpPr>
+      <p:sp>
+        <p:nvSpPr>
+          <p:cNvPr id="2" name="Title 1"/>
+          <p:cNvSpPr>
+            <a:spLocks noGrp="1"/>
+          </p:cNvSpPr>
+          <p:nvPr>
+            <p:ph type="title"/>
+          </p:nvPr>
+        </p:nvSpPr>
+        <p:spPr/>
+        <p:txBody>
+          <a:bodyPr/>
+          <a:lstStyle/>
+          <a:p>
+            <a:r>
+              <a:rPr lang="en-US" dirty="0" smtClean="0"/>
               <a:t>Spring Framework</a:t>
             </a:r>
             <a:endParaRPr lang="en-US" dirty="0"/>
@@ -4911,7 +6626,7 @@
 </p:sld>
 </file>
 
-<file path=ppt/slides/slide13.xml><?xml version="1.0" encoding="utf-8"?>
+<file path=ppt/slides/slide15.xml><?xml version="1.0" encoding="utf-8"?>
 <p:sld xmlns:a="http://schemas.openxmlformats.org/drawingml/2006/main" xmlns:r="http://schemas.openxmlformats.org/officeDocument/2006/relationships" xmlns:p="http://schemas.openxmlformats.org/presentationml/2006/main">
   <p:cSld>
     <p:spTree>
@@ -5064,7 +6779,7 @@
 </p:sld>
 </file>
 
-<file path=ppt/slides/slide14.xml><?xml version="1.0" encoding="utf-8"?>
+<file path=ppt/slides/slide16.xml><?xml version="1.0" encoding="utf-8"?>
 <p:sld xmlns:a="http://schemas.openxmlformats.org/drawingml/2006/main" xmlns:r="http://schemas.openxmlformats.org/officeDocument/2006/relationships" xmlns:p="http://schemas.openxmlformats.org/presentationml/2006/main">
   <p:cSld>
     <p:spTree>
@@ -5204,7 +6919,7 @@
 </p:sld>
 </file>
 
-<file path=ppt/slides/slide15.xml><?xml version="1.0" encoding="utf-8"?>
+<file path=ppt/slides/slide17.xml><?xml version="1.0" encoding="utf-8"?>
 <p:sld xmlns:a="http://schemas.openxmlformats.org/drawingml/2006/main" xmlns:r="http://schemas.openxmlformats.org/officeDocument/2006/relationships" xmlns:p="http://schemas.openxmlformats.org/presentationml/2006/main">
   <p:cSld>
     <p:spTree>
@@ -5535,11 +7250,7 @@
           <a:p>
             <a:r>
               <a:rPr lang="en-US" dirty="0" smtClean="0"/>
-              <a:t>Representations – Typically JSON/XML or could be anything that represents a part or the whole of the resource </a:t>
-            </a:r>
-            <a:r>
-              <a:rPr lang="en-US" dirty="0" smtClean="0"/>
-              <a:t>state</a:t>
+              <a:t>Representations – Typically JSON/XML or could be anything that represents a part or the whole of the resource state</a:t>
             </a:r>
           </a:p>
           <a:p>
@@ -5547,7 +7258,6 @@
               <a:rPr lang="en-US" dirty="0" smtClean="0"/>
               <a:t>Not tied to HTTP, but most commonly associated with it</a:t>
             </a:r>
-            <a:endParaRPr lang="en-US" dirty="0" smtClean="0"/>
           </a:p>
         </p:txBody>
       </p:sp>
@@ -6038,53 +7748,28 @@
             </a:r>
             <a:r>
               <a:rPr lang="en-US" dirty="0" smtClean="0"/>
-              <a:t>– Decouple client/server implementations using Standards . Interface is standardized across all components through principle of “generality</a:t>
-            </a:r>
-            <a:r>
-              <a:rPr lang="en-US" dirty="0" smtClean="0"/>
-              <a:t>”</a:t>
+              <a:t>– Decouple client/server implementations using Standards . Interface is standardized across all components through principle of “generality”</a:t>
             </a:r>
           </a:p>
           <a:p>
             <a:pPr lvl="2"/>
             <a:r>
               <a:rPr lang="en-US" sz="2400" dirty="0" smtClean="0"/>
-              <a:t> Example</a:t>
-            </a:r>
-            <a:r>
-              <a:rPr lang="en-US" sz="2400" dirty="0" smtClean="0"/>
-              <a:t>: </a:t>
-            </a:r>
-            <a:endParaRPr lang="en-US" sz="2400" dirty="0" smtClean="0"/>
+              <a:t> Example: </a:t>
+            </a:r>
           </a:p>
           <a:p>
             <a:pPr lvl="3"/>
             <a:r>
               <a:rPr lang="en-US" sz="2200" dirty="0" smtClean="0"/>
-              <a:t>Use </a:t>
-            </a:r>
+              <a:t>Use URIs to identify resources ( /user/6)</a:t>
+            </a:r>
+          </a:p>
+          <a:p>
+            <a:pPr lvl="3"/>
             <a:r>
               <a:rPr lang="en-US" sz="2200" dirty="0" smtClean="0"/>
-              <a:t>URIs to identify </a:t>
-            </a:r>
-            <a:r>
-              <a:rPr lang="en-US" sz="2200" dirty="0" smtClean="0"/>
-              <a:t>resources ( /user/6)</a:t>
-            </a:r>
-          </a:p>
-          <a:p>
-            <a:pPr lvl="3"/>
-            <a:r>
-              <a:rPr lang="en-US" sz="2200" dirty="0" smtClean="0"/>
-              <a:t>HTTP </a:t>
-            </a:r>
-            <a:r>
-              <a:rPr lang="en-US" sz="2200" dirty="0" smtClean="0"/>
-              <a:t>methods for manipulation, self descriptive messages to </a:t>
-            </a:r>
-            <a:r>
-              <a:rPr lang="en-US" sz="2200" dirty="0" smtClean="0"/>
-              <a:t>client (GET, DELETE, POST..)</a:t>
+              <a:t>HTTP methods for manipulation, self descriptive messages to client (GET, DELETE, POST..)</a:t>
             </a:r>
           </a:p>
           <a:p>
@@ -6122,13 +7807,8 @@
             </a:r>
             <a:r>
               <a:rPr lang="en-US" sz="2200" dirty="0" smtClean="0"/>
-              <a:t> </a:t>
-            </a:r>
-            <a:r>
-              <a:rPr lang="en-US" sz="2200" dirty="0" smtClean="0"/>
-              <a:t>HATEOAS</a:t>
-            </a:r>
-            <a:endParaRPr lang="en-US" sz="2200" dirty="0" smtClean="0"/>
+              <a:t> HATEOAS</a:t>
+            </a:r>
           </a:p>
           <a:p>
             <a:pPr lvl="1"/>
@@ -6258,13 +7938,7 @@
               <a:rPr lang="en-US" sz="1200" i="1" dirty="0" smtClean="0">
                 <a:hlinkClick r:id="rId5"/>
               </a:rPr>
-              <a:t>REST – What is meant by uniform </a:t>
-            </a:r>
-            <a:r>
-              <a:rPr lang="en-US" sz="1200" i="1" dirty="0" smtClean="0">
-                <a:hlinkClick r:id="rId5"/>
-              </a:rPr>
-              <a:t>interface</a:t>
+              <a:t>REST – What is meant by uniform interface</a:t>
             </a:r>
             <a:endParaRPr lang="en-US" sz="1200" i="1" dirty="0" smtClean="0"/>
           </a:p>
@@ -7024,22 +8698,9 @@
           <a:p>
             <a:r>
               <a:rPr lang="en-US" dirty="0" smtClean="0"/>
-              <a:t>A </a:t>
-            </a:r>
-            <a:r>
-              <a:rPr lang="en-US" dirty="0"/>
-              <a:t>hypermedia-driven site provides information to navigate the site's </a:t>
-            </a:r>
-            <a:r>
-              <a:rPr lang="en-US" dirty="0">
-                <a:hlinkClick r:id="rId3"/>
-              </a:rPr>
-              <a:t>REST</a:t>
-            </a:r>
-            <a:r>
-              <a:rPr lang="en-US" dirty="0"/>
-              <a:t> interfaces dynamically by including hypermedia links with the responses.</a:t>
-            </a:r>
+              <a:t>Help client navigate the Service API by providing necessary information dynamically in the response using media types and link relations</a:t>
+            </a:r>
+            <a:endParaRPr lang="en-US" dirty="0"/>
           </a:p>
         </p:txBody>
       </p:sp>
@@ -7071,7 +8732,7 @@
             </a:r>
             <a:r>
               <a:rPr lang="en-US" sz="1200" i="1" dirty="0" smtClean="0">
-                <a:hlinkClick r:id="rId4"/>
+                <a:hlinkClick r:id="rId3"/>
               </a:rPr>
               <a:t>: </a:t>
             </a:r>
@@ -7081,7 +8742,7 @@
             </a:r>
             <a:r>
               <a:rPr lang="en-US" sz="1200" i="1" dirty="0" smtClean="0">
-                <a:hlinkClick r:id="rId5"/>
+                <a:hlinkClick r:id="rId4"/>
               </a:rPr>
               <a:t>Understanding HATEOAS</a:t>
             </a:r>
@@ -7098,7 +8759,7 @@
           <p:nvPr/>
         </p:nvPicPr>
         <p:blipFill>
-          <a:blip r:embed="rId6">
+          <a:blip r:embed="rId5">
             <a:extLst>
               <a:ext uri="{28A0092B-C50C-407E-A947-70E740481C1C}">
                 <a14:useLocalDpi xmlns:a14="http://schemas.microsoft.com/office/drawing/2010/main" val="0"/>
@@ -7152,7 +8813,7 @@
           <p:nvPr/>
         </p:nvPicPr>
         <p:blipFill>
-          <a:blip r:embed="rId7">
+          <a:blip r:embed="rId6">
             <a:extLst>
               <a:ext uri="{28A0092B-C50C-407E-A947-70E740481C1C}">
                 <a14:useLocalDpi xmlns:a14="http://schemas.microsoft.com/office/drawing/2010/main" val="0"/>
@@ -7318,48 +8979,1143 @@
             <p:ph type="title"/>
           </p:nvPr>
         </p:nvSpPr>
-        <p:spPr/>
-        <p:txBody>
-          <a:bodyPr/>
-          <a:lstStyle/>
-          <a:p>
-            <a:r>
-              <a:rPr lang="en-US" dirty="0" smtClean="0"/>
-              <a:t>REST - CRUD</a:t>
-            </a:r>
-            <a:endParaRPr lang="en-US" dirty="0"/>
-          </a:p>
-        </p:txBody>
-      </p:sp>
-      <p:sp>
-        <p:nvSpPr>
-          <p:cNvPr id="3" name="Content Placeholder 2"/>
-          <p:cNvSpPr>
-            <a:spLocks noGrp="1"/>
-          </p:cNvSpPr>
-          <p:nvPr>
-            <p:ph idx="1"/>
-          </p:nvPr>
-        </p:nvSpPr>
         <p:spPr>
           <a:xfrm>
-            <a:off x="334851" y="1287887"/>
-            <a:ext cx="11384923" cy="4889076"/>
+            <a:off x="1" y="365125"/>
+            <a:ext cx="12192000" cy="981075"/>
           </a:xfrm>
         </p:spPr>
         <p:txBody>
-          <a:bodyPr>
-            <a:normAutofit/>
-          </a:bodyPr>
-          <a:lstStyle/>
-          <a:p>
-            <a:pPr marL="0" indent="0">
-              <a:buNone/>
-            </a:pPr>
+          <a:bodyPr/>
+          <a:lstStyle/>
+          <a:p>
+            <a:r>
+              <a:rPr lang="en-US" dirty="0" smtClean="0"/>
+              <a:t>CRUD using HTTP methods (*as per the RFCs)</a:t>
+            </a:r>
             <a:endParaRPr lang="en-US" dirty="0"/>
           </a:p>
         </p:txBody>
       </p:sp>
+      <p:graphicFrame>
+        <p:nvGraphicFramePr>
+          <p:cNvPr id="5" name="Content Placeholder 4"/>
+          <p:cNvGraphicFramePr>
+            <a:graphicFrameLocks noGrp="1"/>
+          </p:cNvGraphicFramePr>
+          <p:nvPr>
+            <p:ph idx="1"/>
+            <p:extLst>
+              <p:ext uri="{D42A27DB-BD31-4B8C-83A1-F6EECF244321}">
+                <p14:modId xmlns:p14="http://schemas.microsoft.com/office/powerpoint/2010/main" val="2803411255"/>
+              </p:ext>
+            </p:extLst>
+          </p:nvPr>
+        </p:nvGraphicFramePr>
+        <p:xfrm>
+          <a:off x="103030" y="1266064"/>
+          <a:ext cx="12000070" cy="4996068"/>
+        </p:xfrm>
+        <a:graphic>
+          <a:graphicData uri="http://schemas.openxmlformats.org/drawingml/2006/table">
+            <a:tbl>
+              <a:tblPr firstRow="1" bandRow="1">
+                <a:tableStyleId>{2D5ABB26-0587-4C30-8999-92F81FD0307C}</a:tableStyleId>
+              </a:tblPr>
+              <a:tblGrid>
+                <a:gridCol w="2400014"/>
+                <a:gridCol w="2400014"/>
+                <a:gridCol w="2400014"/>
+                <a:gridCol w="2132399"/>
+                <a:gridCol w="2667629"/>
+              </a:tblGrid>
+              <a:tr h="764811">
+                <a:tc>
+                  <a:txBody>
+                    <a:bodyPr/>
+                    <a:lstStyle/>
+                    <a:p>
+                      <a:pPr algn="ctr"/>
+                      <a:r>
+                        <a:rPr lang="en-US" sz="2800" b="1" dirty="0" smtClean="0"/>
+                        <a:t>GET</a:t>
+                      </a:r>
+                      <a:endParaRPr lang="en-US" sz="2800" b="1" dirty="0"/>
+                    </a:p>
+                  </a:txBody>
+                  <a:tcPr>
+                    <a:lnL w="12700" cap="flat" cmpd="sng" algn="ctr">
+                      <a:solidFill>
+                        <a:schemeClr val="tx1"/>
+                      </a:solidFill>
+                      <a:prstDash val="solid"/>
+                      <a:round/>
+                      <a:headEnd type="none" w="med" len="med"/>
+                      <a:tailEnd type="none" w="med" len="med"/>
+                    </a:lnL>
+                    <a:lnR w="12700" cap="flat" cmpd="sng" algn="ctr">
+                      <a:solidFill>
+                        <a:schemeClr val="tx1"/>
+                      </a:solidFill>
+                      <a:prstDash val="solid"/>
+                      <a:round/>
+                      <a:headEnd type="none" w="med" len="med"/>
+                      <a:tailEnd type="none" w="med" len="med"/>
+                    </a:lnR>
+                    <a:lnT w="12700" cap="flat" cmpd="sng" algn="ctr">
+                      <a:solidFill>
+                        <a:schemeClr val="tx1"/>
+                      </a:solidFill>
+                      <a:prstDash val="solid"/>
+                      <a:round/>
+                      <a:headEnd type="none" w="med" len="med"/>
+                      <a:tailEnd type="none" w="med" len="med"/>
+                    </a:lnT>
+                    <a:lnB w="12700" cap="flat" cmpd="sng" algn="ctr">
+                      <a:solidFill>
+                        <a:schemeClr val="tx1"/>
+                      </a:solidFill>
+                      <a:prstDash val="solid"/>
+                      <a:round/>
+                      <a:headEnd type="none" w="med" len="med"/>
+                      <a:tailEnd type="none" w="med" len="med"/>
+                    </a:lnB>
+                  </a:tcPr>
+                </a:tc>
+                <a:tc>
+                  <a:txBody>
+                    <a:bodyPr/>
+                    <a:lstStyle/>
+                    <a:p>
+                      <a:pPr algn="ctr"/>
+                      <a:r>
+                        <a:rPr lang="en-US" sz="2800" b="1" dirty="0" smtClean="0"/>
+                        <a:t>PUT</a:t>
+                      </a:r>
+                      <a:endParaRPr lang="en-US" sz="2800" b="1" dirty="0"/>
+                    </a:p>
+                  </a:txBody>
+                  <a:tcPr>
+                    <a:lnL w="12700" cap="flat" cmpd="sng" algn="ctr">
+                      <a:solidFill>
+                        <a:schemeClr val="tx1"/>
+                      </a:solidFill>
+                      <a:prstDash val="solid"/>
+                      <a:round/>
+                      <a:headEnd type="none" w="med" len="med"/>
+                      <a:tailEnd type="none" w="med" len="med"/>
+                    </a:lnL>
+                    <a:lnR w="12700" cap="flat" cmpd="sng" algn="ctr">
+                      <a:solidFill>
+                        <a:schemeClr val="tx1"/>
+                      </a:solidFill>
+                      <a:prstDash val="solid"/>
+                      <a:round/>
+                      <a:headEnd type="none" w="med" len="med"/>
+                      <a:tailEnd type="none" w="med" len="med"/>
+                    </a:lnR>
+                    <a:lnT w="12700" cap="flat" cmpd="sng" algn="ctr">
+                      <a:solidFill>
+                        <a:schemeClr val="tx1"/>
+                      </a:solidFill>
+                      <a:prstDash val="solid"/>
+                      <a:round/>
+                      <a:headEnd type="none" w="med" len="med"/>
+                      <a:tailEnd type="none" w="med" len="med"/>
+                    </a:lnT>
+                    <a:lnB w="12700" cap="flat" cmpd="sng" algn="ctr">
+                      <a:solidFill>
+                        <a:schemeClr val="tx1"/>
+                      </a:solidFill>
+                      <a:prstDash val="solid"/>
+                      <a:round/>
+                      <a:headEnd type="none" w="med" len="med"/>
+                      <a:tailEnd type="none" w="med" len="med"/>
+                    </a:lnB>
+                  </a:tcPr>
+                </a:tc>
+                <a:tc>
+                  <a:txBody>
+                    <a:bodyPr/>
+                    <a:lstStyle/>
+                    <a:p>
+                      <a:pPr algn="ctr"/>
+                      <a:r>
+                        <a:rPr lang="en-US" sz="2800" b="1" dirty="0" smtClean="0"/>
+                        <a:t>POST</a:t>
+                      </a:r>
+                      <a:endParaRPr lang="en-US" sz="2800" b="1" dirty="0"/>
+                    </a:p>
+                  </a:txBody>
+                  <a:tcPr>
+                    <a:lnL w="12700" cap="flat" cmpd="sng" algn="ctr">
+                      <a:solidFill>
+                        <a:schemeClr val="tx1"/>
+                      </a:solidFill>
+                      <a:prstDash val="solid"/>
+                      <a:round/>
+                      <a:headEnd type="none" w="med" len="med"/>
+                      <a:tailEnd type="none" w="med" len="med"/>
+                    </a:lnL>
+                    <a:lnR w="12700" cap="flat" cmpd="sng" algn="ctr">
+                      <a:solidFill>
+                        <a:schemeClr val="tx1"/>
+                      </a:solidFill>
+                      <a:prstDash val="solid"/>
+                      <a:round/>
+                      <a:headEnd type="none" w="med" len="med"/>
+                      <a:tailEnd type="none" w="med" len="med"/>
+                    </a:lnR>
+                    <a:lnT w="12700" cap="flat" cmpd="sng" algn="ctr">
+                      <a:solidFill>
+                        <a:schemeClr val="tx1"/>
+                      </a:solidFill>
+                      <a:prstDash val="solid"/>
+                      <a:round/>
+                      <a:headEnd type="none" w="med" len="med"/>
+                      <a:tailEnd type="none" w="med" len="med"/>
+                    </a:lnT>
+                    <a:lnB w="12700" cap="flat" cmpd="sng" algn="ctr">
+                      <a:solidFill>
+                        <a:schemeClr val="tx1"/>
+                      </a:solidFill>
+                      <a:prstDash val="solid"/>
+                      <a:round/>
+                      <a:headEnd type="none" w="med" len="med"/>
+                      <a:tailEnd type="none" w="med" len="med"/>
+                    </a:lnB>
+                  </a:tcPr>
+                </a:tc>
+                <a:tc>
+                  <a:txBody>
+                    <a:bodyPr/>
+                    <a:lstStyle/>
+                    <a:p>
+                      <a:pPr algn="ctr"/>
+                      <a:r>
+                        <a:rPr lang="en-US" sz="2800" b="1" dirty="0" smtClean="0"/>
+                        <a:t>DELETE</a:t>
+                      </a:r>
+                      <a:endParaRPr lang="en-US" sz="2800" b="1" dirty="0"/>
+                    </a:p>
+                  </a:txBody>
+                  <a:tcPr>
+                    <a:lnL w="12700" cap="flat" cmpd="sng" algn="ctr">
+                      <a:solidFill>
+                        <a:schemeClr val="tx1"/>
+                      </a:solidFill>
+                      <a:prstDash val="solid"/>
+                      <a:round/>
+                      <a:headEnd type="none" w="med" len="med"/>
+                      <a:tailEnd type="none" w="med" len="med"/>
+                    </a:lnL>
+                    <a:lnR w="12700" cap="flat" cmpd="sng" algn="ctr">
+                      <a:solidFill>
+                        <a:schemeClr val="tx1"/>
+                      </a:solidFill>
+                      <a:prstDash val="solid"/>
+                      <a:round/>
+                      <a:headEnd type="none" w="med" len="med"/>
+                      <a:tailEnd type="none" w="med" len="med"/>
+                    </a:lnR>
+                    <a:lnT w="12700" cap="flat" cmpd="sng" algn="ctr">
+                      <a:solidFill>
+                        <a:schemeClr val="tx1"/>
+                      </a:solidFill>
+                      <a:prstDash val="solid"/>
+                      <a:round/>
+                      <a:headEnd type="none" w="med" len="med"/>
+                      <a:tailEnd type="none" w="med" len="med"/>
+                    </a:lnT>
+                    <a:lnB w="12700" cap="flat" cmpd="sng" algn="ctr">
+                      <a:solidFill>
+                        <a:schemeClr val="tx1"/>
+                      </a:solidFill>
+                      <a:prstDash val="solid"/>
+                      <a:round/>
+                      <a:headEnd type="none" w="med" len="med"/>
+                      <a:tailEnd type="none" w="med" len="med"/>
+                    </a:lnB>
+                  </a:tcPr>
+                </a:tc>
+                <a:tc>
+                  <a:txBody>
+                    <a:bodyPr/>
+                    <a:lstStyle/>
+                    <a:p>
+                      <a:pPr algn="ctr"/>
+                      <a:r>
+                        <a:rPr lang="en-US" sz="2800" b="1" dirty="0" smtClean="0"/>
+                        <a:t>PATCH</a:t>
+                      </a:r>
+                      <a:endParaRPr lang="en-US" sz="2800" b="1" dirty="0"/>
+                    </a:p>
+                  </a:txBody>
+                  <a:tcPr>
+                    <a:lnL w="12700" cap="flat" cmpd="sng" algn="ctr">
+                      <a:solidFill>
+                        <a:schemeClr val="tx1"/>
+                      </a:solidFill>
+                      <a:prstDash val="solid"/>
+                      <a:round/>
+                      <a:headEnd type="none" w="med" len="med"/>
+                      <a:tailEnd type="none" w="med" len="med"/>
+                    </a:lnL>
+                    <a:lnR w="12700" cap="flat" cmpd="sng" algn="ctr">
+                      <a:solidFill>
+                        <a:schemeClr val="tx1"/>
+                      </a:solidFill>
+                      <a:prstDash val="solid"/>
+                      <a:round/>
+                      <a:headEnd type="none" w="med" len="med"/>
+                      <a:tailEnd type="none" w="med" len="med"/>
+                    </a:lnR>
+                    <a:lnT w="12700" cap="flat" cmpd="sng" algn="ctr">
+                      <a:solidFill>
+                        <a:schemeClr val="tx1"/>
+                      </a:solidFill>
+                      <a:prstDash val="solid"/>
+                      <a:round/>
+                      <a:headEnd type="none" w="med" len="med"/>
+                      <a:tailEnd type="none" w="med" len="med"/>
+                    </a:lnT>
+                    <a:lnB w="12700" cap="flat" cmpd="sng" algn="ctr">
+                      <a:solidFill>
+                        <a:schemeClr val="tx1"/>
+                      </a:solidFill>
+                      <a:prstDash val="solid"/>
+                      <a:round/>
+                      <a:headEnd type="none" w="med" len="med"/>
+                      <a:tailEnd type="none" w="med" len="med"/>
+                    </a:lnB>
+                  </a:tcPr>
+                </a:tc>
+              </a:tr>
+              <a:tr h="1863666">
+                <a:tc>
+                  <a:txBody>
+                    <a:bodyPr/>
+                    <a:lstStyle/>
+                    <a:p>
+                      <a:pPr algn="ctr"/>
+                      <a:r>
+                        <a:rPr lang="en-US" sz="2000" dirty="0" smtClean="0"/>
+                        <a:t>Retrieve a resource. RFC 2616.</a:t>
+                      </a:r>
+                      <a:endParaRPr lang="en-US" sz="2000" dirty="0"/>
+                    </a:p>
+                  </a:txBody>
+                  <a:tcPr anchor="ctr">
+                    <a:lnL w="12700" cap="flat" cmpd="sng" algn="ctr">
+                      <a:solidFill>
+                        <a:schemeClr val="tx1"/>
+                      </a:solidFill>
+                      <a:prstDash val="solid"/>
+                      <a:round/>
+                      <a:headEnd type="none" w="med" len="med"/>
+                      <a:tailEnd type="none" w="med" len="med"/>
+                    </a:lnL>
+                    <a:lnR w="12700" cap="flat" cmpd="sng" algn="ctr">
+                      <a:solidFill>
+                        <a:schemeClr val="tx1"/>
+                      </a:solidFill>
+                      <a:prstDash val="solid"/>
+                      <a:round/>
+                      <a:headEnd type="none" w="med" len="med"/>
+                      <a:tailEnd type="none" w="med" len="med"/>
+                    </a:lnR>
+                    <a:lnT w="12700" cap="flat" cmpd="sng" algn="ctr">
+                      <a:solidFill>
+                        <a:schemeClr val="tx1"/>
+                      </a:solidFill>
+                      <a:prstDash val="solid"/>
+                      <a:round/>
+                      <a:headEnd type="none" w="med" len="med"/>
+                      <a:tailEnd type="none" w="med" len="med"/>
+                    </a:lnT>
+                    <a:lnB w="12700" cap="flat" cmpd="sng" algn="ctr">
+                      <a:solidFill>
+                        <a:schemeClr val="tx1"/>
+                      </a:solidFill>
+                      <a:prstDash val="solid"/>
+                      <a:round/>
+                      <a:headEnd type="none" w="med" len="med"/>
+                      <a:tailEnd type="none" w="med" len="med"/>
+                    </a:lnB>
+                  </a:tcPr>
+                </a:tc>
+                <a:tc>
+                  <a:txBody>
+                    <a:bodyPr/>
+                    <a:lstStyle/>
+                    <a:p>
+                      <a:pPr algn="ctr"/>
+                      <a:r>
+                        <a:rPr lang="en-US" sz="2000" dirty="0" smtClean="0"/>
+                        <a:t>Create</a:t>
+                      </a:r>
+                      <a:r>
+                        <a:rPr lang="en-US" sz="2000" baseline="0" dirty="0" smtClean="0"/>
+                        <a:t> or replace a resource in its entirety at the Client defined URL. RFC 2616.</a:t>
+                      </a:r>
+                      <a:endParaRPr lang="en-US" sz="2000" dirty="0"/>
+                    </a:p>
+                  </a:txBody>
+                  <a:tcPr anchor="ctr">
+                    <a:lnL w="12700" cap="flat" cmpd="sng" algn="ctr">
+                      <a:solidFill>
+                        <a:schemeClr val="tx1"/>
+                      </a:solidFill>
+                      <a:prstDash val="solid"/>
+                      <a:round/>
+                      <a:headEnd type="none" w="med" len="med"/>
+                      <a:tailEnd type="none" w="med" len="med"/>
+                    </a:lnL>
+                    <a:lnR w="12700" cap="flat" cmpd="sng" algn="ctr">
+                      <a:solidFill>
+                        <a:schemeClr val="tx1"/>
+                      </a:solidFill>
+                      <a:prstDash val="solid"/>
+                      <a:round/>
+                      <a:headEnd type="none" w="med" len="med"/>
+                      <a:tailEnd type="none" w="med" len="med"/>
+                    </a:lnR>
+                    <a:lnT w="12700" cap="flat" cmpd="sng" algn="ctr">
+                      <a:solidFill>
+                        <a:schemeClr val="tx1"/>
+                      </a:solidFill>
+                      <a:prstDash val="solid"/>
+                      <a:round/>
+                      <a:headEnd type="none" w="med" len="med"/>
+                      <a:tailEnd type="none" w="med" len="med"/>
+                    </a:lnT>
+                    <a:lnB w="12700" cap="flat" cmpd="sng" algn="ctr">
+                      <a:solidFill>
+                        <a:schemeClr val="tx1"/>
+                      </a:solidFill>
+                      <a:prstDash val="solid"/>
+                      <a:round/>
+                      <a:headEnd type="none" w="med" len="med"/>
+                      <a:tailEnd type="none" w="med" len="med"/>
+                    </a:lnB>
+                  </a:tcPr>
+                </a:tc>
+                <a:tc>
+                  <a:txBody>
+                    <a:bodyPr/>
+                    <a:lstStyle/>
+                    <a:p>
+                      <a:pPr algn="ctr"/>
+                      <a:r>
+                        <a:rPr lang="en-US" sz="2000" dirty="0" smtClean="0"/>
+                        <a:t>Add a child resource</a:t>
+                      </a:r>
+                      <a:r>
+                        <a:rPr lang="en-US" sz="2000" baseline="0" dirty="0" smtClean="0"/>
+                        <a:t> at a Service defined URL. RFC 2616.</a:t>
+                      </a:r>
+                      <a:endParaRPr lang="en-US" sz="2000" dirty="0"/>
+                    </a:p>
+                  </a:txBody>
+                  <a:tcPr anchor="ctr">
+                    <a:lnL w="12700" cap="flat" cmpd="sng" algn="ctr">
+                      <a:solidFill>
+                        <a:schemeClr val="tx1"/>
+                      </a:solidFill>
+                      <a:prstDash val="solid"/>
+                      <a:round/>
+                      <a:headEnd type="none" w="med" len="med"/>
+                      <a:tailEnd type="none" w="med" len="med"/>
+                    </a:lnL>
+                    <a:lnR w="12700" cap="flat" cmpd="sng" algn="ctr">
+                      <a:solidFill>
+                        <a:schemeClr val="tx1"/>
+                      </a:solidFill>
+                      <a:prstDash val="solid"/>
+                      <a:round/>
+                      <a:headEnd type="none" w="med" len="med"/>
+                      <a:tailEnd type="none" w="med" len="med"/>
+                    </a:lnR>
+                    <a:lnT w="12700" cap="flat" cmpd="sng" algn="ctr">
+                      <a:solidFill>
+                        <a:schemeClr val="tx1"/>
+                      </a:solidFill>
+                      <a:prstDash val="solid"/>
+                      <a:round/>
+                      <a:headEnd type="none" w="med" len="med"/>
+                      <a:tailEnd type="none" w="med" len="med"/>
+                    </a:lnT>
+                    <a:lnB w="12700" cap="flat" cmpd="sng" algn="ctr">
+                      <a:solidFill>
+                        <a:schemeClr val="tx1"/>
+                      </a:solidFill>
+                      <a:prstDash val="solid"/>
+                      <a:round/>
+                      <a:headEnd type="none" w="med" len="med"/>
+                      <a:tailEnd type="none" w="med" len="med"/>
+                    </a:lnB>
+                  </a:tcPr>
+                </a:tc>
+                <a:tc>
+                  <a:txBody>
+                    <a:bodyPr/>
+                    <a:lstStyle/>
+                    <a:p>
+                      <a:pPr algn="ctr"/>
+                      <a:r>
+                        <a:rPr lang="en-US" sz="2000" dirty="0" smtClean="0"/>
+                        <a:t>Delete</a:t>
+                      </a:r>
+                      <a:r>
+                        <a:rPr lang="en-US" sz="2000" baseline="0" dirty="0" smtClean="0"/>
+                        <a:t> a resource. RFC 2616.</a:t>
+                      </a:r>
+                      <a:endParaRPr lang="en-US" sz="2000" dirty="0"/>
+                    </a:p>
+                  </a:txBody>
+                  <a:tcPr anchor="ctr">
+                    <a:lnL w="12700" cap="flat" cmpd="sng" algn="ctr">
+                      <a:solidFill>
+                        <a:schemeClr val="tx1"/>
+                      </a:solidFill>
+                      <a:prstDash val="solid"/>
+                      <a:round/>
+                      <a:headEnd type="none" w="med" len="med"/>
+                      <a:tailEnd type="none" w="med" len="med"/>
+                    </a:lnL>
+                    <a:lnR w="12700" cap="flat" cmpd="sng" algn="ctr">
+                      <a:solidFill>
+                        <a:schemeClr val="tx1"/>
+                      </a:solidFill>
+                      <a:prstDash val="solid"/>
+                      <a:round/>
+                      <a:headEnd type="none" w="med" len="med"/>
+                      <a:tailEnd type="none" w="med" len="med"/>
+                    </a:lnR>
+                    <a:lnT w="12700" cap="flat" cmpd="sng" algn="ctr">
+                      <a:solidFill>
+                        <a:schemeClr val="tx1"/>
+                      </a:solidFill>
+                      <a:prstDash val="solid"/>
+                      <a:round/>
+                      <a:headEnd type="none" w="med" len="med"/>
+                      <a:tailEnd type="none" w="med" len="med"/>
+                    </a:lnT>
+                    <a:lnB w="12700" cap="flat" cmpd="sng" algn="ctr">
+                      <a:solidFill>
+                        <a:schemeClr val="tx1"/>
+                      </a:solidFill>
+                      <a:prstDash val="solid"/>
+                      <a:round/>
+                      <a:headEnd type="none" w="med" len="med"/>
+                      <a:tailEnd type="none" w="med" len="med"/>
+                    </a:lnB>
+                  </a:tcPr>
+                </a:tc>
+                <a:tc>
+                  <a:txBody>
+                    <a:bodyPr/>
+                    <a:lstStyle/>
+                    <a:p>
+                      <a:pPr algn="ctr"/>
+                      <a:r>
+                        <a:rPr lang="en-US" sz="2000" dirty="0" smtClean="0"/>
+                        <a:t>Send instructions</a:t>
+                      </a:r>
+                      <a:r>
+                        <a:rPr lang="en-US" sz="2000" baseline="0" dirty="0" smtClean="0"/>
+                        <a:t> on how the Service should modify a resource. RFC 5789.</a:t>
+                      </a:r>
+                      <a:endParaRPr lang="en-US" sz="2000" dirty="0"/>
+                    </a:p>
+                  </a:txBody>
+                  <a:tcPr anchor="ctr">
+                    <a:lnL w="12700" cap="flat" cmpd="sng" algn="ctr">
+                      <a:solidFill>
+                        <a:schemeClr val="tx1"/>
+                      </a:solidFill>
+                      <a:prstDash val="solid"/>
+                      <a:round/>
+                      <a:headEnd type="none" w="med" len="med"/>
+                      <a:tailEnd type="none" w="med" len="med"/>
+                    </a:lnL>
+                    <a:lnR w="12700" cap="flat" cmpd="sng" algn="ctr">
+                      <a:solidFill>
+                        <a:schemeClr val="tx1"/>
+                      </a:solidFill>
+                      <a:prstDash val="solid"/>
+                      <a:round/>
+                      <a:headEnd type="none" w="med" len="med"/>
+                      <a:tailEnd type="none" w="med" len="med"/>
+                    </a:lnR>
+                    <a:lnT w="12700" cap="flat" cmpd="sng" algn="ctr">
+                      <a:solidFill>
+                        <a:schemeClr val="tx1"/>
+                      </a:solidFill>
+                      <a:prstDash val="solid"/>
+                      <a:round/>
+                      <a:headEnd type="none" w="med" len="med"/>
+                      <a:tailEnd type="none" w="med" len="med"/>
+                    </a:lnT>
+                    <a:lnB w="12700" cap="flat" cmpd="sng" algn="ctr">
+                      <a:solidFill>
+                        <a:schemeClr val="tx1"/>
+                      </a:solidFill>
+                      <a:prstDash val="solid"/>
+                      <a:round/>
+                      <a:headEnd type="none" w="med" len="med"/>
+                      <a:tailEnd type="none" w="med" len="med"/>
+                    </a:lnB>
+                  </a:tcPr>
+                </a:tc>
+              </a:tr>
+              <a:tr h="1160396">
+                <a:tc>
+                  <a:txBody>
+                    <a:bodyPr/>
+                    <a:lstStyle/>
+                    <a:p>
+                      <a:pPr algn="ctr"/>
+                      <a:r>
+                        <a:rPr lang="en-US" sz="2000" dirty="0" smtClean="0"/>
+                        <a:t>Safe/Idempotent</a:t>
+                      </a:r>
+                      <a:endParaRPr lang="en-US" sz="2000" dirty="0"/>
+                    </a:p>
+                  </a:txBody>
+                  <a:tcPr anchor="ctr">
+                    <a:lnL w="12700" cap="flat" cmpd="sng" algn="ctr">
+                      <a:solidFill>
+                        <a:schemeClr val="tx1"/>
+                      </a:solidFill>
+                      <a:prstDash val="solid"/>
+                      <a:round/>
+                      <a:headEnd type="none" w="med" len="med"/>
+                      <a:tailEnd type="none" w="med" len="med"/>
+                    </a:lnL>
+                    <a:lnR w="12700" cap="flat" cmpd="sng" algn="ctr">
+                      <a:solidFill>
+                        <a:schemeClr val="tx1"/>
+                      </a:solidFill>
+                      <a:prstDash val="solid"/>
+                      <a:round/>
+                      <a:headEnd type="none" w="med" len="med"/>
+                      <a:tailEnd type="none" w="med" len="med"/>
+                    </a:lnR>
+                    <a:lnT w="12700" cap="flat" cmpd="sng" algn="ctr">
+                      <a:solidFill>
+                        <a:schemeClr val="tx1"/>
+                      </a:solidFill>
+                      <a:prstDash val="solid"/>
+                      <a:round/>
+                      <a:headEnd type="none" w="med" len="med"/>
+                      <a:tailEnd type="none" w="med" len="med"/>
+                    </a:lnT>
+                    <a:lnB w="12700" cap="flat" cmpd="sng" algn="ctr">
+                      <a:solidFill>
+                        <a:schemeClr val="tx1"/>
+                      </a:solidFill>
+                      <a:prstDash val="solid"/>
+                      <a:round/>
+                      <a:headEnd type="none" w="med" len="med"/>
+                      <a:tailEnd type="none" w="med" len="med"/>
+                    </a:lnB>
+                  </a:tcPr>
+                </a:tc>
+                <a:tc>
+                  <a:txBody>
+                    <a:bodyPr/>
+                    <a:lstStyle/>
+                    <a:p>
+                      <a:pPr algn="ctr"/>
+                      <a:r>
+                        <a:rPr lang="en-US" sz="2000" dirty="0" smtClean="0"/>
+                        <a:t>Safe/Idempotent</a:t>
+                      </a:r>
+                      <a:endParaRPr lang="en-US" sz="2000" dirty="0"/>
+                    </a:p>
+                  </a:txBody>
+                  <a:tcPr anchor="ctr">
+                    <a:lnL w="12700" cap="flat" cmpd="sng" algn="ctr">
+                      <a:solidFill>
+                        <a:schemeClr val="tx1"/>
+                      </a:solidFill>
+                      <a:prstDash val="solid"/>
+                      <a:round/>
+                      <a:headEnd type="none" w="med" len="med"/>
+                      <a:tailEnd type="none" w="med" len="med"/>
+                    </a:lnL>
+                    <a:lnR w="12700" cap="flat" cmpd="sng" algn="ctr">
+                      <a:solidFill>
+                        <a:schemeClr val="tx1"/>
+                      </a:solidFill>
+                      <a:prstDash val="solid"/>
+                      <a:round/>
+                      <a:headEnd type="none" w="med" len="med"/>
+                      <a:tailEnd type="none" w="med" len="med"/>
+                    </a:lnR>
+                    <a:lnT w="12700" cap="flat" cmpd="sng" algn="ctr">
+                      <a:solidFill>
+                        <a:schemeClr val="tx1"/>
+                      </a:solidFill>
+                      <a:prstDash val="solid"/>
+                      <a:round/>
+                      <a:headEnd type="none" w="med" len="med"/>
+                      <a:tailEnd type="none" w="med" len="med"/>
+                    </a:lnT>
+                    <a:lnB w="12700" cap="flat" cmpd="sng" algn="ctr">
+                      <a:solidFill>
+                        <a:schemeClr val="tx1"/>
+                      </a:solidFill>
+                      <a:prstDash val="solid"/>
+                      <a:round/>
+                      <a:headEnd type="none" w="med" len="med"/>
+                      <a:tailEnd type="none" w="med" len="med"/>
+                    </a:lnB>
+                  </a:tcPr>
+                </a:tc>
+                <a:tc>
+                  <a:txBody>
+                    <a:bodyPr/>
+                    <a:lstStyle/>
+                    <a:p>
+                      <a:pPr algn="ctr"/>
+                      <a:r>
+                        <a:rPr lang="en-US" sz="2000" dirty="0" smtClean="0"/>
+                        <a:t>Not Idempotent</a:t>
+                      </a:r>
+                      <a:endParaRPr lang="en-US" sz="2000" dirty="0"/>
+                    </a:p>
+                  </a:txBody>
+                  <a:tcPr anchor="ctr">
+                    <a:lnL w="12700" cap="flat" cmpd="sng" algn="ctr">
+                      <a:solidFill>
+                        <a:schemeClr val="tx1"/>
+                      </a:solidFill>
+                      <a:prstDash val="solid"/>
+                      <a:round/>
+                      <a:headEnd type="none" w="med" len="med"/>
+                      <a:tailEnd type="none" w="med" len="med"/>
+                    </a:lnL>
+                    <a:lnR w="12700" cap="flat" cmpd="sng" algn="ctr">
+                      <a:solidFill>
+                        <a:schemeClr val="tx1"/>
+                      </a:solidFill>
+                      <a:prstDash val="solid"/>
+                      <a:round/>
+                      <a:headEnd type="none" w="med" len="med"/>
+                      <a:tailEnd type="none" w="med" len="med"/>
+                    </a:lnR>
+                    <a:lnT w="12700" cap="flat" cmpd="sng" algn="ctr">
+                      <a:solidFill>
+                        <a:schemeClr val="tx1"/>
+                      </a:solidFill>
+                      <a:prstDash val="solid"/>
+                      <a:round/>
+                      <a:headEnd type="none" w="med" len="med"/>
+                      <a:tailEnd type="none" w="med" len="med"/>
+                    </a:lnT>
+                    <a:lnB w="12700" cap="flat" cmpd="sng" algn="ctr">
+                      <a:solidFill>
+                        <a:schemeClr val="tx1"/>
+                      </a:solidFill>
+                      <a:prstDash val="solid"/>
+                      <a:round/>
+                      <a:headEnd type="none" w="med" len="med"/>
+                      <a:tailEnd type="none" w="med" len="med"/>
+                    </a:lnB>
+                  </a:tcPr>
+                </a:tc>
+                <a:tc>
+                  <a:txBody>
+                    <a:bodyPr/>
+                    <a:lstStyle/>
+                    <a:p>
+                      <a:pPr algn="ctr"/>
+                      <a:r>
+                        <a:rPr lang="en-US" sz="2000" dirty="0" smtClean="0"/>
+                        <a:t>Not Idempotent</a:t>
+                      </a:r>
+                      <a:endParaRPr lang="en-US" sz="2000" dirty="0"/>
+                    </a:p>
+                  </a:txBody>
+                  <a:tcPr anchor="ctr">
+                    <a:lnL w="12700" cap="flat" cmpd="sng" algn="ctr">
+                      <a:solidFill>
+                        <a:schemeClr val="tx1"/>
+                      </a:solidFill>
+                      <a:prstDash val="solid"/>
+                      <a:round/>
+                      <a:headEnd type="none" w="med" len="med"/>
+                      <a:tailEnd type="none" w="med" len="med"/>
+                    </a:lnL>
+                    <a:lnR w="12700" cap="flat" cmpd="sng" algn="ctr">
+                      <a:solidFill>
+                        <a:schemeClr val="tx1"/>
+                      </a:solidFill>
+                      <a:prstDash val="solid"/>
+                      <a:round/>
+                      <a:headEnd type="none" w="med" len="med"/>
+                      <a:tailEnd type="none" w="med" len="med"/>
+                    </a:lnR>
+                    <a:lnT w="12700" cap="flat" cmpd="sng" algn="ctr">
+                      <a:solidFill>
+                        <a:schemeClr val="tx1"/>
+                      </a:solidFill>
+                      <a:prstDash val="solid"/>
+                      <a:round/>
+                      <a:headEnd type="none" w="med" len="med"/>
+                      <a:tailEnd type="none" w="med" len="med"/>
+                    </a:lnT>
+                    <a:lnB w="12700" cap="flat" cmpd="sng" algn="ctr">
+                      <a:solidFill>
+                        <a:schemeClr val="tx1"/>
+                      </a:solidFill>
+                      <a:prstDash val="solid"/>
+                      <a:round/>
+                      <a:headEnd type="none" w="med" len="med"/>
+                      <a:tailEnd type="none" w="med" len="med"/>
+                    </a:lnB>
+                  </a:tcPr>
+                </a:tc>
+                <a:tc>
+                  <a:txBody>
+                    <a:bodyPr/>
+                    <a:lstStyle/>
+                    <a:p>
+                      <a:pPr algn="ctr"/>
+                      <a:r>
+                        <a:rPr lang="en-US" sz="2000" dirty="0" smtClean="0"/>
+                        <a:t>Can be made</a:t>
+                      </a:r>
+                      <a:r>
+                        <a:rPr lang="en-US" sz="2000" baseline="0" dirty="0" smtClean="0"/>
+                        <a:t> Idempotent but isn’t required to be.</a:t>
+                      </a:r>
+                      <a:endParaRPr lang="en-US" sz="2000" dirty="0"/>
+                    </a:p>
+                  </a:txBody>
+                  <a:tcPr anchor="ctr">
+                    <a:lnL w="12700" cap="flat" cmpd="sng" algn="ctr">
+                      <a:solidFill>
+                        <a:schemeClr val="tx1"/>
+                      </a:solidFill>
+                      <a:prstDash val="solid"/>
+                      <a:round/>
+                      <a:headEnd type="none" w="med" len="med"/>
+                      <a:tailEnd type="none" w="med" len="med"/>
+                    </a:lnL>
+                    <a:lnR w="12700" cap="flat" cmpd="sng" algn="ctr">
+                      <a:solidFill>
+                        <a:schemeClr val="tx1"/>
+                      </a:solidFill>
+                      <a:prstDash val="solid"/>
+                      <a:round/>
+                      <a:headEnd type="none" w="med" len="med"/>
+                      <a:tailEnd type="none" w="med" len="med"/>
+                    </a:lnR>
+                    <a:lnT w="12700" cap="flat" cmpd="sng" algn="ctr">
+                      <a:solidFill>
+                        <a:schemeClr val="tx1"/>
+                      </a:solidFill>
+                      <a:prstDash val="solid"/>
+                      <a:round/>
+                      <a:headEnd type="none" w="med" len="med"/>
+                      <a:tailEnd type="none" w="med" len="med"/>
+                    </a:lnT>
+                    <a:lnB w="12700" cap="flat" cmpd="sng" algn="ctr">
+                      <a:solidFill>
+                        <a:schemeClr val="tx1"/>
+                      </a:solidFill>
+                      <a:prstDash val="solid"/>
+                      <a:round/>
+                      <a:headEnd type="none" w="med" len="med"/>
+                      <a:tailEnd type="none" w="med" len="med"/>
+                    </a:lnB>
+                  </a:tcPr>
+                </a:tc>
+              </a:tr>
+              <a:tr h="1207195">
+                <a:tc>
+                  <a:txBody>
+                    <a:bodyPr/>
+                    <a:lstStyle/>
+                    <a:p>
+                      <a:r>
+                        <a:rPr lang="en-US" dirty="0" smtClean="0"/>
+                        <a:t>GET /user/6</a:t>
+                      </a:r>
+                      <a:endParaRPr lang="en-US" dirty="0"/>
+                    </a:p>
+                  </a:txBody>
+                  <a:tcPr>
+                    <a:lnL w="12700" cap="flat" cmpd="sng" algn="ctr">
+                      <a:solidFill>
+                        <a:schemeClr val="tx1"/>
+                      </a:solidFill>
+                      <a:prstDash val="solid"/>
+                      <a:round/>
+                      <a:headEnd type="none" w="med" len="med"/>
+                      <a:tailEnd type="none" w="med" len="med"/>
+                    </a:lnL>
+                    <a:lnR w="12700" cap="flat" cmpd="sng" algn="ctr">
+                      <a:solidFill>
+                        <a:schemeClr val="tx1"/>
+                      </a:solidFill>
+                      <a:prstDash val="solid"/>
+                      <a:round/>
+                      <a:headEnd type="none" w="med" len="med"/>
+                      <a:tailEnd type="none" w="med" len="med"/>
+                    </a:lnR>
+                    <a:lnT w="12700" cap="flat" cmpd="sng" algn="ctr">
+                      <a:solidFill>
+                        <a:schemeClr val="tx1"/>
+                      </a:solidFill>
+                      <a:prstDash val="solid"/>
+                      <a:round/>
+                      <a:headEnd type="none" w="med" len="med"/>
+                      <a:tailEnd type="none" w="med" len="med"/>
+                    </a:lnT>
+                    <a:lnB w="12700" cap="flat" cmpd="sng" algn="ctr">
+                      <a:solidFill>
+                        <a:schemeClr val="tx1"/>
+                      </a:solidFill>
+                      <a:prstDash val="solid"/>
+                      <a:round/>
+                      <a:headEnd type="none" w="med" len="med"/>
+                      <a:tailEnd type="none" w="med" len="med"/>
+                    </a:lnB>
+                  </a:tcPr>
+                </a:tc>
+                <a:tc>
+                  <a:txBody>
+                    <a:bodyPr/>
+                    <a:lstStyle/>
+                    <a:p>
+                      <a:r>
+                        <a:rPr lang="en-US" dirty="0" smtClean="0"/>
+                        <a:t>PUT /user/6/friend/7</a:t>
+                      </a:r>
+                    </a:p>
+                    <a:p>
+                      <a:r>
+                        <a:rPr lang="en-US" dirty="0" smtClean="0"/>
+                        <a:t>{“Name”:</a:t>
+                      </a:r>
+                      <a:r>
+                        <a:rPr lang="en-US" baseline="0" dirty="0" smtClean="0"/>
+                        <a:t> “Jane Doe”}</a:t>
+                      </a:r>
+                      <a:endParaRPr lang="en-US" dirty="0"/>
+                    </a:p>
+                  </a:txBody>
+                  <a:tcPr>
+                    <a:lnL w="12700" cap="flat" cmpd="sng" algn="ctr">
+                      <a:solidFill>
+                        <a:schemeClr val="tx1"/>
+                      </a:solidFill>
+                      <a:prstDash val="solid"/>
+                      <a:round/>
+                      <a:headEnd type="none" w="med" len="med"/>
+                      <a:tailEnd type="none" w="med" len="med"/>
+                    </a:lnL>
+                    <a:lnR w="12700" cap="flat" cmpd="sng" algn="ctr">
+                      <a:solidFill>
+                        <a:schemeClr val="tx1"/>
+                      </a:solidFill>
+                      <a:prstDash val="solid"/>
+                      <a:round/>
+                      <a:headEnd type="none" w="med" len="med"/>
+                      <a:tailEnd type="none" w="med" len="med"/>
+                    </a:lnR>
+                    <a:lnT w="12700" cap="flat" cmpd="sng" algn="ctr">
+                      <a:solidFill>
+                        <a:schemeClr val="tx1"/>
+                      </a:solidFill>
+                      <a:prstDash val="solid"/>
+                      <a:round/>
+                      <a:headEnd type="none" w="med" len="med"/>
+                      <a:tailEnd type="none" w="med" len="med"/>
+                    </a:lnT>
+                    <a:lnB w="12700" cap="flat" cmpd="sng" algn="ctr">
+                      <a:solidFill>
+                        <a:schemeClr val="tx1"/>
+                      </a:solidFill>
+                      <a:prstDash val="solid"/>
+                      <a:round/>
+                      <a:headEnd type="none" w="med" len="med"/>
+                      <a:tailEnd type="none" w="med" len="med"/>
+                    </a:lnB>
+                  </a:tcPr>
+                </a:tc>
+                <a:tc>
+                  <a:txBody>
+                    <a:bodyPr/>
+                    <a:lstStyle/>
+                    <a:p>
+                      <a:r>
+                        <a:rPr lang="en-US" dirty="0" smtClean="0"/>
+                        <a:t>POST /users</a:t>
+                      </a:r>
+                    </a:p>
+                    <a:p>
+                      <a:r>
+                        <a:rPr lang="en-US" dirty="0" smtClean="0"/>
+                        <a:t>{“Name”: ”Jane Doe”}</a:t>
+                      </a:r>
+                      <a:endParaRPr lang="en-US" dirty="0"/>
+                    </a:p>
+                  </a:txBody>
+                  <a:tcPr>
+                    <a:lnL w="12700" cap="flat" cmpd="sng" algn="ctr">
+                      <a:solidFill>
+                        <a:schemeClr val="tx1"/>
+                      </a:solidFill>
+                      <a:prstDash val="solid"/>
+                      <a:round/>
+                      <a:headEnd type="none" w="med" len="med"/>
+                      <a:tailEnd type="none" w="med" len="med"/>
+                    </a:lnL>
+                    <a:lnR w="12700" cap="flat" cmpd="sng" algn="ctr">
+                      <a:solidFill>
+                        <a:schemeClr val="tx1"/>
+                      </a:solidFill>
+                      <a:prstDash val="solid"/>
+                      <a:round/>
+                      <a:headEnd type="none" w="med" len="med"/>
+                      <a:tailEnd type="none" w="med" len="med"/>
+                    </a:lnR>
+                    <a:lnT w="12700" cap="flat" cmpd="sng" algn="ctr">
+                      <a:solidFill>
+                        <a:schemeClr val="tx1"/>
+                      </a:solidFill>
+                      <a:prstDash val="solid"/>
+                      <a:round/>
+                      <a:headEnd type="none" w="med" len="med"/>
+                      <a:tailEnd type="none" w="med" len="med"/>
+                    </a:lnT>
+                    <a:lnB w="12700" cap="flat" cmpd="sng" algn="ctr">
+                      <a:solidFill>
+                        <a:schemeClr val="tx1"/>
+                      </a:solidFill>
+                      <a:prstDash val="solid"/>
+                      <a:round/>
+                      <a:headEnd type="none" w="med" len="med"/>
+                      <a:tailEnd type="none" w="med" len="med"/>
+                    </a:lnB>
+                  </a:tcPr>
+                </a:tc>
+                <a:tc>
+                  <a:txBody>
+                    <a:bodyPr/>
+                    <a:lstStyle/>
+                    <a:p>
+                      <a:r>
+                        <a:rPr lang="en-US" dirty="0" smtClean="0"/>
+                        <a:t>DELETE</a:t>
+                      </a:r>
+                      <a:r>
+                        <a:rPr lang="en-US" baseline="0" dirty="0" smtClean="0"/>
+                        <a:t> /user/6</a:t>
+                      </a:r>
+                      <a:endParaRPr lang="en-US" dirty="0"/>
+                    </a:p>
+                  </a:txBody>
+                  <a:tcPr>
+                    <a:lnL w="12700" cap="flat" cmpd="sng" algn="ctr">
+                      <a:solidFill>
+                        <a:schemeClr val="tx1"/>
+                      </a:solidFill>
+                      <a:prstDash val="solid"/>
+                      <a:round/>
+                      <a:headEnd type="none" w="med" len="med"/>
+                      <a:tailEnd type="none" w="med" len="med"/>
+                    </a:lnL>
+                    <a:lnR w="12700" cap="flat" cmpd="sng" algn="ctr">
+                      <a:solidFill>
+                        <a:schemeClr val="tx1"/>
+                      </a:solidFill>
+                      <a:prstDash val="solid"/>
+                      <a:round/>
+                      <a:headEnd type="none" w="med" len="med"/>
+                      <a:tailEnd type="none" w="med" len="med"/>
+                    </a:lnR>
+                    <a:lnT w="12700" cap="flat" cmpd="sng" algn="ctr">
+                      <a:solidFill>
+                        <a:schemeClr val="tx1"/>
+                      </a:solidFill>
+                      <a:prstDash val="solid"/>
+                      <a:round/>
+                      <a:headEnd type="none" w="med" len="med"/>
+                      <a:tailEnd type="none" w="med" len="med"/>
+                    </a:lnT>
+                    <a:lnB w="12700" cap="flat" cmpd="sng" algn="ctr">
+                      <a:solidFill>
+                        <a:schemeClr val="tx1"/>
+                      </a:solidFill>
+                      <a:prstDash val="solid"/>
+                      <a:round/>
+                      <a:headEnd type="none" w="med" len="med"/>
+                      <a:tailEnd type="none" w="med" len="med"/>
+                    </a:lnB>
+                  </a:tcPr>
+                </a:tc>
+                <a:tc>
+                  <a:txBody>
+                    <a:bodyPr/>
+                    <a:lstStyle/>
+                    <a:p>
+                      <a:r>
+                        <a:rPr lang="en-US" dirty="0" smtClean="0"/>
+                        <a:t>[   {“increment": "/count/5", “by": 7} ]</a:t>
+                      </a:r>
+                      <a:endParaRPr lang="en-US" dirty="0"/>
+                    </a:p>
+                  </a:txBody>
+                  <a:tcPr>
+                    <a:lnL w="12700" cap="flat" cmpd="sng" algn="ctr">
+                      <a:solidFill>
+                        <a:schemeClr val="tx1"/>
+                      </a:solidFill>
+                      <a:prstDash val="solid"/>
+                      <a:round/>
+                      <a:headEnd type="none" w="med" len="med"/>
+                      <a:tailEnd type="none" w="med" len="med"/>
+                    </a:lnL>
+                    <a:lnR w="12700" cap="flat" cmpd="sng" algn="ctr">
+                      <a:solidFill>
+                        <a:schemeClr val="tx1"/>
+                      </a:solidFill>
+                      <a:prstDash val="solid"/>
+                      <a:round/>
+                      <a:headEnd type="none" w="med" len="med"/>
+                      <a:tailEnd type="none" w="med" len="med"/>
+                    </a:lnR>
+                    <a:lnT w="12700" cap="flat" cmpd="sng" algn="ctr">
+                      <a:solidFill>
+                        <a:schemeClr val="tx1"/>
+                      </a:solidFill>
+                      <a:prstDash val="solid"/>
+                      <a:round/>
+                      <a:headEnd type="none" w="med" len="med"/>
+                      <a:tailEnd type="none" w="med" len="med"/>
+                    </a:lnT>
+                    <a:lnB w="12700" cap="flat" cmpd="sng" algn="ctr">
+                      <a:solidFill>
+                        <a:schemeClr val="tx1"/>
+                      </a:solidFill>
+                      <a:prstDash val="solid"/>
+                      <a:round/>
+                      <a:headEnd type="none" w="med" len="med"/>
+                      <a:tailEnd type="none" w="med" len="med"/>
+                    </a:lnB>
+                  </a:tcPr>
+                </a:tc>
+              </a:tr>
+            </a:tbl>
+          </a:graphicData>
+        </a:graphic>
+      </p:graphicFrame>
       <p:sp>
         <p:nvSpPr>
           <p:cNvPr id="4" name="TextBox 3"/>
@@ -7400,9 +10156,61 @@
               <a:rPr lang="en-US" sz="1200" i="1" dirty="0" smtClean="0">
                 <a:hlinkClick r:id="rId4"/>
               </a:rPr>
-              <a:t>Understanding HATEOAS</a:t>
+              <a:t>RFC 2616</a:t>
+            </a:r>
+            <a:r>
+              <a:rPr lang="en-US" sz="1200" i="1" dirty="0" smtClean="0"/>
+              <a:t>, </a:t>
+            </a:r>
+            <a:r>
+              <a:rPr lang="en-US" sz="1200" i="1" dirty="0" smtClean="0">
+                <a:hlinkClick r:id="rId5"/>
+              </a:rPr>
+              <a:t>RFC 5789</a:t>
             </a:r>
             <a:endParaRPr lang="en-US" sz="1200" i="1" dirty="0"/>
+          </a:p>
+        </p:txBody>
+      </p:sp>
+      <p:sp>
+        <p:nvSpPr>
+          <p:cNvPr id="6" name="TextBox 5"/>
+          <p:cNvSpPr txBox="1"/>
+          <p:nvPr/>
+        </p:nvSpPr>
+        <p:spPr>
+          <a:xfrm>
+            <a:off x="444500" y="6262132"/>
+            <a:ext cx="9906000" cy="369332"/>
+          </a:xfrm>
+          <a:prstGeom prst="rect">
+            <a:avLst/>
+          </a:prstGeom>
+          <a:noFill/>
+        </p:spPr>
+        <p:txBody>
+          <a:bodyPr wrap="square" rtlCol="0">
+            <a:spAutoFit/>
+          </a:bodyPr>
+          <a:lstStyle/>
+          <a:p>
+            <a:r>
+              <a:rPr lang="en-US" b="1" i="1" dirty="0" err="1" smtClean="0"/>
+              <a:t>Idempotence</a:t>
+            </a:r>
+            <a:r>
+              <a:rPr lang="en-US" b="1" i="1" dirty="0" smtClean="0"/>
+              <a:t>: The </a:t>
+            </a:r>
+            <a:r>
+              <a:rPr lang="en-US" b="1" i="1" dirty="0"/>
+              <a:t>side-effects of N &gt; 0 identical requests is the same as for a single request</a:t>
+            </a:r>
+            <a:r>
+              <a:rPr lang="en-US" b="1" i="1" dirty="0" smtClean="0"/>
+              <a:t> </a:t>
+            </a:r>
+            <a:endParaRPr lang="en-US" b="1" i="1" dirty="0"/>
           </a:p>
         </p:txBody>
       </p:sp>
@@ -7674,7 +10482,7 @@
   <a:extraClrSchemeLst/>
   <a:extLst>
     <a:ext uri="{05A4C25C-085E-4340-85A3-A5531E510DB2}">
-      <thm15:themeFamily xmlns="" xmlns:thm15="http://schemas.microsoft.com/office/thememl/2012/main" name="Office Theme" id="{62F939B6-93AF-4DB8-9C6B-D6C7DFDC589F}" vid="{4A3C46E8-61CC-4603-A589-7422A47A8E4A}"/>
+      <thm15:themeFamily xmlns:thm15="http://schemas.microsoft.com/office/thememl/2012/main" xmlns="" name="Office Theme" id="{62F939B6-93AF-4DB8-9C6B-D6C7DFDC589F}" vid="{4A3C46E8-61CC-4603-A589-7422A47A8E4A}"/>
     </a:ext>
   </a:extLst>
 </a:theme>
@@ -7935,7 +10743,7 @@
   <a:extraClrSchemeLst/>
   <a:extLst>
     <a:ext uri="{05A4C25C-085E-4340-85A3-A5531E510DB2}">
-      <thm15:themeFamily xmlns="" xmlns:thm15="http://schemas.microsoft.com/office/thememl/2012/main" name="Office Theme" id="{62F939B6-93AF-4DB8-9C6B-D6C7DFDC589F}" vid="{4A3C46E8-61CC-4603-A589-7422A47A8E4A}"/>
+      <thm15:themeFamily xmlns:thm15="http://schemas.microsoft.com/office/thememl/2012/main" xmlns="" name="Office Theme" id="{62F939B6-93AF-4DB8-9C6B-D6C7DFDC589F}" vid="{4A3C46E8-61CC-4603-A589-7422A47A8E4A}"/>
     </a:ext>
   </a:extLst>
 </a:theme>
@@ -8196,7 +11004,7 @@
   <a:extraClrSchemeLst/>
   <a:extLst>
     <a:ext uri="{05A4C25C-085E-4340-85A3-A5531E510DB2}">
-      <thm15:themeFamily xmlns="" xmlns:thm15="http://schemas.microsoft.com/office/thememl/2012/main" name="Office Theme" id="{62F939B6-93AF-4DB8-9C6B-D6C7DFDC589F}" vid="{4A3C46E8-61CC-4603-A589-7422A47A8E4A}"/>
+      <thm15:themeFamily xmlns:thm15="http://schemas.microsoft.com/office/thememl/2012/main" xmlns="" name="Office Theme" id="{62F939B6-93AF-4DB8-9C6B-D6C7DFDC589F}" vid="{4A3C46E8-61CC-4603-A589-7422A47A8E4A}"/>
     </a:ext>
   </a:extLst>
 </a:theme>

</xml_diff>

<commit_message>
Adding diagram for ideal arch
</commit_message>
<xml_diff>
--- a/Spring Boot.pptx
+++ b/Spring Boot.pptx
@@ -5,10 +5,10 @@
     <p:sldMasterId id="2147483648" r:id="rId1"/>
   </p:sldMasterIdLst>
   <p:notesMasterIdLst>
-    <p:notesMasterId r:id="rId20"/>
+    <p:notesMasterId r:id="rId21"/>
   </p:notesMasterIdLst>
   <p:handoutMasterIdLst>
-    <p:handoutMasterId r:id="rId21"/>
+    <p:handoutMasterId r:id="rId22"/>
   </p:handoutMasterIdLst>
   <p:sldIdLst>
     <p:sldId id="256" r:id="rId2"/>
@@ -24,11 +24,12 @@
     <p:sldId id="272" r:id="rId12"/>
     <p:sldId id="259" r:id="rId13"/>
     <p:sldId id="273" r:id="rId14"/>
-    <p:sldId id="262" r:id="rId15"/>
-    <p:sldId id="260" r:id="rId16"/>
-    <p:sldId id="261" r:id="rId17"/>
-    <p:sldId id="263" r:id="rId18"/>
-    <p:sldId id="264" r:id="rId19"/>
+    <p:sldId id="274" r:id="rId15"/>
+    <p:sldId id="262" r:id="rId16"/>
+    <p:sldId id="260" r:id="rId17"/>
+    <p:sldId id="261" r:id="rId18"/>
+    <p:sldId id="263" r:id="rId19"/>
+    <p:sldId id="264" r:id="rId20"/>
   </p:sldIdLst>
   <p:sldSz cx="12192000" cy="6858000"/>
   <p:notesSz cx="6858000" cy="9144000"/>
@@ -129,7 +130,7 @@
   </p:defaultTextStyle>
   <p:extLst>
     <p:ext uri="{EFAFB233-063F-42B5-8137-9DF3F51BA10A}">
-      <p15:sldGuideLst xmlns="" xmlns:p15="http://schemas.microsoft.com/office/powerpoint/2012/main">
+      <p15:sldGuideLst xmlns:p15="http://schemas.microsoft.com/office/powerpoint/2012/main">
         <p15:guide id="1" orient="horz" pos="2160">
           <p15:clr>
             <a:srgbClr val="A4A3A4"/>
@@ -143,7 +144,7 @@
       </p15:sldGuideLst>
     </p:ext>
     <p:ext uri="{2D200454-40CA-4A62-9FC3-DE9A4176ACB9}">
-      <p15:notesGuideLst xmlns="" xmlns:p15="http://schemas.microsoft.com/office/powerpoint/2012/main"/>
+      <p15:notesGuideLst xmlns:p15="http://schemas.microsoft.com/office/powerpoint/2012/main"/>
     </p:ext>
   </p:extLst>
 </p:presentation>
@@ -231,7 +232,7 @@
           <a:p>
             <a:fld id="{7B2C7FEA-B7FB-4AAC-85C3-2BC7C9E6B196}" type="datetimeFigureOut">
               <a:rPr lang="en-US" smtClean="0"/>
-              <a:t>3/15/2015</a:t>
+              <a:t>3/16/2015</a:t>
             </a:fld>
             <a:endParaRPr lang="en-US" dirty="0"/>
           </a:p>
@@ -396,7 +397,7 @@
           <a:p>
             <a:fld id="{98CE4EFE-6887-4330-98E2-9EA0AF676C64}" type="datetimeFigureOut">
               <a:rPr lang="en-US" smtClean="0"/>
-              <a:t>3/15/2015</a:t>
+              <a:t>3/16/2015</a:t>
             </a:fld>
             <a:endParaRPr lang="en-US" dirty="0"/>
           </a:p>
@@ -876,14 +877,6 @@
           <a:bodyPr/>
           <a:lstStyle/>
           <a:p>
-            <a:r>
-              <a:rPr lang="en-US" b="1" dirty="0" smtClean="0"/>
-              <a:t>component</a:t>
-            </a:r>
-            <a:r>
-              <a:rPr lang="en-US" dirty="0" smtClean="0"/>
-              <a:t> is a unit of software that is independently replaceable and upgradeable.</a:t>
-            </a:r>
             <a:endParaRPr lang="en-US" dirty="0"/>
           </a:p>
         </p:txBody>
@@ -914,7 +907,7 @@
     </p:spTree>
     <p:extLst>
       <p:ext uri="{BB962C8B-B14F-4D97-AF65-F5344CB8AC3E}">
-        <p14:creationId xmlns:p14="http://schemas.microsoft.com/office/powerpoint/2010/main" val="2056578434"/>
+        <p14:creationId xmlns:p14="http://schemas.microsoft.com/office/powerpoint/2010/main" val="1357648832"/>
       </p:ext>
     </p:extLst>
   </p:cSld>
@@ -969,17 +962,12 @@
           <a:lstStyle/>
           <a:p>
             <a:r>
+              <a:rPr lang="en-US" b="1" dirty="0" smtClean="0"/>
+              <a:t>component</a:t>
+            </a:r>
+            <a:r>
               <a:rPr lang="en-US" dirty="0" smtClean="0"/>
-              <a:t>Spring Boot makes it easy to create stand-alone, production-grade Spring based Applications that you can “just run”.  </a:t>
-            </a:r>
-          </a:p>
-          <a:p>
-            <a:endParaRPr lang="en-US" dirty="0" smtClean="0"/>
-          </a:p>
-          <a:p>
-            <a:r>
-              <a:rPr lang="en-US" dirty="0" smtClean="0"/>
-              <a:t>take an opinionated view</a:t>
+              <a:t> is a unit of software that is independently replaceable and upgradeable.</a:t>
             </a:r>
             <a:endParaRPr lang="en-US" dirty="0"/>
           </a:p>
@@ -1002,7 +990,7 @@
           <a:p>
             <a:fld id="{9F9FB9DD-7CF9-4A0C-8C7F-91FD9EF34B36}" type="slidenum">
               <a:rPr lang="en-US" smtClean="0"/>
-              <a:t>16</a:t>
+              <a:t>15</a:t>
             </a:fld>
             <a:endParaRPr lang="en-US" dirty="0"/>
           </a:p>
@@ -1011,7 +999,7 @@
     </p:spTree>
     <p:extLst>
       <p:ext uri="{BB962C8B-B14F-4D97-AF65-F5344CB8AC3E}">
-        <p14:creationId xmlns:p14="http://schemas.microsoft.com/office/powerpoint/2010/main" val="639032137"/>
+        <p14:creationId xmlns:p14="http://schemas.microsoft.com/office/powerpoint/2010/main" val="2056578434"/>
       </p:ext>
     </p:extLst>
   </p:cSld>
@@ -1067,7 +1055,16 @@
           <a:p>
             <a:r>
               <a:rPr lang="en-US" dirty="0" smtClean="0"/>
-              <a:t>Example:</a:t>
+              <a:t>Spring Boot makes it easy to create stand-alone, production-grade Spring based Applications that you can “just run”.  </a:t>
+            </a:r>
+          </a:p>
+          <a:p>
+            <a:endParaRPr lang="en-US" dirty="0" smtClean="0"/>
+          </a:p>
+          <a:p>
+            <a:r>
+              <a:rPr lang="en-US" dirty="0" smtClean="0"/>
+              <a:t>take an opinionated view</a:t>
             </a:r>
             <a:endParaRPr lang="en-US" dirty="0"/>
           </a:p>
@@ -1091,6 +1088,94 @@
             <a:fld id="{9F9FB9DD-7CF9-4A0C-8C7F-91FD9EF34B36}" type="slidenum">
               <a:rPr lang="en-US" smtClean="0"/>
               <a:t>17</a:t>
+            </a:fld>
+            <a:endParaRPr lang="en-US" dirty="0"/>
+          </a:p>
+        </p:txBody>
+      </p:sp>
+    </p:spTree>
+    <p:extLst>
+      <p:ext uri="{BB962C8B-B14F-4D97-AF65-F5344CB8AC3E}">
+        <p14:creationId xmlns:p14="http://schemas.microsoft.com/office/powerpoint/2010/main" val="639032137"/>
+      </p:ext>
+    </p:extLst>
+  </p:cSld>
+  <p:clrMapOvr>
+    <a:masterClrMapping/>
+  </p:clrMapOvr>
+</p:notes>
+</file>
+
+<file path=ppt/notesSlides/notesSlide14.xml><?xml version="1.0" encoding="utf-8"?>
+<p:notes xmlns:a="http://schemas.openxmlformats.org/drawingml/2006/main" xmlns:r="http://schemas.openxmlformats.org/officeDocument/2006/relationships" xmlns:p="http://schemas.openxmlformats.org/presentationml/2006/main">
+  <p:cSld>
+    <p:spTree>
+      <p:nvGrpSpPr>
+        <p:cNvPr id="1" name=""/>
+        <p:cNvGrpSpPr/>
+        <p:nvPr/>
+      </p:nvGrpSpPr>
+      <p:grpSpPr>
+        <a:xfrm>
+          <a:off x="0" y="0"/>
+          <a:ext cx="0" cy="0"/>
+          <a:chOff x="0" y="0"/>
+          <a:chExt cx="0" cy="0"/>
+        </a:xfrm>
+      </p:grpSpPr>
+      <p:sp>
+        <p:nvSpPr>
+          <p:cNvPr id="2" name="Slide Image Placeholder 1"/>
+          <p:cNvSpPr>
+            <a:spLocks noGrp="1" noRot="1" noChangeAspect="1"/>
+          </p:cNvSpPr>
+          <p:nvPr>
+            <p:ph type="sldImg"/>
+          </p:nvPr>
+        </p:nvSpPr>
+        <p:spPr/>
+      </p:sp>
+      <p:sp>
+        <p:nvSpPr>
+          <p:cNvPr id="3" name="Notes Placeholder 2"/>
+          <p:cNvSpPr>
+            <a:spLocks noGrp="1"/>
+          </p:cNvSpPr>
+          <p:nvPr>
+            <p:ph type="body" idx="1"/>
+          </p:nvPr>
+        </p:nvSpPr>
+        <p:spPr/>
+        <p:txBody>
+          <a:bodyPr/>
+          <a:lstStyle/>
+          <a:p>
+            <a:r>
+              <a:rPr lang="en-US" dirty="0" smtClean="0"/>
+              <a:t>Example:</a:t>
+            </a:r>
+            <a:endParaRPr lang="en-US" dirty="0"/>
+          </a:p>
+        </p:txBody>
+      </p:sp>
+      <p:sp>
+        <p:nvSpPr>
+          <p:cNvPr id="4" name="Slide Number Placeholder 3"/>
+          <p:cNvSpPr>
+            <a:spLocks noGrp="1"/>
+          </p:cNvSpPr>
+          <p:nvPr>
+            <p:ph type="sldNum" sz="quarter" idx="10"/>
+          </p:nvPr>
+        </p:nvSpPr>
+        <p:spPr/>
+        <p:txBody>
+          <a:bodyPr/>
+          <a:lstStyle/>
+          <a:p>
+            <a:fld id="{9F9FB9DD-7CF9-4A0C-8C7F-91FD9EF34B36}" type="slidenum">
+              <a:rPr lang="en-US" smtClean="0"/>
+              <a:t>18</a:t>
             </a:fld>
             <a:endParaRPr lang="en-US" dirty="0"/>
           </a:p>
@@ -1986,7 +2071,7 @@
           <a:p>
             <a:fld id="{F2C87F99-6566-47F3-94EA-E945E3B61FD1}" type="datetimeFigureOut">
               <a:rPr lang="en-US" smtClean="0"/>
-              <a:t>3/15/2015</a:t>
+              <a:t>3/16/2015</a:t>
             </a:fld>
             <a:endParaRPr lang="en-US" dirty="0"/>
           </a:p>
@@ -2156,7 +2241,7 @@
           <a:p>
             <a:fld id="{F2C87F99-6566-47F3-94EA-E945E3B61FD1}" type="datetimeFigureOut">
               <a:rPr lang="en-US" smtClean="0"/>
-              <a:t>3/15/2015</a:t>
+              <a:t>3/16/2015</a:t>
             </a:fld>
             <a:endParaRPr lang="en-US" dirty="0"/>
           </a:p>
@@ -2336,7 +2421,7 @@
           <a:p>
             <a:fld id="{F2C87F99-6566-47F3-94EA-E945E3B61FD1}" type="datetimeFigureOut">
               <a:rPr lang="en-US" smtClean="0"/>
-              <a:t>3/15/2015</a:t>
+              <a:t>3/16/2015</a:t>
             </a:fld>
             <a:endParaRPr lang="en-US" dirty="0"/>
           </a:p>
@@ -2506,7 +2591,7 @@
           <a:p>
             <a:fld id="{F2C87F99-6566-47F3-94EA-E945E3B61FD1}" type="datetimeFigureOut">
               <a:rPr lang="en-US" smtClean="0"/>
-              <a:t>3/15/2015</a:t>
+              <a:t>3/16/2015</a:t>
             </a:fld>
             <a:endParaRPr lang="en-US" dirty="0"/>
           </a:p>
@@ -2752,7 +2837,7 @@
           <a:p>
             <a:fld id="{F2C87F99-6566-47F3-94EA-E945E3B61FD1}" type="datetimeFigureOut">
               <a:rPr lang="en-US" smtClean="0"/>
-              <a:t>3/15/2015</a:t>
+              <a:t>3/16/2015</a:t>
             </a:fld>
             <a:endParaRPr lang="en-US" dirty="0"/>
           </a:p>
@@ -2984,7 +3069,7 @@
           <a:p>
             <a:fld id="{F2C87F99-6566-47F3-94EA-E945E3B61FD1}" type="datetimeFigureOut">
               <a:rPr lang="en-US" smtClean="0"/>
-              <a:t>3/15/2015</a:t>
+              <a:t>3/16/2015</a:t>
             </a:fld>
             <a:endParaRPr lang="en-US" dirty="0"/>
           </a:p>
@@ -3351,7 +3436,7 @@
           <a:p>
             <a:fld id="{F2C87F99-6566-47F3-94EA-E945E3B61FD1}" type="datetimeFigureOut">
               <a:rPr lang="en-US" smtClean="0"/>
-              <a:t>3/15/2015</a:t>
+              <a:t>3/16/2015</a:t>
             </a:fld>
             <a:endParaRPr lang="en-US" dirty="0"/>
           </a:p>
@@ -3469,7 +3554,7 @@
           <a:p>
             <a:fld id="{F2C87F99-6566-47F3-94EA-E945E3B61FD1}" type="datetimeFigureOut">
               <a:rPr lang="en-US" smtClean="0"/>
-              <a:t>3/15/2015</a:t>
+              <a:t>3/16/2015</a:t>
             </a:fld>
             <a:endParaRPr lang="en-US" dirty="0"/>
           </a:p>
@@ -3564,7 +3649,7 @@
           <a:p>
             <a:fld id="{F2C87F99-6566-47F3-94EA-E945E3B61FD1}" type="datetimeFigureOut">
               <a:rPr lang="en-US" smtClean="0"/>
-              <a:t>3/15/2015</a:t>
+              <a:t>3/16/2015</a:t>
             </a:fld>
             <a:endParaRPr lang="en-US" dirty="0"/>
           </a:p>
@@ -3841,7 +3926,7 @@
           <a:p>
             <a:fld id="{F2C87F99-6566-47F3-94EA-E945E3B61FD1}" type="datetimeFigureOut">
               <a:rPr lang="en-US" smtClean="0"/>
-              <a:t>3/15/2015</a:t>
+              <a:t>3/16/2015</a:t>
             </a:fld>
             <a:endParaRPr lang="en-US" dirty="0"/>
           </a:p>
@@ -4094,7 +4179,7 @@
           <a:p>
             <a:fld id="{F2C87F99-6566-47F3-94EA-E945E3B61FD1}" type="datetimeFigureOut">
               <a:rPr lang="en-US" smtClean="0"/>
-              <a:t>3/15/2015</a:t>
+              <a:t>3/16/2015</a:t>
             </a:fld>
             <a:endParaRPr lang="en-US" dirty="0"/>
           </a:p>
@@ -4307,7 +4392,7 @@
           <a:p>
             <a:fld id="{F2C87F99-6566-47F3-94EA-E945E3B61FD1}" type="datetimeFigureOut">
               <a:rPr lang="en-US" smtClean="0"/>
-              <a:t>3/15/2015</a:t>
+              <a:t>3/16/2015</a:t>
             </a:fld>
             <a:endParaRPr lang="en-US" dirty="0"/>
           </a:p>
@@ -6234,11 +6319,7 @@
           <a:p>
             <a:r>
               <a:rPr lang="en-US" sz="2000" b="1" dirty="0" smtClean="0"/>
-              <a:t>A </a:t>
-            </a:r>
-            <a:r>
-              <a:rPr lang="en-US" sz="2000" b="1" dirty="0" smtClean="0"/>
-              <a:t>typical Java App with Spring MVC</a:t>
+              <a:t>A typical Java App with Spring MVC</a:t>
             </a:r>
             <a:endParaRPr lang="en-US" sz="2000" b="1" dirty="0"/>
           </a:p>
@@ -6252,7 +6333,7 @@
         </p:nvSpPr>
         <p:spPr>
           <a:xfrm>
-            <a:off x="5937071" y="2975881"/>
+            <a:off x="5983963" y="2975881"/>
             <a:ext cx="1436914" cy="646331"/>
           </a:xfrm>
           <a:prstGeom prst="rect">
@@ -6482,7 +6563,6 @@
               <a:rPr lang="en-US" b="1" dirty="0" smtClean="0"/>
               <a:t>(Interfaces)</a:t>
             </a:r>
-            <a:endParaRPr lang="en-US" b="1" dirty="0" smtClean="0"/>
           </a:p>
           <a:p>
             <a:pPr algn="ctr"/>
@@ -7005,7 +7085,7 @@
         </p:nvSpPr>
         <p:spPr>
           <a:xfrm>
-            <a:off x="6153157" y="3616121"/>
+            <a:off x="5858193" y="3643468"/>
             <a:ext cx="1436914" cy="646331"/>
           </a:xfrm>
           <a:prstGeom prst="rect">
@@ -7109,6 +7189,74 @@
               <a:t>…</a:t>
             </a:r>
             <a:endParaRPr lang="en-US" b="1" dirty="0"/>
+          </a:p>
+        </p:txBody>
+      </p:sp>
+      <p:sp>
+        <p:nvSpPr>
+          <p:cNvPr id="33" name="TextBox 32"/>
+          <p:cNvSpPr txBox="1"/>
+          <p:nvPr/>
+        </p:nvSpPr>
+        <p:spPr>
+          <a:xfrm rot="20633550">
+            <a:off x="1681537" y="2945166"/>
+            <a:ext cx="2775165" cy="369332"/>
+          </a:xfrm>
+          <a:prstGeom prst="rect">
+            <a:avLst/>
+          </a:prstGeom>
+          <a:noFill/>
+        </p:spPr>
+        <p:txBody>
+          <a:bodyPr wrap="square" rtlCol="0">
+            <a:spAutoFit/>
+          </a:bodyPr>
+          <a:lstStyle/>
+          <a:p>
+            <a:r>
+              <a:rPr lang="en-US" dirty="0" err="1" smtClean="0"/>
+              <a:t>Json</a:t>
+            </a:r>
+            <a:r>
+              <a:rPr lang="en-US" dirty="0" smtClean="0"/>
+              <a:t>/*-form-</a:t>
+            </a:r>
+            <a:r>
+              <a:rPr lang="en-US" dirty="0" err="1" smtClean="0"/>
+              <a:t>urlencoded</a:t>
+            </a:r>
+            <a:endParaRPr lang="en-US" dirty="0"/>
+          </a:p>
+        </p:txBody>
+      </p:sp>
+      <p:sp>
+        <p:nvSpPr>
+          <p:cNvPr id="34" name="TextBox 33"/>
+          <p:cNvSpPr txBox="1"/>
+          <p:nvPr/>
+        </p:nvSpPr>
+        <p:spPr>
+          <a:xfrm rot="18901490">
+            <a:off x="3389450" y="4432089"/>
+            <a:ext cx="770113" cy="369332"/>
+          </a:xfrm>
+          <a:prstGeom prst="rect">
+            <a:avLst/>
+          </a:prstGeom>
+          <a:noFill/>
+        </p:spPr>
+        <p:txBody>
+          <a:bodyPr wrap="square" rtlCol="0">
+            <a:spAutoFit/>
+          </a:bodyPr>
+          <a:lstStyle/>
+          <a:p>
+            <a:r>
+              <a:rPr lang="en-US" dirty="0" smtClean="0"/>
+              <a:t>html</a:t>
+            </a:r>
+            <a:endParaRPr lang="en-US" dirty="0"/>
           </a:p>
         </p:txBody>
       </p:sp>
@@ -7398,129 +7546,1090 @@
             <p:ph type="title"/>
           </p:nvPr>
         </p:nvSpPr>
-        <p:spPr/>
-        <p:txBody>
-          <a:bodyPr/>
-          <a:lstStyle/>
-          <a:p>
-            <a:r>
-              <a:rPr lang="en-US" dirty="0" smtClean="0"/>
-              <a:t>Micro-services architectural style</a:t>
-            </a:r>
+        <p:spPr>
+          <a:xfrm>
+            <a:off x="183802" y="1952477"/>
+            <a:ext cx="2067029" cy="720385"/>
+          </a:xfrm>
+        </p:spPr>
+        <p:txBody>
+          <a:bodyPr>
+            <a:noAutofit/>
+          </a:bodyPr>
+          <a:lstStyle/>
+          <a:p>
+            <a:r>
+              <a:rPr lang="en-US" sz="1800" dirty="0" smtClean="0"/>
+              <a:t>Scalable Micro Service Architecture</a:t>
+            </a:r>
+            <a:endParaRPr lang="en-US" sz="1800" dirty="0"/>
+          </a:p>
+        </p:txBody>
+      </p:sp>
+      <p:pic>
+        <p:nvPicPr>
+          <p:cNvPr id="1033" name="Picture 9" descr="https://openclipart.org/image/800px/svg_to_png/20369/thilakarathna-Computer.png"/>
+          <p:cNvPicPr>
+            <a:picLocks noChangeAspect="1" noChangeArrowheads="1"/>
+          </p:cNvPicPr>
+          <p:nvPr/>
+        </p:nvPicPr>
+        <p:blipFill>
+          <a:blip r:embed="rId3" cstate="print">
+            <a:extLst>
+              <a:ext uri="{28A0092B-C50C-407E-A947-70E740481C1C}">
+                <a14:useLocalDpi xmlns:a14="http://schemas.microsoft.com/office/drawing/2010/main" val="0"/>
+              </a:ext>
+            </a:extLst>
+          </a:blip>
+          <a:srcRect/>
+          <a:stretch>
+            <a:fillRect/>
+          </a:stretch>
+        </p:blipFill>
+        <p:spPr bwMode="auto">
+          <a:xfrm>
+            <a:off x="3044248" y="3755139"/>
+            <a:ext cx="1065456" cy="1054720"/>
+          </a:xfrm>
+          <a:prstGeom prst="rect">
+            <a:avLst/>
+          </a:prstGeom>
+          <a:noFill/>
+          <a:extLst>
+            <a:ext uri="{909E8E84-426E-40DD-AFC4-6F175D3DCCD1}">
+              <a14:hiddenFill xmlns:a14="http://schemas.microsoft.com/office/drawing/2010/main">
+                <a:solidFill>
+                  <a:srgbClr val="FFFFFF"/>
+                </a:solidFill>
+              </a14:hiddenFill>
+            </a:ext>
+          </a:extLst>
+        </p:spPr>
+      </p:pic>
+      <p:pic>
+        <p:nvPicPr>
+          <p:cNvPr id="1035" name="Picture 11" descr="http://www.innovationfiles.org/wp-content/uploads/2013/06/firefox_logo-only_RGB.png"/>
+          <p:cNvPicPr>
+            <a:picLocks noChangeAspect="1" noChangeArrowheads="1"/>
+          </p:cNvPicPr>
+          <p:nvPr/>
+        </p:nvPicPr>
+        <p:blipFill>
+          <a:blip r:embed="rId4" cstate="print">
+            <a:extLst>
+              <a:ext uri="{28A0092B-C50C-407E-A947-70E740481C1C}">
+                <a14:useLocalDpi xmlns:a14="http://schemas.microsoft.com/office/drawing/2010/main" val="0"/>
+              </a:ext>
+            </a:extLst>
+          </a:blip>
+          <a:srcRect/>
+          <a:stretch>
+            <a:fillRect/>
+          </a:stretch>
+        </p:blipFill>
+        <p:spPr bwMode="auto">
+          <a:xfrm flipH="1">
+            <a:off x="3069122" y="3911471"/>
+            <a:ext cx="345853" cy="331746"/>
+          </a:xfrm>
+          <a:prstGeom prst="rect">
+            <a:avLst/>
+          </a:prstGeom>
+          <a:noFill/>
+          <a:extLst>
+            <a:ext uri="{909E8E84-426E-40DD-AFC4-6F175D3DCCD1}">
+              <a14:hiddenFill xmlns:a14="http://schemas.microsoft.com/office/drawing/2010/main">
+                <a:solidFill>
+                  <a:srgbClr val="FFFFFF"/>
+                </a:solidFill>
+              </a14:hiddenFill>
+            </a:ext>
+          </a:extLst>
+        </p:spPr>
+      </p:pic>
+      <p:pic>
+        <p:nvPicPr>
+          <p:cNvPr id="1037" name="Picture 13" descr="http://assets.hunterunited.com.au/images/Chromev2.png"/>
+          <p:cNvPicPr>
+            <a:picLocks noChangeAspect="1" noChangeArrowheads="1"/>
+          </p:cNvPicPr>
+          <p:nvPr/>
+        </p:nvPicPr>
+        <p:blipFill>
+          <a:blip r:embed="rId5" cstate="print">
+            <a:extLst>
+              <a:ext uri="{28A0092B-C50C-407E-A947-70E740481C1C}">
+                <a14:useLocalDpi xmlns:a14="http://schemas.microsoft.com/office/drawing/2010/main" val="0"/>
+              </a:ext>
+            </a:extLst>
+          </a:blip>
+          <a:srcRect/>
+          <a:stretch>
+            <a:fillRect/>
+          </a:stretch>
+        </p:blipFill>
+        <p:spPr bwMode="auto">
+          <a:xfrm flipH="1">
+            <a:off x="3460631" y="3950806"/>
+            <a:ext cx="272514" cy="272514"/>
+          </a:xfrm>
+          <a:prstGeom prst="rect">
+            <a:avLst/>
+          </a:prstGeom>
+          <a:noFill/>
+          <a:extLst>
+            <a:ext uri="{909E8E84-426E-40DD-AFC4-6F175D3DCCD1}">
+              <a14:hiddenFill xmlns:a14="http://schemas.microsoft.com/office/drawing/2010/main">
+                <a:solidFill>
+                  <a:srgbClr val="FFFFFF"/>
+                </a:solidFill>
+              </a14:hiddenFill>
+            </a:ext>
+          </a:extLst>
+        </p:spPr>
+      </p:pic>
+      <p:pic>
+        <p:nvPicPr>
+          <p:cNvPr id="1039" name="Picture 15" descr="http://freepngimages.com/wp-content/uploads/2014/04/Internet_Explorer_7_Logo_2.png"/>
+          <p:cNvPicPr>
+            <a:picLocks noChangeAspect="1" noChangeArrowheads="1"/>
+          </p:cNvPicPr>
+          <p:nvPr/>
+        </p:nvPicPr>
+        <p:blipFill>
+          <a:blip r:embed="rId6" cstate="print">
+            <a:extLst>
+              <a:ext uri="{28A0092B-C50C-407E-A947-70E740481C1C}">
+                <a14:useLocalDpi xmlns:a14="http://schemas.microsoft.com/office/drawing/2010/main" val="0"/>
+              </a:ext>
+            </a:extLst>
+          </a:blip>
+          <a:srcRect/>
+          <a:stretch>
+            <a:fillRect/>
+          </a:stretch>
+        </p:blipFill>
+        <p:spPr bwMode="auto">
+          <a:xfrm flipH="1">
+            <a:off x="3782165" y="3921191"/>
+            <a:ext cx="310892" cy="312305"/>
+          </a:xfrm>
+          <a:prstGeom prst="rect">
+            <a:avLst/>
+          </a:prstGeom>
+          <a:noFill/>
+          <a:extLst>
+            <a:ext uri="{909E8E84-426E-40DD-AFC4-6F175D3DCCD1}">
+              <a14:hiddenFill xmlns:a14="http://schemas.microsoft.com/office/drawing/2010/main">
+                <a:solidFill>
+                  <a:srgbClr val="FFFFFF"/>
+                </a:solidFill>
+              </a14:hiddenFill>
+            </a:ext>
+          </a:extLst>
+        </p:spPr>
+      </p:pic>
+      <p:sp>
+        <p:nvSpPr>
+          <p:cNvPr id="9" name="Rectangle 8"/>
+          <p:cNvSpPr/>
+          <p:nvPr/>
+        </p:nvSpPr>
+        <p:spPr>
+          <a:xfrm>
+            <a:off x="7274180" y="2383281"/>
+            <a:ext cx="4800589" cy="4379546"/>
+          </a:xfrm>
+          <a:prstGeom prst="rect">
+            <a:avLst/>
+          </a:prstGeom>
+          <a:solidFill>
+            <a:schemeClr val="accent4">
+              <a:lumMod val="60000"/>
+              <a:lumOff val="40000"/>
+            </a:schemeClr>
+          </a:solidFill>
+          <a:effectLst>
+            <a:softEdge rad="31750"/>
+          </a:effectLst>
+        </p:spPr>
+        <p:style>
+          <a:lnRef idx="2">
+            <a:schemeClr val="accent1">
+              <a:shade val="50000"/>
+            </a:schemeClr>
+          </a:lnRef>
+          <a:fillRef idx="1">
+            <a:schemeClr val="accent1"/>
+          </a:fillRef>
+          <a:effectRef idx="0">
+            <a:schemeClr val="accent1"/>
+          </a:effectRef>
+          <a:fontRef idx="minor">
+            <a:schemeClr val="lt1"/>
+          </a:fontRef>
+        </p:style>
+        <p:txBody>
+          <a:bodyPr rtlCol="0" anchor="ctr"/>
+          <a:lstStyle/>
+          <a:p>
+            <a:pPr algn="ctr"/>
+            <a:endParaRPr lang="en-US"/>
+          </a:p>
+        </p:txBody>
+      </p:sp>
+      <p:sp>
+        <p:nvSpPr>
+          <p:cNvPr id="11" name="TextBox 10"/>
+          <p:cNvSpPr txBox="1"/>
+          <p:nvPr/>
+        </p:nvSpPr>
+        <p:spPr>
+          <a:xfrm>
+            <a:off x="7321935" y="2438405"/>
+            <a:ext cx="2369903" cy="400110"/>
+          </a:xfrm>
+          <a:prstGeom prst="rect">
+            <a:avLst/>
+          </a:prstGeom>
+          <a:noFill/>
+        </p:spPr>
+        <p:txBody>
+          <a:bodyPr wrap="square" rtlCol="0">
+            <a:spAutoFit/>
+          </a:bodyPr>
+          <a:lstStyle/>
+          <a:p>
+            <a:r>
+              <a:rPr lang="en-US" sz="2000" b="1" dirty="0" smtClean="0"/>
+              <a:t>Micro Service Pool</a:t>
+            </a:r>
+            <a:endParaRPr lang="en-US" sz="2000" b="1" dirty="0"/>
+          </a:p>
+        </p:txBody>
+      </p:sp>
+      <p:sp>
+        <p:nvSpPr>
+          <p:cNvPr id="3" name="Oval 2"/>
+          <p:cNvSpPr/>
+          <p:nvPr/>
+        </p:nvSpPr>
+        <p:spPr>
+          <a:xfrm>
+            <a:off x="7689317" y="5179313"/>
+            <a:ext cx="1129576" cy="1013081"/>
+          </a:xfrm>
+          <a:prstGeom prst="ellipse">
+            <a:avLst/>
+          </a:prstGeom>
+          <a:solidFill>
+            <a:schemeClr val="accent6"/>
+          </a:solidFill>
+        </p:spPr>
+        <p:style>
+          <a:lnRef idx="2">
+            <a:schemeClr val="accent1">
+              <a:shade val="50000"/>
+            </a:schemeClr>
+          </a:lnRef>
+          <a:fillRef idx="1">
+            <a:schemeClr val="accent1"/>
+          </a:fillRef>
+          <a:effectRef idx="0">
+            <a:schemeClr val="accent1"/>
+          </a:effectRef>
+          <a:fontRef idx="minor">
+            <a:schemeClr val="lt1"/>
+          </a:fontRef>
+        </p:style>
+        <p:txBody>
+          <a:bodyPr rtlCol="0" anchor="ctr"/>
+          <a:lstStyle/>
+          <a:p>
+            <a:pPr algn="ctr"/>
+            <a:endParaRPr lang="en-US"/>
+          </a:p>
+        </p:txBody>
+      </p:sp>
+      <p:sp>
+        <p:nvSpPr>
+          <p:cNvPr id="19" name="Oval 18"/>
+          <p:cNvSpPr/>
+          <p:nvPr/>
+        </p:nvSpPr>
+        <p:spPr>
+          <a:xfrm>
+            <a:off x="7712797" y="3979439"/>
+            <a:ext cx="1129576" cy="1013081"/>
+          </a:xfrm>
+          <a:prstGeom prst="ellipse">
+            <a:avLst/>
+          </a:prstGeom>
+          <a:solidFill>
+            <a:schemeClr val="accent6"/>
+          </a:solidFill>
+        </p:spPr>
+        <p:style>
+          <a:lnRef idx="2">
+            <a:schemeClr val="accent1">
+              <a:shade val="50000"/>
+            </a:schemeClr>
+          </a:lnRef>
+          <a:fillRef idx="1">
+            <a:schemeClr val="accent1"/>
+          </a:fillRef>
+          <a:effectRef idx="0">
+            <a:schemeClr val="accent1"/>
+          </a:effectRef>
+          <a:fontRef idx="minor">
+            <a:schemeClr val="lt1"/>
+          </a:fontRef>
+        </p:style>
+        <p:txBody>
+          <a:bodyPr rtlCol="0" anchor="ctr"/>
+          <a:lstStyle/>
+          <a:p>
+            <a:pPr algn="ctr"/>
+            <a:endParaRPr lang="en-US"/>
+          </a:p>
+        </p:txBody>
+      </p:sp>
+      <p:sp>
+        <p:nvSpPr>
+          <p:cNvPr id="26" name="Oval 25"/>
+          <p:cNvSpPr/>
+          <p:nvPr/>
+        </p:nvSpPr>
+        <p:spPr>
+          <a:xfrm>
+            <a:off x="7712797" y="2976716"/>
+            <a:ext cx="1129576" cy="1013081"/>
+          </a:xfrm>
+          <a:prstGeom prst="ellipse">
+            <a:avLst/>
+          </a:prstGeom>
+          <a:solidFill>
+            <a:schemeClr val="accent6"/>
+          </a:solidFill>
+        </p:spPr>
+        <p:style>
+          <a:lnRef idx="2">
+            <a:schemeClr val="accent1">
+              <a:shade val="50000"/>
+            </a:schemeClr>
+          </a:lnRef>
+          <a:fillRef idx="1">
+            <a:schemeClr val="accent1"/>
+          </a:fillRef>
+          <a:effectRef idx="0">
+            <a:schemeClr val="accent1"/>
+          </a:effectRef>
+          <a:fontRef idx="minor">
+            <a:schemeClr val="lt1"/>
+          </a:fontRef>
+        </p:style>
+        <p:txBody>
+          <a:bodyPr rtlCol="0" anchor="ctr"/>
+          <a:lstStyle/>
+          <a:p>
+            <a:pPr algn="ctr"/>
+            <a:endParaRPr lang="en-US"/>
+          </a:p>
+        </p:txBody>
+      </p:sp>
+      <p:sp>
+        <p:nvSpPr>
+          <p:cNvPr id="35" name="TextBox 34"/>
+          <p:cNvSpPr txBox="1"/>
+          <p:nvPr/>
+        </p:nvSpPr>
+        <p:spPr>
+          <a:xfrm>
+            <a:off x="4109704" y="53710"/>
+            <a:ext cx="2595291" cy="477054"/>
+          </a:xfrm>
+          <a:prstGeom prst="rect">
+            <a:avLst/>
+          </a:prstGeom>
+          <a:noFill/>
+        </p:spPr>
+        <p:txBody>
+          <a:bodyPr wrap="square" rtlCol="0">
+            <a:spAutoFit/>
+          </a:bodyPr>
+          <a:lstStyle/>
+          <a:p>
+            <a:pPr algn="ctr">
+              <a:lnSpc>
+                <a:spcPts val="1500"/>
+              </a:lnSpc>
+            </a:pPr>
+            <a:r>
+              <a:rPr lang="en-US" sz="2000" b="1" dirty="0" smtClean="0"/>
+              <a:t>Static Repository </a:t>
+            </a:r>
+          </a:p>
+          <a:p>
+            <a:pPr algn="ctr">
+              <a:lnSpc>
+                <a:spcPts val="1500"/>
+              </a:lnSpc>
+            </a:pPr>
+            <a:r>
+              <a:rPr lang="en-US" sz="1400" b="1" dirty="0" smtClean="0"/>
+              <a:t>(Node/</a:t>
+            </a:r>
+            <a:r>
+              <a:rPr lang="en-US" sz="1400" b="1" dirty="0" err="1" smtClean="0"/>
+              <a:t>nginix</a:t>
+            </a:r>
+            <a:r>
+              <a:rPr lang="en-US" sz="2000" b="1" dirty="0" smtClean="0"/>
+              <a:t>)</a:t>
+            </a:r>
+            <a:endParaRPr lang="en-US" sz="2000" b="1" dirty="0"/>
+          </a:p>
+        </p:txBody>
+      </p:sp>
+      <p:pic>
+        <p:nvPicPr>
+          <p:cNvPr id="8" name="Picture 7"/>
+          <p:cNvPicPr>
+            <a:picLocks noChangeAspect="1"/>
+          </p:cNvPicPr>
+          <p:nvPr/>
+        </p:nvPicPr>
+        <p:blipFill>
+          <a:blip r:embed="rId7">
+            <a:extLst>
+              <a:ext uri="{28A0092B-C50C-407E-A947-70E740481C1C}">
+                <a14:useLocalDpi xmlns:a14="http://schemas.microsoft.com/office/drawing/2010/main" val="0"/>
+              </a:ext>
+            </a:extLst>
+          </a:blip>
+          <a:stretch>
+            <a:fillRect/>
+          </a:stretch>
+        </p:blipFill>
+        <p:spPr>
+          <a:xfrm>
+            <a:off x="4794846" y="494134"/>
+            <a:ext cx="1225008" cy="1458343"/>
+          </a:xfrm>
+          <a:prstGeom prst="rect">
+            <a:avLst/>
+          </a:prstGeom>
+        </p:spPr>
+      </p:pic>
+      <p:pic>
+        <p:nvPicPr>
+          <p:cNvPr id="14" name="Picture 13"/>
+          <p:cNvPicPr>
+            <a:picLocks noChangeAspect="1"/>
+          </p:cNvPicPr>
+          <p:nvPr/>
+        </p:nvPicPr>
+        <p:blipFill>
+          <a:blip r:embed="rId8">
+            <a:extLst>
+              <a:ext uri="{28A0092B-C50C-407E-A947-70E740481C1C}">
+                <a14:useLocalDpi xmlns:a14="http://schemas.microsoft.com/office/drawing/2010/main" val="0"/>
+              </a:ext>
+            </a:extLst>
+          </a:blip>
+          <a:stretch>
+            <a:fillRect/>
+          </a:stretch>
+        </p:blipFill>
+        <p:spPr>
+          <a:xfrm>
+            <a:off x="6355352" y="1179987"/>
+            <a:ext cx="925523" cy="1416617"/>
+          </a:xfrm>
+          <a:prstGeom prst="rect">
+            <a:avLst/>
+          </a:prstGeom>
+        </p:spPr>
+      </p:pic>
+      <p:pic>
+        <p:nvPicPr>
+          <p:cNvPr id="15" name="Picture 14"/>
+          <p:cNvPicPr>
+            <a:picLocks noChangeAspect="1"/>
+          </p:cNvPicPr>
+          <p:nvPr/>
+        </p:nvPicPr>
+        <p:blipFill>
+          <a:blip r:embed="rId9" cstate="print">
+            <a:extLst>
+              <a:ext uri="{28A0092B-C50C-407E-A947-70E740481C1C}">
+                <a14:useLocalDpi xmlns:a14="http://schemas.microsoft.com/office/drawing/2010/main" val="0"/>
+              </a:ext>
+            </a:extLst>
+          </a:blip>
+          <a:stretch>
+            <a:fillRect/>
+          </a:stretch>
+        </p:blipFill>
+        <p:spPr>
+          <a:xfrm>
+            <a:off x="6871297" y="1647825"/>
+            <a:ext cx="468193" cy="548663"/>
+          </a:xfrm>
+          <a:prstGeom prst="rect">
+            <a:avLst/>
+          </a:prstGeom>
+        </p:spPr>
+      </p:pic>
+      <p:sp>
+        <p:nvSpPr>
+          <p:cNvPr id="40" name="TextBox 39"/>
+          <p:cNvSpPr txBox="1"/>
+          <p:nvPr/>
+        </p:nvSpPr>
+        <p:spPr>
+          <a:xfrm>
+            <a:off x="6189840" y="805743"/>
+            <a:ext cx="2168680" cy="400110"/>
+          </a:xfrm>
+          <a:prstGeom prst="rect">
+            <a:avLst/>
+          </a:prstGeom>
+          <a:noFill/>
+        </p:spPr>
+        <p:txBody>
+          <a:bodyPr wrap="square" rtlCol="0">
+            <a:spAutoFit/>
+          </a:bodyPr>
+          <a:lstStyle/>
+          <a:p>
+            <a:r>
+              <a:rPr lang="en-US" sz="2000" b="1" dirty="0" err="1" smtClean="0"/>
+              <a:t>Oauth</a:t>
+            </a:r>
+            <a:r>
+              <a:rPr lang="en-US" sz="2000" b="1" dirty="0" smtClean="0"/>
+              <a:t> </a:t>
+            </a:r>
+            <a:r>
+              <a:rPr lang="en-US" sz="2000" b="1" dirty="0" err="1" smtClean="0"/>
+              <a:t>Auth</a:t>
+            </a:r>
+            <a:r>
+              <a:rPr lang="en-US" sz="2000" b="1" dirty="0" smtClean="0"/>
+              <a:t> Server</a:t>
+            </a:r>
+            <a:endParaRPr lang="en-US" sz="2000" b="1" dirty="0"/>
+          </a:p>
+        </p:txBody>
+      </p:sp>
+      <p:sp>
+        <p:nvSpPr>
+          <p:cNvPr id="41" name="Oval 40"/>
+          <p:cNvSpPr/>
+          <p:nvPr/>
+        </p:nvSpPr>
+        <p:spPr>
+          <a:xfrm>
+            <a:off x="9127050" y="4339517"/>
+            <a:ext cx="1129576" cy="1013081"/>
+          </a:xfrm>
+          <a:prstGeom prst="ellipse">
+            <a:avLst/>
+          </a:prstGeom>
+          <a:solidFill>
+            <a:schemeClr val="accent6"/>
+          </a:solidFill>
+        </p:spPr>
+        <p:style>
+          <a:lnRef idx="2">
+            <a:schemeClr val="accent1">
+              <a:shade val="50000"/>
+            </a:schemeClr>
+          </a:lnRef>
+          <a:fillRef idx="1">
+            <a:schemeClr val="accent1"/>
+          </a:fillRef>
+          <a:effectRef idx="0">
+            <a:schemeClr val="accent1"/>
+          </a:effectRef>
+          <a:fontRef idx="minor">
+            <a:schemeClr val="lt1"/>
+          </a:fontRef>
+        </p:style>
+        <p:txBody>
+          <a:bodyPr rtlCol="0" anchor="ctr"/>
+          <a:lstStyle/>
+          <a:p>
+            <a:pPr algn="ctr"/>
+            <a:endParaRPr lang="en-US"/>
+          </a:p>
+        </p:txBody>
+      </p:sp>
+      <p:sp>
+        <p:nvSpPr>
+          <p:cNvPr id="42" name="Oval 41"/>
+          <p:cNvSpPr/>
+          <p:nvPr/>
+        </p:nvSpPr>
+        <p:spPr>
+          <a:xfrm>
+            <a:off x="9328995" y="3159808"/>
+            <a:ext cx="1129576" cy="1013081"/>
+          </a:xfrm>
+          <a:prstGeom prst="ellipse">
+            <a:avLst/>
+          </a:prstGeom>
+          <a:solidFill>
+            <a:schemeClr val="accent6"/>
+          </a:solidFill>
+        </p:spPr>
+        <p:style>
+          <a:lnRef idx="2">
+            <a:schemeClr val="accent1">
+              <a:shade val="50000"/>
+            </a:schemeClr>
+          </a:lnRef>
+          <a:fillRef idx="1">
+            <a:schemeClr val="accent1"/>
+          </a:fillRef>
+          <a:effectRef idx="0">
+            <a:schemeClr val="accent1"/>
+          </a:effectRef>
+          <a:fontRef idx="minor">
+            <a:schemeClr val="lt1"/>
+          </a:fontRef>
+        </p:style>
+        <p:txBody>
+          <a:bodyPr rtlCol="0" anchor="ctr"/>
+          <a:lstStyle/>
+          <a:p>
+            <a:pPr algn="ctr"/>
+            <a:endParaRPr lang="en-US"/>
+          </a:p>
+        </p:txBody>
+      </p:sp>
+      <p:sp>
+        <p:nvSpPr>
+          <p:cNvPr id="43" name="Oval 42"/>
+          <p:cNvSpPr/>
+          <p:nvPr/>
+        </p:nvSpPr>
+        <p:spPr>
+          <a:xfrm>
+            <a:off x="10513946" y="2488885"/>
+            <a:ext cx="1129576" cy="1013081"/>
+          </a:xfrm>
+          <a:prstGeom prst="ellipse">
+            <a:avLst/>
+          </a:prstGeom>
+          <a:solidFill>
+            <a:schemeClr val="accent6"/>
+          </a:solidFill>
+        </p:spPr>
+        <p:style>
+          <a:lnRef idx="2">
+            <a:schemeClr val="accent1">
+              <a:shade val="50000"/>
+            </a:schemeClr>
+          </a:lnRef>
+          <a:fillRef idx="1">
+            <a:schemeClr val="accent1"/>
+          </a:fillRef>
+          <a:effectRef idx="0">
+            <a:schemeClr val="accent1"/>
+          </a:effectRef>
+          <a:fontRef idx="minor">
+            <a:schemeClr val="lt1"/>
+          </a:fontRef>
+        </p:style>
+        <p:txBody>
+          <a:bodyPr rtlCol="0" anchor="ctr"/>
+          <a:lstStyle/>
+          <a:p>
+            <a:pPr algn="ctr"/>
             <a:endParaRPr lang="en-US" dirty="0"/>
           </a:p>
         </p:txBody>
       </p:sp>
       <p:sp>
         <p:nvSpPr>
-          <p:cNvPr id="3" name="Content Placeholder 2"/>
-          <p:cNvSpPr>
-            <a:spLocks noGrp="1"/>
-          </p:cNvSpPr>
-          <p:nvPr>
-            <p:ph idx="1"/>
-          </p:nvPr>
-        </p:nvSpPr>
-        <p:spPr/>
-        <p:txBody>
-          <a:bodyPr>
-            <a:normAutofit fontScale="55000" lnSpcReduction="20000"/>
+          <p:cNvPr id="46" name="Oval 45"/>
+          <p:cNvSpPr/>
+          <p:nvPr/>
+        </p:nvSpPr>
+        <p:spPr>
+          <a:xfrm>
+            <a:off x="10877273" y="4735046"/>
+            <a:ext cx="1129576" cy="1013081"/>
+          </a:xfrm>
+          <a:prstGeom prst="ellipse">
+            <a:avLst/>
+          </a:prstGeom>
+          <a:solidFill>
+            <a:schemeClr val="accent6"/>
+          </a:solidFill>
+        </p:spPr>
+        <p:style>
+          <a:lnRef idx="2">
+            <a:schemeClr val="accent1">
+              <a:shade val="50000"/>
+            </a:schemeClr>
+          </a:lnRef>
+          <a:fillRef idx="1">
+            <a:schemeClr val="accent1"/>
+          </a:fillRef>
+          <a:effectRef idx="0">
+            <a:schemeClr val="accent1"/>
+          </a:effectRef>
+          <a:fontRef idx="minor">
+            <a:schemeClr val="lt1"/>
+          </a:fontRef>
+        </p:style>
+        <p:txBody>
+          <a:bodyPr rtlCol="0" anchor="ctr"/>
+          <a:lstStyle/>
+          <a:p>
+            <a:pPr algn="ctr"/>
+            <a:endParaRPr lang="en-US"/>
+          </a:p>
+        </p:txBody>
+      </p:sp>
+      <p:sp>
+        <p:nvSpPr>
+          <p:cNvPr id="47" name="Oval 46"/>
+          <p:cNvSpPr/>
+          <p:nvPr/>
+        </p:nvSpPr>
+        <p:spPr>
+          <a:xfrm>
+            <a:off x="10004328" y="5685853"/>
+            <a:ext cx="1129576" cy="1013081"/>
+          </a:xfrm>
+          <a:prstGeom prst="ellipse">
+            <a:avLst/>
+          </a:prstGeom>
+          <a:solidFill>
+            <a:schemeClr val="accent6"/>
+          </a:solidFill>
+        </p:spPr>
+        <p:style>
+          <a:lnRef idx="2">
+            <a:schemeClr val="accent1">
+              <a:shade val="50000"/>
+            </a:schemeClr>
+          </a:lnRef>
+          <a:fillRef idx="1">
+            <a:schemeClr val="accent1"/>
+          </a:fillRef>
+          <a:effectRef idx="0">
+            <a:schemeClr val="accent1"/>
+          </a:effectRef>
+          <a:fontRef idx="minor">
+            <a:schemeClr val="lt1"/>
+          </a:fontRef>
+        </p:style>
+        <p:txBody>
+          <a:bodyPr rtlCol="0" anchor="ctr"/>
+          <a:lstStyle/>
+          <a:p>
+            <a:pPr algn="ctr"/>
+            <a:endParaRPr lang="en-US"/>
+          </a:p>
+        </p:txBody>
+      </p:sp>
+      <p:sp>
+        <p:nvSpPr>
+          <p:cNvPr id="32" name="Rectangle 31"/>
+          <p:cNvSpPr/>
+          <p:nvPr/>
+        </p:nvSpPr>
+        <p:spPr>
+          <a:xfrm>
+            <a:off x="7712797" y="2942107"/>
+            <a:ext cx="1129576" cy="2050413"/>
+          </a:xfrm>
+          <a:prstGeom prst="rect">
+            <a:avLst/>
+          </a:prstGeom>
+          <a:noFill/>
+          <a:ln>
+            <a:solidFill>
+              <a:schemeClr val="bg1">
+                <a:alpha val="58000"/>
+              </a:schemeClr>
+            </a:solidFill>
+          </a:ln>
+        </p:spPr>
+        <p:style>
+          <a:lnRef idx="2">
+            <a:schemeClr val="accent1">
+              <a:shade val="50000"/>
+            </a:schemeClr>
+          </a:lnRef>
+          <a:fillRef idx="1">
+            <a:schemeClr val="accent1"/>
+          </a:fillRef>
+          <a:effectRef idx="0">
+            <a:schemeClr val="accent1"/>
+          </a:effectRef>
+          <a:fontRef idx="minor">
+            <a:schemeClr val="lt1"/>
+          </a:fontRef>
+        </p:style>
+        <p:txBody>
+          <a:bodyPr rtlCol="0" anchor="ctr"/>
+          <a:lstStyle/>
+          <a:p>
+            <a:pPr algn="ctr"/>
+            <a:endParaRPr lang="en-US"/>
+          </a:p>
+        </p:txBody>
+      </p:sp>
+      <p:sp>
+        <p:nvSpPr>
+          <p:cNvPr id="33" name="TextBox 32"/>
+          <p:cNvSpPr txBox="1"/>
+          <p:nvPr/>
+        </p:nvSpPr>
+        <p:spPr>
+          <a:xfrm>
+            <a:off x="8073257" y="3307826"/>
+            <a:ext cx="285263" cy="369332"/>
+          </a:xfrm>
+          <a:prstGeom prst="rect">
+            <a:avLst/>
+          </a:prstGeom>
+          <a:noFill/>
+        </p:spPr>
+        <p:txBody>
+          <a:bodyPr wrap="square" rtlCol="0">
+            <a:spAutoFit/>
           </a:bodyPr>
           <a:lstStyle/>
           <a:p>
-            <a:pPr marL="0" indent="0">
-              <a:buNone/>
-            </a:pPr>
-            <a:r>
-              <a:rPr lang="en-US" dirty="0" smtClean="0"/>
-              <a:t>Characteristics:</a:t>
-            </a:r>
-          </a:p>
-          <a:p>
             <a:r>
               <a:rPr lang="en-US" b="1" dirty="0" smtClean="0"/>
-              <a:t>Componentization via Services</a:t>
-            </a:r>
-          </a:p>
+              <a:t>a</a:t>
+            </a:r>
+            <a:endParaRPr lang="en-US" b="1" dirty="0"/>
+          </a:p>
+        </p:txBody>
+      </p:sp>
+      <p:sp>
+        <p:nvSpPr>
+          <p:cNvPr id="50" name="TextBox 49"/>
+          <p:cNvSpPr txBox="1"/>
+          <p:nvPr/>
+        </p:nvSpPr>
+        <p:spPr>
+          <a:xfrm>
+            <a:off x="8073257" y="4303788"/>
+            <a:ext cx="433146" cy="369332"/>
+          </a:xfrm>
+          <a:prstGeom prst="rect">
+            <a:avLst/>
+          </a:prstGeom>
+          <a:noFill/>
+        </p:spPr>
+        <p:txBody>
+          <a:bodyPr wrap="square" rtlCol="0">
+            <a:spAutoFit/>
+          </a:bodyPr>
+          <a:lstStyle/>
           <a:p>
             <a:r>
               <a:rPr lang="en-US" b="1" dirty="0" smtClean="0"/>
-              <a:t>Organized around Business Capabilities</a:t>
-            </a:r>
-          </a:p>
+              <a:t>a1</a:t>
+            </a:r>
+            <a:endParaRPr lang="en-US" b="1" dirty="0"/>
+          </a:p>
+        </p:txBody>
+      </p:sp>
+      <p:sp>
+        <p:nvSpPr>
+          <p:cNvPr id="51" name="TextBox 50"/>
+          <p:cNvSpPr txBox="1"/>
+          <p:nvPr/>
+        </p:nvSpPr>
+        <p:spPr>
+          <a:xfrm>
+            <a:off x="9751151" y="3517320"/>
+            <a:ext cx="285263" cy="369332"/>
+          </a:xfrm>
+          <a:prstGeom prst="rect">
+            <a:avLst/>
+          </a:prstGeom>
+          <a:noFill/>
+        </p:spPr>
+        <p:txBody>
+          <a:bodyPr wrap="square" rtlCol="0">
+            <a:spAutoFit/>
+          </a:bodyPr>
+          <a:lstStyle/>
           <a:p>
             <a:r>
               <a:rPr lang="en-US" b="1" dirty="0" smtClean="0"/>
-              <a:t>Products not Projects</a:t>
-            </a:r>
-          </a:p>
+              <a:t>c</a:t>
+            </a:r>
+            <a:endParaRPr lang="en-US" b="1" dirty="0"/>
+          </a:p>
+        </p:txBody>
+      </p:sp>
+      <p:sp>
+        <p:nvSpPr>
+          <p:cNvPr id="52" name="TextBox 51"/>
+          <p:cNvSpPr txBox="1"/>
+          <p:nvPr/>
+        </p:nvSpPr>
+        <p:spPr>
+          <a:xfrm>
+            <a:off x="10945193" y="2838515"/>
+            <a:ext cx="285263" cy="369332"/>
+          </a:xfrm>
+          <a:prstGeom prst="rect">
+            <a:avLst/>
+          </a:prstGeom>
+          <a:noFill/>
+        </p:spPr>
+        <p:txBody>
+          <a:bodyPr wrap="square" rtlCol="0">
+            <a:spAutoFit/>
+          </a:bodyPr>
+          <a:lstStyle/>
+          <a:p>
+            <a:r>
+              <a:rPr lang="en-US" b="1" dirty="0"/>
+              <a:t>e</a:t>
+            </a:r>
+          </a:p>
+        </p:txBody>
+      </p:sp>
+      <p:sp>
+        <p:nvSpPr>
+          <p:cNvPr id="53" name="TextBox 52"/>
+          <p:cNvSpPr txBox="1"/>
+          <p:nvPr/>
+        </p:nvSpPr>
+        <p:spPr>
+          <a:xfrm>
+            <a:off x="9572686" y="4661391"/>
+            <a:ext cx="285263" cy="369332"/>
+          </a:xfrm>
+          <a:prstGeom prst="rect">
+            <a:avLst/>
+          </a:prstGeom>
+          <a:noFill/>
+        </p:spPr>
+        <p:txBody>
+          <a:bodyPr wrap="square" rtlCol="0">
+            <a:spAutoFit/>
+          </a:bodyPr>
+          <a:lstStyle/>
           <a:p>
             <a:r>
               <a:rPr lang="en-US" b="1" dirty="0" smtClean="0"/>
-              <a:t>Smart endpoints and dumb pipes</a:t>
-            </a:r>
-          </a:p>
+              <a:t>d</a:t>
+            </a:r>
+            <a:endParaRPr lang="en-US" b="1" dirty="0"/>
+          </a:p>
+        </p:txBody>
+      </p:sp>
+      <p:sp>
+        <p:nvSpPr>
+          <p:cNvPr id="54" name="TextBox 53"/>
+          <p:cNvSpPr txBox="1"/>
+          <p:nvPr/>
+        </p:nvSpPr>
+        <p:spPr>
+          <a:xfrm>
+            <a:off x="11299429" y="5056920"/>
+            <a:ext cx="285263" cy="369332"/>
+          </a:xfrm>
+          <a:prstGeom prst="rect">
+            <a:avLst/>
+          </a:prstGeom>
+          <a:noFill/>
+        </p:spPr>
+        <p:txBody>
+          <a:bodyPr wrap="square" rtlCol="0">
+            <a:spAutoFit/>
+          </a:bodyPr>
+          <a:lstStyle/>
           <a:p>
             <a:r>
               <a:rPr lang="en-US" b="1" dirty="0" smtClean="0"/>
-              <a:t>Decentralized Governance</a:t>
-            </a:r>
-          </a:p>
+              <a:t>f</a:t>
+            </a:r>
+            <a:endParaRPr lang="en-US" b="1" dirty="0"/>
+          </a:p>
+        </p:txBody>
+      </p:sp>
+      <p:sp>
+        <p:nvSpPr>
+          <p:cNvPr id="55" name="TextBox 54"/>
+          <p:cNvSpPr txBox="1"/>
+          <p:nvPr/>
+        </p:nvSpPr>
+        <p:spPr>
+          <a:xfrm>
+            <a:off x="8111473" y="5563461"/>
+            <a:ext cx="285263" cy="369332"/>
+          </a:xfrm>
+          <a:prstGeom prst="rect">
+            <a:avLst/>
+          </a:prstGeom>
+          <a:noFill/>
+        </p:spPr>
+        <p:txBody>
+          <a:bodyPr wrap="square" rtlCol="0">
+            <a:spAutoFit/>
+          </a:bodyPr>
+          <a:lstStyle/>
           <a:p>
             <a:r>
               <a:rPr lang="en-US" b="1" dirty="0" smtClean="0"/>
-              <a:t>Decentralized Data Management</a:t>
-            </a:r>
-          </a:p>
+              <a:t>b</a:t>
+            </a:r>
+            <a:endParaRPr lang="en-US" b="1" dirty="0"/>
+          </a:p>
+        </p:txBody>
+      </p:sp>
+      <p:sp>
+        <p:nvSpPr>
+          <p:cNvPr id="56" name="TextBox 55"/>
+          <p:cNvSpPr txBox="1"/>
+          <p:nvPr/>
+        </p:nvSpPr>
+        <p:spPr>
+          <a:xfrm>
+            <a:off x="10426484" y="6007727"/>
+            <a:ext cx="285263" cy="369332"/>
+          </a:xfrm>
+          <a:prstGeom prst="rect">
+            <a:avLst/>
+          </a:prstGeom>
+          <a:noFill/>
+        </p:spPr>
+        <p:txBody>
+          <a:bodyPr wrap="square" rtlCol="0">
+            <a:spAutoFit/>
+          </a:bodyPr>
+          <a:lstStyle/>
           <a:p>
             <a:r>
               <a:rPr lang="en-US" b="1" dirty="0" smtClean="0"/>
-              <a:t>Infrastructure Automation</a:t>
-            </a:r>
-          </a:p>
-          <a:p>
-            <a:r>
-              <a:rPr lang="en-US" b="1" dirty="0" smtClean="0"/>
-              <a:t>Design for failure</a:t>
-            </a:r>
-          </a:p>
-          <a:p>
-            <a:r>
-              <a:rPr lang="en-US" b="1" dirty="0" smtClean="0"/>
-              <a:t>Evolutionary Design</a:t>
-            </a:r>
-          </a:p>
-          <a:p>
-            <a:endParaRPr lang="en-US" b="1" dirty="0" smtClean="0"/>
-          </a:p>
-          <a:p>
-            <a:pPr marL="0" indent="0">
-              <a:buNone/>
-            </a:pPr>
-            <a:endParaRPr lang="en-US" dirty="0" smtClean="0"/>
-          </a:p>
-          <a:p>
-            <a:endParaRPr lang="en-US" dirty="0" smtClean="0"/>
-          </a:p>
-          <a:p>
-            <a:endParaRPr lang="en-US" dirty="0"/>
-          </a:p>
-          <a:p>
-            <a:pPr marL="0" indent="0">
-              <a:buNone/>
-            </a:pPr>
-            <a:r>
-              <a:rPr lang="en-US" dirty="0" smtClean="0"/>
-              <a:t>Reference: http://martinfowler.com/articles/microservices.html</a:t>
-            </a:r>
-            <a:endParaRPr lang="en-US" dirty="0"/>
+              <a:t>g</a:t>
+            </a:r>
+            <a:endParaRPr lang="en-US" b="1" dirty="0"/>
           </a:p>
         </p:txBody>
       </p:sp>
     </p:spTree>
     <p:extLst>
       <p:ext uri="{BB962C8B-B14F-4D97-AF65-F5344CB8AC3E}">
-        <p14:creationId xmlns:p14="http://schemas.microsoft.com/office/powerpoint/2010/main" val="3712099602"/>
+        <p14:creationId xmlns:p14="http://schemas.microsoft.com/office/powerpoint/2010/main" val="1442845223"/>
       </p:ext>
     </p:extLst>
   </p:cSld>
@@ -7571,6 +8680,172 @@
           <a:p>
             <a:r>
               <a:rPr lang="en-US" dirty="0" smtClean="0"/>
+              <a:t>Micro-services architectural style</a:t>
+            </a:r>
+            <a:endParaRPr lang="en-US" dirty="0"/>
+          </a:p>
+        </p:txBody>
+      </p:sp>
+      <p:sp>
+        <p:nvSpPr>
+          <p:cNvPr id="3" name="Content Placeholder 2"/>
+          <p:cNvSpPr>
+            <a:spLocks noGrp="1"/>
+          </p:cNvSpPr>
+          <p:nvPr>
+            <p:ph idx="1"/>
+          </p:nvPr>
+        </p:nvSpPr>
+        <p:spPr/>
+        <p:txBody>
+          <a:bodyPr>
+            <a:normAutofit fontScale="55000" lnSpcReduction="20000"/>
+          </a:bodyPr>
+          <a:lstStyle/>
+          <a:p>
+            <a:pPr marL="0" indent="0">
+              <a:buNone/>
+            </a:pPr>
+            <a:r>
+              <a:rPr lang="en-US" dirty="0" smtClean="0"/>
+              <a:t>Characteristics:</a:t>
+            </a:r>
+          </a:p>
+          <a:p>
+            <a:r>
+              <a:rPr lang="en-US" b="1" dirty="0" smtClean="0"/>
+              <a:t>Componentization via Services</a:t>
+            </a:r>
+          </a:p>
+          <a:p>
+            <a:r>
+              <a:rPr lang="en-US" b="1" dirty="0" smtClean="0"/>
+              <a:t>Organized around Business Capabilities</a:t>
+            </a:r>
+          </a:p>
+          <a:p>
+            <a:r>
+              <a:rPr lang="en-US" b="1" dirty="0" smtClean="0"/>
+              <a:t>Products not Projects</a:t>
+            </a:r>
+          </a:p>
+          <a:p>
+            <a:r>
+              <a:rPr lang="en-US" b="1" dirty="0" smtClean="0"/>
+              <a:t>Smart endpoints and dumb pipes</a:t>
+            </a:r>
+          </a:p>
+          <a:p>
+            <a:r>
+              <a:rPr lang="en-US" b="1" dirty="0" smtClean="0"/>
+              <a:t>Decentralized Governance</a:t>
+            </a:r>
+          </a:p>
+          <a:p>
+            <a:r>
+              <a:rPr lang="en-US" b="1" dirty="0" smtClean="0"/>
+              <a:t>Decentralized Data Management</a:t>
+            </a:r>
+          </a:p>
+          <a:p>
+            <a:r>
+              <a:rPr lang="en-US" b="1" dirty="0" smtClean="0"/>
+              <a:t>Infrastructure Automation</a:t>
+            </a:r>
+          </a:p>
+          <a:p>
+            <a:r>
+              <a:rPr lang="en-US" b="1" dirty="0" smtClean="0"/>
+              <a:t>Design for failure</a:t>
+            </a:r>
+          </a:p>
+          <a:p>
+            <a:r>
+              <a:rPr lang="en-US" b="1" dirty="0" smtClean="0"/>
+              <a:t>Evolutionary Design</a:t>
+            </a:r>
+          </a:p>
+          <a:p>
+            <a:endParaRPr lang="en-US" b="1" dirty="0" smtClean="0"/>
+          </a:p>
+          <a:p>
+            <a:pPr marL="0" indent="0">
+              <a:buNone/>
+            </a:pPr>
+            <a:endParaRPr lang="en-US" dirty="0" smtClean="0"/>
+          </a:p>
+          <a:p>
+            <a:endParaRPr lang="en-US" dirty="0" smtClean="0"/>
+          </a:p>
+          <a:p>
+            <a:endParaRPr lang="en-US" dirty="0"/>
+          </a:p>
+          <a:p>
+            <a:pPr marL="0" indent="0">
+              <a:buNone/>
+            </a:pPr>
+            <a:r>
+              <a:rPr lang="en-US" dirty="0" smtClean="0"/>
+              <a:t>Reference: http://martinfowler.com/articles/microservices.html</a:t>
+            </a:r>
+            <a:endParaRPr lang="en-US" dirty="0"/>
+          </a:p>
+        </p:txBody>
+      </p:sp>
+    </p:spTree>
+    <p:extLst>
+      <p:ext uri="{BB962C8B-B14F-4D97-AF65-F5344CB8AC3E}">
+        <p14:creationId xmlns:p14="http://schemas.microsoft.com/office/powerpoint/2010/main" val="3712099602"/>
+      </p:ext>
+    </p:extLst>
+  </p:cSld>
+  <p:clrMapOvr>
+    <a:masterClrMapping/>
+  </p:clrMapOvr>
+  <p:timing>
+    <p:tnLst>
+      <p:par>
+        <p:cTn id="1" dur="indefinite" restart="never" nodeType="tmRoot"/>
+      </p:par>
+    </p:tnLst>
+  </p:timing>
+</p:sld>
+</file>
+
+<file path=ppt/slides/slide16.xml><?xml version="1.0" encoding="utf-8"?>
+<p:sld xmlns:a="http://schemas.openxmlformats.org/drawingml/2006/main" xmlns:r="http://schemas.openxmlformats.org/officeDocument/2006/relationships" xmlns:p="http://schemas.openxmlformats.org/presentationml/2006/main">
+  <p:cSld>
+    <p:spTree>
+      <p:nvGrpSpPr>
+        <p:cNvPr id="1" name=""/>
+        <p:cNvGrpSpPr/>
+        <p:nvPr/>
+      </p:nvGrpSpPr>
+      <p:grpSpPr>
+        <a:xfrm>
+          <a:off x="0" y="0"/>
+          <a:ext cx="0" cy="0"/>
+          <a:chOff x="0" y="0"/>
+          <a:chExt cx="0" cy="0"/>
+        </a:xfrm>
+      </p:grpSpPr>
+      <p:sp>
+        <p:nvSpPr>
+          <p:cNvPr id="2" name="Title 1"/>
+          <p:cNvSpPr>
+            <a:spLocks noGrp="1"/>
+          </p:cNvSpPr>
+          <p:nvPr>
+            <p:ph type="title"/>
+          </p:nvPr>
+        </p:nvSpPr>
+        <p:spPr/>
+        <p:txBody>
+          <a:bodyPr/>
+          <a:lstStyle/>
+          <a:p>
+            <a:r>
+              <a:rPr lang="en-US" dirty="0" smtClean="0"/>
               <a:t>Spring Framework</a:t>
             </a:r>
             <a:endParaRPr lang="en-US" dirty="0"/>
@@ -7627,7 +8902,7 @@
 </p:sld>
 </file>
 
-<file path=ppt/slides/slide16.xml><?xml version="1.0" encoding="utf-8"?>
+<file path=ppt/slides/slide17.xml><?xml version="1.0" encoding="utf-8"?>
 <p:sld xmlns:a="http://schemas.openxmlformats.org/drawingml/2006/main" xmlns:r="http://schemas.openxmlformats.org/officeDocument/2006/relationships" xmlns:p="http://schemas.openxmlformats.org/presentationml/2006/main">
   <p:cSld>
     <p:spTree>
@@ -7780,7 +9055,7 @@
 </p:sld>
 </file>
 
-<file path=ppt/slides/slide17.xml><?xml version="1.0" encoding="utf-8"?>
+<file path=ppt/slides/slide18.xml><?xml version="1.0" encoding="utf-8"?>
 <p:sld xmlns:a="http://schemas.openxmlformats.org/drawingml/2006/main" xmlns:r="http://schemas.openxmlformats.org/officeDocument/2006/relationships" xmlns:p="http://schemas.openxmlformats.org/presentationml/2006/main">
   <p:cSld>
     <p:spTree>
@@ -7920,7 +9195,7 @@
 </p:sld>
 </file>
 
-<file path=ppt/slides/slide18.xml><?xml version="1.0" encoding="utf-8"?>
+<file path=ppt/slides/slide19.xml><?xml version="1.0" encoding="utf-8"?>
 <p:sld xmlns:a="http://schemas.openxmlformats.org/drawingml/2006/main" xmlns:r="http://schemas.openxmlformats.org/officeDocument/2006/relationships" xmlns:p="http://schemas.openxmlformats.org/presentationml/2006/main">
   <p:cSld>
     <p:spTree>
@@ -11483,7 +12758,7 @@
   <a:extraClrSchemeLst/>
   <a:extLst>
     <a:ext uri="{05A4C25C-085E-4340-85A3-A5531E510DB2}">
-      <thm15:themeFamily xmlns="" xmlns:thm15="http://schemas.microsoft.com/office/thememl/2012/main" name="Office Theme" id="{62F939B6-93AF-4DB8-9C6B-D6C7DFDC589F}" vid="{4A3C46E8-61CC-4603-A589-7422A47A8E4A}"/>
+      <thm15:themeFamily xmlns:thm15="http://schemas.microsoft.com/office/thememl/2012/main" name="Office Theme" id="{62F939B6-93AF-4DB8-9C6B-D6C7DFDC589F}" vid="{4A3C46E8-61CC-4603-A589-7422A47A8E4A}"/>
     </a:ext>
   </a:extLst>
 </a:theme>
@@ -11744,7 +13019,7 @@
   <a:extraClrSchemeLst/>
   <a:extLst>
     <a:ext uri="{05A4C25C-085E-4340-85A3-A5531E510DB2}">
-      <thm15:themeFamily xmlns="" xmlns:thm15="http://schemas.microsoft.com/office/thememl/2012/main" name="Office Theme" id="{62F939B6-93AF-4DB8-9C6B-D6C7DFDC589F}" vid="{4A3C46E8-61CC-4603-A589-7422A47A8E4A}"/>
+      <thm15:themeFamily xmlns:thm15="http://schemas.microsoft.com/office/thememl/2012/main" name="Office Theme" id="{62F939B6-93AF-4DB8-9C6B-D6C7DFDC589F}" vid="{4A3C46E8-61CC-4603-A589-7422A47A8E4A}"/>
     </a:ext>
   </a:extLst>
 </a:theme>
@@ -12005,7 +13280,7 @@
   <a:extraClrSchemeLst/>
   <a:extLst>
     <a:ext uri="{05A4C25C-085E-4340-85A3-A5531E510DB2}">
-      <thm15:themeFamily xmlns="" xmlns:thm15="http://schemas.microsoft.com/office/thememl/2012/main" name="Office Theme" id="{62F939B6-93AF-4DB8-9C6B-D6C7DFDC589F}" vid="{4A3C46E8-61CC-4603-A589-7422A47A8E4A}"/>
+      <thm15:themeFamily xmlns:thm15="http://schemas.microsoft.com/office/thememl/2012/main" name="Office Theme" id="{62F939B6-93AF-4DB8-9C6B-D6C7DFDC589F}" vid="{4A3C46E8-61CC-4603-A589-7422A47A8E4A}"/>
     </a:ext>
   </a:extLst>
 </a:theme>

</xml_diff>

<commit_message>
Adding ideal arch diagram.. contd
</commit_message>
<xml_diff>
--- a/Spring Boot.pptx
+++ b/Spring Boot.pptx
@@ -7215,12 +7215,8 @@
           <a:lstStyle/>
           <a:p>
             <a:r>
-              <a:rPr lang="en-US" dirty="0" err="1" smtClean="0"/>
-              <a:t>Json</a:t>
-            </a:r>
-            <a:r>
               <a:rPr lang="en-US" dirty="0" smtClean="0"/>
-              <a:t>/*-form-</a:t>
+              <a:t>Json/*-form-</a:t>
             </a:r>
             <a:r>
               <a:rPr lang="en-US" dirty="0" err="1" smtClean="0"/>
@@ -7738,7 +7734,7 @@
         </p:nvSpPr>
         <p:spPr>
           <a:xfrm>
-            <a:off x="7274180" y="2383281"/>
+            <a:off x="7379687" y="2383281"/>
             <a:ext cx="4800589" cy="4379546"/>
           </a:xfrm>
           <a:prstGeom prst="rect">
@@ -7787,7 +7783,7 @@
         </p:nvSpPr>
         <p:spPr>
           <a:xfrm>
-            <a:off x="7321935" y="2438405"/>
+            <a:off x="8625870" y="2451070"/>
             <a:ext cx="2369903" cy="400110"/>
           </a:xfrm>
           <a:prstGeom prst="rect">
@@ -7817,7 +7813,7 @@
         </p:nvSpPr>
         <p:spPr>
           <a:xfrm>
-            <a:off x="7689317" y="5179313"/>
+            <a:off x="7794824" y="5179313"/>
             <a:ext cx="1129576" cy="1013081"/>
           </a:xfrm>
           <a:prstGeom prst="ellipse">
@@ -7860,7 +7856,7 @@
         </p:nvSpPr>
         <p:spPr>
           <a:xfrm>
-            <a:off x="7712797" y="3979439"/>
+            <a:off x="7818304" y="3979439"/>
             <a:ext cx="1129576" cy="1013081"/>
           </a:xfrm>
           <a:prstGeom prst="ellipse">
@@ -7903,7 +7899,7 @@
         </p:nvSpPr>
         <p:spPr>
           <a:xfrm>
-            <a:off x="7712797" y="2976716"/>
+            <a:off x="7818304" y="2976716"/>
             <a:ext cx="1129576" cy="1013081"/>
           </a:xfrm>
           <a:prstGeom prst="ellipse">
@@ -7946,7 +7942,7 @@
         </p:nvSpPr>
         <p:spPr>
           <a:xfrm>
-            <a:off x="4109704" y="53710"/>
+            <a:off x="3028857" y="52416"/>
             <a:ext cx="2595291" cy="477054"/>
           </a:xfrm>
           <a:prstGeom prst="rect">
@@ -8014,7 +8010,7 @@
         </p:blipFill>
         <p:spPr>
           <a:xfrm>
-            <a:off x="4794846" y="494134"/>
+            <a:off x="3754196" y="456763"/>
             <a:ext cx="1225008" cy="1458343"/>
           </a:xfrm>
           <a:prstGeom prst="rect">
@@ -8044,7 +8040,7 @@
         </p:blipFill>
         <p:spPr>
           <a:xfrm>
-            <a:off x="6355352" y="1179987"/>
+            <a:off x="5858318" y="370921"/>
             <a:ext cx="925523" cy="1416617"/>
           </a:xfrm>
           <a:prstGeom prst="rect">
@@ -8074,7 +8070,7 @@
         </p:blipFill>
         <p:spPr>
           <a:xfrm>
-            <a:off x="6871297" y="1647825"/>
+            <a:off x="6321079" y="839309"/>
             <a:ext cx="468193" cy="548663"/>
           </a:xfrm>
           <a:prstGeom prst="rect">
@@ -8090,7 +8086,7 @@
         </p:nvSpPr>
         <p:spPr>
           <a:xfrm>
-            <a:off x="6189840" y="805743"/>
+            <a:off x="5520637" y="-61694"/>
             <a:ext cx="2168680" cy="400110"/>
           </a:xfrm>
           <a:prstGeom prst="rect">
@@ -8110,15 +8106,7 @@
             </a:r>
             <a:r>
               <a:rPr lang="en-US" sz="2000" b="1" dirty="0" smtClean="0"/>
-              <a:t> </a:t>
-            </a:r>
-            <a:r>
-              <a:rPr lang="en-US" sz="2000" b="1" dirty="0" err="1" smtClean="0"/>
-              <a:t>Auth</a:t>
-            </a:r>
-            <a:r>
-              <a:rPr lang="en-US" sz="2000" b="1" dirty="0" smtClean="0"/>
-              <a:t> Server</a:t>
+              <a:t> Auth Server</a:t>
             </a:r>
             <a:endParaRPr lang="en-US" sz="2000" b="1" dirty="0"/>
           </a:p>
@@ -8132,7 +8120,7 @@
         </p:nvSpPr>
         <p:spPr>
           <a:xfrm>
-            <a:off x="9127050" y="4339517"/>
+            <a:off x="9232557" y="4339517"/>
             <a:ext cx="1129576" cy="1013081"/>
           </a:xfrm>
           <a:prstGeom prst="ellipse">
@@ -8175,7 +8163,7 @@
         </p:nvSpPr>
         <p:spPr>
           <a:xfrm>
-            <a:off x="9328995" y="3159808"/>
+            <a:off x="9434502" y="3159808"/>
             <a:ext cx="1129576" cy="1013081"/>
           </a:xfrm>
           <a:prstGeom prst="ellipse">
@@ -8218,7 +8206,7 @@
         </p:nvSpPr>
         <p:spPr>
           <a:xfrm>
-            <a:off x="10513946" y="2488885"/>
+            <a:off x="10619453" y="2488885"/>
             <a:ext cx="1129576" cy="1013081"/>
           </a:xfrm>
           <a:prstGeom prst="ellipse">
@@ -8261,7 +8249,7 @@
         </p:nvSpPr>
         <p:spPr>
           <a:xfrm>
-            <a:off x="10877273" y="4735046"/>
+            <a:off x="10982780" y="4735046"/>
             <a:ext cx="1129576" cy="1013081"/>
           </a:xfrm>
           <a:prstGeom prst="ellipse">
@@ -8304,7 +8292,7 @@
         </p:nvSpPr>
         <p:spPr>
           <a:xfrm>
-            <a:off x="10004328" y="5685853"/>
+            <a:off x="10109835" y="5685853"/>
             <a:ext cx="1129576" cy="1013081"/>
           </a:xfrm>
           <a:prstGeom prst="ellipse">
@@ -8347,7 +8335,7 @@
         </p:nvSpPr>
         <p:spPr>
           <a:xfrm>
-            <a:off x="7712797" y="2942107"/>
+            <a:off x="7818304" y="2942107"/>
             <a:ext cx="1129576" cy="2050413"/>
           </a:xfrm>
           <a:prstGeom prst="rect">
@@ -8395,7 +8383,7 @@
         </p:nvSpPr>
         <p:spPr>
           <a:xfrm>
-            <a:off x="8073257" y="3307826"/>
+            <a:off x="8178764" y="3307826"/>
             <a:ext cx="285263" cy="369332"/>
           </a:xfrm>
           <a:prstGeom prst="rect">
@@ -8425,7 +8413,7 @@
         </p:nvSpPr>
         <p:spPr>
           <a:xfrm>
-            <a:off x="8073257" y="4303788"/>
+            <a:off x="8178764" y="4303788"/>
             <a:ext cx="433146" cy="369332"/>
           </a:xfrm>
           <a:prstGeom prst="rect">
@@ -8455,7 +8443,7 @@
         </p:nvSpPr>
         <p:spPr>
           <a:xfrm>
-            <a:off x="9751151" y="3517320"/>
+            <a:off x="9856658" y="3517320"/>
             <a:ext cx="285263" cy="369332"/>
           </a:xfrm>
           <a:prstGeom prst="rect">
@@ -8485,7 +8473,7 @@
         </p:nvSpPr>
         <p:spPr>
           <a:xfrm>
-            <a:off x="10945193" y="2838515"/>
+            <a:off x="11050700" y="2838515"/>
             <a:ext cx="285263" cy="369332"/>
           </a:xfrm>
           <a:prstGeom prst="rect">
@@ -8514,7 +8502,7 @@
         </p:nvSpPr>
         <p:spPr>
           <a:xfrm>
-            <a:off x="9572686" y="4661391"/>
+            <a:off x="9678193" y="4661391"/>
             <a:ext cx="285263" cy="369332"/>
           </a:xfrm>
           <a:prstGeom prst="rect">
@@ -8544,7 +8532,7 @@
         </p:nvSpPr>
         <p:spPr>
           <a:xfrm>
-            <a:off x="11299429" y="5056920"/>
+            <a:off x="11404936" y="5056920"/>
             <a:ext cx="285263" cy="369332"/>
           </a:xfrm>
           <a:prstGeom prst="rect">
@@ -8574,7 +8562,7 @@
         </p:nvSpPr>
         <p:spPr>
           <a:xfrm>
-            <a:off x="8111473" y="5563461"/>
+            <a:off x="8216980" y="5563461"/>
             <a:ext cx="285263" cy="369332"/>
           </a:xfrm>
           <a:prstGeom prst="rect">
@@ -8604,7 +8592,7 @@
         </p:nvSpPr>
         <p:spPr>
           <a:xfrm>
-            <a:off x="10426484" y="6007727"/>
+            <a:off x="10531991" y="6007727"/>
             <a:ext cx="285263" cy="369332"/>
           </a:xfrm>
           <a:prstGeom prst="rect">
@@ -8623,6 +8611,456 @@
               <a:t>g</a:t>
             </a:r>
             <a:endParaRPr lang="en-US" b="1" dirty="0"/>
+          </a:p>
+        </p:txBody>
+      </p:sp>
+      <p:sp>
+        <p:nvSpPr>
+          <p:cNvPr id="20" name="TextBox 19"/>
+          <p:cNvSpPr txBox="1"/>
+          <p:nvPr/>
+        </p:nvSpPr>
+        <p:spPr>
+          <a:xfrm rot="16828570">
+            <a:off x="2857035" y="2528612"/>
+            <a:ext cx="1492646" cy="307777"/>
+          </a:xfrm>
+          <a:prstGeom prst="rect">
+            <a:avLst/>
+          </a:prstGeom>
+          <a:noFill/>
+        </p:spPr>
+        <p:txBody>
+          <a:bodyPr wrap="square" rtlCol="0">
+            <a:spAutoFit/>
+          </a:bodyPr>
+          <a:lstStyle/>
+          <a:p>
+            <a:r>
+              <a:rPr lang="en-US" sz="1400" dirty="0" smtClean="0"/>
+              <a:t>1. Initial Request</a:t>
+            </a:r>
+            <a:endParaRPr lang="en-US" sz="1400" dirty="0"/>
+          </a:p>
+        </p:txBody>
+      </p:sp>
+      <p:sp>
+        <p:nvSpPr>
+          <p:cNvPr id="45" name="TextBox 44"/>
+          <p:cNvSpPr txBox="1"/>
+          <p:nvPr/>
+        </p:nvSpPr>
+        <p:spPr>
+          <a:xfrm rot="16828315">
+            <a:off x="3228197" y="2613836"/>
+            <a:ext cx="1492646" cy="307777"/>
+          </a:xfrm>
+          <a:prstGeom prst="rect">
+            <a:avLst/>
+          </a:prstGeom>
+          <a:noFill/>
+        </p:spPr>
+        <p:txBody>
+          <a:bodyPr wrap="square" rtlCol="0">
+            <a:spAutoFit/>
+          </a:bodyPr>
+          <a:lstStyle/>
+          <a:p>
+            <a:r>
+              <a:rPr lang="en-US" sz="1400" dirty="0" smtClean="0"/>
+              <a:t>2. Html, JS, CSS</a:t>
+            </a:r>
+            <a:endParaRPr lang="en-US" sz="1400" dirty="0"/>
+          </a:p>
+        </p:txBody>
+      </p:sp>
+      <p:cxnSp>
+        <p:nvCxnSpPr>
+          <p:cNvPr id="60" name="Straight Arrow Connector 59"/>
+          <p:cNvCxnSpPr/>
+          <p:nvPr/>
+        </p:nvCxnSpPr>
+        <p:spPr>
+          <a:xfrm flipV="1">
+            <a:off x="3518404" y="1846964"/>
+            <a:ext cx="351826" cy="1908176"/>
+          </a:xfrm>
+          <a:prstGeom prst="straightConnector1">
+            <a:avLst/>
+          </a:prstGeom>
+          <a:ln>
+            <a:tailEnd type="triangle"/>
+          </a:ln>
+        </p:spPr>
+        <p:style>
+          <a:lnRef idx="1">
+            <a:schemeClr val="accent1"/>
+          </a:lnRef>
+          <a:fillRef idx="0">
+            <a:schemeClr val="accent1"/>
+          </a:fillRef>
+          <a:effectRef idx="0">
+            <a:schemeClr val="accent1"/>
+          </a:effectRef>
+          <a:fontRef idx="minor">
+            <a:schemeClr val="tx1"/>
+          </a:fontRef>
+        </p:style>
+      </p:cxnSp>
+      <p:cxnSp>
+        <p:nvCxnSpPr>
+          <p:cNvPr id="63" name="Straight Arrow Connector 62"/>
+          <p:cNvCxnSpPr/>
+          <p:nvPr/>
+        </p:nvCxnSpPr>
+        <p:spPr>
+          <a:xfrm flipH="1">
+            <a:off x="3905366" y="1922156"/>
+            <a:ext cx="315023" cy="1832982"/>
+          </a:xfrm>
+          <a:prstGeom prst="straightConnector1">
+            <a:avLst/>
+          </a:prstGeom>
+          <a:ln>
+            <a:tailEnd type="triangle"/>
+          </a:ln>
+        </p:spPr>
+        <p:style>
+          <a:lnRef idx="1">
+            <a:schemeClr val="accent1"/>
+          </a:lnRef>
+          <a:fillRef idx="0">
+            <a:schemeClr val="accent1"/>
+          </a:fillRef>
+          <a:effectRef idx="0">
+            <a:schemeClr val="accent1"/>
+          </a:effectRef>
+          <a:fontRef idx="minor">
+            <a:schemeClr val="tx1"/>
+          </a:fontRef>
+        </p:style>
+      </p:cxnSp>
+      <p:cxnSp>
+        <p:nvCxnSpPr>
+          <p:cNvPr id="1026" name="Straight Arrow Connector 1025"/>
+          <p:cNvCxnSpPr>
+            <a:endCxn id="14" idx="1"/>
+          </p:cNvCxnSpPr>
+          <p:nvPr/>
+        </p:nvCxnSpPr>
+        <p:spPr>
+          <a:xfrm flipV="1">
+            <a:off x="4069451" y="1079230"/>
+            <a:ext cx="1788867" cy="2675908"/>
+          </a:xfrm>
+          <a:prstGeom prst="straightConnector1">
+            <a:avLst/>
+          </a:prstGeom>
+          <a:ln>
+            <a:tailEnd type="triangle"/>
+          </a:ln>
+        </p:spPr>
+        <p:style>
+          <a:lnRef idx="1">
+            <a:schemeClr val="accent1"/>
+          </a:lnRef>
+          <a:fillRef idx="0">
+            <a:schemeClr val="accent1"/>
+          </a:fillRef>
+          <a:effectRef idx="0">
+            <a:schemeClr val="accent1"/>
+          </a:effectRef>
+          <a:fontRef idx="minor">
+            <a:schemeClr val="tx1"/>
+          </a:fontRef>
+        </p:style>
+      </p:cxnSp>
+      <p:sp>
+        <p:nvSpPr>
+          <p:cNvPr id="72" name="TextBox 71"/>
+          <p:cNvSpPr txBox="1"/>
+          <p:nvPr/>
+        </p:nvSpPr>
+        <p:spPr>
+          <a:xfrm rot="18138454">
+            <a:off x="4092373" y="2264190"/>
+            <a:ext cx="1492646" cy="307777"/>
+          </a:xfrm>
+          <a:prstGeom prst="rect">
+            <a:avLst/>
+          </a:prstGeom>
+          <a:noFill/>
+        </p:spPr>
+        <p:txBody>
+          <a:bodyPr wrap="square" rtlCol="0">
+            <a:spAutoFit/>
+          </a:bodyPr>
+          <a:lstStyle/>
+          <a:p>
+            <a:r>
+              <a:rPr lang="en-US" sz="1400" dirty="0" smtClean="0"/>
+              <a:t>3. Auth Request</a:t>
+            </a:r>
+            <a:endParaRPr lang="en-US" sz="1400" dirty="0"/>
+          </a:p>
+        </p:txBody>
+      </p:sp>
+      <p:cxnSp>
+        <p:nvCxnSpPr>
+          <p:cNvPr id="1029" name="Straight Arrow Connector 1028"/>
+          <p:cNvCxnSpPr>
+            <a:stCxn id="14" idx="2"/>
+          </p:cNvCxnSpPr>
+          <p:nvPr/>
+        </p:nvCxnSpPr>
+        <p:spPr>
+          <a:xfrm flipH="1">
+            <a:off x="4081369" y="1787538"/>
+            <a:ext cx="2239711" cy="2099114"/>
+          </a:xfrm>
+          <a:prstGeom prst="straightConnector1">
+            <a:avLst/>
+          </a:prstGeom>
+          <a:ln>
+            <a:tailEnd type="triangle"/>
+          </a:ln>
+        </p:spPr>
+        <p:style>
+          <a:lnRef idx="1">
+            <a:schemeClr val="accent1"/>
+          </a:lnRef>
+          <a:fillRef idx="0">
+            <a:schemeClr val="accent1"/>
+          </a:fillRef>
+          <a:effectRef idx="0">
+            <a:schemeClr val="accent1"/>
+          </a:effectRef>
+          <a:fontRef idx="minor">
+            <a:schemeClr val="tx1"/>
+          </a:fontRef>
+        </p:style>
+      </p:cxnSp>
+      <p:sp>
+        <p:nvSpPr>
+          <p:cNvPr id="76" name="TextBox 75"/>
+          <p:cNvSpPr txBox="1"/>
+          <p:nvPr/>
+        </p:nvSpPr>
+        <p:spPr>
+          <a:xfrm rot="19022726">
+            <a:off x="4900440" y="2138171"/>
+            <a:ext cx="1492646" cy="307777"/>
+          </a:xfrm>
+          <a:prstGeom prst="rect">
+            <a:avLst/>
+          </a:prstGeom>
+          <a:noFill/>
+        </p:spPr>
+        <p:txBody>
+          <a:bodyPr wrap="square" rtlCol="0">
+            <a:spAutoFit/>
+          </a:bodyPr>
+          <a:lstStyle/>
+          <a:p>
+            <a:r>
+              <a:rPr lang="en-US" sz="1400" dirty="0" smtClean="0"/>
+              <a:t>4. Token</a:t>
+            </a:r>
+            <a:endParaRPr lang="en-US" sz="1400" dirty="0"/>
+          </a:p>
+        </p:txBody>
+      </p:sp>
+      <p:cxnSp>
+        <p:nvCxnSpPr>
+          <p:cNvPr id="1047" name="Straight Arrow Connector 1046"/>
+          <p:cNvCxnSpPr/>
+          <p:nvPr/>
+        </p:nvCxnSpPr>
+        <p:spPr>
+          <a:xfrm flipV="1">
+            <a:off x="4108040" y="3832403"/>
+            <a:ext cx="3735162" cy="127568"/>
+          </a:xfrm>
+          <a:prstGeom prst="straightConnector1">
+            <a:avLst/>
+          </a:prstGeom>
+          <a:ln>
+            <a:tailEnd type="triangle"/>
+          </a:ln>
+        </p:spPr>
+        <p:style>
+          <a:lnRef idx="1">
+            <a:schemeClr val="accent1"/>
+          </a:lnRef>
+          <a:fillRef idx="0">
+            <a:schemeClr val="accent1"/>
+          </a:fillRef>
+          <a:effectRef idx="0">
+            <a:schemeClr val="accent1"/>
+          </a:effectRef>
+          <a:fontRef idx="minor">
+            <a:schemeClr val="tx1"/>
+          </a:fontRef>
+        </p:style>
+      </p:cxnSp>
+      <p:sp>
+        <p:nvSpPr>
+          <p:cNvPr id="92" name="TextBox 91"/>
+          <p:cNvSpPr txBox="1"/>
+          <p:nvPr/>
+        </p:nvSpPr>
+        <p:spPr>
+          <a:xfrm rot="21448092">
+            <a:off x="4245954" y="3615413"/>
+            <a:ext cx="3299849" cy="307777"/>
+          </a:xfrm>
+          <a:prstGeom prst="rect">
+            <a:avLst/>
+          </a:prstGeom>
+          <a:noFill/>
+        </p:spPr>
+        <p:txBody>
+          <a:bodyPr wrap="square" rtlCol="0">
+            <a:spAutoFit/>
+          </a:bodyPr>
+          <a:lstStyle/>
+          <a:p>
+            <a:r>
+              <a:rPr lang="en-US" sz="1400" dirty="0" smtClean="0"/>
+              <a:t>5. Resource request + Token + json payload</a:t>
+            </a:r>
+            <a:endParaRPr lang="en-US" sz="1400" dirty="0"/>
+          </a:p>
+        </p:txBody>
+      </p:sp>
+      <p:cxnSp>
+        <p:nvCxnSpPr>
+          <p:cNvPr id="1052" name="Straight Arrow Connector 1051"/>
+          <p:cNvCxnSpPr>
+            <a:stCxn id="32" idx="0"/>
+            <a:endCxn id="14" idx="3"/>
+          </p:cNvCxnSpPr>
+          <p:nvPr/>
+        </p:nvCxnSpPr>
+        <p:spPr>
+          <a:xfrm flipH="1" flipV="1">
+            <a:off x="6783841" y="1079230"/>
+            <a:ext cx="1599251" cy="1862877"/>
+          </a:xfrm>
+          <a:prstGeom prst="straightConnector1">
+            <a:avLst/>
+          </a:prstGeom>
+          <a:ln>
+            <a:tailEnd type="triangle"/>
+          </a:ln>
+        </p:spPr>
+        <p:style>
+          <a:lnRef idx="1">
+            <a:schemeClr val="accent1"/>
+          </a:lnRef>
+          <a:fillRef idx="0">
+            <a:schemeClr val="accent1"/>
+          </a:fillRef>
+          <a:effectRef idx="0">
+            <a:schemeClr val="accent1"/>
+          </a:effectRef>
+          <a:fontRef idx="minor">
+            <a:schemeClr val="tx1"/>
+          </a:fontRef>
+        </p:style>
+      </p:cxnSp>
+      <p:sp>
+        <p:nvSpPr>
+          <p:cNvPr id="97" name="TextBox 96"/>
+          <p:cNvSpPr txBox="1"/>
+          <p:nvPr/>
+        </p:nvSpPr>
+        <p:spPr>
+          <a:xfrm rot="2923262">
+            <a:off x="6625477" y="1837409"/>
+            <a:ext cx="2243925" cy="307777"/>
+          </a:xfrm>
+          <a:prstGeom prst="rect">
+            <a:avLst/>
+          </a:prstGeom>
+          <a:noFill/>
+        </p:spPr>
+        <p:txBody>
+          <a:bodyPr wrap="square" rtlCol="0">
+            <a:spAutoFit/>
+          </a:bodyPr>
+          <a:lstStyle/>
+          <a:p>
+            <a:r>
+              <a:rPr lang="en-US" sz="1400" dirty="0" smtClean="0"/>
+              <a:t>6. Token validation request</a:t>
+            </a:r>
+            <a:endParaRPr lang="en-US" sz="1400" dirty="0"/>
+          </a:p>
+        </p:txBody>
+      </p:sp>
+      <p:cxnSp>
+        <p:nvCxnSpPr>
+          <p:cNvPr id="1055" name="Straight Arrow Connector 1054"/>
+          <p:cNvCxnSpPr>
+            <a:endCxn id="1033" idx="3"/>
+          </p:cNvCxnSpPr>
+          <p:nvPr/>
+        </p:nvCxnSpPr>
+        <p:spPr>
+          <a:xfrm flipH="1">
+            <a:off x="4109704" y="4240035"/>
+            <a:ext cx="3685120" cy="42464"/>
+          </a:xfrm>
+          <a:prstGeom prst="straightConnector1">
+            <a:avLst/>
+          </a:prstGeom>
+          <a:ln>
+            <a:tailEnd type="triangle"/>
+          </a:ln>
+        </p:spPr>
+        <p:style>
+          <a:lnRef idx="1">
+            <a:schemeClr val="accent1"/>
+          </a:lnRef>
+          <a:fillRef idx="0">
+            <a:schemeClr val="accent1"/>
+          </a:fillRef>
+          <a:effectRef idx="0">
+            <a:schemeClr val="accent1"/>
+          </a:effectRef>
+          <a:fontRef idx="minor">
+            <a:schemeClr val="tx1"/>
+          </a:fontRef>
+        </p:style>
+      </p:cxnSp>
+      <p:sp>
+        <p:nvSpPr>
+          <p:cNvPr id="102" name="TextBox 101"/>
+          <p:cNvSpPr txBox="1"/>
+          <p:nvPr/>
+        </p:nvSpPr>
+        <p:spPr>
+          <a:xfrm>
+            <a:off x="4673174" y="4023096"/>
+            <a:ext cx="1650146" cy="307777"/>
+          </a:xfrm>
+          <a:prstGeom prst="rect">
+            <a:avLst/>
+          </a:prstGeom>
+          <a:noFill/>
+        </p:spPr>
+        <p:txBody>
+          <a:bodyPr wrap="square" rtlCol="0">
+            <a:spAutoFit/>
+          </a:bodyPr>
+          <a:lstStyle/>
+          <a:p>
+            <a:r>
+              <a:rPr lang="en-US" sz="1400" dirty="0" smtClean="0"/>
+              <a:t>7. Response (json)</a:t>
+            </a:r>
+            <a:endParaRPr lang="en-US" sz="1400" dirty="0"/>
           </a:p>
         </p:txBody>
       </p:sp>

</xml_diff>

<commit_message>
added shell pass to JPA, updated PPT
</commit_message>
<xml_diff>
--- a/Spring Boot.pptx
+++ b/Spring Boot.pptx
@@ -5,34 +5,37 @@
     <p:sldMasterId id="2147483648" r:id="rId1"/>
   </p:sldMasterIdLst>
   <p:notesMasterIdLst>
-    <p:notesMasterId r:id="rId24"/>
+    <p:notesMasterId r:id="rId27"/>
   </p:notesMasterIdLst>
   <p:handoutMasterIdLst>
-    <p:handoutMasterId r:id="rId25"/>
+    <p:handoutMasterId r:id="rId28"/>
   </p:handoutMasterIdLst>
   <p:sldIdLst>
     <p:sldId id="256" r:id="rId2"/>
-    <p:sldId id="257" r:id="rId3"/>
-    <p:sldId id="261" r:id="rId4"/>
-    <p:sldId id="263" r:id="rId5"/>
-    <p:sldId id="275" r:id="rId6"/>
-    <p:sldId id="276" r:id="rId7"/>
-    <p:sldId id="264" r:id="rId8"/>
-    <p:sldId id="277" r:id="rId9"/>
-    <p:sldId id="278" r:id="rId10"/>
-    <p:sldId id="258" r:id="rId11"/>
-    <p:sldId id="266" r:id="rId12"/>
-    <p:sldId id="269" r:id="rId13"/>
-    <p:sldId id="267" r:id="rId14"/>
-    <p:sldId id="265" r:id="rId15"/>
-    <p:sldId id="268" r:id="rId16"/>
-    <p:sldId id="270" r:id="rId17"/>
-    <p:sldId id="271" r:id="rId18"/>
-    <p:sldId id="272" r:id="rId19"/>
-    <p:sldId id="262" r:id="rId20"/>
-    <p:sldId id="259" r:id="rId21"/>
-    <p:sldId id="273" r:id="rId22"/>
-    <p:sldId id="274" r:id="rId23"/>
+    <p:sldId id="281" r:id="rId3"/>
+    <p:sldId id="257" r:id="rId4"/>
+    <p:sldId id="261" r:id="rId5"/>
+    <p:sldId id="263" r:id="rId6"/>
+    <p:sldId id="275" r:id="rId7"/>
+    <p:sldId id="276" r:id="rId8"/>
+    <p:sldId id="264" r:id="rId9"/>
+    <p:sldId id="279" r:id="rId10"/>
+    <p:sldId id="277" r:id="rId11"/>
+    <p:sldId id="278" r:id="rId12"/>
+    <p:sldId id="258" r:id="rId13"/>
+    <p:sldId id="266" r:id="rId14"/>
+    <p:sldId id="269" r:id="rId15"/>
+    <p:sldId id="267" r:id="rId16"/>
+    <p:sldId id="265" r:id="rId17"/>
+    <p:sldId id="268" r:id="rId18"/>
+    <p:sldId id="270" r:id="rId19"/>
+    <p:sldId id="271" r:id="rId20"/>
+    <p:sldId id="272" r:id="rId21"/>
+    <p:sldId id="262" r:id="rId22"/>
+    <p:sldId id="259" r:id="rId23"/>
+    <p:sldId id="273" r:id="rId24"/>
+    <p:sldId id="274" r:id="rId25"/>
+    <p:sldId id="280" r:id="rId26"/>
   </p:sldIdLst>
   <p:sldSz cx="12192000" cy="6858000"/>
   <p:notesSz cx="6858000" cy="9144000"/>
@@ -714,17 +717,28 @@
           <a:p>
             <a:r>
               <a:rPr lang="en-US" dirty="0" smtClean="0"/>
-              <a:t>Spring Boot makes it easy to create stand-alone, production-grade Spring based Applications that you can “just run”.  </a:t>
-            </a:r>
-          </a:p>
-          <a:p>
-            <a:endParaRPr lang="en-US" dirty="0" smtClean="0"/>
-          </a:p>
-          <a:p>
+              <a:t>Have </a:t>
+            </a:r>
+            <a:r>
+              <a:rPr lang="en-US" dirty="0" err="1" smtClean="0"/>
+              <a:t>jdk</a:t>
+            </a:r>
             <a:r>
               <a:rPr lang="en-US" dirty="0" smtClean="0"/>
-              <a:t>take an opinionated view</a:t>
-            </a:r>
+              <a:t>/bin</a:t>
+            </a:r>
+            <a:r>
+              <a:rPr lang="en-US" baseline="0" dirty="0" smtClean="0"/>
+              <a:t> folder open</a:t>
+            </a:r>
+          </a:p>
+          <a:p>
+            <a:r>
+              <a:rPr lang="en-US" baseline="0" dirty="0" smtClean="0"/>
+              <a:t>Have putty ready</a:t>
+            </a:r>
+          </a:p>
+          <a:p>
             <a:endParaRPr lang="en-US" dirty="0"/>
           </a:p>
         </p:txBody>
@@ -746,7 +760,7 @@
           <a:p>
             <a:fld id="{9F9FB9DD-7CF9-4A0C-8C7F-91FD9EF34B36}" type="slidenum">
               <a:rPr lang="en-US" smtClean="0"/>
-              <a:t>3</a:t>
+              <a:t>1</a:t>
             </a:fld>
             <a:endParaRPr lang="en-US" dirty="0"/>
           </a:p>
@@ -755,7 +769,7 @@
     </p:spTree>
     <p:extLst>
       <p:ext uri="{BB962C8B-B14F-4D97-AF65-F5344CB8AC3E}">
-        <p14:creationId xmlns:p14="http://schemas.microsoft.com/office/powerpoint/2010/main" val="639032137"/>
+        <p14:creationId xmlns:p14="http://schemas.microsoft.com/office/powerpoint/2010/main" val="1681202078"/>
       </p:ext>
     </p:extLst>
   </p:cSld>
@@ -893,6 +907,80 @@
           <a:bodyPr/>
           <a:lstStyle/>
           <a:p>
+            <a:pPr marL="0" marR="0" lvl="0" indent="0" algn="l" defTabSz="914400" rtl="0" eaLnBrk="1" fontAlgn="auto" latinLnBrk="0" hangingPunct="1">
+              <a:lnSpc>
+                <a:spcPct val="100000"/>
+              </a:lnSpc>
+              <a:spcBef>
+                <a:spcPts val="0"/>
+              </a:spcBef>
+              <a:spcAft>
+                <a:spcPts val="0"/>
+              </a:spcAft>
+              <a:buClrTx/>
+              <a:buSzTx/>
+              <a:buFontTx/>
+              <a:buNone/>
+              <a:tabLst/>
+              <a:defRPr/>
+            </a:pPr>
+            <a:r>
+              <a:rPr lang="en-US" altLang="en-US" dirty="0" smtClean="0">
+                <a:ea typeface="Times New Roman" pitchFamily="18" charset="0"/>
+              </a:rPr>
+              <a:t>You could call SOAP a </a:t>
+            </a:r>
+            <a:r>
+              <a:rPr lang="en-US" altLang="en-US" b="1" dirty="0" smtClean="0">
+                <a:ea typeface="Times New Roman" pitchFamily="18" charset="0"/>
+              </a:rPr>
+              <a:t>Level 0</a:t>
+            </a:r>
+            <a:r>
+              <a:rPr lang="en-US" altLang="en-US" dirty="0" smtClean="0">
+                <a:ea typeface="Times New Roman" pitchFamily="18" charset="0"/>
+              </a:rPr>
+              <a:t> technology. It uses HTTP, but as a transport. It’s worth mentioning that you could also use SOAP </a:t>
+            </a:r>
+            <a:r>
+              <a:rPr lang="en-US" altLang="en-US" dirty="0" smtClean="0">
+                <a:ea typeface="Times New Roman" pitchFamily="18" charset="0"/>
+                <a:hlinkClick r:id="rId3"/>
+              </a:rPr>
+              <a:t>on top of something like JMS</a:t>
+            </a:r>
+            <a:r>
+              <a:rPr lang="en-US" altLang="en-US" dirty="0" smtClean="0">
+                <a:ea typeface="Times New Roman" pitchFamily="18" charset="0"/>
+              </a:rPr>
+              <a:t> with no HTTP at all. SOAP, thus, is </a:t>
+            </a:r>
+            <a:r>
+              <a:rPr lang="en-US" altLang="en-US" i="1" dirty="0" smtClean="0">
+                <a:ea typeface="Times New Roman" pitchFamily="18" charset="0"/>
+              </a:rPr>
+              <a:t>not</a:t>
+            </a:r>
+            <a:r>
+              <a:rPr lang="en-US" altLang="en-US" dirty="0" smtClean="0">
+                <a:ea typeface="Times New Roman" pitchFamily="18" charset="0"/>
+              </a:rPr>
+              <a:t> RESTful. It’s only just HTTP-aware.</a:t>
+            </a:r>
+            <a:endParaRPr kumimoji="0" lang="en-US" altLang="en-US" b="0" i="0" u="none" strike="noStrike" cap="none" normalizeH="0" baseline="0" dirty="0" smtClean="0">
+              <a:ln>
+                <a:noFill/>
+              </a:ln>
+              <a:solidFill>
+                <a:schemeClr val="tx1"/>
+              </a:solidFill>
+              <a:effectLst/>
+              <a:latin typeface="Arial" pitchFamily="34" charset="0"/>
+              <a:ea typeface="Times New Roman" pitchFamily="18" charset="0"/>
+              <a:cs typeface="Arial" pitchFamily="34" charset="0"/>
+            </a:endParaRPr>
+          </a:p>
+          <a:p>
             <a:endParaRPr lang="en-US" dirty="0"/>
           </a:p>
         </p:txBody>
@@ -923,7 +1011,7 @@
     </p:spTree>
     <p:extLst>
       <p:ext uri="{BB962C8B-B14F-4D97-AF65-F5344CB8AC3E}">
-        <p14:creationId xmlns:p14="http://schemas.microsoft.com/office/powerpoint/2010/main" val="2110186832"/>
+        <p14:creationId xmlns:p14="http://schemas.microsoft.com/office/powerpoint/2010/main" val="1321528369"/>
       </p:ext>
     </p:extLst>
   </p:cSld>
@@ -1061,14 +1149,6 @@
           <a:bodyPr/>
           <a:lstStyle/>
           <a:p>
-            <a:r>
-              <a:rPr lang="en-US" b="1" dirty="0" smtClean="0"/>
-              <a:t>component</a:t>
-            </a:r>
-            <a:r>
-              <a:rPr lang="en-US" dirty="0" smtClean="0"/>
-              <a:t> is a unit of software that is independently replaceable and upgradeable.</a:t>
-            </a:r>
             <a:endParaRPr lang="en-US" dirty="0"/>
           </a:p>
         </p:txBody>
@@ -1090,7 +1170,7 @@
           <a:p>
             <a:fld id="{9F9FB9DD-7CF9-4A0C-8C7F-91FD9EF34B36}" type="slidenum">
               <a:rPr lang="en-US" smtClean="0"/>
-              <a:t>19</a:t>
+              <a:t>18</a:t>
             </a:fld>
             <a:endParaRPr lang="en-US" dirty="0"/>
           </a:p>
@@ -1099,7 +1179,7 @@
     </p:spTree>
     <p:extLst>
       <p:ext uri="{BB962C8B-B14F-4D97-AF65-F5344CB8AC3E}">
-        <p14:creationId xmlns:p14="http://schemas.microsoft.com/office/powerpoint/2010/main" val="2056578434"/>
+        <p14:creationId xmlns:p14="http://schemas.microsoft.com/office/powerpoint/2010/main" val="2110186832"/>
       </p:ext>
     </p:extLst>
   </p:cSld>
@@ -1174,7 +1254,7 @@
           <a:p>
             <a:fld id="{9F9FB9DD-7CF9-4A0C-8C7F-91FD9EF34B36}" type="slidenum">
               <a:rPr lang="en-US" smtClean="0"/>
-              <a:t>20</a:t>
+              <a:t>19</a:t>
             </a:fld>
             <a:endParaRPr lang="en-US" dirty="0"/>
           </a:p>
@@ -1183,7 +1263,7 @@
     </p:spTree>
     <p:extLst>
       <p:ext uri="{BB962C8B-B14F-4D97-AF65-F5344CB8AC3E}">
-        <p14:creationId xmlns:p14="http://schemas.microsoft.com/office/powerpoint/2010/main" val="4276762252"/>
+        <p14:creationId xmlns:p14="http://schemas.microsoft.com/office/powerpoint/2010/main" val="2110186832"/>
       </p:ext>
     </p:extLst>
   </p:cSld>
@@ -1237,6 +1317,14 @@
           <a:bodyPr/>
           <a:lstStyle/>
           <a:p>
+            <a:r>
+              <a:rPr lang="en-US" b="1" dirty="0" smtClean="0"/>
+              <a:t>component</a:t>
+            </a:r>
+            <a:r>
+              <a:rPr lang="en-US" dirty="0" smtClean="0"/>
+              <a:t> is a unit of software that is independently replaceable and upgradeable.</a:t>
+            </a:r>
             <a:endParaRPr lang="en-US" dirty="0"/>
           </a:p>
         </p:txBody>
@@ -1267,7 +1355,7 @@
     </p:spTree>
     <p:extLst>
       <p:ext uri="{BB962C8B-B14F-4D97-AF65-F5344CB8AC3E}">
-        <p14:creationId xmlns:p14="http://schemas.microsoft.com/office/powerpoint/2010/main" val="4276762252"/>
+        <p14:creationId xmlns:p14="http://schemas.microsoft.com/office/powerpoint/2010/main" val="2056578434"/>
       </p:ext>
     </p:extLst>
   </p:cSld>
@@ -1343,6 +1431,174 @@
             <a:fld id="{9F9FB9DD-7CF9-4A0C-8C7F-91FD9EF34B36}" type="slidenum">
               <a:rPr lang="en-US" smtClean="0"/>
               <a:t>22</a:t>
+            </a:fld>
+            <a:endParaRPr lang="en-US" dirty="0"/>
+          </a:p>
+        </p:txBody>
+      </p:sp>
+    </p:spTree>
+    <p:extLst>
+      <p:ext uri="{BB962C8B-B14F-4D97-AF65-F5344CB8AC3E}">
+        <p14:creationId xmlns:p14="http://schemas.microsoft.com/office/powerpoint/2010/main" val="4276762252"/>
+      </p:ext>
+    </p:extLst>
+  </p:cSld>
+  <p:clrMapOvr>
+    <a:masterClrMapping/>
+  </p:clrMapOvr>
+</p:notes>
+</file>
+
+<file path=ppt/notesSlides/notesSlide17.xml><?xml version="1.0" encoding="utf-8"?>
+<p:notes xmlns:a="http://schemas.openxmlformats.org/drawingml/2006/main" xmlns:r="http://schemas.openxmlformats.org/officeDocument/2006/relationships" xmlns:p="http://schemas.openxmlformats.org/presentationml/2006/main">
+  <p:cSld>
+    <p:spTree>
+      <p:nvGrpSpPr>
+        <p:cNvPr id="1" name=""/>
+        <p:cNvGrpSpPr/>
+        <p:nvPr/>
+      </p:nvGrpSpPr>
+      <p:grpSpPr>
+        <a:xfrm>
+          <a:off x="0" y="0"/>
+          <a:ext cx="0" cy="0"/>
+          <a:chOff x="0" y="0"/>
+          <a:chExt cx="0" cy="0"/>
+        </a:xfrm>
+      </p:grpSpPr>
+      <p:sp>
+        <p:nvSpPr>
+          <p:cNvPr id="2" name="Slide Image Placeholder 1"/>
+          <p:cNvSpPr>
+            <a:spLocks noGrp="1" noRot="1" noChangeAspect="1"/>
+          </p:cNvSpPr>
+          <p:nvPr>
+            <p:ph type="sldImg"/>
+          </p:nvPr>
+        </p:nvSpPr>
+        <p:spPr/>
+      </p:sp>
+      <p:sp>
+        <p:nvSpPr>
+          <p:cNvPr id="3" name="Notes Placeholder 2"/>
+          <p:cNvSpPr>
+            <a:spLocks noGrp="1"/>
+          </p:cNvSpPr>
+          <p:nvPr>
+            <p:ph type="body" idx="1"/>
+          </p:nvPr>
+        </p:nvSpPr>
+        <p:spPr/>
+        <p:txBody>
+          <a:bodyPr/>
+          <a:lstStyle/>
+          <a:p>
+            <a:endParaRPr lang="en-US" dirty="0"/>
+          </a:p>
+        </p:txBody>
+      </p:sp>
+      <p:sp>
+        <p:nvSpPr>
+          <p:cNvPr id="4" name="Slide Number Placeholder 3"/>
+          <p:cNvSpPr>
+            <a:spLocks noGrp="1"/>
+          </p:cNvSpPr>
+          <p:nvPr>
+            <p:ph type="sldNum" sz="quarter" idx="10"/>
+          </p:nvPr>
+        </p:nvSpPr>
+        <p:spPr/>
+        <p:txBody>
+          <a:bodyPr/>
+          <a:lstStyle/>
+          <a:p>
+            <a:fld id="{9F9FB9DD-7CF9-4A0C-8C7F-91FD9EF34B36}" type="slidenum">
+              <a:rPr lang="en-US" smtClean="0"/>
+              <a:t>23</a:t>
+            </a:fld>
+            <a:endParaRPr lang="en-US" dirty="0"/>
+          </a:p>
+        </p:txBody>
+      </p:sp>
+    </p:spTree>
+    <p:extLst>
+      <p:ext uri="{BB962C8B-B14F-4D97-AF65-F5344CB8AC3E}">
+        <p14:creationId xmlns:p14="http://schemas.microsoft.com/office/powerpoint/2010/main" val="4276762252"/>
+      </p:ext>
+    </p:extLst>
+  </p:cSld>
+  <p:clrMapOvr>
+    <a:masterClrMapping/>
+  </p:clrMapOvr>
+</p:notes>
+</file>
+
+<file path=ppt/notesSlides/notesSlide18.xml><?xml version="1.0" encoding="utf-8"?>
+<p:notes xmlns:a="http://schemas.openxmlformats.org/drawingml/2006/main" xmlns:r="http://schemas.openxmlformats.org/officeDocument/2006/relationships" xmlns:p="http://schemas.openxmlformats.org/presentationml/2006/main">
+  <p:cSld>
+    <p:spTree>
+      <p:nvGrpSpPr>
+        <p:cNvPr id="1" name=""/>
+        <p:cNvGrpSpPr/>
+        <p:nvPr/>
+      </p:nvGrpSpPr>
+      <p:grpSpPr>
+        <a:xfrm>
+          <a:off x="0" y="0"/>
+          <a:ext cx="0" cy="0"/>
+          <a:chOff x="0" y="0"/>
+          <a:chExt cx="0" cy="0"/>
+        </a:xfrm>
+      </p:grpSpPr>
+      <p:sp>
+        <p:nvSpPr>
+          <p:cNvPr id="2" name="Slide Image Placeholder 1"/>
+          <p:cNvSpPr>
+            <a:spLocks noGrp="1" noRot="1" noChangeAspect="1"/>
+          </p:cNvSpPr>
+          <p:nvPr>
+            <p:ph type="sldImg"/>
+          </p:nvPr>
+        </p:nvSpPr>
+        <p:spPr/>
+      </p:sp>
+      <p:sp>
+        <p:nvSpPr>
+          <p:cNvPr id="3" name="Notes Placeholder 2"/>
+          <p:cNvSpPr>
+            <a:spLocks noGrp="1"/>
+          </p:cNvSpPr>
+          <p:nvPr>
+            <p:ph type="body" idx="1"/>
+          </p:nvPr>
+        </p:nvSpPr>
+        <p:spPr/>
+        <p:txBody>
+          <a:bodyPr/>
+          <a:lstStyle/>
+          <a:p>
+            <a:endParaRPr lang="en-US" dirty="0"/>
+          </a:p>
+        </p:txBody>
+      </p:sp>
+      <p:sp>
+        <p:nvSpPr>
+          <p:cNvPr id="4" name="Slide Number Placeholder 3"/>
+          <p:cNvSpPr>
+            <a:spLocks noGrp="1"/>
+          </p:cNvSpPr>
+          <p:nvPr>
+            <p:ph type="sldNum" sz="quarter" idx="10"/>
+          </p:nvPr>
+        </p:nvSpPr>
+        <p:spPr/>
+        <p:txBody>
+          <a:bodyPr/>
+          <a:lstStyle/>
+          <a:p>
+            <a:fld id="{9F9FB9DD-7CF9-4A0C-8C7F-91FD9EF34B36}" type="slidenum">
+              <a:rPr lang="en-US" smtClean="0"/>
+              <a:t>24</a:t>
             </a:fld>
             <a:endParaRPr lang="en-US" dirty="0"/>
           </a:p>
@@ -1407,8 +1663,28 @@
           <a:p>
             <a:r>
               <a:rPr lang="en-US" dirty="0" smtClean="0"/>
-              <a:t>Example:</a:t>
-            </a:r>
+              <a:t>Have </a:t>
+            </a:r>
+            <a:r>
+              <a:rPr lang="en-US" dirty="0" err="1" smtClean="0"/>
+              <a:t>jdk</a:t>
+            </a:r>
+            <a:r>
+              <a:rPr lang="en-US" dirty="0" smtClean="0"/>
+              <a:t>/bin</a:t>
+            </a:r>
+            <a:r>
+              <a:rPr lang="en-US" baseline="0" dirty="0" smtClean="0"/>
+              <a:t> folder open</a:t>
+            </a:r>
+          </a:p>
+          <a:p>
+            <a:r>
+              <a:rPr lang="en-US" baseline="0" smtClean="0"/>
+              <a:t>Have putty ready</a:t>
+            </a:r>
+          </a:p>
+          <a:p>
             <a:endParaRPr lang="en-US" dirty="0"/>
           </a:p>
         </p:txBody>
@@ -1430,7 +1706,7 @@
           <a:p>
             <a:fld id="{9F9FB9DD-7CF9-4A0C-8C7F-91FD9EF34B36}" type="slidenum">
               <a:rPr lang="en-US" smtClean="0"/>
-              <a:t>4</a:t>
+              <a:t>2</a:t>
             </a:fld>
             <a:endParaRPr lang="en-US" dirty="0"/>
           </a:p>
@@ -1439,7 +1715,7 @@
     </p:spTree>
     <p:extLst>
       <p:ext uri="{BB962C8B-B14F-4D97-AF65-F5344CB8AC3E}">
-        <p14:creationId xmlns:p14="http://schemas.microsoft.com/office/powerpoint/2010/main" val="3644509374"/>
+        <p14:creationId xmlns:p14="http://schemas.microsoft.com/office/powerpoint/2010/main" val="1011997961"/>
       </p:ext>
     </p:extLst>
   </p:cSld>
@@ -1495,7 +1771,16 @@
           <a:p>
             <a:r>
               <a:rPr lang="en-US" dirty="0" smtClean="0"/>
-              <a:t>Example:</a:t>
+              <a:t>Spring Boot makes it easy to create stand-alone, production-grade Spring based Applications that you can “just run”.  </a:t>
+            </a:r>
+          </a:p>
+          <a:p>
+            <a:endParaRPr lang="en-US" dirty="0" smtClean="0"/>
+          </a:p>
+          <a:p>
+            <a:r>
+              <a:rPr lang="en-US" dirty="0" smtClean="0"/>
+              <a:t>take an opinionated view</a:t>
             </a:r>
             <a:endParaRPr lang="en-US" dirty="0"/>
           </a:p>
@@ -1518,7 +1803,7 @@
           <a:p>
             <a:fld id="{9F9FB9DD-7CF9-4A0C-8C7F-91FD9EF34B36}" type="slidenum">
               <a:rPr lang="en-US" smtClean="0"/>
-              <a:t>5</a:t>
+              <a:t>4</a:t>
             </a:fld>
             <a:endParaRPr lang="en-US" dirty="0"/>
           </a:p>
@@ -1527,7 +1812,7 @@
     </p:spTree>
     <p:extLst>
       <p:ext uri="{BB962C8B-B14F-4D97-AF65-F5344CB8AC3E}">
-        <p14:creationId xmlns:p14="http://schemas.microsoft.com/office/powerpoint/2010/main" val="2695060157"/>
+        <p14:creationId xmlns:p14="http://schemas.microsoft.com/office/powerpoint/2010/main" val="639032137"/>
       </p:ext>
     </p:extLst>
   </p:cSld>
@@ -1582,12 +1867,8 @@
           <a:lstStyle/>
           <a:p>
             <a:r>
-              <a:rPr lang="en-US" dirty="0" err="1" smtClean="0"/>
-              <a:t>Gradle</a:t>
-            </a:r>
-            <a:r>
               <a:rPr lang="en-US" dirty="0" smtClean="0"/>
-              <a:t> and Ant are also supported</a:t>
+              <a:t>Example:</a:t>
             </a:r>
             <a:endParaRPr lang="en-US" dirty="0"/>
           </a:p>
@@ -1610,7 +1891,7 @@
           <a:p>
             <a:fld id="{9F9FB9DD-7CF9-4A0C-8C7F-91FD9EF34B36}" type="slidenum">
               <a:rPr lang="en-US" smtClean="0"/>
-              <a:t>6</a:t>
+              <a:t>5</a:t>
             </a:fld>
             <a:endParaRPr lang="en-US" dirty="0"/>
           </a:p>
@@ -1619,7 +1900,7 @@
     </p:spTree>
     <p:extLst>
       <p:ext uri="{BB962C8B-B14F-4D97-AF65-F5344CB8AC3E}">
-        <p14:creationId xmlns:p14="http://schemas.microsoft.com/office/powerpoint/2010/main" val="3359930110"/>
+        <p14:creationId xmlns:p14="http://schemas.microsoft.com/office/powerpoint/2010/main" val="3644509374"/>
       </p:ext>
     </p:extLst>
   </p:cSld>
@@ -1673,6 +1954,10 @@
           <a:bodyPr/>
           <a:lstStyle/>
           <a:p>
+            <a:r>
+              <a:rPr lang="en-US" dirty="0" smtClean="0"/>
+              <a:t>Example:</a:t>
+            </a:r>
             <a:endParaRPr lang="en-US" dirty="0"/>
           </a:p>
         </p:txBody>
@@ -1694,7 +1979,7 @@
           <a:p>
             <a:fld id="{9F9FB9DD-7CF9-4A0C-8C7F-91FD9EF34B36}" type="slidenum">
               <a:rPr lang="en-US" smtClean="0"/>
-              <a:t>10</a:t>
+              <a:t>6</a:t>
             </a:fld>
             <a:endParaRPr lang="en-US" dirty="0"/>
           </a:p>
@@ -1703,7 +1988,7 @@
     </p:spTree>
     <p:extLst>
       <p:ext uri="{BB962C8B-B14F-4D97-AF65-F5344CB8AC3E}">
-        <p14:creationId xmlns:p14="http://schemas.microsoft.com/office/powerpoint/2010/main" val="2110186832"/>
+        <p14:creationId xmlns:p14="http://schemas.microsoft.com/office/powerpoint/2010/main" val="2695060157"/>
       </p:ext>
     </p:extLst>
   </p:cSld>
@@ -1757,6 +2042,14 @@
           <a:bodyPr/>
           <a:lstStyle/>
           <a:p>
+            <a:r>
+              <a:rPr lang="en-US" dirty="0" err="1" smtClean="0"/>
+              <a:t>Gradle</a:t>
+            </a:r>
+            <a:r>
+              <a:rPr lang="en-US" dirty="0" smtClean="0"/>
+              <a:t> and Ant are also supported</a:t>
+            </a:r>
             <a:endParaRPr lang="en-US" dirty="0"/>
           </a:p>
         </p:txBody>
@@ -1778,7 +2071,7 @@
           <a:p>
             <a:fld id="{9F9FB9DD-7CF9-4A0C-8C7F-91FD9EF34B36}" type="slidenum">
               <a:rPr lang="en-US" smtClean="0"/>
-              <a:t>11</a:t>
+              <a:t>7</a:t>
             </a:fld>
             <a:endParaRPr lang="en-US" dirty="0"/>
           </a:p>
@@ -1787,7 +2080,7 @@
     </p:spTree>
     <p:extLst>
       <p:ext uri="{BB962C8B-B14F-4D97-AF65-F5344CB8AC3E}">
-        <p14:creationId xmlns:p14="http://schemas.microsoft.com/office/powerpoint/2010/main" val="2110186832"/>
+        <p14:creationId xmlns:p14="http://schemas.microsoft.com/office/powerpoint/2010/main" val="3359930110"/>
       </p:ext>
     </p:extLst>
   </p:cSld>
@@ -2009,80 +2302,6 @@
           <a:bodyPr/>
           <a:lstStyle/>
           <a:p>
-            <a:pPr marL="0" marR="0" lvl="0" indent="0" algn="l" defTabSz="914400" rtl="0" eaLnBrk="1" fontAlgn="auto" latinLnBrk="0" hangingPunct="1">
-              <a:lnSpc>
-                <a:spcPct val="100000"/>
-              </a:lnSpc>
-              <a:spcBef>
-                <a:spcPts val="0"/>
-              </a:spcBef>
-              <a:spcAft>
-                <a:spcPts val="0"/>
-              </a:spcAft>
-              <a:buClrTx/>
-              <a:buSzTx/>
-              <a:buFontTx/>
-              <a:buNone/>
-              <a:tabLst/>
-              <a:defRPr/>
-            </a:pPr>
-            <a:r>
-              <a:rPr lang="en-US" altLang="en-US" dirty="0" smtClean="0">
-                <a:ea typeface="Times New Roman" pitchFamily="18" charset="0"/>
-              </a:rPr>
-              <a:t>You could call SOAP a </a:t>
-            </a:r>
-            <a:r>
-              <a:rPr lang="en-US" altLang="en-US" b="1" dirty="0" smtClean="0">
-                <a:ea typeface="Times New Roman" pitchFamily="18" charset="0"/>
-              </a:rPr>
-              <a:t>Level 0</a:t>
-            </a:r>
-            <a:r>
-              <a:rPr lang="en-US" altLang="en-US" dirty="0" smtClean="0">
-                <a:ea typeface="Times New Roman" pitchFamily="18" charset="0"/>
-              </a:rPr>
-              <a:t> technology. It uses HTTP, but as a transport. It’s worth mentioning that you could also use SOAP </a:t>
-            </a:r>
-            <a:r>
-              <a:rPr lang="en-US" altLang="en-US" dirty="0" smtClean="0">
-                <a:ea typeface="Times New Roman" pitchFamily="18" charset="0"/>
-                <a:hlinkClick r:id="rId3"/>
-              </a:rPr>
-              <a:t>on top of something like JMS</a:t>
-            </a:r>
-            <a:r>
-              <a:rPr lang="en-US" altLang="en-US" dirty="0" smtClean="0">
-                <a:ea typeface="Times New Roman" pitchFamily="18" charset="0"/>
-              </a:rPr>
-              <a:t> with no HTTP at all. SOAP, thus, is </a:t>
-            </a:r>
-            <a:r>
-              <a:rPr lang="en-US" altLang="en-US" i="1" dirty="0" smtClean="0">
-                <a:ea typeface="Times New Roman" pitchFamily="18" charset="0"/>
-              </a:rPr>
-              <a:t>not</a:t>
-            </a:r>
-            <a:r>
-              <a:rPr lang="en-US" altLang="en-US" dirty="0" smtClean="0">
-                <a:ea typeface="Times New Roman" pitchFamily="18" charset="0"/>
-              </a:rPr>
-              <a:t> RESTful. It’s only just HTTP-aware.</a:t>
-            </a:r>
-            <a:endParaRPr kumimoji="0" lang="en-US" altLang="en-US" b="0" i="0" u="none" strike="noStrike" cap="none" normalizeH="0" baseline="0" dirty="0" smtClean="0">
-              <a:ln>
-                <a:noFill/>
-              </a:ln>
-              <a:solidFill>
-                <a:schemeClr val="tx1"/>
-              </a:solidFill>
-              <a:effectLst/>
-              <a:latin typeface="Arial" pitchFamily="34" charset="0"/>
-              <a:ea typeface="Times New Roman" pitchFamily="18" charset="0"/>
-              <a:cs typeface="Arial" pitchFamily="34" charset="0"/>
-            </a:endParaRPr>
-          </a:p>
-          <a:p>
             <a:endParaRPr lang="en-US" dirty="0"/>
           </a:p>
         </p:txBody>
@@ -2113,7 +2332,7 @@
     </p:spTree>
     <p:extLst>
       <p:ext uri="{BB962C8B-B14F-4D97-AF65-F5344CB8AC3E}">
-        <p14:creationId xmlns:p14="http://schemas.microsoft.com/office/powerpoint/2010/main" val="1321528369"/>
+        <p14:creationId xmlns:p14="http://schemas.microsoft.com/office/powerpoint/2010/main" val="2110186832"/>
       </p:ext>
     </p:extLst>
   </p:cSld>
@@ -4990,7 +5209,12 @@
             <p:ph type="ctrTitle"/>
           </p:nvPr>
         </p:nvSpPr>
-        <p:spPr/>
+        <p:spPr>
+          <a:xfrm>
+            <a:off x="1523999" y="2096718"/>
+            <a:ext cx="9144000" cy="2387600"/>
+          </a:xfrm>
+        </p:spPr>
         <p:txBody>
           <a:bodyPr/>
           <a:lstStyle/>
@@ -5005,35 +5229,58 @@
       </p:sp>
       <p:sp>
         <p:nvSpPr>
-          <p:cNvPr id="3" name="Subtitle 2"/>
-          <p:cNvSpPr>
-            <a:spLocks noGrp="1"/>
-          </p:cNvSpPr>
-          <p:nvPr>
-            <p:ph type="subTitle" idx="1"/>
-          </p:nvPr>
-        </p:nvSpPr>
-        <p:spPr/>
-        <p:txBody>
-          <a:bodyPr/>
-          <a:lstStyle/>
-          <a:p>
-            <a:r>
-              <a:rPr lang="en-US" dirty="0" smtClean="0"/>
-              <a:t>Building '</a:t>
-            </a:r>
-            <a:r>
-              <a:rPr lang="en-US" dirty="0" err="1" smtClean="0"/>
-              <a:t>Bootiful</a:t>
-            </a:r>
-            <a:r>
-              <a:rPr lang="en-US" dirty="0" smtClean="0"/>
-              <a:t>' Applications with Spring Boot</a:t>
-            </a:r>
-            <a:endParaRPr lang="en-US" dirty="0"/>
-          </a:p>
-        </p:txBody>
-      </p:sp>
+          <p:cNvPr id="4" name="TextBox 3"/>
+          <p:cNvSpPr txBox="1"/>
+          <p:nvPr/>
+        </p:nvSpPr>
+        <p:spPr>
+          <a:xfrm>
+            <a:off x="4668032" y="4484318"/>
+            <a:ext cx="2855935" cy="461665"/>
+          </a:xfrm>
+          <a:prstGeom prst="rect">
+            <a:avLst/>
+          </a:prstGeom>
+          <a:noFill/>
+        </p:spPr>
+        <p:txBody>
+          <a:bodyPr wrap="square" rtlCol="0">
+            <a:spAutoFit/>
+          </a:bodyPr>
+          <a:lstStyle/>
+          <a:p>
+            <a:r>
+              <a:rPr lang="en-US" sz="2400" b="1" dirty="0" smtClean="0"/>
+              <a:t>Prashanth Batchu</a:t>
+            </a:r>
+            <a:endParaRPr lang="en-US" sz="2400" b="1" dirty="0"/>
+          </a:p>
+        </p:txBody>
+      </p:sp>
+      <p:pic>
+        <p:nvPicPr>
+          <p:cNvPr id="6" name="Picture 5"/>
+          <p:cNvPicPr>
+            <a:picLocks noChangeAspect="1"/>
+          </p:cNvPicPr>
+          <p:nvPr/>
+        </p:nvPicPr>
+        <p:blipFill>
+          <a:blip r:embed="rId3"/>
+          <a:stretch>
+            <a:fillRect/>
+          </a:stretch>
+        </p:blipFill>
+        <p:spPr>
+          <a:xfrm>
+            <a:off x="5710236" y="2109940"/>
+            <a:ext cx="771525" cy="762000"/>
+          </a:xfrm>
+          <a:prstGeom prst="rect">
+            <a:avLst/>
+          </a:prstGeom>
+        </p:spPr>
+      </p:pic>
     </p:spTree>
     <p:extLst>
       <p:ext uri="{BB962C8B-B14F-4D97-AF65-F5344CB8AC3E}">
@@ -5088,32 +5335,9 @@
           <a:p>
             <a:r>
               <a:rPr lang="en-US" dirty="0" smtClean="0"/>
-              <a:t>REST – </a:t>
-            </a:r>
-            <a:r>
-              <a:rPr lang="en-US" b="1" dirty="0"/>
-              <a:t>Re</a:t>
-            </a:r>
-            <a:r>
-              <a:rPr lang="en-US" dirty="0"/>
-              <a:t>presentational </a:t>
-            </a:r>
-            <a:r>
-              <a:rPr lang="en-US" b="1" dirty="0"/>
-              <a:t>S</a:t>
-            </a:r>
-            <a:r>
-              <a:rPr lang="en-US" dirty="0"/>
-              <a:t>tate </a:t>
-            </a:r>
-            <a:r>
-              <a:rPr lang="en-US" b="1" dirty="0"/>
-              <a:t>T</a:t>
-            </a:r>
-            <a:r>
-              <a:rPr lang="en-US" dirty="0"/>
-              <a:t>ransfer</a:t>
-            </a:r>
+              <a:t>Spring Boot - Features</a:t>
+            </a:r>
+            <a:endParaRPr lang="en-US" dirty="0"/>
           </a:p>
         </p:txBody>
       </p:sp>
@@ -5127,115 +5351,118 @@
             <p:ph idx="1"/>
           </p:nvPr>
         </p:nvSpPr>
-        <p:spPr>
-          <a:xfrm>
-            <a:off x="838200" y="1287887"/>
-            <a:ext cx="11023242" cy="4889076"/>
-          </a:xfrm>
-        </p:spPr>
+        <p:spPr/>
         <p:txBody>
           <a:bodyPr>
-            <a:normAutofit/>
+            <a:normAutofit lnSpcReduction="10000"/>
           </a:bodyPr>
           <a:lstStyle/>
           <a:p>
-            <a:pPr marL="0" indent="0">
-              <a:buNone/>
-            </a:pPr>
-            <a:endParaRPr lang="en-US" b="1" dirty="0" smtClean="0"/>
-          </a:p>
-          <a:p>
-            <a:r>
-              <a:rPr lang="en-US" dirty="0" smtClean="0"/>
-              <a:t>Introduced in Roy Fielding’s dissertation submitted to UC, Irvine in 2000</a:t>
-            </a:r>
-          </a:p>
-          <a:p>
-            <a:r>
-              <a:rPr lang="en-US" dirty="0" smtClean="0"/>
-              <a:t>It’s an </a:t>
-            </a:r>
-            <a:r>
-              <a:rPr lang="en-US" dirty="0"/>
-              <a:t>architecture style for designing networked applications</a:t>
-            </a:r>
-            <a:r>
-              <a:rPr lang="en-US" dirty="0" smtClean="0"/>
-              <a:t>. It’s not a protocol, standard or a framework</a:t>
-            </a:r>
-          </a:p>
-          <a:p>
-            <a:r>
-              <a:rPr lang="en-US" dirty="0" smtClean="0"/>
-              <a:t>Resource-based – REST API is all about “things” or “resources” as opposed to “actions” (as verbs/methods/actions  in SOAP)</a:t>
-            </a:r>
-          </a:p>
-          <a:p>
-            <a:r>
-              <a:rPr lang="en-US" dirty="0" smtClean="0"/>
-              <a:t>Representations – Typically JSON/XML or could be anything that represents a part or the whole of the resource state</a:t>
-            </a:r>
-          </a:p>
-          <a:p>
-            <a:r>
-              <a:rPr lang="en-US" dirty="0" smtClean="0"/>
-              <a:t>Not tied to HTTP, but most commonly associated with it</a:t>
-            </a:r>
-          </a:p>
-        </p:txBody>
-      </p:sp>
-      <p:sp>
-        <p:nvSpPr>
-          <p:cNvPr id="4" name="TextBox 3"/>
-          <p:cNvSpPr txBox="1"/>
-          <p:nvPr/>
-        </p:nvSpPr>
-        <p:spPr>
-          <a:xfrm>
-            <a:off x="914400" y="6284889"/>
-            <a:ext cx="3515932" cy="276999"/>
-          </a:xfrm>
-          <a:prstGeom prst="rect">
-            <a:avLst/>
-          </a:prstGeom>
-          <a:noFill/>
-        </p:spPr>
-        <p:txBody>
-          <a:bodyPr wrap="square" rtlCol="0">
-            <a:spAutoFit/>
-          </a:bodyPr>
-          <a:lstStyle/>
-          <a:p>
-            <a:r>
-              <a:rPr lang="en-US" sz="1200" i="1" dirty="0" smtClean="0"/>
-              <a:t>Ref</a:t>
-            </a:r>
-            <a:r>
-              <a:rPr lang="en-US" sz="1200" i="1" dirty="0" smtClean="0">
+            <a:r>
+              <a:rPr lang="en-US" dirty="0" smtClean="0">
+                <a:hlinkClick r:id="rId2"/>
+              </a:rPr>
+              <a:t>Externalized </a:t>
+            </a:r>
+            <a:r>
+              <a:rPr lang="en-US" dirty="0" err="1" smtClean="0">
+                <a:hlinkClick r:id="rId2"/>
+              </a:rPr>
+              <a:t>Config</a:t>
+            </a:r>
+            <a:endParaRPr lang="en-US" dirty="0" smtClean="0"/>
+          </a:p>
+          <a:p>
+            <a:r>
+              <a:rPr lang="en-US" dirty="0" smtClean="0">
+                <a:hlinkClick r:id="rId2"/>
+              </a:rPr>
+              <a:t>Profiles</a:t>
+            </a:r>
+            <a:endParaRPr lang="en-US" dirty="0" smtClean="0"/>
+          </a:p>
+          <a:p>
+            <a:r>
+              <a:rPr lang="en-US" dirty="0" smtClean="0">
                 <a:hlinkClick r:id="rId3"/>
               </a:rPr>
-              <a:t>: </a:t>
-            </a:r>
-            <a:r>
-              <a:rPr lang="en-US" sz="1200" i="1" dirty="0" smtClean="0">
+              <a:t>Logging</a:t>
+            </a:r>
+            <a:endParaRPr lang="en-US" dirty="0" smtClean="0"/>
+          </a:p>
+          <a:p>
+            <a:r>
+              <a:rPr lang="en-US" dirty="0" smtClean="0">
                 <a:hlinkClick r:id="rId4"/>
               </a:rPr>
-              <a:t>What is REST anyway? – Todd </a:t>
-            </a:r>
-            <a:r>
-              <a:rPr lang="en-US" sz="1200" i="1" dirty="0" err="1" smtClean="0">
-                <a:hlinkClick r:id="rId4"/>
+              <a:t>Static Content </a:t>
+            </a:r>
+            <a:r>
+              <a:rPr lang="en-US" dirty="0" smtClean="0"/>
+              <a:t>/w Live Reload &amp; Hot Swapping for Java</a:t>
+            </a:r>
+          </a:p>
+          <a:p>
+            <a:r>
+              <a:rPr lang="en-US" dirty="0" smtClean="0">
+                <a:hlinkClick r:id="rId5"/>
               </a:rPr>
-              <a:t>Fredrich</a:t>
-            </a:r>
-            <a:endParaRPr lang="en-US" sz="1200" i="1" dirty="0"/>
+              <a:t>Embedded Server customization</a:t>
+            </a:r>
+            <a:endParaRPr lang="en-US" dirty="0" smtClean="0"/>
+          </a:p>
+          <a:p>
+            <a:r>
+              <a:rPr lang="en-US" dirty="0" smtClean="0">
+                <a:hlinkClick r:id="rId6"/>
+              </a:rPr>
+              <a:t>Security</a:t>
+            </a:r>
+            <a:endParaRPr lang="en-US" dirty="0" smtClean="0"/>
+          </a:p>
+          <a:p>
+            <a:r>
+              <a:rPr lang="en-US" dirty="0" smtClean="0">
+                <a:hlinkClick r:id="rId7"/>
+              </a:rPr>
+              <a:t>SQL </a:t>
+            </a:r>
+            <a:r>
+              <a:rPr lang="en-US" dirty="0" smtClean="0"/>
+              <a:t>&amp; </a:t>
+            </a:r>
+            <a:r>
+              <a:rPr lang="en-US" dirty="0" smtClean="0">
+                <a:hlinkClick r:id="rId8"/>
+              </a:rPr>
+              <a:t>NoSQL </a:t>
+            </a:r>
+            <a:r>
+              <a:rPr lang="en-US" dirty="0" smtClean="0"/>
+              <a:t>Database configuration</a:t>
+            </a:r>
+          </a:p>
+          <a:p>
+            <a:r>
+              <a:rPr lang="en-US" dirty="0" smtClean="0"/>
+              <a:t>Testing</a:t>
+            </a:r>
+          </a:p>
+          <a:p>
+            <a:r>
+              <a:rPr lang="en-US" dirty="0" smtClean="0">
+                <a:hlinkClick r:id="rId9"/>
+              </a:rPr>
+              <a:t>Messaging</a:t>
+            </a:r>
+            <a:endParaRPr lang="en-US" dirty="0"/>
           </a:p>
         </p:txBody>
       </p:sp>
     </p:spTree>
     <p:extLst>
       <p:ext uri="{BB962C8B-B14F-4D97-AF65-F5344CB8AC3E}">
-        <p14:creationId xmlns:p14="http://schemas.microsoft.com/office/powerpoint/2010/main" val="1678379241"/>
+        <p14:creationId xmlns:p14="http://schemas.microsoft.com/office/powerpoint/2010/main" val="1225777219"/>
       </p:ext>
     </p:extLst>
   </p:cSld>
@@ -5279,7 +5506,7 @@
           <a:p>
             <a:r>
               <a:rPr lang="en-US" dirty="0" smtClean="0"/>
-              <a:t>REST architectural style - Drivers</a:t>
+              <a:t>Spring Boot – Features (Contd..)</a:t>
             </a:r>
             <a:endParaRPr lang="en-US" dirty="0"/>
           </a:p>
@@ -5297,116 +5524,170 @@
         </p:nvSpPr>
         <p:spPr/>
         <p:txBody>
-          <a:bodyPr>
-            <a:normAutofit/>
-          </a:bodyPr>
-          <a:lstStyle/>
-          <a:p>
-            <a:pPr marL="0" indent="0">
-              <a:buNone/>
-            </a:pPr>
+          <a:bodyPr/>
+          <a:lstStyle/>
+          <a:p>
+            <a:r>
+              <a:rPr lang="en-US" dirty="0" smtClean="0">
+                <a:hlinkClick r:id="rId2"/>
+              </a:rPr>
+              <a:t>Actuator</a:t>
+            </a:r>
             <a:r>
               <a:rPr lang="en-US" dirty="0" smtClean="0"/>
-              <a:t>Heterogeneous Interoperability &amp; Rise of Mobile</a:t>
-            </a:r>
-          </a:p>
-          <a:p>
-            <a:pPr lvl="1"/>
+              <a:t> (demo-</a:t>
+            </a:r>
+            <a:r>
+              <a:rPr lang="en-US" dirty="0" err="1" smtClean="0"/>
+              <a:t>jmx,http</a:t>
+            </a:r>
             <a:r>
               <a:rPr lang="en-US" dirty="0" smtClean="0"/>
-              <a:t>Service (API) providers cannot make any assumptions about the client platforms. </a:t>
-            </a:r>
-          </a:p>
-          <a:p>
-            <a:pPr lvl="1"/>
-            <a:r>
-              <a:rPr lang="en-US" dirty="0"/>
-              <a:t>The client could be a browser, a mobile device running any OS, </a:t>
-            </a:r>
-            <a:r>
-              <a:rPr lang="en-US" dirty="0" smtClean="0"/>
-              <a:t>a GPS navigator, automotive system or anything else</a:t>
-            </a:r>
-          </a:p>
-          <a:p>
-            <a:pPr lvl="1"/>
-            <a:r>
-              <a:rPr lang="en-US" dirty="0" smtClean="0"/>
-              <a:t>Clients and Services need to evolve independently. </a:t>
-            </a:r>
-          </a:p>
-          <a:p>
-            <a:pPr lvl="1"/>
-            <a:r>
-              <a:rPr lang="en-US" dirty="0" smtClean="0"/>
-              <a:t>Each Client could be running a unique native OS and could be deployed at varied times independent of the Service</a:t>
-            </a:r>
-          </a:p>
-          <a:p>
-            <a:pPr lvl="1"/>
-            <a:r>
-              <a:rPr lang="en-US" dirty="0" smtClean="0"/>
-              <a:t>Latency issues, performance, reliability are major issues for Mobile platforms</a:t>
-            </a:r>
-          </a:p>
-          <a:p>
-            <a:pPr lvl="1"/>
-            <a:r>
-              <a:rPr lang="en-US" dirty="0" smtClean="0"/>
-              <a:t>Horizontal Scalability – It is critical to build a scalable architecture in order to take advantage of a scalable infrastructure</a:t>
-            </a:r>
-          </a:p>
-          <a:p>
-            <a:endParaRPr lang="en-US" dirty="0"/>
-          </a:p>
-        </p:txBody>
-      </p:sp>
-      <p:sp>
-        <p:nvSpPr>
-          <p:cNvPr id="4" name="TextBox 3"/>
-          <p:cNvSpPr txBox="1"/>
-          <p:nvPr/>
-        </p:nvSpPr>
-        <p:spPr>
-          <a:xfrm>
-            <a:off x="8281116" y="6423389"/>
-            <a:ext cx="3515932" cy="276999"/>
-          </a:xfrm>
-          <a:prstGeom prst="rect">
-            <a:avLst/>
-          </a:prstGeom>
-          <a:noFill/>
-        </p:spPr>
-        <p:txBody>
-          <a:bodyPr wrap="square" rtlCol="0">
-            <a:spAutoFit/>
-          </a:bodyPr>
-          <a:lstStyle/>
-          <a:p>
-            <a:r>
-              <a:rPr lang="en-US" sz="1200" i="1" dirty="0" smtClean="0"/>
-              <a:t>Ref</a:t>
-            </a:r>
-            <a:r>
-              <a:rPr lang="en-US" sz="1200" i="1" dirty="0" smtClean="0">
+              <a:t>)</a:t>
+            </a:r>
+            <a:endParaRPr lang="en-US" dirty="0" smtClean="0"/>
+          </a:p>
+          <a:p>
+            <a:r>
+              <a:rPr lang="en-US" dirty="0" smtClean="0">
                 <a:hlinkClick r:id="rId3"/>
               </a:rPr>
-              <a:t>: REST fundamentals – Howard </a:t>
-            </a:r>
-            <a:r>
-              <a:rPr lang="en-US" sz="1200" i="1" dirty="0" err="1" smtClean="0">
-                <a:hlinkClick r:id="rId3"/>
+              <a:t>HATEOAS</a:t>
+            </a:r>
+            <a:endParaRPr lang="en-US" dirty="0" smtClean="0"/>
+          </a:p>
+          <a:p>
+            <a:r>
+              <a:rPr lang="en-US" dirty="0" smtClean="0">
+                <a:hlinkClick r:id="rId4"/>
               </a:rPr>
-              <a:t>Dierking</a:t>
-            </a:r>
-            <a:endParaRPr lang="en-US" sz="1200" i="1" dirty="0"/>
+              <a:t>Solr </a:t>
+            </a:r>
+            <a:r>
+              <a:rPr lang="en-US" dirty="0" smtClean="0"/>
+              <a:t>&amp;  </a:t>
+            </a:r>
+            <a:r>
+              <a:rPr lang="en-US" dirty="0" err="1" smtClean="0">
+                <a:hlinkClick r:id="rId5"/>
+              </a:rPr>
+              <a:t>Elasticsearch</a:t>
+            </a:r>
+            <a:endParaRPr lang="en-US" dirty="0" smtClean="0"/>
+          </a:p>
+          <a:p>
+            <a:r>
+              <a:rPr lang="en-US" dirty="0" smtClean="0">
+                <a:hlinkClick r:id="rId6"/>
+              </a:rPr>
+              <a:t>Distributed Transactions </a:t>
+            </a:r>
+            <a:r>
+              <a:rPr lang="en-US" dirty="0" smtClean="0"/>
+              <a:t>– </a:t>
+            </a:r>
+            <a:r>
+              <a:rPr lang="en-US" dirty="0" err="1" smtClean="0"/>
+              <a:t>Atomikos</a:t>
+            </a:r>
+            <a:r>
+              <a:rPr lang="en-US" dirty="0" smtClean="0"/>
+              <a:t>/</a:t>
+            </a:r>
+            <a:r>
+              <a:rPr lang="en-US" dirty="0" err="1" smtClean="0"/>
+              <a:t>Bitronix</a:t>
+            </a:r>
+            <a:endParaRPr lang="en-US" dirty="0" smtClean="0"/>
+          </a:p>
+          <a:p>
+            <a:r>
+              <a:rPr lang="en-US" dirty="0" smtClean="0"/>
+              <a:t>Monitoring &amp; Management using </a:t>
+            </a:r>
+            <a:r>
+              <a:rPr lang="en-US" dirty="0" smtClean="0">
+                <a:hlinkClick r:id="rId7"/>
+              </a:rPr>
+              <a:t>Remote shell</a:t>
+            </a:r>
+            <a:r>
+              <a:rPr lang="en-US" dirty="0" smtClean="0"/>
+              <a:t> (demo -shell)</a:t>
+            </a:r>
+          </a:p>
+          <a:p>
+            <a:r>
+              <a:rPr lang="en-US" dirty="0" smtClean="0">
+                <a:hlinkClick r:id="rId8"/>
+              </a:rPr>
+              <a:t>Custom Metrics</a:t>
+            </a:r>
+            <a:endParaRPr lang="en-US" dirty="0" smtClean="0"/>
+          </a:p>
+          <a:p>
+            <a:r>
+              <a:rPr lang="en-US" dirty="0" smtClean="0">
+                <a:hlinkClick r:id="rId9"/>
+              </a:rPr>
+              <a:t>Cloud Deployment</a:t>
+            </a:r>
+            <a:r>
+              <a:rPr lang="en-US" dirty="0" smtClean="0"/>
+              <a:t> (Cloud Foundry, </a:t>
+            </a:r>
+            <a:r>
+              <a:rPr lang="en-US" dirty="0" err="1" smtClean="0"/>
+              <a:t>Heroku</a:t>
+            </a:r>
+            <a:r>
+              <a:rPr lang="en-US" dirty="0" smtClean="0"/>
+              <a:t>, </a:t>
+            </a:r>
+            <a:r>
+              <a:rPr lang="en-US" dirty="0" err="1" smtClean="0"/>
+              <a:t>Openshift</a:t>
+            </a:r>
+            <a:r>
+              <a:rPr lang="en-US" dirty="0" smtClean="0"/>
+              <a:t>, </a:t>
+            </a:r>
+            <a:r>
+              <a:rPr lang="en-US" dirty="0" err="1" smtClean="0"/>
+              <a:t>Goog</a:t>
+            </a:r>
+            <a:r>
+              <a:rPr lang="en-US" dirty="0" smtClean="0"/>
+              <a:t> App </a:t>
+            </a:r>
+            <a:r>
+              <a:rPr lang="en-US" dirty="0" err="1" smtClean="0"/>
+              <a:t>Eng</a:t>
+            </a:r>
+            <a:r>
+              <a:rPr lang="en-US" dirty="0" smtClean="0"/>
+              <a:t>)</a:t>
+            </a:r>
+          </a:p>
+          <a:p>
+            <a:r>
+              <a:rPr lang="en-US" dirty="0" smtClean="0"/>
+              <a:t>Prototyping with </a:t>
+            </a:r>
+            <a:r>
+              <a:rPr lang="en-US" dirty="0" smtClean="0">
+                <a:hlinkClick r:id="rId10"/>
+              </a:rPr>
+              <a:t>Spring Boot CLI</a:t>
+            </a:r>
+            <a:endParaRPr lang="en-US" dirty="0"/>
           </a:p>
         </p:txBody>
       </p:sp>
     </p:spTree>
     <p:extLst>
       <p:ext uri="{BB962C8B-B14F-4D97-AF65-F5344CB8AC3E}">
-        <p14:creationId xmlns:p14="http://schemas.microsoft.com/office/powerpoint/2010/main" val="1907703282"/>
+        <p14:creationId xmlns:p14="http://schemas.microsoft.com/office/powerpoint/2010/main" val="2413789768"/>
       </p:ext>
     </p:extLst>
   </p:cSld>
@@ -5449,10 +5730,33 @@
           <a:lstStyle/>
           <a:p>
             <a:r>
-              <a:rPr lang="en-US" b="1" dirty="0" smtClean="0"/>
-              <a:t>How to derive REST style?</a:t>
-            </a:r>
-            <a:endParaRPr lang="en-US" dirty="0"/>
+              <a:rPr lang="en-US" dirty="0" smtClean="0"/>
+              <a:t>REST – </a:t>
+            </a:r>
+            <a:r>
+              <a:rPr lang="en-US" b="1" dirty="0"/>
+              <a:t>Re</a:t>
+            </a:r>
+            <a:r>
+              <a:rPr lang="en-US" dirty="0"/>
+              <a:t>presentational </a:t>
+            </a:r>
+            <a:r>
+              <a:rPr lang="en-US" b="1" dirty="0"/>
+              <a:t>S</a:t>
+            </a:r>
+            <a:r>
+              <a:rPr lang="en-US" dirty="0"/>
+              <a:t>tate </a:t>
+            </a:r>
+            <a:r>
+              <a:rPr lang="en-US" b="1" dirty="0"/>
+              <a:t>T</a:t>
+            </a:r>
+            <a:r>
+              <a:rPr lang="en-US" dirty="0"/>
+              <a:t>ransfer</a:t>
+            </a:r>
           </a:p>
         </p:txBody>
       </p:sp>
@@ -5469,7 +5773,7 @@
         <p:spPr>
           <a:xfrm>
             <a:off x="838200" y="1287887"/>
-            <a:ext cx="11353800" cy="4889076"/>
+            <a:ext cx="11023242" cy="4889076"/>
           </a:xfrm>
         </p:spPr>
         <p:txBody>
@@ -5486,48 +5790,40 @@
           <a:p>
             <a:r>
               <a:rPr lang="en-US" dirty="0" smtClean="0"/>
-              <a:t>Roy Fielding talks about two approaches to design</a:t>
-            </a:r>
-          </a:p>
-          <a:p>
-            <a:pPr lvl="1"/>
+              <a:t>Introduced in Roy Fielding’s dissertation submitted to UC, Irvine in 2000</a:t>
+            </a:r>
+          </a:p>
+          <a:p>
             <a:r>
               <a:rPr lang="en-US" dirty="0" smtClean="0"/>
-              <a:t>Start with a clean slate to reach the desired design goals </a:t>
-            </a:r>
-            <a:r>
-              <a:rPr lang="en-US" i="1" dirty="0" smtClean="0"/>
-              <a:t>(Emphasizes creativity and unbounded vision)</a:t>
-            </a:r>
-          </a:p>
-          <a:p>
-            <a:pPr lvl="1"/>
+              <a:t>It’s an </a:t>
+            </a:r>
+            <a:r>
+              <a:rPr lang="en-US" dirty="0"/>
+              <a:t>architecture style for designing networked applications</a:t>
+            </a:r>
             <a:r>
               <a:rPr lang="en-US" dirty="0" smtClean="0"/>
-              <a:t>Start with the system needs as a whole, without constraints and then incrementally identify and apply constraints to elements of the system in order to differentiate the design space and allow forces that influence system behavior to flow naturally. </a:t>
-            </a:r>
-            <a:r>
-              <a:rPr lang="en-US" i="1" dirty="0" smtClean="0"/>
-              <a:t>(Emphasizes restraint and understanding of the system context)</a:t>
-            </a:r>
-          </a:p>
-          <a:p>
-            <a:pPr lvl="1"/>
-            <a:endParaRPr lang="en-US" i="1" dirty="0" smtClean="0"/>
-          </a:p>
-          <a:p>
-            <a:pPr lvl="1"/>
-            <a:endParaRPr lang="en-US" i="1" dirty="0"/>
-          </a:p>
-          <a:p>
-            <a:pPr marL="457200" lvl="1" indent="0" algn="ctr">
-              <a:buNone/>
-            </a:pPr>
-            <a:r>
-              <a:rPr lang="en-US" b="1" i="1" dirty="0" smtClean="0"/>
-              <a:t>REST is derived through the second approach by adding “Constraints” to the design</a:t>
-            </a:r>
-            <a:endParaRPr lang="en-US" b="1" i="1" dirty="0"/>
+              <a:t>. It’s not a protocol, standard or a framework</a:t>
+            </a:r>
+          </a:p>
+          <a:p>
+            <a:r>
+              <a:rPr lang="en-US" dirty="0" smtClean="0"/>
+              <a:t>Resource-based – REST API is all about “things” or “resources” as opposed to “actions” (as verbs/methods/actions  in SOAP)</a:t>
+            </a:r>
+          </a:p>
+          <a:p>
+            <a:r>
+              <a:rPr lang="en-US" dirty="0" smtClean="0"/>
+              <a:t>Representations – Typically JSON/XML or could be anything that represents a part or the whole of the resource state</a:t>
+            </a:r>
+          </a:p>
+          <a:p>
+            <a:r>
+              <a:rPr lang="en-US" dirty="0" smtClean="0"/>
+              <a:t>Not tied to HTTP, but most commonly associated with it</a:t>
+            </a:r>
           </a:p>
         </p:txBody>
       </p:sp>
@@ -5539,8 +5835,8 @@
         </p:nvSpPr>
         <p:spPr>
           <a:xfrm>
-            <a:off x="785611" y="6284889"/>
-            <a:ext cx="8281115" cy="276999"/>
+            <a:off x="914400" y="6284889"/>
+            <a:ext cx="3515932" cy="276999"/>
           </a:xfrm>
           <a:prstGeom prst="rect">
             <a:avLst/>
@@ -5567,7 +5863,13 @@
               <a:rPr lang="en-US" sz="1200" i="1" dirty="0" smtClean="0">
                 <a:hlinkClick r:id="rId4"/>
               </a:rPr>
-              <a:t>Architectural Styles and the design of Network based Software Architectures – Roy Fielding</a:t>
+              <a:t>What is REST anyway? – Todd </a:t>
+            </a:r>
+            <a:r>
+              <a:rPr lang="en-US" sz="1200" i="1" dirty="0" err="1" smtClean="0">
+                <a:hlinkClick r:id="rId4"/>
+              </a:rPr>
+              <a:t>Fredrich</a:t>
             </a:r>
             <a:endParaRPr lang="en-US" sz="1200" i="1" dirty="0"/>
           </a:p>
@@ -5576,7 +5878,7 @@
     </p:spTree>
     <p:extLst>
       <p:ext uri="{BB962C8B-B14F-4D97-AF65-F5344CB8AC3E}">
-        <p14:creationId xmlns:p14="http://schemas.microsoft.com/office/powerpoint/2010/main" val="2131087853"/>
+        <p14:creationId xmlns:p14="http://schemas.microsoft.com/office/powerpoint/2010/main" val="1678379241"/>
       </p:ext>
     </p:extLst>
   </p:cSld>
@@ -5620,6 +5922,347 @@
           <a:p>
             <a:r>
               <a:rPr lang="en-US" dirty="0" smtClean="0"/>
+              <a:t>REST architectural style - Drivers</a:t>
+            </a:r>
+            <a:endParaRPr lang="en-US" dirty="0"/>
+          </a:p>
+        </p:txBody>
+      </p:sp>
+      <p:sp>
+        <p:nvSpPr>
+          <p:cNvPr id="3" name="Content Placeholder 2"/>
+          <p:cNvSpPr>
+            <a:spLocks noGrp="1"/>
+          </p:cNvSpPr>
+          <p:nvPr>
+            <p:ph idx="1"/>
+          </p:nvPr>
+        </p:nvSpPr>
+        <p:spPr/>
+        <p:txBody>
+          <a:bodyPr>
+            <a:normAutofit/>
+          </a:bodyPr>
+          <a:lstStyle/>
+          <a:p>
+            <a:pPr marL="0" indent="0">
+              <a:buNone/>
+            </a:pPr>
+            <a:r>
+              <a:rPr lang="en-US" dirty="0" smtClean="0"/>
+              <a:t>Heterogeneous Interoperability &amp; Rise of Mobile</a:t>
+            </a:r>
+          </a:p>
+          <a:p>
+            <a:pPr lvl="1"/>
+            <a:r>
+              <a:rPr lang="en-US" dirty="0" smtClean="0"/>
+              <a:t>Service (API) providers cannot make any assumptions about the client platforms. </a:t>
+            </a:r>
+          </a:p>
+          <a:p>
+            <a:pPr lvl="1"/>
+            <a:r>
+              <a:rPr lang="en-US" dirty="0"/>
+              <a:t>The client could be a browser, a mobile device running any OS, </a:t>
+            </a:r>
+            <a:r>
+              <a:rPr lang="en-US" dirty="0" smtClean="0"/>
+              <a:t>a GPS navigator, automotive system or anything else</a:t>
+            </a:r>
+          </a:p>
+          <a:p>
+            <a:pPr lvl="1"/>
+            <a:r>
+              <a:rPr lang="en-US" dirty="0" smtClean="0"/>
+              <a:t>Clients and Services need to evolve independently. </a:t>
+            </a:r>
+          </a:p>
+          <a:p>
+            <a:pPr lvl="1"/>
+            <a:r>
+              <a:rPr lang="en-US" dirty="0" smtClean="0"/>
+              <a:t>Each Client could be running a unique native OS and could be deployed at varied times independent of the Service</a:t>
+            </a:r>
+          </a:p>
+          <a:p>
+            <a:pPr lvl="1"/>
+            <a:r>
+              <a:rPr lang="en-US" dirty="0" smtClean="0"/>
+              <a:t>Latency issues, performance, reliability are major issues for Mobile platforms</a:t>
+            </a:r>
+          </a:p>
+          <a:p>
+            <a:pPr lvl="1"/>
+            <a:r>
+              <a:rPr lang="en-US" dirty="0" smtClean="0"/>
+              <a:t>Horizontal Scalability – It is critical to build a scalable architecture in order to take advantage of a scalable infrastructure</a:t>
+            </a:r>
+          </a:p>
+          <a:p>
+            <a:endParaRPr lang="en-US" dirty="0"/>
+          </a:p>
+        </p:txBody>
+      </p:sp>
+      <p:sp>
+        <p:nvSpPr>
+          <p:cNvPr id="4" name="TextBox 3"/>
+          <p:cNvSpPr txBox="1"/>
+          <p:nvPr/>
+        </p:nvSpPr>
+        <p:spPr>
+          <a:xfrm>
+            <a:off x="8281116" y="6423389"/>
+            <a:ext cx="3515932" cy="276999"/>
+          </a:xfrm>
+          <a:prstGeom prst="rect">
+            <a:avLst/>
+          </a:prstGeom>
+          <a:noFill/>
+        </p:spPr>
+        <p:txBody>
+          <a:bodyPr wrap="square" rtlCol="0">
+            <a:spAutoFit/>
+          </a:bodyPr>
+          <a:lstStyle/>
+          <a:p>
+            <a:r>
+              <a:rPr lang="en-US" sz="1200" i="1" dirty="0" smtClean="0"/>
+              <a:t>Ref</a:t>
+            </a:r>
+            <a:r>
+              <a:rPr lang="en-US" sz="1200" i="1" dirty="0" smtClean="0">
+                <a:hlinkClick r:id="rId3"/>
+              </a:rPr>
+              <a:t>: REST fundamentals – Howard </a:t>
+            </a:r>
+            <a:r>
+              <a:rPr lang="en-US" sz="1200" i="1" dirty="0" err="1" smtClean="0">
+                <a:hlinkClick r:id="rId3"/>
+              </a:rPr>
+              <a:t>Dierking</a:t>
+            </a:r>
+            <a:endParaRPr lang="en-US" sz="1200" i="1" dirty="0"/>
+          </a:p>
+        </p:txBody>
+      </p:sp>
+    </p:spTree>
+    <p:extLst>
+      <p:ext uri="{BB962C8B-B14F-4D97-AF65-F5344CB8AC3E}">
+        <p14:creationId xmlns:p14="http://schemas.microsoft.com/office/powerpoint/2010/main" val="1907703282"/>
+      </p:ext>
+    </p:extLst>
+  </p:cSld>
+  <p:clrMapOvr>
+    <a:masterClrMapping/>
+  </p:clrMapOvr>
+</p:sld>
+</file>
+
+<file path=ppt/slides/slide14.xml><?xml version="1.0" encoding="utf-8"?>
+<p:sld xmlns:a="http://schemas.openxmlformats.org/drawingml/2006/main" xmlns:r="http://schemas.openxmlformats.org/officeDocument/2006/relationships" xmlns:p="http://schemas.openxmlformats.org/presentationml/2006/main">
+  <p:cSld>
+    <p:spTree>
+      <p:nvGrpSpPr>
+        <p:cNvPr id="1" name=""/>
+        <p:cNvGrpSpPr/>
+        <p:nvPr/>
+      </p:nvGrpSpPr>
+      <p:grpSpPr>
+        <a:xfrm>
+          <a:off x="0" y="0"/>
+          <a:ext cx="0" cy="0"/>
+          <a:chOff x="0" y="0"/>
+          <a:chExt cx="0" cy="0"/>
+        </a:xfrm>
+      </p:grpSpPr>
+      <p:sp>
+        <p:nvSpPr>
+          <p:cNvPr id="2" name="Title 1"/>
+          <p:cNvSpPr>
+            <a:spLocks noGrp="1"/>
+          </p:cNvSpPr>
+          <p:nvPr>
+            <p:ph type="title"/>
+          </p:nvPr>
+        </p:nvSpPr>
+        <p:spPr/>
+        <p:txBody>
+          <a:bodyPr/>
+          <a:lstStyle/>
+          <a:p>
+            <a:r>
+              <a:rPr lang="en-US" b="1" dirty="0" smtClean="0"/>
+              <a:t>How to derive REST style?</a:t>
+            </a:r>
+            <a:endParaRPr lang="en-US" dirty="0"/>
+          </a:p>
+        </p:txBody>
+      </p:sp>
+      <p:sp>
+        <p:nvSpPr>
+          <p:cNvPr id="3" name="Content Placeholder 2"/>
+          <p:cNvSpPr>
+            <a:spLocks noGrp="1"/>
+          </p:cNvSpPr>
+          <p:nvPr>
+            <p:ph idx="1"/>
+          </p:nvPr>
+        </p:nvSpPr>
+        <p:spPr>
+          <a:xfrm>
+            <a:off x="838200" y="1287887"/>
+            <a:ext cx="11353800" cy="4889076"/>
+          </a:xfrm>
+        </p:spPr>
+        <p:txBody>
+          <a:bodyPr>
+            <a:normAutofit/>
+          </a:bodyPr>
+          <a:lstStyle/>
+          <a:p>
+            <a:pPr marL="0" indent="0">
+              <a:buNone/>
+            </a:pPr>
+            <a:endParaRPr lang="en-US" b="1" dirty="0" smtClean="0"/>
+          </a:p>
+          <a:p>
+            <a:r>
+              <a:rPr lang="en-US" dirty="0" smtClean="0"/>
+              <a:t>Roy Fielding talks about two approaches to design</a:t>
+            </a:r>
+          </a:p>
+          <a:p>
+            <a:pPr lvl="1"/>
+            <a:r>
+              <a:rPr lang="en-US" dirty="0" smtClean="0"/>
+              <a:t>Start with a clean slate to reach the desired design goals </a:t>
+            </a:r>
+            <a:r>
+              <a:rPr lang="en-US" i="1" dirty="0" smtClean="0"/>
+              <a:t>(Emphasizes creativity and unbounded vision)</a:t>
+            </a:r>
+          </a:p>
+          <a:p>
+            <a:pPr lvl="1"/>
+            <a:r>
+              <a:rPr lang="en-US" dirty="0" smtClean="0"/>
+              <a:t>Start with the system needs as a whole, without constraints and then incrementally identify and apply constraints to elements of the system in order to differentiate the design space and allow forces that influence system behavior to flow naturally. </a:t>
+            </a:r>
+            <a:r>
+              <a:rPr lang="en-US" i="1" dirty="0" smtClean="0"/>
+              <a:t>(Emphasizes restraint and understanding of the system context)</a:t>
+            </a:r>
+          </a:p>
+          <a:p>
+            <a:pPr lvl="1"/>
+            <a:endParaRPr lang="en-US" i="1" dirty="0" smtClean="0"/>
+          </a:p>
+          <a:p>
+            <a:pPr lvl="1"/>
+            <a:endParaRPr lang="en-US" i="1" dirty="0"/>
+          </a:p>
+          <a:p>
+            <a:pPr marL="457200" lvl="1" indent="0" algn="ctr">
+              <a:buNone/>
+            </a:pPr>
+            <a:r>
+              <a:rPr lang="en-US" b="1" i="1" dirty="0" smtClean="0"/>
+              <a:t>REST is derived through the second approach by adding “Constraints” to the design</a:t>
+            </a:r>
+            <a:endParaRPr lang="en-US" b="1" i="1" dirty="0"/>
+          </a:p>
+        </p:txBody>
+      </p:sp>
+      <p:sp>
+        <p:nvSpPr>
+          <p:cNvPr id="4" name="TextBox 3"/>
+          <p:cNvSpPr txBox="1"/>
+          <p:nvPr/>
+        </p:nvSpPr>
+        <p:spPr>
+          <a:xfrm>
+            <a:off x="785611" y="6284889"/>
+            <a:ext cx="8281115" cy="276999"/>
+          </a:xfrm>
+          <a:prstGeom prst="rect">
+            <a:avLst/>
+          </a:prstGeom>
+          <a:noFill/>
+        </p:spPr>
+        <p:txBody>
+          <a:bodyPr wrap="square" rtlCol="0">
+            <a:spAutoFit/>
+          </a:bodyPr>
+          <a:lstStyle/>
+          <a:p>
+            <a:r>
+              <a:rPr lang="en-US" sz="1200" i="1" dirty="0" smtClean="0"/>
+              <a:t>Ref</a:t>
+            </a:r>
+            <a:r>
+              <a:rPr lang="en-US" sz="1200" i="1" dirty="0" smtClean="0">
+                <a:hlinkClick r:id="rId3"/>
+              </a:rPr>
+              <a:t>: </a:t>
+            </a:r>
+            <a:r>
+              <a:rPr lang="en-US" sz="1200" i="1" dirty="0" smtClean="0">
+                <a:hlinkClick r:id="rId4"/>
+              </a:rPr>
+              <a:t>Architectural Styles and the design of Network based Software Architectures – Roy Fielding</a:t>
+            </a:r>
+            <a:endParaRPr lang="en-US" sz="1200" i="1" dirty="0"/>
+          </a:p>
+        </p:txBody>
+      </p:sp>
+    </p:spTree>
+    <p:extLst>
+      <p:ext uri="{BB962C8B-B14F-4D97-AF65-F5344CB8AC3E}">
+        <p14:creationId xmlns:p14="http://schemas.microsoft.com/office/powerpoint/2010/main" val="2131087853"/>
+      </p:ext>
+    </p:extLst>
+  </p:cSld>
+  <p:clrMapOvr>
+    <a:masterClrMapping/>
+  </p:clrMapOvr>
+</p:sld>
+</file>
+
+<file path=ppt/slides/slide15.xml><?xml version="1.0" encoding="utf-8"?>
+<p:sld xmlns:a="http://schemas.openxmlformats.org/drawingml/2006/main" xmlns:r="http://schemas.openxmlformats.org/officeDocument/2006/relationships" xmlns:p="http://schemas.openxmlformats.org/presentationml/2006/main">
+  <p:cSld>
+    <p:spTree>
+      <p:nvGrpSpPr>
+        <p:cNvPr id="1" name=""/>
+        <p:cNvGrpSpPr/>
+        <p:nvPr/>
+      </p:nvGrpSpPr>
+      <p:grpSpPr>
+        <a:xfrm>
+          <a:off x="0" y="0"/>
+          <a:ext cx="0" cy="0"/>
+          <a:chOff x="0" y="0"/>
+          <a:chExt cx="0" cy="0"/>
+        </a:xfrm>
+      </p:grpSpPr>
+      <p:sp>
+        <p:nvSpPr>
+          <p:cNvPr id="2" name="Title 1"/>
+          <p:cNvSpPr>
+            <a:spLocks noGrp="1"/>
+          </p:cNvSpPr>
+          <p:nvPr>
+            <p:ph type="title"/>
+          </p:nvPr>
+        </p:nvSpPr>
+        <p:spPr/>
+        <p:txBody>
+          <a:bodyPr/>
+          <a:lstStyle/>
+          <a:p>
+            <a:r>
+              <a:rPr lang="en-US" dirty="0" smtClean="0"/>
               <a:t>REST – </a:t>
             </a:r>
             <a:r>
@@ -5648,7 +6291,7 @@
         </p:spPr>
         <p:txBody>
           <a:bodyPr>
-            <a:normAutofit fontScale="92500" lnSpcReduction="20000"/>
+            <a:normAutofit fontScale="92500" lnSpcReduction="10000"/>
           </a:bodyPr>
           <a:lstStyle/>
           <a:p>
@@ -5793,15 +6436,11 @@
             </a:r>
             <a:r>
               <a:rPr lang="en-US" dirty="0" smtClean="0"/>
-              <a:t>Service can temporarily extend client like Java applets, Executable </a:t>
-            </a:r>
-            <a:r>
-              <a:rPr lang="en-US" dirty="0" err="1" smtClean="0"/>
-              <a:t>javascript</a:t>
+              <a:t>Service can temporarily extend </a:t>
             </a:r>
             <a:r>
               <a:rPr lang="en-US" dirty="0" smtClean="0"/>
-              <a:t> snippets etc.</a:t>
+              <a:t>client</a:t>
             </a:r>
             <a:endParaRPr lang="en-US" b="1" dirty="0"/>
           </a:p>
@@ -5901,7 +6540,7 @@
 </p:sld>
 </file>
 
-<file path=ppt/slides/slide14.xml><?xml version="1.0" encoding="utf-8"?>
+<file path=ppt/slides/slide16.xml><?xml version="1.0" encoding="utf-8"?>
 <p:sld xmlns:a="http://schemas.openxmlformats.org/drawingml/2006/main" xmlns:r="http://schemas.openxmlformats.org/officeDocument/2006/relationships" xmlns:p="http://schemas.openxmlformats.org/presentationml/2006/main">
   <p:cSld>
     <p:spTree>
@@ -6007,8 +6646,8 @@
         </p:nvSpPr>
         <p:spPr bwMode="auto">
           <a:xfrm>
-            <a:off x="257578" y="1567897"/>
-            <a:ext cx="7392473" cy="5324535"/>
+            <a:off x="257579" y="1466132"/>
+            <a:ext cx="7095200" cy="5324535"/>
           </a:xfrm>
           <a:prstGeom prst="rect">
             <a:avLst/>
@@ -6524,7 +7163,7 @@
 </p:sld>
 </file>
 
-<file path=ppt/slides/slide15.xml><?xml version="1.0" encoding="utf-8"?>
+<file path=ppt/slides/slide17.xml><?xml version="1.0" encoding="utf-8"?>
 <p:sld xmlns:a="http://schemas.openxmlformats.org/drawingml/2006/main" xmlns:r="http://schemas.openxmlformats.org/officeDocument/2006/relationships" xmlns:p="http://schemas.openxmlformats.org/presentationml/2006/main">
   <p:cSld>
     <p:spTree>
@@ -6875,7 +7514,7 @@
 </p:sld>
 </file>
 
-<file path=ppt/slides/slide16.xml><?xml version="1.0" encoding="utf-8"?>
+<file path=ppt/slides/slide18.xml><?xml version="1.0" encoding="utf-8"?>
 <p:sld xmlns:a="http://schemas.openxmlformats.org/drawingml/2006/main" xmlns:r="http://schemas.openxmlformats.org/officeDocument/2006/relationships" xmlns:p="http://schemas.openxmlformats.org/presentationml/2006/main">
   <p:cSld>
     <p:spTree>
@@ -8150,7 +8789,7 @@
 </p:sld>
 </file>
 
-<file path=ppt/slides/slide17.xml><?xml version="1.0" encoding="utf-8"?>
+<file path=ppt/slides/slide19.xml><?xml version="1.0" encoding="utf-8"?>
 <p:sld xmlns:a="http://schemas.openxmlformats.org/drawingml/2006/main" xmlns:r="http://schemas.openxmlformats.org/officeDocument/2006/relationships" xmlns:p="http://schemas.openxmlformats.org/presentationml/2006/main">
   <p:cSld>
     <p:spTree>
@@ -9075,7 +9714,144 @@
 </p:sld>
 </file>
 
-<file path=ppt/slides/slide18.xml><?xml version="1.0" encoding="utf-8"?>
+<file path=ppt/slides/slide2.xml><?xml version="1.0" encoding="utf-8"?>
+<p:sld xmlns:a="http://schemas.openxmlformats.org/drawingml/2006/main" xmlns:r="http://schemas.openxmlformats.org/officeDocument/2006/relationships" xmlns:p="http://schemas.openxmlformats.org/presentationml/2006/main">
+  <p:cSld>
+    <p:spTree>
+      <p:nvGrpSpPr>
+        <p:cNvPr id="1" name=""/>
+        <p:cNvGrpSpPr/>
+        <p:nvPr/>
+      </p:nvGrpSpPr>
+      <p:grpSpPr>
+        <a:xfrm>
+          <a:off x="0" y="0"/>
+          <a:ext cx="0" cy="0"/>
+          <a:chOff x="0" y="0"/>
+          <a:chExt cx="0" cy="0"/>
+        </a:xfrm>
+      </p:grpSpPr>
+      <p:sp>
+        <p:nvSpPr>
+          <p:cNvPr id="3" name="Title 2"/>
+          <p:cNvSpPr>
+            <a:spLocks noGrp="1"/>
+          </p:cNvSpPr>
+          <p:nvPr>
+            <p:ph type="ctrTitle"/>
+          </p:nvPr>
+        </p:nvSpPr>
+        <p:spPr>
+          <a:xfrm>
+            <a:off x="1524000" y="1122363"/>
+            <a:ext cx="3574093" cy="305604"/>
+          </a:xfrm>
+        </p:spPr>
+        <p:txBody>
+          <a:bodyPr>
+            <a:normAutofit fontScale="90000"/>
+          </a:bodyPr>
+          <a:lstStyle/>
+          <a:p>
+            <a:r>
+              <a:rPr lang="en-US" dirty="0" smtClean="0"/>
+              <a:t>About me</a:t>
+            </a:r>
+            <a:endParaRPr lang="en-US" dirty="0"/>
+          </a:p>
+        </p:txBody>
+      </p:sp>
+      <p:sp>
+        <p:nvSpPr>
+          <p:cNvPr id="7" name="TextBox 6"/>
+          <p:cNvSpPr txBox="1"/>
+          <p:nvPr/>
+        </p:nvSpPr>
+        <p:spPr>
+          <a:xfrm>
+            <a:off x="726510" y="1578280"/>
+            <a:ext cx="10647123" cy="1569660"/>
+          </a:xfrm>
+          <a:prstGeom prst="rect">
+            <a:avLst/>
+          </a:prstGeom>
+          <a:noFill/>
+        </p:spPr>
+        <p:txBody>
+          <a:bodyPr wrap="square" rtlCol="0">
+            <a:spAutoFit/>
+          </a:bodyPr>
+          <a:lstStyle/>
+          <a:p>
+            <a:pPr marL="285750" indent="-285750">
+              <a:buFont typeface="Arial" panose="020B0604020202020204" pitchFamily="34" charset="0"/>
+              <a:buChar char="•"/>
+            </a:pPr>
+            <a:r>
+              <a:rPr lang="en-US" sz="2400" dirty="0" smtClean="0"/>
+              <a:t>Part of the </a:t>
+            </a:r>
+            <a:r>
+              <a:rPr lang="en-US" sz="2400" b="1" dirty="0" err="1" smtClean="0"/>
+              <a:t>MyHealth</a:t>
+            </a:r>
+            <a:r>
+              <a:rPr lang="en-US" sz="2400" dirty="0" smtClean="0"/>
+              <a:t> team at Intermountain healthcare</a:t>
+            </a:r>
+          </a:p>
+          <a:p>
+            <a:pPr marL="285750" indent="-285750">
+              <a:buFont typeface="Arial" panose="020B0604020202020204" pitchFamily="34" charset="0"/>
+              <a:buChar char="•"/>
+            </a:pPr>
+            <a:r>
+              <a:rPr lang="en-US" sz="2400" dirty="0" smtClean="0"/>
+              <a:t>Extremely </a:t>
+            </a:r>
+            <a:r>
+              <a:rPr lang="en-US" sz="2400" dirty="0" err="1" smtClean="0"/>
+              <a:t>medio</a:t>
+            </a:r>
+            <a:endParaRPr lang="en-US" sz="2400" dirty="0" smtClean="0"/>
+          </a:p>
+          <a:p>
+            <a:pPr marL="285750" indent="-285750">
+              <a:buFont typeface="Arial" panose="020B0604020202020204" pitchFamily="34" charset="0"/>
+              <a:buChar char="•"/>
+            </a:pPr>
+            <a:endParaRPr lang="en-US" sz="2400" dirty="0" smtClean="0"/>
+          </a:p>
+          <a:p>
+            <a:pPr marL="285750" indent="-285750">
+              <a:buFont typeface="Arial" panose="020B0604020202020204" pitchFamily="34" charset="0"/>
+              <a:buChar char="•"/>
+            </a:pPr>
+            <a:endParaRPr lang="en-US" sz="2400" dirty="0"/>
+          </a:p>
+        </p:txBody>
+      </p:sp>
+    </p:spTree>
+    <p:extLst>
+      <p:ext uri="{BB962C8B-B14F-4D97-AF65-F5344CB8AC3E}">
+        <p14:creationId xmlns:p14="http://schemas.microsoft.com/office/powerpoint/2010/main" val="177240797"/>
+      </p:ext>
+    </p:extLst>
+  </p:cSld>
+  <p:clrMapOvr>
+    <a:masterClrMapping/>
+  </p:clrMapOvr>
+  <p:timing>
+    <p:tnLst>
+      <p:par>
+        <p:cTn id="1" dur="indefinite" restart="never" nodeType="tmRoot"/>
+      </p:par>
+    </p:tnLst>
+  </p:timing>
+</p:sld>
+</file>
+
+<file path=ppt/slides/slide20.xml><?xml version="1.0" encoding="utf-8"?>
 <p:sld xmlns:a="http://schemas.openxmlformats.org/drawingml/2006/main" xmlns:r="http://schemas.openxmlformats.org/officeDocument/2006/relationships" xmlns:p="http://schemas.openxmlformats.org/presentationml/2006/main">
   <p:cSld>
     <p:spTree>
@@ -9273,7 +10049,7 @@
 </p:sld>
 </file>
 
-<file path=ppt/slides/slide19.xml><?xml version="1.0" encoding="utf-8"?>
+<file path=ppt/slides/slide21.xml><?xml version="1.0" encoding="utf-8"?>
 <p:sld xmlns:a="http://schemas.openxmlformats.org/drawingml/2006/main" xmlns:r="http://schemas.openxmlformats.org/officeDocument/2006/relationships" xmlns:p="http://schemas.openxmlformats.org/presentationml/2006/main">
   <p:cSld>
     <p:spTree>
@@ -9439,7 +10215,7 @@
 </p:sld>
 </file>
 
-<file path=ppt/slides/slide2.xml><?xml version="1.0" encoding="utf-8"?>
+<file path=ppt/slides/slide22.xml><?xml version="1.0" encoding="utf-8"?>
 <p:sld xmlns:a="http://schemas.openxmlformats.org/drawingml/2006/main" xmlns:r="http://schemas.openxmlformats.org/officeDocument/2006/relationships" xmlns:p="http://schemas.openxmlformats.org/presentationml/2006/main">
   <p:cSld>
     <p:spTree>
@@ -9466,142 +10242,6 @@
             <p:ph type="title"/>
           </p:nvPr>
         </p:nvSpPr>
-        <p:spPr/>
-        <p:txBody>
-          <a:bodyPr/>
-          <a:lstStyle/>
-          <a:p>
-            <a:r>
-              <a:rPr lang="en-US" dirty="0" smtClean="0"/>
-              <a:t>Agenda</a:t>
-            </a:r>
-            <a:endParaRPr lang="en-US" dirty="0"/>
-          </a:p>
-        </p:txBody>
-      </p:sp>
-      <p:sp>
-        <p:nvSpPr>
-          <p:cNvPr id="3" name="Content Placeholder 2"/>
-          <p:cNvSpPr>
-            <a:spLocks noGrp="1"/>
-          </p:cNvSpPr>
-          <p:nvPr>
-            <p:ph idx="1"/>
-          </p:nvPr>
-        </p:nvSpPr>
-        <p:spPr/>
-        <p:txBody>
-          <a:bodyPr>
-            <a:normAutofit/>
-          </a:bodyPr>
-          <a:lstStyle/>
-          <a:p>
-            <a:r>
-              <a:rPr lang="en-US" dirty="0" smtClean="0"/>
-              <a:t>REST principles</a:t>
-            </a:r>
-          </a:p>
-          <a:p>
-            <a:r>
-              <a:rPr lang="en-US" smtClean="0"/>
-              <a:t>Micro-services</a:t>
-            </a:r>
-            <a:endParaRPr lang="en-US" dirty="0" smtClean="0"/>
-          </a:p>
-          <a:p>
-            <a:r>
-              <a:rPr lang="en-US" dirty="0" smtClean="0"/>
-              <a:t>Spring Framework</a:t>
-            </a:r>
-          </a:p>
-          <a:p>
-            <a:r>
-              <a:rPr lang="en-US" dirty="0" smtClean="0"/>
-              <a:t>Overview of Spring Boot</a:t>
-            </a:r>
-          </a:p>
-          <a:p>
-            <a:pPr lvl="1"/>
-            <a:r>
-              <a:rPr lang="en-US" dirty="0" smtClean="0"/>
-              <a:t>Philosophy, goals, features, benefits and limitations</a:t>
-            </a:r>
-          </a:p>
-          <a:p>
-            <a:pPr lvl="1"/>
-            <a:r>
-              <a:rPr lang="en-US" dirty="0" smtClean="0"/>
-              <a:t>How to?</a:t>
-            </a:r>
-          </a:p>
-          <a:p>
-            <a:pPr lvl="1"/>
-            <a:r>
-              <a:rPr lang="en-US" dirty="0" smtClean="0"/>
-              <a:t>Live Demo</a:t>
-            </a:r>
-          </a:p>
-          <a:p>
-            <a:r>
-              <a:rPr lang="en-US" dirty="0" smtClean="0"/>
-              <a:t>Q&amp;A</a:t>
-            </a:r>
-          </a:p>
-          <a:p>
-            <a:endParaRPr lang="en-US" dirty="0" smtClean="0"/>
-          </a:p>
-          <a:p>
-            <a:endParaRPr lang="en-US" dirty="0"/>
-          </a:p>
-        </p:txBody>
-      </p:sp>
-    </p:spTree>
-    <p:extLst>
-      <p:ext uri="{BB962C8B-B14F-4D97-AF65-F5344CB8AC3E}">
-        <p14:creationId xmlns:p14="http://schemas.microsoft.com/office/powerpoint/2010/main" val="3363239950"/>
-      </p:ext>
-    </p:extLst>
-  </p:cSld>
-  <p:clrMapOvr>
-    <a:masterClrMapping/>
-  </p:clrMapOvr>
-  <p:timing>
-    <p:tnLst>
-      <p:par>
-        <p:cTn id="1" dur="indefinite" restart="never" nodeType="tmRoot"/>
-      </p:par>
-    </p:tnLst>
-  </p:timing>
-</p:sld>
-</file>
-
-<file path=ppt/slides/slide20.xml><?xml version="1.0" encoding="utf-8"?>
-<p:sld xmlns:a="http://schemas.openxmlformats.org/drawingml/2006/main" xmlns:r="http://schemas.openxmlformats.org/officeDocument/2006/relationships" xmlns:p="http://schemas.openxmlformats.org/presentationml/2006/main">
-  <p:cSld>
-    <p:spTree>
-      <p:nvGrpSpPr>
-        <p:cNvPr id="1" name=""/>
-        <p:cNvGrpSpPr/>
-        <p:nvPr/>
-      </p:nvGrpSpPr>
-      <p:grpSpPr>
-        <a:xfrm>
-          <a:off x="0" y="0"/>
-          <a:ext cx="0" cy="0"/>
-          <a:chOff x="0" y="0"/>
-          <a:chExt cx="0" cy="0"/>
-        </a:xfrm>
-      </p:grpSpPr>
-      <p:sp>
-        <p:nvSpPr>
-          <p:cNvPr id="2" name="Title 1"/>
-          <p:cNvSpPr>
-            <a:spLocks noGrp="1"/>
-          </p:cNvSpPr>
-          <p:nvPr>
-            <p:ph type="title"/>
-          </p:nvPr>
-        </p:nvSpPr>
         <p:spPr>
           <a:xfrm>
             <a:off x="69313" y="64221"/>
@@ -9614,7 +10254,11 @@
           <a:p>
             <a:r>
               <a:rPr lang="en-US" dirty="0" smtClean="0"/>
-              <a:t>Monolithic nightmares </a:t>
+              <a:t>Monolithic </a:t>
+            </a:r>
+            <a:r>
+              <a:rPr lang="en-US" dirty="0" smtClean="0"/>
+              <a:t>challenges</a:t>
             </a:r>
             <a:endParaRPr lang="en-US" dirty="0"/>
           </a:p>
@@ -10865,7 +11509,7 @@
 </p:sld>
 </file>
 
-<file path=ppt/slides/slide21.xml><?xml version="1.0" encoding="utf-8"?>
+<file path=ppt/slides/slide23.xml><?xml version="1.0" encoding="utf-8"?>
 <p:sld xmlns:a="http://schemas.openxmlformats.org/drawingml/2006/main" xmlns:r="http://schemas.openxmlformats.org/officeDocument/2006/relationships" xmlns:p="http://schemas.openxmlformats.org/presentationml/2006/main">
   <p:cSld>
     <p:spTree>
@@ -11104,7 +11748,7 @@
 </p:sld>
 </file>
 
-<file path=ppt/slides/slide22.xml><?xml version="1.0" encoding="utf-8"?>
+<file path=ppt/slides/slide24.xml><?xml version="1.0" encoding="utf-8"?>
 <p:sld xmlns:a="http://schemas.openxmlformats.org/drawingml/2006/main" xmlns:r="http://schemas.openxmlformats.org/officeDocument/2006/relationships" xmlns:p="http://schemas.openxmlformats.org/presentationml/2006/main">
   <p:cSld>
     <p:spTree>
@@ -12731,7 +13375,255 @@
 </p:sld>
 </file>
 
+<file path=ppt/slides/slide25.xml><?xml version="1.0" encoding="utf-8"?>
+<p:sld xmlns:a="http://schemas.openxmlformats.org/drawingml/2006/main" xmlns:r="http://schemas.openxmlformats.org/officeDocument/2006/relationships" xmlns:p="http://schemas.openxmlformats.org/presentationml/2006/main">
+  <p:cSld>
+    <p:spTree>
+      <p:nvGrpSpPr>
+        <p:cNvPr id="1" name=""/>
+        <p:cNvGrpSpPr/>
+        <p:nvPr/>
+      </p:nvGrpSpPr>
+      <p:grpSpPr>
+        <a:xfrm>
+          <a:off x="0" y="0"/>
+          <a:ext cx="0" cy="0"/>
+          <a:chOff x="0" y="0"/>
+          <a:chExt cx="0" cy="0"/>
+        </a:xfrm>
+      </p:grpSpPr>
+      <p:sp>
+        <p:nvSpPr>
+          <p:cNvPr id="2" name="Title 1"/>
+          <p:cNvSpPr>
+            <a:spLocks noGrp="1"/>
+          </p:cNvSpPr>
+          <p:nvPr>
+            <p:ph type="title"/>
+          </p:nvPr>
+        </p:nvSpPr>
+        <p:spPr/>
+        <p:txBody>
+          <a:bodyPr/>
+          <a:lstStyle/>
+          <a:p>
+            <a:r>
+              <a:rPr lang="en-US" dirty="0" smtClean="0"/>
+              <a:t>Questions?</a:t>
+            </a:r>
+            <a:endParaRPr lang="en-US" dirty="0"/>
+          </a:p>
+        </p:txBody>
+      </p:sp>
+      <p:pic>
+        <p:nvPicPr>
+          <p:cNvPr id="1026" name="Picture 2" descr="thinkingboy outline by ryanlerch - an image from the US government EPA &quot;Sunwise&quot; program. I converted it from PDF format. the source link is here - http://www.epa.gov/sunwise/doc/poster.pdf"/>
+          <p:cNvPicPr>
+            <a:picLocks noGrp="1" noChangeAspect="1" noChangeArrowheads="1"/>
+          </p:cNvPicPr>
+          <p:nvPr>
+            <p:ph idx="1"/>
+          </p:nvPr>
+        </p:nvPicPr>
+        <p:blipFill>
+          <a:blip r:embed="rId2">
+            <a:extLst>
+              <a:ext uri="{28A0092B-C50C-407E-A947-70E740481C1C}">
+                <a14:useLocalDpi xmlns:a14="http://schemas.microsoft.com/office/drawing/2010/main" val="0"/>
+              </a:ext>
+            </a:extLst>
+          </a:blip>
+          <a:srcRect/>
+          <a:stretch>
+            <a:fillRect/>
+          </a:stretch>
+        </p:blipFill>
+        <p:spPr bwMode="auto">
+          <a:xfrm>
+            <a:off x="4473086" y="1825625"/>
+            <a:ext cx="3245828" cy="4351338"/>
+          </a:xfrm>
+          <a:prstGeom prst="rect">
+            <a:avLst/>
+          </a:prstGeom>
+          <a:noFill/>
+          <a:extLst>
+            <a:ext uri="{909E8E84-426E-40DD-AFC4-6F175D3DCCD1}">
+              <a14:hiddenFill xmlns:a14="http://schemas.microsoft.com/office/drawing/2010/main">
+                <a:solidFill>
+                  <a:srgbClr val="FFFFFF"/>
+                </a:solidFill>
+              </a14:hiddenFill>
+            </a:ext>
+          </a:extLst>
+        </p:spPr>
+      </p:pic>
+    </p:spTree>
+    <p:extLst>
+      <p:ext uri="{BB962C8B-B14F-4D97-AF65-F5344CB8AC3E}">
+        <p14:creationId xmlns:p14="http://schemas.microsoft.com/office/powerpoint/2010/main" val="1061971297"/>
+      </p:ext>
+    </p:extLst>
+  </p:cSld>
+  <p:clrMapOvr>
+    <a:masterClrMapping/>
+  </p:clrMapOvr>
+</p:sld>
+</file>
+
 <file path=ppt/slides/slide3.xml><?xml version="1.0" encoding="utf-8"?>
+<p:sld xmlns:a="http://schemas.openxmlformats.org/drawingml/2006/main" xmlns:r="http://schemas.openxmlformats.org/officeDocument/2006/relationships" xmlns:p="http://schemas.openxmlformats.org/presentationml/2006/main">
+  <p:cSld>
+    <p:spTree>
+      <p:nvGrpSpPr>
+        <p:cNvPr id="1" name=""/>
+        <p:cNvGrpSpPr/>
+        <p:nvPr/>
+      </p:nvGrpSpPr>
+      <p:grpSpPr>
+        <a:xfrm>
+          <a:off x="0" y="0"/>
+          <a:ext cx="0" cy="0"/>
+          <a:chOff x="0" y="0"/>
+          <a:chExt cx="0" cy="0"/>
+        </a:xfrm>
+      </p:grpSpPr>
+      <p:sp>
+        <p:nvSpPr>
+          <p:cNvPr id="2" name="Title 1"/>
+          <p:cNvSpPr>
+            <a:spLocks noGrp="1"/>
+          </p:cNvSpPr>
+          <p:nvPr>
+            <p:ph type="title"/>
+          </p:nvPr>
+        </p:nvSpPr>
+        <p:spPr/>
+        <p:txBody>
+          <a:bodyPr/>
+          <a:lstStyle/>
+          <a:p>
+            <a:r>
+              <a:rPr lang="en-US" dirty="0" smtClean="0"/>
+              <a:t>Agenda</a:t>
+            </a:r>
+            <a:endParaRPr lang="en-US" dirty="0"/>
+          </a:p>
+        </p:txBody>
+      </p:sp>
+      <p:sp>
+        <p:nvSpPr>
+          <p:cNvPr id="3" name="Content Placeholder 2"/>
+          <p:cNvSpPr>
+            <a:spLocks noGrp="1"/>
+          </p:cNvSpPr>
+          <p:nvPr>
+            <p:ph idx="1"/>
+          </p:nvPr>
+        </p:nvSpPr>
+        <p:spPr/>
+        <p:txBody>
+          <a:bodyPr>
+            <a:normAutofit/>
+          </a:bodyPr>
+          <a:lstStyle/>
+          <a:p>
+            <a:r>
+              <a:rPr lang="en-US" dirty="0" smtClean="0"/>
+              <a:t>Spring </a:t>
+            </a:r>
+            <a:r>
+              <a:rPr lang="en-US" dirty="0" smtClean="0"/>
+              <a:t>Framework</a:t>
+            </a:r>
+          </a:p>
+          <a:p>
+            <a:r>
+              <a:rPr lang="en-US" dirty="0" smtClean="0"/>
+              <a:t>Introduction to Spring </a:t>
+            </a:r>
+            <a:r>
+              <a:rPr lang="en-US" dirty="0" smtClean="0"/>
+              <a:t>Boot</a:t>
+            </a:r>
+          </a:p>
+          <a:p>
+            <a:pPr lvl="1"/>
+            <a:r>
+              <a:rPr lang="en-US" dirty="0" smtClean="0"/>
+              <a:t>Philosophy, goals, features, benefits and limitations</a:t>
+            </a:r>
+          </a:p>
+          <a:p>
+            <a:pPr lvl="1"/>
+            <a:r>
+              <a:rPr lang="en-US" dirty="0" smtClean="0"/>
+              <a:t>How to?</a:t>
+            </a:r>
+          </a:p>
+          <a:p>
+            <a:pPr lvl="1"/>
+            <a:r>
+              <a:rPr lang="en-US" dirty="0" smtClean="0"/>
+              <a:t>Live </a:t>
+            </a:r>
+            <a:r>
+              <a:rPr lang="en-US" dirty="0" smtClean="0"/>
+              <a:t>Demo</a:t>
+            </a:r>
+          </a:p>
+          <a:p>
+            <a:pPr lvl="1"/>
+            <a:endParaRPr lang="en-US" dirty="0"/>
+          </a:p>
+          <a:p>
+            <a:r>
+              <a:rPr lang="en-US" dirty="0"/>
+              <a:t>REST principles</a:t>
+            </a:r>
+          </a:p>
+          <a:p>
+            <a:r>
+              <a:rPr lang="en-US" dirty="0" smtClean="0"/>
+              <a:t>Micro-services</a:t>
+            </a:r>
+            <a:endParaRPr lang="en-US" dirty="0" smtClean="0"/>
+          </a:p>
+          <a:p>
+            <a:r>
+              <a:rPr lang="en-US" dirty="0" smtClean="0"/>
+              <a:t>Q&amp;A</a:t>
+            </a:r>
+          </a:p>
+          <a:p>
+            <a:endParaRPr lang="en-US" dirty="0" smtClean="0"/>
+          </a:p>
+          <a:p>
+            <a:endParaRPr lang="en-US" dirty="0"/>
+          </a:p>
+        </p:txBody>
+      </p:sp>
+    </p:spTree>
+    <p:extLst>
+      <p:ext uri="{BB962C8B-B14F-4D97-AF65-F5344CB8AC3E}">
+        <p14:creationId xmlns:p14="http://schemas.microsoft.com/office/powerpoint/2010/main" val="3363239950"/>
+      </p:ext>
+    </p:extLst>
+  </p:cSld>
+  <p:clrMapOvr>
+    <a:masterClrMapping/>
+  </p:clrMapOvr>
+  <p:timing>
+    <p:tnLst>
+      <p:par>
+        <p:cTn id="1" dur="indefinite" restart="never" nodeType="tmRoot"/>
+      </p:par>
+    </p:tnLst>
+  </p:timing>
+</p:sld>
+</file>
+
+<file path=ppt/slides/slide4.xml><?xml version="1.0" encoding="utf-8"?>
 <p:sld xmlns:a="http://schemas.openxmlformats.org/drawingml/2006/main" xmlns:r="http://schemas.openxmlformats.org/officeDocument/2006/relationships" xmlns:p="http://schemas.openxmlformats.org/presentationml/2006/main">
   <p:cSld>
     <p:spTree>
@@ -12881,146 +13773,13 @@
   <p:clrMapOvr>
     <a:masterClrMapping/>
   </p:clrMapOvr>
-</p:sld>
-</file>
-
-<file path=ppt/slides/slide4.xml><?xml version="1.0" encoding="utf-8"?>
-<p:sld xmlns:a="http://schemas.openxmlformats.org/drawingml/2006/main" xmlns:r="http://schemas.openxmlformats.org/officeDocument/2006/relationships" xmlns:p="http://schemas.openxmlformats.org/presentationml/2006/main">
-  <p:cSld>
-    <p:spTree>
-      <p:nvGrpSpPr>
-        <p:cNvPr id="1" name=""/>
-        <p:cNvGrpSpPr/>
-        <p:nvPr/>
-      </p:nvGrpSpPr>
-      <p:grpSpPr>
-        <a:xfrm>
-          <a:off x="0" y="0"/>
-          <a:ext cx="0" cy="0"/>
-          <a:chOff x="0" y="0"/>
-          <a:chExt cx="0" cy="0"/>
-        </a:xfrm>
-      </p:grpSpPr>
-      <p:sp>
-        <p:nvSpPr>
-          <p:cNvPr id="2" name="Title 1"/>
-          <p:cNvSpPr>
-            <a:spLocks noGrp="1"/>
-          </p:cNvSpPr>
-          <p:nvPr>
-            <p:ph type="title"/>
-          </p:nvPr>
-        </p:nvSpPr>
-        <p:spPr/>
-        <p:txBody>
-          <a:bodyPr/>
-          <a:lstStyle/>
-          <a:p>
-            <a:r>
-              <a:rPr lang="en-US" dirty="0" smtClean="0"/>
-              <a:t>Convention over Configuration</a:t>
-            </a:r>
-            <a:endParaRPr lang="en-US" dirty="0"/>
-          </a:p>
-        </p:txBody>
-      </p:sp>
-      <p:sp>
-        <p:nvSpPr>
-          <p:cNvPr id="3" name="Content Placeholder 2"/>
-          <p:cNvSpPr>
-            <a:spLocks noGrp="1"/>
-          </p:cNvSpPr>
-          <p:nvPr>
-            <p:ph idx="1"/>
-          </p:nvPr>
-        </p:nvSpPr>
-        <p:spPr/>
-        <p:txBody>
-          <a:bodyPr>
-            <a:normAutofit/>
-          </a:bodyPr>
-          <a:lstStyle/>
-          <a:p>
-            <a:pPr marL="0" indent="0">
-              <a:buNone/>
-            </a:pPr>
-            <a:endParaRPr lang="en-US" dirty="0" smtClean="0"/>
-          </a:p>
-          <a:p>
-            <a:r>
-              <a:rPr lang="en-US" dirty="0" smtClean="0"/>
-              <a:t>DRY Principle – Do not repeat yourself!</a:t>
-            </a:r>
-          </a:p>
-          <a:p>
-            <a:r>
-              <a:rPr lang="en-US" smtClean="0"/>
-              <a:t>Start with </a:t>
-            </a:r>
-            <a:r>
-              <a:rPr lang="en-US" dirty="0" smtClean="0"/>
-              <a:t>sensible defaults</a:t>
-            </a:r>
-          </a:p>
-          <a:p>
-            <a:r>
-              <a:rPr lang="en-US" dirty="0" smtClean="0"/>
-              <a:t>You should only have to configure something to use it for customization (non default setting).</a:t>
-            </a:r>
-          </a:p>
-          <a:p>
-            <a:pPr marL="0" indent="0">
-              <a:buNone/>
-            </a:pPr>
-            <a:endParaRPr lang="en-US" dirty="0" smtClean="0"/>
-          </a:p>
-          <a:p>
-            <a:pPr marL="0" indent="0">
-              <a:buNone/>
-            </a:pPr>
-            <a:r>
-              <a:rPr lang="en-US" dirty="0" smtClean="0"/>
-              <a:t>Example: Did you include </a:t>
-            </a:r>
-            <a:r>
-              <a:rPr lang="en-US" dirty="0" err="1"/>
-              <a:t>L</a:t>
-            </a:r>
-            <a:r>
-              <a:rPr lang="en-US" dirty="0" err="1" smtClean="0"/>
-              <a:t>ogback</a:t>
-            </a:r>
-            <a:r>
-              <a:rPr lang="en-US" dirty="0" smtClean="0"/>
-              <a:t> in the </a:t>
-            </a:r>
-            <a:r>
-              <a:rPr lang="en-US" dirty="0" err="1" smtClean="0"/>
-              <a:t>classpath</a:t>
-            </a:r>
-            <a:r>
-              <a:rPr lang="en-US" dirty="0" smtClean="0"/>
-              <a:t>? Spring Boot will assume that you want to use it and will attempt to configure it. </a:t>
-            </a:r>
-          </a:p>
-          <a:p>
-            <a:pPr marL="0" indent="0">
-              <a:buNone/>
-            </a:pPr>
-            <a:endParaRPr lang="en-US" dirty="0"/>
-          </a:p>
-        </p:txBody>
-      </p:sp>
-    </p:spTree>
-    <p:extLst>
-      <p:ext uri="{BB962C8B-B14F-4D97-AF65-F5344CB8AC3E}">
-        <p14:creationId xmlns:p14="http://schemas.microsoft.com/office/powerpoint/2010/main" val="3682208326"/>
-      </p:ext>
-    </p:extLst>
-  </p:cSld>
-  <p:clrMapOvr>
-    <a:masterClrMapping/>
-  </p:clrMapOvr>
+  <p:timing>
+    <p:tnLst>
+      <p:par>
+        <p:cTn id="1" dur="indefinite" restart="never" nodeType="tmRoot"/>
+      </p:par>
+    </p:tnLst>
+  </p:timing>
 </p:sld>
 </file>
 
@@ -13058,7 +13817,7 @@
           <a:p>
             <a:r>
               <a:rPr lang="en-US" dirty="0" smtClean="0"/>
-              <a:t>Spring Boot – Getting to know</a:t>
+              <a:t>Convention over Configuration</a:t>
             </a:r>
             <a:endParaRPr lang="en-US" dirty="0"/>
           </a:p>
@@ -13089,58 +13848,64 @@
           <a:p>
             <a:r>
               <a:rPr lang="en-US" dirty="0" smtClean="0"/>
-              <a:t>App packaged as an executable jar* and runs on an embedded </a:t>
+              <a:t>DRY Principle – Do not repeat yourself!</a:t>
+            </a:r>
+          </a:p>
+          <a:p>
+            <a:r>
+              <a:rPr lang="en-US" smtClean="0"/>
+              <a:t>Start with </a:t>
             </a:r>
             <a:r>
               <a:rPr lang="en-US" dirty="0" smtClean="0"/>
-              <a:t>Tomcat. </a:t>
+              <a:t>sensible defaults</a:t>
             </a:r>
           </a:p>
           <a:p>
             <a:r>
               <a:rPr lang="en-US" dirty="0" smtClean="0"/>
-              <a:t>Fully </a:t>
-            </a:r>
+              <a:t>You should only have to configure something to use it for customization (non default setting).</a:t>
+            </a:r>
+          </a:p>
+          <a:p>
+            <a:pPr marL="0" indent="0">
+              <a:buNone/>
+            </a:pPr>
+            <a:endParaRPr lang="en-US" dirty="0" smtClean="0"/>
+          </a:p>
+          <a:p>
+            <a:pPr marL="0" indent="0">
+              <a:buNone/>
+            </a:pPr>
             <a:r>
               <a:rPr lang="en-US" dirty="0" smtClean="0"/>
-              <a:t>supports all of traditional Spring </a:t>
+              <a:t>Example: Did you include </a:t>
+            </a:r>
+            <a:r>
+              <a:rPr lang="en-US" dirty="0" err="1"/>
+              <a:t>L</a:t>
+            </a:r>
+            <a:r>
+              <a:rPr lang="en-US" dirty="0" err="1" smtClean="0"/>
+              <a:t>ogback</a:t>
             </a:r>
             <a:r>
               <a:rPr lang="en-US" dirty="0" smtClean="0"/>
-              <a:t>features (In a way Spring Boot is a layer on top of Spring infrastructure)</a:t>
-            </a:r>
-          </a:p>
-          <a:p>
+              <a:t> in the </a:t>
+            </a:r>
+            <a:r>
+              <a:rPr lang="en-US" dirty="0" err="1" smtClean="0"/>
+              <a:t>classpath</a:t>
+            </a:r>
             <a:r>
               <a:rPr lang="en-US" dirty="0" smtClean="0"/>
-              <a:t>Out </a:t>
-            </a:r>
-            <a:r>
-              <a:rPr lang="en-US" dirty="0" smtClean="0"/>
-              <a:t>of the box Production ready management/monitoring features including Auditing, Tracing, Metrics and Process monitoring. </a:t>
-            </a:r>
-          </a:p>
-          <a:p>
-            <a:r>
-              <a:rPr lang="en-US" dirty="0" smtClean="0"/>
-              <a:t>Cloud deployment support - </a:t>
-            </a:r>
-            <a:r>
-              <a:rPr lang="en-US" dirty="0" err="1" smtClean="0"/>
-              <a:t>Heroku</a:t>
-            </a:r>
-            <a:r>
-              <a:rPr lang="en-US" dirty="0" smtClean="0"/>
-              <a:t>, </a:t>
-            </a:r>
-            <a:r>
-              <a:rPr lang="en-US" dirty="0" err="1" smtClean="0"/>
-              <a:t>Openshift</a:t>
-            </a:r>
-            <a:r>
-              <a:rPr lang="en-US" dirty="0" smtClean="0"/>
-              <a:t>, Cloud Foundry, Google app engine etc.</a:t>
-            </a:r>
+              <a:t>? Spring Boot will assume that you want to use it and will attempt to configure it. </a:t>
+            </a:r>
+          </a:p>
+          <a:p>
+            <a:pPr marL="0" indent="0">
+              <a:buNone/>
+            </a:pPr>
             <a:endParaRPr lang="en-US" dirty="0"/>
           </a:p>
         </p:txBody>
@@ -13148,7 +13913,7 @@
     </p:spTree>
     <p:extLst>
       <p:ext uri="{BB962C8B-B14F-4D97-AF65-F5344CB8AC3E}">
-        <p14:creationId xmlns:p14="http://schemas.microsoft.com/office/powerpoint/2010/main" val="1861585912"/>
+        <p14:creationId xmlns:p14="http://schemas.microsoft.com/office/powerpoint/2010/main" val="3682208326"/>
       </p:ext>
     </p:extLst>
   </p:cSld>
@@ -13192,11 +13957,7 @@
           <a:p>
             <a:r>
               <a:rPr lang="en-US" dirty="0" smtClean="0"/>
-              <a:t>Spring Boot </a:t>
-            </a:r>
-            <a:r>
-              <a:rPr lang="en-US" dirty="0" smtClean="0"/>
-              <a:t>– Getting started</a:t>
+              <a:t>Spring Boot – Getting to know</a:t>
             </a:r>
             <a:endParaRPr lang="en-US" dirty="0"/>
           </a:p>
@@ -13227,60 +13988,42 @@
           <a:p>
             <a:r>
               <a:rPr lang="en-US" dirty="0" smtClean="0"/>
-              <a:t>Initializer class with a </a:t>
-            </a:r>
-            <a:r>
-              <a:rPr lang="en-US" b="1" dirty="0" smtClean="0"/>
-              <a:t>Main method </a:t>
-            </a:r>
+              <a:t>App packaged as an executable jar* and runs on an embedded Tomcat. </a:t>
+            </a:r>
+          </a:p>
+          <a:p>
             <a:r>
               <a:rPr lang="en-US" dirty="0" smtClean="0"/>
-              <a:t>– Entry point of the app</a:t>
+              <a:t>Fully supports all of traditional Spring features (In a way Spring Boot is a layer on top of Spring infrastructure)</a:t>
             </a:r>
           </a:p>
           <a:p>
             <a:r>
               <a:rPr lang="en-US" dirty="0" smtClean="0"/>
-              <a:t>Maven – Parent (</a:t>
-            </a:r>
-            <a:r>
-              <a:rPr lang="en-US" b="1" dirty="0" smtClean="0"/>
-              <a:t>spring-boot-starter-parent</a:t>
-            </a:r>
+              <a:t>Out of the box Production ready management/monitoring features including Auditing, Tracing, Metrics and Process monitoring. </a:t>
+            </a:r>
+          </a:p>
+          <a:p>
             <a:r>
               <a:rPr lang="en-US" dirty="0" smtClean="0"/>
-              <a:t>)*</a:t>
-            </a:r>
-          </a:p>
-          <a:p>
+              <a:t>Cloud deployment support - </a:t>
+            </a:r>
+            <a:r>
+              <a:rPr lang="en-US" dirty="0" err="1" smtClean="0"/>
+              <a:t>Heroku</a:t>
+            </a:r>
             <a:r>
               <a:rPr lang="en-US" dirty="0" smtClean="0"/>
-              <a:t>Optional </a:t>
-            </a:r>
-            <a:r>
-              <a:rPr lang="en-US" b="1" dirty="0" err="1" smtClean="0"/>
-              <a:t>application.properties</a:t>
+              <a:t>, </a:t>
+            </a:r>
+            <a:r>
+              <a:rPr lang="en-US" dirty="0" err="1" smtClean="0"/>
+              <a:t>Openshift</a:t>
             </a:r>
             <a:r>
               <a:rPr lang="en-US" dirty="0" smtClean="0"/>
-              <a:t> for custom/overriding default </a:t>
-            </a:r>
-            <a:r>
-              <a:rPr lang="en-US" dirty="0" err="1" smtClean="0"/>
-              <a:t>config</a:t>
-            </a:r>
-            <a:endParaRPr lang="en-US" dirty="0" smtClean="0"/>
-          </a:p>
-          <a:p>
-            <a:r>
-              <a:rPr lang="en-US" dirty="0" smtClean="0">
-                <a:hlinkClick r:id="rId3"/>
-              </a:rPr>
-              <a:t>Auto-configuration</a:t>
-            </a:r>
-            <a:endParaRPr lang="en-US" dirty="0" smtClean="0"/>
-          </a:p>
-          <a:p>
+              <a:t>, Cloud Foundry, Google app engine etc.</a:t>
+            </a:r>
             <a:endParaRPr lang="en-US" dirty="0"/>
           </a:p>
         </p:txBody>
@@ -13288,7 +14031,7 @@
     </p:spTree>
     <p:extLst>
       <p:ext uri="{BB962C8B-B14F-4D97-AF65-F5344CB8AC3E}">
-        <p14:creationId xmlns:p14="http://schemas.microsoft.com/office/powerpoint/2010/main" val="4087314675"/>
+        <p14:creationId xmlns:p14="http://schemas.microsoft.com/office/powerpoint/2010/main" val="1861585912"/>
       </p:ext>
     </p:extLst>
   </p:cSld>
@@ -13332,13 +14075,9 @@
           <a:p>
             <a:r>
               <a:rPr lang="en-US" dirty="0" smtClean="0"/>
-              <a:t>Hello world </a:t>
-            </a:r>
-            <a:r>
-              <a:rPr lang="en-US" smtClean="0"/>
-              <a:t>with Spring Boot</a:t>
-            </a:r>
-            <a:endParaRPr lang="en-US"/>
+              <a:t>Spring Boot – Getting started</a:t>
+            </a:r>
+            <a:endParaRPr lang="en-US" dirty="0"/>
           </a:p>
         </p:txBody>
       </p:sp>
@@ -13354,8 +14093,72 @@
         </p:nvSpPr>
         <p:spPr/>
         <p:txBody>
-          <a:bodyPr/>
-          <a:lstStyle/>
+          <a:bodyPr>
+            <a:normAutofit/>
+          </a:bodyPr>
+          <a:lstStyle/>
+          <a:p>
+            <a:pPr marL="0" indent="0">
+              <a:buNone/>
+            </a:pPr>
+            <a:endParaRPr lang="en-US" dirty="0" smtClean="0"/>
+          </a:p>
+          <a:p>
+            <a:r>
+              <a:rPr lang="en-US" dirty="0" smtClean="0"/>
+              <a:t>Initializer class with a </a:t>
+            </a:r>
+            <a:r>
+              <a:rPr lang="en-US" b="1" dirty="0" smtClean="0"/>
+              <a:t>Main method </a:t>
+            </a:r>
+            <a:r>
+              <a:rPr lang="en-US" dirty="0" smtClean="0"/>
+              <a:t>– Entry point of the app</a:t>
+            </a:r>
+          </a:p>
+          <a:p>
+            <a:r>
+              <a:rPr lang="en-US" dirty="0" smtClean="0"/>
+              <a:t>Maven – Parent (</a:t>
+            </a:r>
+            <a:r>
+              <a:rPr lang="en-US" b="1" dirty="0" smtClean="0"/>
+              <a:t>spring-boot-starter-parent</a:t>
+            </a:r>
+            <a:r>
+              <a:rPr lang="en-US" dirty="0" smtClean="0"/>
+              <a:t>)*</a:t>
+            </a:r>
+          </a:p>
+          <a:p>
+            <a:r>
+              <a:rPr lang="en-US" dirty="0" smtClean="0"/>
+              <a:t>Optional </a:t>
+            </a:r>
+            <a:r>
+              <a:rPr lang="en-US" b="1" dirty="0" err="1" smtClean="0"/>
+              <a:t>application.properties</a:t>
+            </a:r>
+            <a:r>
+              <a:rPr lang="en-US" dirty="0" smtClean="0"/>
+              <a:t> for custom/overriding default </a:t>
+            </a:r>
+            <a:r>
+              <a:rPr lang="en-US" dirty="0" err="1" smtClean="0"/>
+              <a:t>config</a:t>
+            </a:r>
+            <a:endParaRPr lang="en-US" dirty="0" smtClean="0"/>
+          </a:p>
+          <a:p>
+            <a:r>
+              <a:rPr lang="en-US" dirty="0" smtClean="0">
+                <a:hlinkClick r:id="rId3"/>
+              </a:rPr>
+              <a:t>Auto-configuration</a:t>
+            </a:r>
+            <a:endParaRPr lang="en-US" dirty="0" smtClean="0"/>
+          </a:p>
           <a:p>
             <a:endParaRPr lang="en-US" dirty="0"/>
           </a:p>
@@ -13364,7 +14167,7 @@
     </p:spTree>
     <p:extLst>
       <p:ext uri="{BB962C8B-B14F-4D97-AF65-F5344CB8AC3E}">
-        <p14:creationId xmlns:p14="http://schemas.microsoft.com/office/powerpoint/2010/main" val="2043375816"/>
+        <p14:creationId xmlns:p14="http://schemas.microsoft.com/office/powerpoint/2010/main" val="4087314675"/>
       </p:ext>
     </p:extLst>
   </p:cSld>
@@ -13408,9 +14211,13 @@
           <a:p>
             <a:r>
               <a:rPr lang="en-US" dirty="0" smtClean="0"/>
-              <a:t>Spring Boot - Features</a:t>
-            </a:r>
-            <a:endParaRPr lang="en-US" dirty="0"/>
+              <a:t>Hello world </a:t>
+            </a:r>
+            <a:r>
+              <a:rPr lang="en-US" smtClean="0"/>
+              <a:t>with Spring Boot</a:t>
+            </a:r>
+            <a:endParaRPr lang="en-US"/>
           </a:p>
         </p:txBody>
       </p:sp>
@@ -13426,108 +14233,9 @@
         </p:nvSpPr>
         <p:spPr/>
         <p:txBody>
-          <a:bodyPr>
-            <a:normAutofit lnSpcReduction="10000"/>
-          </a:bodyPr>
-          <a:lstStyle/>
-          <a:p>
-            <a:r>
-              <a:rPr lang="en-US" dirty="0" smtClean="0">
-                <a:hlinkClick r:id="rId2"/>
-              </a:rPr>
-              <a:t>Externalized </a:t>
-            </a:r>
-            <a:r>
-              <a:rPr lang="en-US" dirty="0" err="1" smtClean="0">
-                <a:hlinkClick r:id="rId2"/>
-              </a:rPr>
-              <a:t>Config</a:t>
-            </a:r>
-            <a:endParaRPr lang="en-US" dirty="0" smtClean="0"/>
-          </a:p>
-          <a:p>
-            <a:r>
-              <a:rPr lang="en-US" dirty="0" smtClean="0">
-                <a:hlinkClick r:id="rId2"/>
-              </a:rPr>
-              <a:t>Profiles</a:t>
-            </a:r>
-            <a:endParaRPr lang="en-US" dirty="0" smtClean="0"/>
-          </a:p>
-          <a:p>
-            <a:r>
-              <a:rPr lang="en-US" dirty="0" smtClean="0">
-                <a:hlinkClick r:id="rId3"/>
-              </a:rPr>
-              <a:t>Logging</a:t>
-            </a:r>
-            <a:endParaRPr lang="en-US" dirty="0" smtClean="0"/>
-          </a:p>
-          <a:p>
-            <a:r>
-              <a:rPr lang="en-US" dirty="0" smtClean="0">
-                <a:hlinkClick r:id="rId4"/>
-              </a:rPr>
-              <a:t>Static Content </a:t>
-            </a:r>
-            <a:r>
-              <a:rPr lang="en-US" dirty="0" smtClean="0"/>
-              <a:t>/w Live Reload &amp; Hot Swapping for Java</a:t>
-            </a:r>
-          </a:p>
-          <a:p>
-            <a:r>
-              <a:rPr lang="en-US" dirty="0" smtClean="0">
-                <a:hlinkClick r:id="rId5"/>
-              </a:rPr>
-              <a:t>Embedded Server customization</a:t>
-            </a:r>
-            <a:endParaRPr lang="en-US" dirty="0" smtClean="0"/>
-          </a:p>
-          <a:p>
-            <a:r>
-              <a:rPr lang="en-US" dirty="0" smtClean="0">
-                <a:hlinkClick r:id="rId6"/>
-              </a:rPr>
-              <a:t>Security</a:t>
-            </a:r>
-            <a:endParaRPr lang="en-US" dirty="0" smtClean="0"/>
-          </a:p>
-          <a:p>
-            <a:r>
-              <a:rPr lang="en-US" dirty="0" smtClean="0">
-                <a:hlinkClick r:id="rId7"/>
-              </a:rPr>
-              <a:t>SQL </a:t>
-            </a:r>
-            <a:r>
-              <a:rPr lang="en-US" dirty="0" smtClean="0"/>
-              <a:t>&amp; </a:t>
-            </a:r>
-            <a:r>
-              <a:rPr lang="en-US" dirty="0" smtClean="0">
-                <a:hlinkClick r:id="rId8"/>
-              </a:rPr>
-              <a:t>NoSQL </a:t>
-            </a:r>
-            <a:r>
-              <a:rPr lang="en-US" dirty="0" smtClean="0"/>
-              <a:t>Database configuration</a:t>
-            </a:r>
-          </a:p>
-          <a:p>
-            <a:r>
-              <a:rPr lang="en-US" dirty="0" smtClean="0"/>
-              <a:t>Testing</a:t>
-            </a:r>
-          </a:p>
-          <a:p>
-            <a:r>
-              <a:rPr lang="en-US" dirty="0" smtClean="0">
-                <a:hlinkClick r:id="rId9"/>
-              </a:rPr>
-              <a:t>Messaging</a:t>
-            </a:r>
+          <a:bodyPr/>
+          <a:lstStyle/>
+          <a:p>
             <a:endParaRPr lang="en-US" dirty="0"/>
           </a:p>
         </p:txBody>
@@ -13535,7 +14243,7 @@
     </p:spTree>
     <p:extLst>
       <p:ext uri="{BB962C8B-B14F-4D97-AF65-F5344CB8AC3E}">
-        <p14:creationId xmlns:p14="http://schemas.microsoft.com/office/powerpoint/2010/main" val="1225777219"/>
+        <p14:creationId xmlns:p14="http://schemas.microsoft.com/office/powerpoint/2010/main" val="2043375816"/>
       </p:ext>
     </p:extLst>
   </p:cSld>
@@ -13579,7 +14287,7 @@
           <a:p>
             <a:r>
               <a:rPr lang="en-US" dirty="0" smtClean="0"/>
-              <a:t>Spring Boot – Features (Contd..)</a:t>
+              <a:t>Spring Boot – Getting Help</a:t>
             </a:r>
             <a:endParaRPr lang="en-US" dirty="0"/>
           </a:p>
@@ -13600,39 +14308,27 @@
           <a:bodyPr/>
           <a:lstStyle/>
           <a:p>
+            <a:r>
+              <a:rPr lang="en-US" dirty="0" smtClean="0"/>
+              <a:t>Spring IO guides</a:t>
+            </a:r>
+          </a:p>
+          <a:p>
+            <a:r>
+              <a:rPr lang="en-US" dirty="0" smtClean="0"/>
+              <a:t>Spring Boot Reference</a:t>
+            </a:r>
+          </a:p>
+          <a:p>
+            <a:r>
+              <a:rPr lang="en-US" dirty="0" smtClean="0"/>
+              <a:t>On </a:t>
+            </a:r>
             <a:r>
               <a:rPr lang="en-US" dirty="0" smtClean="0">
                 <a:hlinkClick r:id="rId2"/>
               </a:rPr>
-              <a:t>Actuator</a:t>
-            </a:r>
-            <a:endParaRPr lang="en-US" dirty="0" smtClean="0"/>
-          </a:p>
-          <a:p>
-            <a:r>
-              <a:rPr lang="en-US" dirty="0" smtClean="0">
-                <a:hlinkClick r:id="rId3"/>
-              </a:rPr>
-              <a:t>HATEOAS</a:t>
-            </a:r>
-            <a:endParaRPr lang="en-US" dirty="0" smtClean="0"/>
-          </a:p>
-          <a:p>
-            <a:r>
-              <a:rPr lang="en-US" dirty="0" smtClean="0">
-                <a:hlinkClick r:id="rId4"/>
-              </a:rPr>
-              <a:t>Solr </a:t>
-            </a:r>
-            <a:r>
-              <a:rPr lang="en-US" dirty="0" smtClean="0"/>
-              <a:t>&amp;  </a:t>
-            </a:r>
-            <a:r>
-              <a:rPr lang="en-US" dirty="0" smtClean="0">
-                <a:hlinkClick r:id="rId5"/>
-              </a:rPr>
-              <a:t>Elasticsearch</a:t>
+              <a:t>Stackoverflow</a:t>
             </a:r>
             <a:endParaRPr lang="en-US" dirty="0"/>
           </a:p>
@@ -13641,7 +14337,7 @@
     </p:spTree>
     <p:extLst>
       <p:ext uri="{BB962C8B-B14F-4D97-AF65-F5344CB8AC3E}">
-        <p14:creationId xmlns:p14="http://schemas.microsoft.com/office/powerpoint/2010/main" val="2413789768"/>
+        <p14:creationId xmlns:p14="http://schemas.microsoft.com/office/powerpoint/2010/main" val="330031475"/>
       </p:ext>
     </p:extLst>
   </p:cSld>

</xml_diff>

<commit_message>
Updated PPT, expanded arch issues
</commit_message>
<xml_diff>
--- a/Spring Boot.pptx
+++ b/Spring Boot.pptx
@@ -5,10 +5,10 @@
     <p:sldMasterId id="2147483648" r:id="rId1"/>
   </p:sldMasterIdLst>
   <p:notesMasterIdLst>
-    <p:notesMasterId r:id="rId27"/>
+    <p:notesMasterId r:id="rId30"/>
   </p:notesMasterIdLst>
   <p:handoutMasterIdLst>
-    <p:handoutMasterId r:id="rId28"/>
+    <p:handoutMasterId r:id="rId31"/>
   </p:handoutMasterIdLst>
   <p:sldIdLst>
     <p:sldId id="256" r:id="rId2"/>
@@ -33,9 +33,12 @@
     <p:sldId id="272" r:id="rId21"/>
     <p:sldId id="262" r:id="rId22"/>
     <p:sldId id="259" r:id="rId23"/>
-    <p:sldId id="273" r:id="rId24"/>
-    <p:sldId id="274" r:id="rId25"/>
-    <p:sldId id="280" r:id="rId26"/>
+    <p:sldId id="283" r:id="rId24"/>
+    <p:sldId id="284" r:id="rId25"/>
+    <p:sldId id="285" r:id="rId26"/>
+    <p:sldId id="282" r:id="rId27"/>
+    <p:sldId id="274" r:id="rId28"/>
+    <p:sldId id="280" r:id="rId29"/>
   </p:sldIdLst>
   <p:sldSz cx="12192000" cy="6858000"/>
   <p:notesSz cx="6858000" cy="9144000"/>
@@ -238,7 +241,7 @@
           <a:p>
             <a:fld id="{7B2C7FEA-B7FB-4AAC-85C3-2BC7C9E6B196}" type="datetimeFigureOut">
               <a:rPr lang="en-US" smtClean="0"/>
-              <a:t>3/17/2015</a:t>
+              <a:t>3/18/2015</a:t>
             </a:fld>
             <a:endParaRPr lang="en-US" dirty="0"/>
           </a:p>
@@ -403,7 +406,7 @@
           <a:p>
             <a:fld id="{98CE4EFE-6887-4330-98E2-9EA0AF676C64}" type="datetimeFigureOut">
               <a:rPr lang="en-US" smtClean="0"/>
-              <a:t>3/17/2015</a:t>
+              <a:t>3/18/2015</a:t>
             </a:fld>
             <a:endParaRPr lang="en-US" dirty="0"/>
           </a:p>
@@ -1523,7 +1526,7 @@
     </p:spTree>
     <p:extLst>
       <p:ext uri="{BB962C8B-B14F-4D97-AF65-F5344CB8AC3E}">
-        <p14:creationId xmlns:p14="http://schemas.microsoft.com/office/powerpoint/2010/main" val="4276762252"/>
+        <p14:creationId xmlns:p14="http://schemas.microsoft.com/office/powerpoint/2010/main" val="2864945359"/>
       </p:ext>
     </p:extLst>
   </p:cSld>
@@ -1607,7 +1610,91 @@
     </p:spTree>
     <p:extLst>
       <p:ext uri="{BB962C8B-B14F-4D97-AF65-F5344CB8AC3E}">
-        <p14:creationId xmlns:p14="http://schemas.microsoft.com/office/powerpoint/2010/main" val="1357648832"/>
+        <p14:creationId xmlns:p14="http://schemas.microsoft.com/office/powerpoint/2010/main" val="257171162"/>
+      </p:ext>
+    </p:extLst>
+  </p:cSld>
+  <p:clrMapOvr>
+    <a:masterClrMapping/>
+  </p:clrMapOvr>
+</p:notes>
+</file>
+
+<file path=ppt/notesSlides/notesSlide19.xml><?xml version="1.0" encoding="utf-8"?>
+<p:notes xmlns:a="http://schemas.openxmlformats.org/drawingml/2006/main" xmlns:r="http://schemas.openxmlformats.org/officeDocument/2006/relationships" xmlns:p="http://schemas.openxmlformats.org/presentationml/2006/main">
+  <p:cSld>
+    <p:spTree>
+      <p:nvGrpSpPr>
+        <p:cNvPr id="1" name=""/>
+        <p:cNvGrpSpPr/>
+        <p:nvPr/>
+      </p:nvGrpSpPr>
+      <p:grpSpPr>
+        <a:xfrm>
+          <a:off x="0" y="0"/>
+          <a:ext cx="0" cy="0"/>
+          <a:chOff x="0" y="0"/>
+          <a:chExt cx="0" cy="0"/>
+        </a:xfrm>
+      </p:grpSpPr>
+      <p:sp>
+        <p:nvSpPr>
+          <p:cNvPr id="2" name="Slide Image Placeholder 1"/>
+          <p:cNvSpPr>
+            <a:spLocks noGrp="1" noRot="1" noChangeAspect="1"/>
+          </p:cNvSpPr>
+          <p:nvPr>
+            <p:ph type="sldImg"/>
+          </p:nvPr>
+        </p:nvSpPr>
+        <p:spPr/>
+      </p:sp>
+      <p:sp>
+        <p:nvSpPr>
+          <p:cNvPr id="3" name="Notes Placeholder 2"/>
+          <p:cNvSpPr>
+            <a:spLocks noGrp="1"/>
+          </p:cNvSpPr>
+          <p:nvPr>
+            <p:ph type="body" idx="1"/>
+          </p:nvPr>
+        </p:nvSpPr>
+        <p:spPr/>
+        <p:txBody>
+          <a:bodyPr/>
+          <a:lstStyle/>
+          <a:p>
+            <a:endParaRPr lang="en-US" dirty="0"/>
+          </a:p>
+        </p:txBody>
+      </p:sp>
+      <p:sp>
+        <p:nvSpPr>
+          <p:cNvPr id="4" name="Slide Number Placeholder 3"/>
+          <p:cNvSpPr>
+            <a:spLocks noGrp="1"/>
+          </p:cNvSpPr>
+          <p:nvPr>
+            <p:ph type="sldNum" sz="quarter" idx="10"/>
+          </p:nvPr>
+        </p:nvSpPr>
+        <p:spPr/>
+        <p:txBody>
+          <a:bodyPr/>
+          <a:lstStyle/>
+          <a:p>
+            <a:fld id="{9F9FB9DD-7CF9-4A0C-8C7F-91FD9EF34B36}" type="slidenum">
+              <a:rPr lang="en-US" smtClean="0"/>
+              <a:t>25</a:t>
+            </a:fld>
+            <a:endParaRPr lang="en-US" dirty="0"/>
+          </a:p>
+        </p:txBody>
+      </p:sp>
+    </p:spTree>
+    <p:extLst>
+      <p:ext uri="{BB962C8B-B14F-4D97-AF65-F5344CB8AC3E}">
+        <p14:creationId xmlns:p14="http://schemas.microsoft.com/office/powerpoint/2010/main" val="1028165449"/>
       </p:ext>
     </p:extLst>
   </p:cSld>
@@ -1716,6 +1803,174 @@
     <p:extLst>
       <p:ext uri="{BB962C8B-B14F-4D97-AF65-F5344CB8AC3E}">
         <p14:creationId xmlns:p14="http://schemas.microsoft.com/office/powerpoint/2010/main" val="1011997961"/>
+      </p:ext>
+    </p:extLst>
+  </p:cSld>
+  <p:clrMapOvr>
+    <a:masterClrMapping/>
+  </p:clrMapOvr>
+</p:notes>
+</file>
+
+<file path=ppt/notesSlides/notesSlide20.xml><?xml version="1.0" encoding="utf-8"?>
+<p:notes xmlns:a="http://schemas.openxmlformats.org/drawingml/2006/main" xmlns:r="http://schemas.openxmlformats.org/officeDocument/2006/relationships" xmlns:p="http://schemas.openxmlformats.org/presentationml/2006/main">
+  <p:cSld>
+    <p:spTree>
+      <p:nvGrpSpPr>
+        <p:cNvPr id="1" name=""/>
+        <p:cNvGrpSpPr/>
+        <p:nvPr/>
+      </p:nvGrpSpPr>
+      <p:grpSpPr>
+        <a:xfrm>
+          <a:off x="0" y="0"/>
+          <a:ext cx="0" cy="0"/>
+          <a:chOff x="0" y="0"/>
+          <a:chExt cx="0" cy="0"/>
+        </a:xfrm>
+      </p:grpSpPr>
+      <p:sp>
+        <p:nvSpPr>
+          <p:cNvPr id="2" name="Slide Image Placeholder 1"/>
+          <p:cNvSpPr>
+            <a:spLocks noGrp="1" noRot="1" noChangeAspect="1"/>
+          </p:cNvSpPr>
+          <p:nvPr>
+            <p:ph type="sldImg"/>
+          </p:nvPr>
+        </p:nvSpPr>
+        <p:spPr/>
+      </p:sp>
+      <p:sp>
+        <p:nvSpPr>
+          <p:cNvPr id="3" name="Notes Placeholder 2"/>
+          <p:cNvSpPr>
+            <a:spLocks noGrp="1"/>
+          </p:cNvSpPr>
+          <p:nvPr>
+            <p:ph type="body" idx="1"/>
+          </p:nvPr>
+        </p:nvSpPr>
+        <p:spPr/>
+        <p:txBody>
+          <a:bodyPr/>
+          <a:lstStyle/>
+          <a:p>
+            <a:endParaRPr lang="en-US" dirty="0"/>
+          </a:p>
+        </p:txBody>
+      </p:sp>
+      <p:sp>
+        <p:nvSpPr>
+          <p:cNvPr id="4" name="Slide Number Placeholder 3"/>
+          <p:cNvSpPr>
+            <a:spLocks noGrp="1"/>
+          </p:cNvSpPr>
+          <p:nvPr>
+            <p:ph type="sldNum" sz="quarter" idx="10"/>
+          </p:nvPr>
+        </p:nvSpPr>
+        <p:spPr/>
+        <p:txBody>
+          <a:bodyPr/>
+          <a:lstStyle/>
+          <a:p>
+            <a:fld id="{9F9FB9DD-7CF9-4A0C-8C7F-91FD9EF34B36}" type="slidenum">
+              <a:rPr lang="en-US" smtClean="0"/>
+              <a:t>26</a:t>
+            </a:fld>
+            <a:endParaRPr lang="en-US" dirty="0"/>
+          </a:p>
+        </p:txBody>
+      </p:sp>
+    </p:spTree>
+    <p:extLst>
+      <p:ext uri="{BB962C8B-B14F-4D97-AF65-F5344CB8AC3E}">
+        <p14:creationId xmlns:p14="http://schemas.microsoft.com/office/powerpoint/2010/main" val="2202958248"/>
+      </p:ext>
+    </p:extLst>
+  </p:cSld>
+  <p:clrMapOvr>
+    <a:masterClrMapping/>
+  </p:clrMapOvr>
+</p:notes>
+</file>
+
+<file path=ppt/notesSlides/notesSlide21.xml><?xml version="1.0" encoding="utf-8"?>
+<p:notes xmlns:a="http://schemas.openxmlformats.org/drawingml/2006/main" xmlns:r="http://schemas.openxmlformats.org/officeDocument/2006/relationships" xmlns:p="http://schemas.openxmlformats.org/presentationml/2006/main">
+  <p:cSld>
+    <p:spTree>
+      <p:nvGrpSpPr>
+        <p:cNvPr id="1" name=""/>
+        <p:cNvGrpSpPr/>
+        <p:nvPr/>
+      </p:nvGrpSpPr>
+      <p:grpSpPr>
+        <a:xfrm>
+          <a:off x="0" y="0"/>
+          <a:ext cx="0" cy="0"/>
+          <a:chOff x="0" y="0"/>
+          <a:chExt cx="0" cy="0"/>
+        </a:xfrm>
+      </p:grpSpPr>
+      <p:sp>
+        <p:nvSpPr>
+          <p:cNvPr id="2" name="Slide Image Placeholder 1"/>
+          <p:cNvSpPr>
+            <a:spLocks noGrp="1" noRot="1" noChangeAspect="1"/>
+          </p:cNvSpPr>
+          <p:nvPr>
+            <p:ph type="sldImg"/>
+          </p:nvPr>
+        </p:nvSpPr>
+        <p:spPr/>
+      </p:sp>
+      <p:sp>
+        <p:nvSpPr>
+          <p:cNvPr id="3" name="Notes Placeholder 2"/>
+          <p:cNvSpPr>
+            <a:spLocks noGrp="1"/>
+          </p:cNvSpPr>
+          <p:nvPr>
+            <p:ph type="body" idx="1"/>
+          </p:nvPr>
+        </p:nvSpPr>
+        <p:spPr/>
+        <p:txBody>
+          <a:bodyPr/>
+          <a:lstStyle/>
+          <a:p>
+            <a:endParaRPr lang="en-US" dirty="0"/>
+          </a:p>
+        </p:txBody>
+      </p:sp>
+      <p:sp>
+        <p:nvSpPr>
+          <p:cNvPr id="4" name="Slide Number Placeholder 3"/>
+          <p:cNvSpPr>
+            <a:spLocks noGrp="1"/>
+          </p:cNvSpPr>
+          <p:nvPr>
+            <p:ph type="sldNum" sz="quarter" idx="10"/>
+          </p:nvPr>
+        </p:nvSpPr>
+        <p:spPr/>
+        <p:txBody>
+          <a:bodyPr/>
+          <a:lstStyle/>
+          <a:p>
+            <a:fld id="{9F9FB9DD-7CF9-4A0C-8C7F-91FD9EF34B36}" type="slidenum">
+              <a:rPr lang="en-US" smtClean="0"/>
+              <a:t>27</a:t>
+            </a:fld>
+            <a:endParaRPr lang="en-US" dirty="0"/>
+          </a:p>
+        </p:txBody>
+      </p:sp>
+    </p:spTree>
+    <p:extLst>
+      <p:ext uri="{BB962C8B-B14F-4D97-AF65-F5344CB8AC3E}">
+        <p14:creationId xmlns:p14="http://schemas.microsoft.com/office/powerpoint/2010/main" val="1357648832"/>
       </p:ext>
     </p:extLst>
   </p:cSld>
@@ -2473,7 +2728,7 @@
           <a:p>
             <a:fld id="{F2C87F99-6566-47F3-94EA-E945E3B61FD1}" type="datetimeFigureOut">
               <a:rPr lang="en-US" smtClean="0"/>
-              <a:t>3/17/2015</a:t>
+              <a:t>3/18/2015</a:t>
             </a:fld>
             <a:endParaRPr lang="en-US" dirty="0"/>
           </a:p>
@@ -2643,7 +2898,7 @@
           <a:p>
             <a:fld id="{F2C87F99-6566-47F3-94EA-E945E3B61FD1}" type="datetimeFigureOut">
               <a:rPr lang="en-US" smtClean="0"/>
-              <a:t>3/17/2015</a:t>
+              <a:t>3/18/2015</a:t>
             </a:fld>
             <a:endParaRPr lang="en-US" dirty="0"/>
           </a:p>
@@ -2823,7 +3078,7 @@
           <a:p>
             <a:fld id="{F2C87F99-6566-47F3-94EA-E945E3B61FD1}" type="datetimeFigureOut">
               <a:rPr lang="en-US" smtClean="0"/>
-              <a:t>3/17/2015</a:t>
+              <a:t>3/18/2015</a:t>
             </a:fld>
             <a:endParaRPr lang="en-US" dirty="0"/>
           </a:p>
@@ -2993,7 +3248,7 @@
           <a:p>
             <a:fld id="{F2C87F99-6566-47F3-94EA-E945E3B61FD1}" type="datetimeFigureOut">
               <a:rPr lang="en-US" smtClean="0"/>
-              <a:t>3/17/2015</a:t>
+              <a:t>3/18/2015</a:t>
             </a:fld>
             <a:endParaRPr lang="en-US" dirty="0"/>
           </a:p>
@@ -3239,7 +3494,7 @@
           <a:p>
             <a:fld id="{F2C87F99-6566-47F3-94EA-E945E3B61FD1}" type="datetimeFigureOut">
               <a:rPr lang="en-US" smtClean="0"/>
-              <a:t>3/17/2015</a:t>
+              <a:t>3/18/2015</a:t>
             </a:fld>
             <a:endParaRPr lang="en-US" dirty="0"/>
           </a:p>
@@ -3471,7 +3726,7 @@
           <a:p>
             <a:fld id="{F2C87F99-6566-47F3-94EA-E945E3B61FD1}" type="datetimeFigureOut">
               <a:rPr lang="en-US" smtClean="0"/>
-              <a:t>3/17/2015</a:t>
+              <a:t>3/18/2015</a:t>
             </a:fld>
             <a:endParaRPr lang="en-US" dirty="0"/>
           </a:p>
@@ -3838,7 +4093,7 @@
           <a:p>
             <a:fld id="{F2C87F99-6566-47F3-94EA-E945E3B61FD1}" type="datetimeFigureOut">
               <a:rPr lang="en-US" smtClean="0"/>
-              <a:t>3/17/2015</a:t>
+              <a:t>3/18/2015</a:t>
             </a:fld>
             <a:endParaRPr lang="en-US" dirty="0"/>
           </a:p>
@@ -3956,7 +4211,7 @@
           <a:p>
             <a:fld id="{F2C87F99-6566-47F3-94EA-E945E3B61FD1}" type="datetimeFigureOut">
               <a:rPr lang="en-US" smtClean="0"/>
-              <a:t>3/17/2015</a:t>
+              <a:t>3/18/2015</a:t>
             </a:fld>
             <a:endParaRPr lang="en-US" dirty="0"/>
           </a:p>
@@ -4051,7 +4306,7 @@
           <a:p>
             <a:fld id="{F2C87F99-6566-47F3-94EA-E945E3B61FD1}" type="datetimeFigureOut">
               <a:rPr lang="en-US" smtClean="0"/>
-              <a:t>3/17/2015</a:t>
+              <a:t>3/18/2015</a:t>
             </a:fld>
             <a:endParaRPr lang="en-US" dirty="0"/>
           </a:p>
@@ -4328,7 +4583,7 @@
           <a:p>
             <a:fld id="{F2C87F99-6566-47F3-94EA-E945E3B61FD1}" type="datetimeFigureOut">
               <a:rPr lang="en-US" smtClean="0"/>
-              <a:t>3/17/2015</a:t>
+              <a:t>3/18/2015</a:t>
             </a:fld>
             <a:endParaRPr lang="en-US" dirty="0"/>
           </a:p>
@@ -4581,7 +4836,7 @@
           <a:p>
             <a:fld id="{F2C87F99-6566-47F3-94EA-E945E3B61FD1}" type="datetimeFigureOut">
               <a:rPr lang="en-US" smtClean="0"/>
-              <a:t>3/17/2015</a:t>
+              <a:t>3/18/2015</a:t>
             </a:fld>
             <a:endParaRPr lang="en-US" dirty="0"/>
           </a:p>
@@ -4794,7 +5049,7 @@
           <a:p>
             <a:fld id="{F2C87F99-6566-47F3-94EA-E945E3B61FD1}" type="datetimeFigureOut">
               <a:rPr lang="en-US" smtClean="0"/>
-              <a:t>3/17/2015</a:t>
+              <a:t>3/18/2015</a:t>
             </a:fld>
             <a:endParaRPr lang="en-US" dirty="0"/>
           </a:p>
@@ -5545,7 +5800,6 @@
               <a:rPr lang="en-US" dirty="0" smtClean="0"/>
               <a:t>)</a:t>
             </a:r>
-            <a:endParaRPr lang="en-US" dirty="0" smtClean="0"/>
           </a:p>
           <a:p>
             <a:r>
@@ -5790,7 +6044,15 @@
           <a:p>
             <a:r>
               <a:rPr lang="en-US" dirty="0" smtClean="0"/>
-              <a:t>Introduced in Roy Fielding’s dissertation submitted to UC, Irvine in 2000</a:t>
+              <a:t>Introduced </a:t>
+            </a:r>
+            <a:r>
+              <a:rPr lang="en-US" dirty="0" smtClean="0"/>
+              <a:t>by Roy Fielding’s in </a:t>
+            </a:r>
+            <a:r>
+              <a:rPr lang="en-US" dirty="0" smtClean="0"/>
+              <a:t>dissertation submitted to UC, Irvine in 2000</a:t>
             </a:r>
           </a:p>
           <a:p>
@@ -6436,11 +6698,7 @@
             </a:r>
             <a:r>
               <a:rPr lang="en-US" dirty="0" smtClean="0"/>
-              <a:t>Service can temporarily extend </a:t>
-            </a:r>
-            <a:r>
-              <a:rPr lang="en-US" dirty="0" smtClean="0"/>
-              <a:t>client</a:t>
+              <a:t>Service can temporarily extend client</a:t>
             </a:r>
             <a:endParaRPr lang="en-US" b="1" dirty="0"/>
           </a:p>
@@ -6646,8 +6904,8 @@
         </p:nvSpPr>
         <p:spPr bwMode="auto">
           <a:xfrm>
-            <a:off x="257579" y="1466132"/>
-            <a:ext cx="7095200" cy="5324535"/>
+            <a:off x="257579" y="2004741"/>
+            <a:ext cx="7095200" cy="4247317"/>
           </a:xfrm>
           <a:prstGeom prst="rect">
             <a:avLst/>
@@ -6869,7 +7127,7 @@
               <a:defRPr/>
             </a:pPr>
             <a:r>
-              <a:rPr kumimoji="0" lang="en-US" altLang="en-US" sz="2000" b="1" i="0" u="none" strike="noStrike" cap="none" normalizeH="0" baseline="0" dirty="0" smtClean="0">
+              <a:rPr kumimoji="0" lang="en-US" altLang="en-US" b="1" i="0" u="none" strike="noStrike" cap="none" normalizeH="0" baseline="0" dirty="0" smtClean="0">
                 <a:ln>
                   <a:noFill/>
                 </a:ln>
@@ -6877,14 +7135,12 @@
                   <a:schemeClr val="tx1"/>
                 </a:solidFill>
                 <a:effectLst/>
-                <a:latin typeface="Arial" pitchFamily="34" charset="0"/>
                 <a:ea typeface="Times New Roman" pitchFamily="18" charset="0"/>
-                <a:cs typeface="Arial" pitchFamily="34" charset="0"/>
               </a:rPr>
               <a:t>Level 0</a:t>
             </a:r>
             <a:r>
-              <a:rPr kumimoji="0" lang="en-US" altLang="en-US" sz="2000" b="0" i="0" u="none" strike="noStrike" cap="none" normalizeH="0" baseline="0" dirty="0" smtClean="0">
+              <a:rPr kumimoji="0" lang="en-US" altLang="en-US" b="0" i="0" u="none" strike="noStrike" cap="none" normalizeH="0" baseline="0" dirty="0" smtClean="0">
                 <a:ln>
                   <a:noFill/>
                 </a:ln>
@@ -6892,9 +7148,7 @@
                   <a:schemeClr val="tx1"/>
                 </a:solidFill>
                 <a:effectLst/>
-                <a:latin typeface="Arial" pitchFamily="34" charset="0"/>
                 <a:ea typeface="Times New Roman" pitchFamily="18" charset="0"/>
-                <a:cs typeface="Arial" pitchFamily="34" charset="0"/>
               </a:rPr>
               <a:t>: the Swamp of POX - at this level, we just use HTTP as a transport. </a:t>
             </a:r>
@@ -6911,26 +7165,26 @@
               <a:defRPr/>
             </a:pPr>
             <a:r>
-              <a:rPr lang="en-US" sz="2000" b="1" dirty="0"/>
+              <a:rPr lang="en-US" b="1" dirty="0"/>
               <a:t>Level 1</a:t>
             </a:r>
             <a:r>
-              <a:rPr lang="en-US" sz="2000" dirty="0"/>
+              <a:rPr lang="en-US" dirty="0"/>
               <a:t>: Resources - at this level, a service might use HTTP URIs to distinguish between nouns, or entities, in the system. For example, you might route requests to /customers, /users, etc. XML-RPC is an </a:t>
             </a:r>
             <a:r>
-              <a:rPr lang="en-US" sz="2000" dirty="0" smtClean="0"/>
+              <a:rPr lang="en-US" dirty="0" smtClean="0"/>
               <a:t>example: </a:t>
             </a:r>
             <a:r>
-              <a:rPr lang="en-US" sz="2000" dirty="0"/>
+              <a:rPr lang="en-US" dirty="0"/>
               <a:t>it uses HTTP, and it can use URIs to distinguish endpoints. Ultimately, though, XML-RPC is not RESTful: it’s using HTTP as a transport for something else (remote procedure calls</a:t>
             </a:r>
             <a:r>
-              <a:rPr lang="en-US" sz="2000" dirty="0" smtClean="0"/>
+              <a:rPr lang="en-US" dirty="0" smtClean="0"/>
               <a:t>).</a:t>
             </a:r>
-            <a:endParaRPr kumimoji="0" lang="en-US" altLang="en-US" sz="2000" b="0" i="0" u="none" strike="noStrike" cap="none" normalizeH="0" baseline="0" dirty="0" smtClean="0">
+            <a:endParaRPr kumimoji="0" lang="en-US" altLang="en-US" b="0" i="0" u="none" strike="noStrike" cap="none" normalizeH="0" baseline="0" dirty="0" smtClean="0">
               <a:ln>
                 <a:noFill/>
               </a:ln>
@@ -6938,9 +7192,7 @@
                 <a:schemeClr val="tx1"/>
               </a:solidFill>
               <a:effectLst/>
-              <a:latin typeface="Arial" pitchFamily="34" charset="0"/>
               <a:ea typeface="Times New Roman" pitchFamily="18" charset="0"/>
-              <a:cs typeface="Arial" pitchFamily="34" charset="0"/>
             </a:endParaRPr>
           </a:p>
           <a:p>
@@ -6961,7 +7213,7 @@
               </a:tabLst>
             </a:pPr>
             <a:r>
-              <a:rPr kumimoji="0" lang="en-US" altLang="en-US" sz="2000" b="1" i="0" u="none" strike="noStrike" cap="none" normalizeH="0" baseline="0" dirty="0" smtClean="0">
+              <a:rPr kumimoji="0" lang="en-US" altLang="en-US" b="1" i="0" u="none" strike="noStrike" cap="none" normalizeH="0" baseline="0" dirty="0" smtClean="0">
                 <a:ln>
                   <a:noFill/>
                 </a:ln>
@@ -6969,14 +7221,12 @@
                   <a:schemeClr val="tx1"/>
                 </a:solidFill>
                 <a:effectLst/>
-                <a:latin typeface="Arial" pitchFamily="34" charset="0"/>
                 <a:ea typeface="Times New Roman" pitchFamily="18" charset="0"/>
-                <a:cs typeface="Arial" pitchFamily="34" charset="0"/>
               </a:rPr>
               <a:t>Level 2</a:t>
             </a:r>
             <a:r>
-              <a:rPr kumimoji="0" lang="en-US" altLang="en-US" sz="2000" b="0" i="0" u="none" strike="noStrike" cap="none" normalizeH="0" baseline="0" dirty="0" smtClean="0">
+              <a:rPr kumimoji="0" lang="en-US" altLang="en-US" b="0" i="0" u="none" strike="noStrike" cap="none" normalizeH="0" baseline="0" dirty="0" smtClean="0">
                 <a:ln>
                   <a:noFill/>
                 </a:ln>
@@ -6984,14 +7234,12 @@
                   <a:schemeClr val="tx1"/>
                 </a:solidFill>
                 <a:effectLst/>
-                <a:latin typeface="Arial" pitchFamily="34" charset="0"/>
                 <a:ea typeface="Times New Roman" pitchFamily="18" charset="0"/>
-                <a:cs typeface="Arial" pitchFamily="34" charset="0"/>
               </a:rPr>
               <a:t>: HTTP methods- this is the level you want to be at. If you do </a:t>
             </a:r>
             <a:r>
-              <a:rPr kumimoji="0" lang="en-US" altLang="en-US" sz="2000" b="1" i="0" u="none" strike="noStrike" cap="none" normalizeH="0" baseline="0" dirty="0" smtClean="0">
+              <a:rPr kumimoji="0" lang="en-US" altLang="en-US" b="1" i="0" u="none" strike="noStrike" cap="none" normalizeH="0" baseline="0" dirty="0" smtClean="0">
                 <a:ln>
                   <a:noFill/>
                 </a:ln>
@@ -6999,14 +7247,12 @@
                   <a:schemeClr val="tx1"/>
                 </a:solidFill>
                 <a:effectLst/>
-                <a:latin typeface="Arial" pitchFamily="34" charset="0"/>
                 <a:ea typeface="Times New Roman" pitchFamily="18" charset="0"/>
-                <a:cs typeface="Arial" pitchFamily="34" charset="0"/>
               </a:rPr>
               <a:t>everything</a:t>
             </a:r>
             <a:r>
-              <a:rPr kumimoji="0" lang="en-US" altLang="en-US" sz="2000" b="0" i="0" u="none" strike="noStrike" cap="none" normalizeH="0" baseline="0" dirty="0" smtClean="0">
+              <a:rPr kumimoji="0" lang="en-US" altLang="en-US" b="0" i="0" u="none" strike="noStrike" cap="none" normalizeH="0" baseline="0" dirty="0" smtClean="0">
                 <a:ln>
                   <a:noFill/>
                 </a:ln>
@@ -7014,9 +7260,7 @@
                   <a:schemeClr val="tx1"/>
                 </a:solidFill>
                 <a:effectLst/>
-                <a:latin typeface="Arial" pitchFamily="34" charset="0"/>
                 <a:ea typeface="Times New Roman" pitchFamily="18" charset="0"/>
-                <a:cs typeface="Arial" pitchFamily="34" charset="0"/>
               </a:rPr>
               <a:t> wrong with Spring MVC, you’ll probably still end up here. At this level, services take advantage of native HTTP qualities like headers, status codes, distinct URIs, and more. This is where we’ll start our journey.</a:t>
             </a:r>
@@ -7039,7 +7283,7 @@
               </a:tabLst>
             </a:pPr>
             <a:r>
-              <a:rPr kumimoji="0" lang="en-US" altLang="en-US" sz="2000" b="1" i="0" u="none" strike="noStrike" cap="none" normalizeH="0" baseline="0" dirty="0" smtClean="0">
+              <a:rPr kumimoji="0" lang="en-US" altLang="en-US" b="1" i="0" u="none" strike="noStrike" cap="none" normalizeH="0" baseline="0" dirty="0" smtClean="0">
                 <a:ln>
                   <a:noFill/>
                 </a:ln>
@@ -7047,14 +7291,12 @@
                   <a:schemeClr val="tx1"/>
                 </a:solidFill>
                 <a:effectLst/>
-                <a:latin typeface="Arial" pitchFamily="34" charset="0"/>
                 <a:ea typeface="Times New Roman" pitchFamily="18" charset="0"/>
-                <a:cs typeface="Arial" pitchFamily="34" charset="0"/>
               </a:rPr>
               <a:t>Level 3</a:t>
             </a:r>
             <a:r>
-              <a:rPr kumimoji="0" lang="en-US" altLang="en-US" sz="2000" b="0" i="0" u="none" strike="noStrike" cap="none" normalizeH="0" baseline="0" dirty="0" smtClean="0">
+              <a:rPr kumimoji="0" lang="en-US" altLang="en-US" b="0" i="0" u="none" strike="noStrike" cap="none" normalizeH="0" baseline="0" dirty="0" smtClean="0">
                 <a:ln>
                   <a:noFill/>
                 </a:ln>
@@ -7062,14 +7304,12 @@
                   <a:schemeClr val="tx1"/>
                 </a:solidFill>
                 <a:effectLst/>
-                <a:latin typeface="Arial" pitchFamily="34" charset="0"/>
                 <a:ea typeface="Times New Roman" pitchFamily="18" charset="0"/>
-                <a:cs typeface="Arial" pitchFamily="34" charset="0"/>
               </a:rPr>
               <a:t>: Hypermedia Controls - This final level is where we</a:t>
             </a:r>
             <a:r>
-              <a:rPr kumimoji="0" lang="en-US" altLang="en-US" sz="2000" b="0" i="0" u="none" strike="noStrike" cap="none" normalizeH="0" dirty="0" smtClean="0">
+              <a:rPr kumimoji="0" lang="en-US" altLang="en-US" b="0" i="0" u="none" strike="noStrike" cap="none" normalizeH="0" dirty="0" smtClean="0">
                 <a:ln>
                   <a:noFill/>
                 </a:ln>
@@ -7077,14 +7317,12 @@
                   <a:schemeClr val="tx1"/>
                 </a:solidFill>
                 <a:effectLst/>
-                <a:latin typeface="Arial" pitchFamily="34" charset="0"/>
                 <a:ea typeface="Times New Roman" pitchFamily="18" charset="0"/>
-                <a:cs typeface="Arial" pitchFamily="34" charset="0"/>
               </a:rPr>
               <a:t> should	</a:t>
             </a:r>
             <a:r>
-              <a:rPr kumimoji="0" lang="en-US" altLang="en-US" sz="2000" b="0" i="0" u="none" strike="noStrike" cap="none" normalizeH="0" baseline="0" dirty="0" smtClean="0">
+              <a:rPr kumimoji="0" lang="en-US" altLang="en-US" b="0" i="0" u="none" strike="noStrike" cap="none" normalizeH="0" baseline="0" dirty="0" smtClean="0">
                 <a:ln>
                   <a:noFill/>
                 </a:ln>
@@ -7092,14 +7330,12 @@
                   <a:schemeClr val="tx1"/>
                 </a:solidFill>
                 <a:effectLst/>
-                <a:latin typeface="Arial" pitchFamily="34" charset="0"/>
                 <a:ea typeface="Times New Roman" pitchFamily="18" charset="0"/>
-                <a:cs typeface="Arial" pitchFamily="34" charset="0"/>
               </a:rPr>
               <a:t> strive to be. Hypermedia, as practiced using the </a:t>
             </a:r>
             <a:r>
-              <a:rPr kumimoji="0" lang="en-US" altLang="en-US" sz="2000" b="0" i="0" u="none" strike="noStrike" cap="none" normalizeH="0" baseline="0" dirty="0" smtClean="0">
+              <a:rPr kumimoji="0" lang="en-US" altLang="en-US" b="0" i="0" u="none" strike="noStrike" cap="none" normalizeH="0" baseline="0" dirty="0" smtClean="0">
                 <a:ln>
                   <a:noFill/>
                 </a:ln>
@@ -7107,15 +7343,13 @@
                   <a:schemeClr val="tx1"/>
                 </a:solidFill>
                 <a:effectLst/>
-                <a:latin typeface="Arial" pitchFamily="34" charset="0"/>
                 <a:ea typeface="Times New Roman" pitchFamily="18" charset="0"/>
-                <a:cs typeface="Arial" pitchFamily="34" charset="0"/>
                 <a:hlinkClick r:id="rId4"/>
               </a:rPr>
               <a:t>HATEOAS</a:t>
             </a:r>
             <a:r>
-              <a:rPr kumimoji="0" lang="en-US" altLang="en-US" sz="2000" b="0" i="0" u="none" strike="noStrike" cap="none" normalizeH="0" baseline="0" dirty="0" smtClean="0">
+              <a:rPr kumimoji="0" lang="en-US" altLang="en-US" b="0" i="0" u="none" strike="noStrike" cap="none" normalizeH="0" baseline="0" dirty="0" smtClean="0">
                 <a:ln>
                   <a:noFill/>
                 </a:ln>
@@ -7123,13 +7357,11 @@
                   <a:schemeClr val="tx1"/>
                 </a:solidFill>
                 <a:effectLst/>
-                <a:latin typeface="Arial" pitchFamily="34" charset="0"/>
                 <a:ea typeface="Times New Roman" pitchFamily="18" charset="0"/>
-                <a:cs typeface="Arial" pitchFamily="34" charset="0"/>
               </a:rPr>
               <a:t> </a:t>
             </a:r>
-            <a:endParaRPr kumimoji="0" lang="en-US" altLang="en-US" sz="3200" b="0" i="0" u="none" strike="noStrike" cap="none" normalizeH="0" baseline="0" dirty="0" smtClean="0">
+            <a:endParaRPr kumimoji="0" lang="en-US" altLang="en-US" sz="2800" b="0" i="0" u="none" strike="noStrike" cap="none" normalizeH="0" baseline="0" dirty="0" smtClean="0">
               <a:ln>
                 <a:noFill/>
               </a:ln>
@@ -7140,6 +7372,66 @@
               <a:latin typeface="Arial" pitchFamily="34" charset="0"/>
               <a:cs typeface="Arial" pitchFamily="34" charset="0"/>
             </a:endParaRPr>
+          </a:p>
+        </p:txBody>
+      </p:sp>
+      <p:sp>
+        <p:nvSpPr>
+          <p:cNvPr id="5" name="TextBox 4"/>
+          <p:cNvSpPr txBox="1"/>
+          <p:nvPr/>
+        </p:nvSpPr>
+        <p:spPr>
+          <a:xfrm>
+            <a:off x="365481" y="6566111"/>
+            <a:ext cx="8281115" cy="276999"/>
+          </a:xfrm>
+          <a:prstGeom prst="rect">
+            <a:avLst/>
+          </a:prstGeom>
+          <a:noFill/>
+        </p:spPr>
+        <p:txBody>
+          <a:bodyPr wrap="square" rtlCol="0">
+            <a:spAutoFit/>
+          </a:bodyPr>
+          <a:lstStyle/>
+          <a:p>
+            <a:r>
+              <a:rPr lang="en-US" sz="1200" i="1" dirty="0" smtClean="0"/>
+              <a:t>Ref</a:t>
+            </a:r>
+            <a:r>
+              <a:rPr lang="en-US" sz="1200" i="1" dirty="0" smtClean="0">
+                <a:hlinkClick r:id="rId5"/>
+              </a:rPr>
+              <a:t>: </a:t>
+            </a:r>
+            <a:r>
+              <a:rPr lang="en-US" sz="1200" b="1" dirty="0">
+                <a:hlinkClick r:id="rId6"/>
+              </a:rPr>
+              <a:t>Richardson Maturity </a:t>
+            </a:r>
+            <a:r>
+              <a:rPr lang="en-US" sz="1200" b="1" dirty="0" smtClean="0">
+                <a:hlinkClick r:id="rId6"/>
+              </a:rPr>
+              <a:t>Model </a:t>
+            </a:r>
+            <a:r>
+              <a:rPr lang="en-US" sz="1200" i="1" dirty="0" smtClean="0">
+                <a:hlinkClick r:id="rId6"/>
+              </a:rPr>
+              <a:t>– </a:t>
+            </a:r>
+            <a:r>
+              <a:rPr lang="en-US" sz="1200" i="1" dirty="0" smtClean="0">
+                <a:hlinkClick r:id="rId6"/>
+              </a:rPr>
+              <a:t>Roy Fielding</a:t>
+            </a:r>
+            <a:endParaRPr lang="en-US" sz="1200" i="1" dirty="0"/>
           </a:p>
         </p:txBody>
       </p:sp>
@@ -9715,7 +10007,7 @@
 </file>
 
 <file path=ppt/slides/slide2.xml><?xml version="1.0" encoding="utf-8"?>
-<p:sld xmlns:a="http://schemas.openxmlformats.org/drawingml/2006/main" xmlns:r="http://schemas.openxmlformats.org/officeDocument/2006/relationships" xmlns:p="http://schemas.openxmlformats.org/presentationml/2006/main">
+<p:sld xmlns:a="http://schemas.openxmlformats.org/drawingml/2006/main" xmlns:r="http://schemas.openxmlformats.org/officeDocument/2006/relationships" xmlns:p="http://schemas.openxmlformats.org/presentationml/2006/main" show="0">
   <p:cSld>
     <p:spTree>
       <p:nvGrpSpPr>
@@ -9807,13 +10099,8 @@
             </a:pPr>
             <a:r>
               <a:rPr lang="en-US" sz="2400" dirty="0" smtClean="0"/>
-              <a:t>Extremely </a:t>
-            </a:r>
-            <a:r>
-              <a:rPr lang="en-US" sz="2400" dirty="0" err="1" smtClean="0"/>
-              <a:t>medio</a:t>
-            </a:r>
-            <a:endParaRPr lang="en-US" sz="2400" dirty="0" smtClean="0"/>
+              <a:t>Big fan of Open source software and it’s philosophy</a:t>
+            </a:r>
           </a:p>
           <a:p>
             <a:pPr marL="285750" indent="-285750">
@@ -9841,6 +10128,14 @@
   <p:clrMapOvr>
     <a:masterClrMapping/>
   </p:clrMapOvr>
+  <mc:AlternateContent xmlns:mc="http://schemas.openxmlformats.org/markup-compatibility/2006">
+    <mc:Choice xmlns:p14="http://schemas.microsoft.com/office/powerpoint/2010/main" Requires="p14">
+      <p:transition spd="slow" p14:dur="2000"/>
+    </mc:Choice>
+    <mc:Fallback>
+      <p:transition spd="slow"/>
+    </mc:Fallback>
+  </mc:AlternateContent>
   <p:timing>
     <p:tnLst>
       <p:par>
@@ -10254,11 +10549,7 @@
           <a:p>
             <a:r>
               <a:rPr lang="en-US" dirty="0" smtClean="0"/>
-              <a:t>Monolithic </a:t>
-            </a:r>
-            <a:r>
-              <a:rPr lang="en-US" dirty="0" smtClean="0"/>
-              <a:t>challenges</a:t>
+              <a:t>Monolithic challenges</a:t>
             </a:r>
             <a:endParaRPr lang="en-US" dirty="0"/>
           </a:p>
@@ -11528,6 +11819,1206 @@
       </p:grpSpPr>
       <p:sp>
         <p:nvSpPr>
+          <p:cNvPr id="2" name="Title 1"/>
+          <p:cNvSpPr>
+            <a:spLocks noGrp="1"/>
+          </p:cNvSpPr>
+          <p:nvPr>
+            <p:ph type="title"/>
+          </p:nvPr>
+        </p:nvSpPr>
+        <p:spPr>
+          <a:xfrm>
+            <a:off x="69313" y="64221"/>
+            <a:ext cx="10515600" cy="1325563"/>
+          </a:xfrm>
+        </p:spPr>
+        <p:txBody>
+          <a:bodyPr/>
+          <a:lstStyle/>
+          <a:p>
+            <a:r>
+              <a:rPr lang="en-US" dirty="0" smtClean="0"/>
+              <a:t>Monolithic </a:t>
+            </a:r>
+            <a:r>
+              <a:rPr lang="en-US" dirty="0" smtClean="0"/>
+              <a:t>challenges</a:t>
+            </a:r>
+            <a:endParaRPr lang="en-US" dirty="0"/>
+          </a:p>
+        </p:txBody>
+      </p:sp>
+      <p:sp>
+        <p:nvSpPr>
+          <p:cNvPr id="6" name="TextBox 5"/>
+          <p:cNvSpPr txBox="1"/>
+          <p:nvPr/>
+        </p:nvSpPr>
+        <p:spPr>
+          <a:xfrm>
+            <a:off x="438149" y="1416934"/>
+            <a:ext cx="7753429" cy="523220"/>
+          </a:xfrm>
+          <a:prstGeom prst="rect">
+            <a:avLst/>
+          </a:prstGeom>
+          <a:noFill/>
+        </p:spPr>
+        <p:txBody>
+          <a:bodyPr wrap="square" rtlCol="0">
+            <a:spAutoFit/>
+          </a:bodyPr>
+          <a:lstStyle/>
+          <a:p>
+            <a:r>
+              <a:rPr lang="en-US" sz="2800" b="1" dirty="0" smtClean="0"/>
+              <a:t>How Scalable is this architecture</a:t>
+            </a:r>
+            <a:r>
+              <a:rPr lang="en-US" sz="2800" b="1" dirty="0" smtClean="0"/>
+              <a:t>? (Horizontal)</a:t>
+            </a:r>
+            <a:endParaRPr lang="en-US" sz="2800" b="1" dirty="0"/>
+          </a:p>
+        </p:txBody>
+      </p:sp>
+      <p:grpSp>
+        <p:nvGrpSpPr>
+          <p:cNvPr id="3" name="Group 2"/>
+          <p:cNvGrpSpPr/>
+          <p:nvPr/>
+        </p:nvGrpSpPr>
+        <p:grpSpPr>
+          <a:xfrm>
+            <a:off x="2425780" y="2197915"/>
+            <a:ext cx="7477393" cy="1147250"/>
+            <a:chOff x="2445082" y="2482121"/>
+            <a:chExt cx="7477393" cy="1147250"/>
+          </a:xfrm>
+        </p:grpSpPr>
+        <p:sp>
+          <p:nvSpPr>
+            <p:cNvPr id="8" name="Oval 7"/>
+            <p:cNvSpPr/>
+            <p:nvPr/>
+          </p:nvSpPr>
+          <p:spPr>
+            <a:xfrm>
+              <a:off x="2445082" y="2482121"/>
+              <a:ext cx="1129576" cy="1013081"/>
+            </a:xfrm>
+            <a:prstGeom prst="ellipse">
+              <a:avLst/>
+            </a:prstGeom>
+            <a:solidFill>
+              <a:schemeClr val="accent1">
+                <a:lumMod val="60000"/>
+                <a:lumOff val="40000"/>
+              </a:schemeClr>
+            </a:solidFill>
+          </p:spPr>
+          <p:style>
+            <a:lnRef idx="2">
+              <a:schemeClr val="accent1">
+                <a:shade val="50000"/>
+              </a:schemeClr>
+            </a:lnRef>
+            <a:fillRef idx="1">
+              <a:schemeClr val="accent1"/>
+            </a:fillRef>
+            <a:effectRef idx="0">
+              <a:schemeClr val="accent1"/>
+            </a:effectRef>
+            <a:fontRef idx="minor">
+              <a:schemeClr val="lt1"/>
+            </a:fontRef>
+          </p:style>
+          <p:txBody>
+            <a:bodyPr rtlCol="0" anchor="ctr"/>
+            <a:lstStyle/>
+            <a:p>
+              <a:pPr algn="ctr"/>
+              <a:endParaRPr lang="en-US"/>
+            </a:p>
+          </p:txBody>
+        </p:sp>
+        <p:sp>
+          <p:nvSpPr>
+            <p:cNvPr id="9" name="TextBox 8"/>
+            <p:cNvSpPr txBox="1"/>
+            <p:nvPr/>
+          </p:nvSpPr>
+          <p:spPr>
+            <a:xfrm>
+              <a:off x="2508582" y="2811848"/>
+              <a:ext cx="1129576" cy="646331"/>
+            </a:xfrm>
+            <a:prstGeom prst="rect">
+              <a:avLst/>
+            </a:prstGeom>
+            <a:noFill/>
+          </p:spPr>
+          <p:txBody>
+            <a:bodyPr wrap="square" rtlCol="0">
+              <a:spAutoFit/>
+            </a:bodyPr>
+            <a:lstStyle/>
+            <a:p>
+              <a:r>
+                <a:rPr lang="en-US" b="1" dirty="0" smtClean="0"/>
+                <a:t>Security</a:t>
+              </a:r>
+            </a:p>
+            <a:p>
+              <a:r>
+                <a:rPr lang="en-US" b="1" dirty="0" smtClean="0"/>
+                <a:t>      20</a:t>
+              </a:r>
+              <a:endParaRPr lang="en-US" b="1" dirty="0"/>
+            </a:p>
+          </p:txBody>
+        </p:sp>
+        <p:sp>
+          <p:nvSpPr>
+            <p:cNvPr id="10" name="Oval 9"/>
+            <p:cNvSpPr/>
+            <p:nvPr/>
+          </p:nvSpPr>
+          <p:spPr>
+            <a:xfrm>
+              <a:off x="3587358" y="2494821"/>
+              <a:ext cx="1129576" cy="1013081"/>
+            </a:xfrm>
+            <a:prstGeom prst="ellipse">
+              <a:avLst/>
+            </a:prstGeom>
+            <a:solidFill>
+              <a:schemeClr val="accent1">
+                <a:lumMod val="60000"/>
+                <a:lumOff val="40000"/>
+              </a:schemeClr>
+            </a:solidFill>
+          </p:spPr>
+          <p:style>
+            <a:lnRef idx="2">
+              <a:schemeClr val="accent1">
+                <a:shade val="50000"/>
+              </a:schemeClr>
+            </a:lnRef>
+            <a:fillRef idx="1">
+              <a:schemeClr val="accent1"/>
+            </a:fillRef>
+            <a:effectRef idx="0">
+              <a:schemeClr val="accent1"/>
+            </a:effectRef>
+            <a:fontRef idx="minor">
+              <a:schemeClr val="lt1"/>
+            </a:fontRef>
+          </p:style>
+          <p:txBody>
+            <a:bodyPr rtlCol="0" anchor="ctr"/>
+            <a:lstStyle/>
+            <a:p>
+              <a:pPr algn="ctr"/>
+              <a:endParaRPr lang="en-US"/>
+            </a:p>
+          </p:txBody>
+        </p:sp>
+        <p:sp>
+          <p:nvSpPr>
+            <p:cNvPr id="11" name="TextBox 10"/>
+            <p:cNvSpPr txBox="1"/>
+            <p:nvPr/>
+          </p:nvSpPr>
+          <p:spPr>
+            <a:xfrm>
+              <a:off x="3752458" y="2811848"/>
+              <a:ext cx="1129576" cy="646331"/>
+            </a:xfrm>
+            <a:prstGeom prst="rect">
+              <a:avLst/>
+            </a:prstGeom>
+            <a:noFill/>
+          </p:spPr>
+          <p:txBody>
+            <a:bodyPr wrap="square" rtlCol="0">
+              <a:spAutoFit/>
+            </a:bodyPr>
+            <a:lstStyle/>
+            <a:p>
+              <a:r>
+                <a:rPr lang="en-US" b="1" dirty="0" smtClean="0"/>
+                <a:t>Orders</a:t>
+              </a:r>
+            </a:p>
+            <a:p>
+              <a:r>
+                <a:rPr lang="en-US" b="1" dirty="0"/>
+                <a:t> </a:t>
+              </a:r>
+              <a:r>
+                <a:rPr lang="en-US" b="1" dirty="0" smtClean="0"/>
+                <a:t>  100</a:t>
+              </a:r>
+              <a:endParaRPr lang="en-US" b="1" dirty="0"/>
+            </a:p>
+          </p:txBody>
+        </p:sp>
+        <p:sp>
+          <p:nvSpPr>
+            <p:cNvPr id="12" name="Oval 11"/>
+            <p:cNvSpPr/>
+            <p:nvPr/>
+          </p:nvSpPr>
+          <p:spPr>
+            <a:xfrm>
+              <a:off x="4742334" y="2497267"/>
+              <a:ext cx="1129576" cy="1013081"/>
+            </a:xfrm>
+            <a:prstGeom prst="ellipse">
+              <a:avLst/>
+            </a:prstGeom>
+            <a:solidFill>
+              <a:schemeClr val="accent1">
+                <a:lumMod val="60000"/>
+                <a:lumOff val="40000"/>
+              </a:schemeClr>
+            </a:solidFill>
+          </p:spPr>
+          <p:style>
+            <a:lnRef idx="2">
+              <a:schemeClr val="accent1">
+                <a:shade val="50000"/>
+              </a:schemeClr>
+            </a:lnRef>
+            <a:fillRef idx="1">
+              <a:schemeClr val="accent1"/>
+            </a:fillRef>
+            <a:effectRef idx="0">
+              <a:schemeClr val="accent1"/>
+            </a:effectRef>
+            <a:fontRef idx="minor">
+              <a:schemeClr val="lt1"/>
+            </a:fontRef>
+          </p:style>
+          <p:txBody>
+            <a:bodyPr rtlCol="0" anchor="ctr"/>
+            <a:lstStyle/>
+            <a:p>
+              <a:pPr algn="ctr"/>
+              <a:endParaRPr lang="en-US"/>
+            </a:p>
+          </p:txBody>
+        </p:sp>
+        <p:sp>
+          <p:nvSpPr>
+            <p:cNvPr id="13" name="TextBox 12"/>
+            <p:cNvSpPr txBox="1"/>
+            <p:nvPr/>
+          </p:nvSpPr>
+          <p:spPr>
+            <a:xfrm>
+              <a:off x="4762481" y="2706041"/>
+              <a:ext cx="1129576" cy="923330"/>
+            </a:xfrm>
+            <a:prstGeom prst="rect">
+              <a:avLst/>
+            </a:prstGeom>
+            <a:noFill/>
+          </p:spPr>
+          <p:txBody>
+            <a:bodyPr wrap="square" rtlCol="0">
+              <a:spAutoFit/>
+            </a:bodyPr>
+            <a:lstStyle/>
+            <a:p>
+              <a:pPr algn="ctr"/>
+              <a:r>
+                <a:rPr lang="en-US" b="1" dirty="0" smtClean="0"/>
+                <a:t>User</a:t>
+              </a:r>
+            </a:p>
+            <a:p>
+              <a:pPr algn="ctr"/>
+              <a:r>
+                <a:rPr lang="en-US" b="1" dirty="0" smtClean="0"/>
+                <a:t>Mgmt.</a:t>
+              </a:r>
+              <a:endParaRPr lang="en-US" b="1" dirty="0"/>
+            </a:p>
+            <a:p>
+              <a:pPr algn="ctr"/>
+              <a:r>
+                <a:rPr lang="en-US" b="1" dirty="0" smtClean="0"/>
+                <a:t>10</a:t>
+              </a:r>
+            </a:p>
+          </p:txBody>
+        </p:sp>
+        <p:sp>
+          <p:nvSpPr>
+            <p:cNvPr id="14" name="Oval 13"/>
+            <p:cNvSpPr/>
+            <p:nvPr/>
+          </p:nvSpPr>
+          <p:spPr>
+            <a:xfrm>
+              <a:off x="5892781" y="2522665"/>
+              <a:ext cx="1129576" cy="1013081"/>
+            </a:xfrm>
+            <a:prstGeom prst="ellipse">
+              <a:avLst/>
+            </a:prstGeom>
+            <a:solidFill>
+              <a:schemeClr val="accent1">
+                <a:lumMod val="60000"/>
+                <a:lumOff val="40000"/>
+              </a:schemeClr>
+            </a:solidFill>
+          </p:spPr>
+          <p:style>
+            <a:lnRef idx="2">
+              <a:schemeClr val="accent1">
+                <a:shade val="50000"/>
+              </a:schemeClr>
+            </a:lnRef>
+            <a:fillRef idx="1">
+              <a:schemeClr val="accent1"/>
+            </a:fillRef>
+            <a:effectRef idx="0">
+              <a:schemeClr val="accent1"/>
+            </a:effectRef>
+            <a:fontRef idx="minor">
+              <a:schemeClr val="lt1"/>
+            </a:fontRef>
+          </p:style>
+          <p:txBody>
+            <a:bodyPr rtlCol="0" anchor="ctr"/>
+            <a:lstStyle/>
+            <a:p>
+              <a:pPr algn="ctr"/>
+              <a:endParaRPr lang="en-US"/>
+            </a:p>
+          </p:txBody>
+        </p:sp>
+        <p:sp>
+          <p:nvSpPr>
+            <p:cNvPr id="15" name="Oval 14"/>
+            <p:cNvSpPr/>
+            <p:nvPr/>
+          </p:nvSpPr>
+          <p:spPr>
+            <a:xfrm>
+              <a:off x="7081305" y="2509965"/>
+              <a:ext cx="1129576" cy="1013081"/>
+            </a:xfrm>
+            <a:prstGeom prst="ellipse">
+              <a:avLst/>
+            </a:prstGeom>
+            <a:solidFill>
+              <a:schemeClr val="accent1">
+                <a:lumMod val="60000"/>
+                <a:lumOff val="40000"/>
+              </a:schemeClr>
+            </a:solidFill>
+          </p:spPr>
+          <p:style>
+            <a:lnRef idx="2">
+              <a:schemeClr val="accent1">
+                <a:shade val="50000"/>
+              </a:schemeClr>
+            </a:lnRef>
+            <a:fillRef idx="1">
+              <a:schemeClr val="accent1"/>
+            </a:fillRef>
+            <a:effectRef idx="0">
+              <a:schemeClr val="accent1"/>
+            </a:effectRef>
+            <a:fontRef idx="minor">
+              <a:schemeClr val="lt1"/>
+            </a:fontRef>
+          </p:style>
+          <p:txBody>
+            <a:bodyPr rtlCol="0" anchor="ctr"/>
+            <a:lstStyle/>
+            <a:p>
+              <a:pPr algn="ctr"/>
+              <a:endParaRPr lang="en-US"/>
+            </a:p>
+          </p:txBody>
+        </p:sp>
+        <p:sp>
+          <p:nvSpPr>
+            <p:cNvPr id="16" name="TextBox 15"/>
+            <p:cNvSpPr txBox="1"/>
+            <p:nvPr/>
+          </p:nvSpPr>
+          <p:spPr>
+            <a:xfrm>
+              <a:off x="7068605" y="2661892"/>
+              <a:ext cx="1294676" cy="923330"/>
+            </a:xfrm>
+            <a:prstGeom prst="rect">
+              <a:avLst/>
+            </a:prstGeom>
+            <a:noFill/>
+          </p:spPr>
+          <p:txBody>
+            <a:bodyPr wrap="square" rtlCol="0">
+              <a:spAutoFit/>
+            </a:bodyPr>
+            <a:lstStyle/>
+            <a:p>
+              <a:r>
+                <a:rPr lang="en-US" b="1" dirty="0" smtClean="0"/>
+                <a:t>3</a:t>
+              </a:r>
+              <a:r>
+                <a:rPr lang="en-US" b="1" baseline="30000" dirty="0" smtClean="0"/>
+                <a:t>rd</a:t>
+              </a:r>
+              <a:r>
+                <a:rPr lang="en-US" b="1" dirty="0" smtClean="0"/>
+                <a:t> Party </a:t>
+              </a:r>
+              <a:r>
+                <a:rPr lang="en-US" b="1" dirty="0" smtClean="0"/>
+                <a:t>Integration</a:t>
+              </a:r>
+            </a:p>
+            <a:p>
+              <a:r>
+                <a:rPr lang="en-US" b="1" dirty="0"/>
+                <a:t> </a:t>
+              </a:r>
+              <a:r>
+                <a:rPr lang="en-US" b="1" dirty="0" smtClean="0"/>
+                <a:t>      100</a:t>
+              </a:r>
+              <a:endParaRPr lang="en-US" b="1" dirty="0"/>
+            </a:p>
+          </p:txBody>
+        </p:sp>
+        <p:sp>
+          <p:nvSpPr>
+            <p:cNvPr id="17" name="Oval 16"/>
+            <p:cNvSpPr/>
+            <p:nvPr/>
+          </p:nvSpPr>
+          <p:spPr>
+            <a:xfrm>
+              <a:off x="8300869" y="2508720"/>
+              <a:ext cx="1129576" cy="1013081"/>
+            </a:xfrm>
+            <a:prstGeom prst="ellipse">
+              <a:avLst/>
+            </a:prstGeom>
+            <a:solidFill>
+              <a:schemeClr val="accent1">
+                <a:lumMod val="60000"/>
+                <a:lumOff val="40000"/>
+              </a:schemeClr>
+            </a:solidFill>
+          </p:spPr>
+          <p:style>
+            <a:lnRef idx="2">
+              <a:schemeClr val="accent1">
+                <a:shade val="50000"/>
+              </a:schemeClr>
+            </a:lnRef>
+            <a:fillRef idx="1">
+              <a:schemeClr val="accent1"/>
+            </a:fillRef>
+            <a:effectRef idx="0">
+              <a:schemeClr val="accent1"/>
+            </a:effectRef>
+            <a:fontRef idx="minor">
+              <a:schemeClr val="lt1"/>
+            </a:fontRef>
+          </p:style>
+          <p:txBody>
+            <a:bodyPr rtlCol="0" anchor="ctr"/>
+            <a:lstStyle/>
+            <a:p>
+              <a:pPr algn="ctr"/>
+              <a:endParaRPr lang="en-US"/>
+            </a:p>
+          </p:txBody>
+        </p:sp>
+        <p:sp>
+          <p:nvSpPr>
+            <p:cNvPr id="18" name="TextBox 17"/>
+            <p:cNvSpPr txBox="1"/>
+            <p:nvPr/>
+          </p:nvSpPr>
+          <p:spPr>
+            <a:xfrm>
+              <a:off x="8627799" y="2749548"/>
+              <a:ext cx="1294676" cy="369332"/>
+            </a:xfrm>
+            <a:prstGeom prst="rect">
+              <a:avLst/>
+            </a:prstGeom>
+            <a:noFill/>
+          </p:spPr>
+          <p:txBody>
+            <a:bodyPr wrap="square" rtlCol="0">
+              <a:spAutoFit/>
+            </a:bodyPr>
+            <a:lstStyle/>
+            <a:p>
+              <a:r>
+                <a:rPr lang="en-US" b="1" dirty="0" smtClean="0"/>
+                <a:t>…</a:t>
+              </a:r>
+              <a:endParaRPr lang="en-US" b="1" dirty="0"/>
+            </a:p>
+          </p:txBody>
+        </p:sp>
+      </p:grpSp>
+      <p:sp>
+        <p:nvSpPr>
+          <p:cNvPr id="4" name="TextBox 3"/>
+          <p:cNvSpPr txBox="1"/>
+          <p:nvPr/>
+        </p:nvSpPr>
+        <p:spPr>
+          <a:xfrm>
+            <a:off x="438150" y="3830595"/>
+            <a:ext cx="11313126" cy="3477875"/>
+          </a:xfrm>
+          <a:prstGeom prst="rect">
+            <a:avLst/>
+          </a:prstGeom>
+          <a:noFill/>
+        </p:spPr>
+        <p:txBody>
+          <a:bodyPr wrap="square" rtlCol="0">
+            <a:spAutoFit/>
+          </a:bodyPr>
+          <a:lstStyle/>
+          <a:p>
+            <a:pPr marL="285750" indent="-285750">
+              <a:buFont typeface="Arial" panose="020B0604020202020204" pitchFamily="34" charset="0"/>
+              <a:buChar char="•"/>
+            </a:pPr>
+            <a:r>
+              <a:rPr lang="en-US" sz="2000" dirty="0" smtClean="0"/>
+              <a:t>Assume that the above is deployed to n nodes to facilitate horizontal scaling</a:t>
+            </a:r>
+          </a:p>
+          <a:p>
+            <a:pPr marL="285750" indent="-285750">
+              <a:buFont typeface="Arial" panose="020B0604020202020204" pitchFamily="34" charset="0"/>
+              <a:buChar char="•"/>
+            </a:pPr>
+            <a:r>
+              <a:rPr lang="en-US" sz="2000" dirty="0" smtClean="0"/>
+              <a:t>Add weights to each piece of functionality/component/module</a:t>
+            </a:r>
+          </a:p>
+          <a:p>
+            <a:pPr marL="742950" lvl="1" indent="-285750">
+              <a:buFont typeface="Arial" panose="020B0604020202020204" pitchFamily="34" charset="0"/>
+              <a:buChar char="•"/>
+            </a:pPr>
+            <a:r>
+              <a:rPr lang="en-US" sz="2000" dirty="0" smtClean="0"/>
+              <a:t>Weights are based on usage statistics, resource requirements, priority, business need etc.</a:t>
+            </a:r>
+          </a:p>
+          <a:p>
+            <a:pPr marL="742950" lvl="1" indent="-285750">
+              <a:buFont typeface="Arial" panose="020B0604020202020204" pitchFamily="34" charset="0"/>
+              <a:buChar char="•"/>
+            </a:pPr>
+            <a:r>
+              <a:rPr lang="en-US" sz="2000" dirty="0" smtClean="0"/>
+              <a:t>Upon horizontal scaling, components with lower weights provide the least value</a:t>
+            </a:r>
+          </a:p>
+          <a:p>
+            <a:pPr lvl="1"/>
+            <a:endParaRPr lang="en-US" sz="2000" dirty="0"/>
+          </a:p>
+          <a:p>
+            <a:pPr marL="285750" indent="-285750">
+              <a:buFont typeface="Arial" panose="020B0604020202020204" pitchFamily="34" charset="0"/>
+              <a:buChar char="•"/>
+            </a:pPr>
+            <a:r>
+              <a:rPr lang="en-US" sz="2000" dirty="0" smtClean="0"/>
+              <a:t>When deploying to other nodes, you will still need to compile the whole application (including the components with lower weights). Lower weighted components still take up JVM space</a:t>
+            </a:r>
+          </a:p>
+          <a:p>
+            <a:pPr marL="285750" indent="-285750">
+              <a:buFont typeface="Arial" panose="020B0604020202020204" pitchFamily="34" charset="0"/>
+              <a:buChar char="•"/>
+            </a:pPr>
+            <a:r>
+              <a:rPr lang="en-US" sz="2000" dirty="0" smtClean="0"/>
+              <a:t>Harder to maintain over time. </a:t>
+            </a:r>
+          </a:p>
+          <a:p>
+            <a:pPr marL="285750" indent="-285750">
+              <a:buFont typeface="Arial" panose="020B0604020202020204" pitchFamily="34" charset="0"/>
+              <a:buChar char="•"/>
+            </a:pPr>
+            <a:r>
+              <a:rPr lang="en-US" sz="2000" dirty="0" smtClean="0"/>
+              <a:t>Hard to re-write/refactor</a:t>
+            </a:r>
+          </a:p>
+          <a:p>
+            <a:pPr marL="742950" lvl="1" indent="-285750">
+              <a:buFont typeface="Arial" panose="020B0604020202020204" pitchFamily="34" charset="0"/>
+              <a:buChar char="•"/>
+            </a:pPr>
+            <a:endParaRPr lang="en-US" sz="2000" dirty="0" smtClean="0"/>
+          </a:p>
+          <a:p>
+            <a:pPr marL="285750" indent="-285750">
+              <a:buFont typeface="Arial" panose="020B0604020202020204" pitchFamily="34" charset="0"/>
+              <a:buChar char="•"/>
+            </a:pPr>
+            <a:endParaRPr lang="en-US" sz="2000" dirty="0"/>
+          </a:p>
+        </p:txBody>
+      </p:sp>
+      <p:sp>
+        <p:nvSpPr>
+          <p:cNvPr id="32" name="TextBox 31"/>
+          <p:cNvSpPr txBox="1"/>
+          <p:nvPr/>
+        </p:nvSpPr>
+        <p:spPr>
+          <a:xfrm>
+            <a:off x="5872755" y="2409305"/>
+            <a:ext cx="1129576" cy="923330"/>
+          </a:xfrm>
+          <a:prstGeom prst="rect">
+            <a:avLst/>
+          </a:prstGeom>
+          <a:noFill/>
+        </p:spPr>
+        <p:txBody>
+          <a:bodyPr wrap="square" rtlCol="0">
+            <a:spAutoFit/>
+          </a:bodyPr>
+          <a:lstStyle/>
+          <a:p>
+            <a:pPr algn="ctr"/>
+            <a:r>
+              <a:rPr lang="en-US" b="1" dirty="0" smtClean="0"/>
+              <a:t>Core Business.</a:t>
+            </a:r>
+            <a:endParaRPr lang="en-US" b="1" dirty="0"/>
+          </a:p>
+          <a:p>
+            <a:pPr algn="ctr"/>
+            <a:r>
+              <a:rPr lang="en-US" b="1" dirty="0" smtClean="0"/>
+              <a:t>100</a:t>
+            </a:r>
+          </a:p>
+        </p:txBody>
+      </p:sp>
+    </p:spTree>
+    <p:extLst>
+      <p:ext uri="{BB962C8B-B14F-4D97-AF65-F5344CB8AC3E}">
+        <p14:creationId xmlns:p14="http://schemas.microsoft.com/office/powerpoint/2010/main" val="243382833"/>
+      </p:ext>
+    </p:extLst>
+  </p:cSld>
+  <p:clrMapOvr>
+    <a:masterClrMapping/>
+  </p:clrMapOvr>
+  <p:timing>
+    <p:tnLst>
+      <p:par>
+        <p:cTn id="1" dur="indefinite" restart="never" nodeType="tmRoot"/>
+      </p:par>
+    </p:tnLst>
+  </p:timing>
+</p:sld>
+</file>
+
+<file path=ppt/slides/slide24.xml><?xml version="1.0" encoding="utf-8"?>
+<p:sld xmlns:a="http://schemas.openxmlformats.org/drawingml/2006/main" xmlns:r="http://schemas.openxmlformats.org/officeDocument/2006/relationships" xmlns:p="http://schemas.openxmlformats.org/presentationml/2006/main">
+  <p:cSld>
+    <p:spTree>
+      <p:nvGrpSpPr>
+        <p:cNvPr id="1" name=""/>
+        <p:cNvGrpSpPr/>
+        <p:nvPr/>
+      </p:nvGrpSpPr>
+      <p:grpSpPr>
+        <a:xfrm>
+          <a:off x="0" y="0"/>
+          <a:ext cx="0" cy="0"/>
+          <a:chOff x="0" y="0"/>
+          <a:chExt cx="0" cy="0"/>
+        </a:xfrm>
+      </p:grpSpPr>
+      <p:sp>
+        <p:nvSpPr>
+          <p:cNvPr id="2" name="Title 1"/>
+          <p:cNvSpPr>
+            <a:spLocks noGrp="1"/>
+          </p:cNvSpPr>
+          <p:nvPr>
+            <p:ph type="title"/>
+          </p:nvPr>
+        </p:nvSpPr>
+        <p:spPr>
+          <a:xfrm>
+            <a:off x="69313" y="64221"/>
+            <a:ext cx="10515600" cy="1325563"/>
+          </a:xfrm>
+        </p:spPr>
+        <p:txBody>
+          <a:bodyPr/>
+          <a:lstStyle/>
+          <a:p>
+            <a:r>
+              <a:rPr lang="en-US" dirty="0" smtClean="0"/>
+              <a:t>Monolithic </a:t>
+            </a:r>
+            <a:r>
+              <a:rPr lang="en-US" dirty="0" smtClean="0"/>
+              <a:t>Challenges</a:t>
+            </a:r>
+            <a:endParaRPr lang="en-US" dirty="0"/>
+          </a:p>
+        </p:txBody>
+      </p:sp>
+      <p:sp>
+        <p:nvSpPr>
+          <p:cNvPr id="34" name="TextBox 33"/>
+          <p:cNvSpPr txBox="1"/>
+          <p:nvPr/>
+        </p:nvSpPr>
+        <p:spPr>
+          <a:xfrm>
+            <a:off x="501650" y="1128174"/>
+            <a:ext cx="7359650" cy="523220"/>
+          </a:xfrm>
+          <a:prstGeom prst="rect">
+            <a:avLst/>
+          </a:prstGeom>
+          <a:noFill/>
+        </p:spPr>
+        <p:txBody>
+          <a:bodyPr wrap="square" rtlCol="0">
+            <a:spAutoFit/>
+          </a:bodyPr>
+          <a:lstStyle/>
+          <a:p>
+            <a:r>
+              <a:rPr lang="en-US" sz="2800" b="1" dirty="0" smtClean="0"/>
+              <a:t>What if I want to support mobile clients?</a:t>
+            </a:r>
+            <a:endParaRPr lang="en-US" sz="2800" b="1" dirty="0"/>
+          </a:p>
+        </p:txBody>
+      </p:sp>
+      <p:sp>
+        <p:nvSpPr>
+          <p:cNvPr id="35" name="TextBox 34"/>
+          <p:cNvSpPr txBox="1"/>
+          <p:nvPr/>
+        </p:nvSpPr>
+        <p:spPr>
+          <a:xfrm>
+            <a:off x="501650" y="1651394"/>
+            <a:ext cx="8096250" cy="523220"/>
+          </a:xfrm>
+          <a:prstGeom prst="rect">
+            <a:avLst/>
+          </a:prstGeom>
+          <a:noFill/>
+        </p:spPr>
+        <p:txBody>
+          <a:bodyPr wrap="square" rtlCol="0">
+            <a:spAutoFit/>
+          </a:bodyPr>
+          <a:lstStyle/>
+          <a:p>
+            <a:r>
+              <a:rPr lang="en-US" sz="2800" b="1" dirty="0" smtClean="0"/>
+              <a:t>How can third party apps/services talk to my app?</a:t>
+            </a:r>
+            <a:endParaRPr lang="en-US" sz="2800" b="1" dirty="0"/>
+          </a:p>
+        </p:txBody>
+      </p:sp>
+      <p:sp>
+        <p:nvSpPr>
+          <p:cNvPr id="3" name="TextBox 2"/>
+          <p:cNvSpPr txBox="1"/>
+          <p:nvPr/>
+        </p:nvSpPr>
+        <p:spPr>
+          <a:xfrm>
+            <a:off x="864973" y="2693773"/>
+            <a:ext cx="10429103" cy="3416320"/>
+          </a:xfrm>
+          <a:prstGeom prst="rect">
+            <a:avLst/>
+          </a:prstGeom>
+          <a:noFill/>
+        </p:spPr>
+        <p:txBody>
+          <a:bodyPr wrap="square" rtlCol="0">
+            <a:spAutoFit/>
+          </a:bodyPr>
+          <a:lstStyle/>
+          <a:p>
+            <a:pPr marL="285750" indent="-285750">
+              <a:buFont typeface="Arial" panose="020B0604020202020204" pitchFamily="34" charset="0"/>
+              <a:buChar char="•"/>
+            </a:pPr>
+            <a:r>
+              <a:rPr lang="en-US" sz="2400" dirty="0" smtClean="0"/>
+              <a:t>One approach to support mobile/other clients is to add a layer of extra Spring controllers that serve JSON</a:t>
+            </a:r>
+          </a:p>
+          <a:p>
+            <a:pPr marL="285750" indent="-285750">
+              <a:buFont typeface="Arial" panose="020B0604020202020204" pitchFamily="34" charset="0"/>
+              <a:buChar char="•"/>
+            </a:pPr>
+            <a:r>
+              <a:rPr lang="en-US" sz="2400" dirty="0" smtClean="0"/>
+              <a:t>This means that you will now have to support</a:t>
+            </a:r>
+          </a:p>
+          <a:p>
+            <a:pPr marL="742950" lvl="1" indent="-285750">
+              <a:buFont typeface="Arial" panose="020B0604020202020204" pitchFamily="34" charset="0"/>
+              <a:buChar char="•"/>
+            </a:pPr>
+            <a:r>
+              <a:rPr lang="en-US" sz="2400" dirty="0" smtClean="0"/>
+              <a:t>Client dependent controllers that serve </a:t>
+            </a:r>
+            <a:r>
+              <a:rPr lang="en-US" sz="2400" dirty="0" err="1" smtClean="0"/>
+              <a:t>jsp</a:t>
+            </a:r>
+            <a:r>
+              <a:rPr lang="en-US" sz="2400" dirty="0" smtClean="0"/>
+              <a:t>/html to Browser clients</a:t>
+            </a:r>
+          </a:p>
+          <a:p>
+            <a:pPr marL="742950" lvl="1" indent="-285750">
+              <a:buFont typeface="Arial" panose="020B0604020202020204" pitchFamily="34" charset="0"/>
+              <a:buChar char="•"/>
+            </a:pPr>
+            <a:r>
+              <a:rPr lang="en-US" sz="2400" dirty="0" smtClean="0"/>
+              <a:t>Client agnostic controllers that serve </a:t>
+            </a:r>
+            <a:r>
+              <a:rPr lang="en-US" sz="2400" dirty="0" err="1" smtClean="0"/>
+              <a:t>json</a:t>
+            </a:r>
+            <a:r>
+              <a:rPr lang="en-US" sz="2400" dirty="0" smtClean="0"/>
+              <a:t> to mobile/other clients</a:t>
+            </a:r>
+          </a:p>
+          <a:p>
+            <a:pPr marL="285750" indent="-285750">
+              <a:buFont typeface="Arial" panose="020B0604020202020204" pitchFamily="34" charset="0"/>
+              <a:buChar char="•"/>
+            </a:pPr>
+            <a:r>
+              <a:rPr lang="en-US" sz="2400" dirty="0" smtClean="0"/>
+              <a:t>Modeling needs for the data to be returned vary significantly between the Client dependent Browsers and Client agnostic Mobile clients (other API consumers)</a:t>
+            </a:r>
+          </a:p>
+          <a:p>
+            <a:pPr marL="285750" indent="-285750">
+              <a:buFont typeface="Arial" panose="020B0604020202020204" pitchFamily="34" charset="0"/>
+              <a:buChar char="•"/>
+            </a:pPr>
+            <a:r>
+              <a:rPr lang="en-US" sz="2400" dirty="0" smtClean="0"/>
+              <a:t>This is inefficient because now we will need to maintain duplicate codebases that serve the same data differently. </a:t>
+            </a:r>
+          </a:p>
+        </p:txBody>
+      </p:sp>
+      <p:pic>
+        <p:nvPicPr>
+          <p:cNvPr id="5" name="Picture 4"/>
+          <p:cNvPicPr>
+            <a:picLocks noChangeAspect="1"/>
+          </p:cNvPicPr>
+          <p:nvPr/>
+        </p:nvPicPr>
+        <p:blipFill>
+          <a:blip r:embed="rId3">
+            <a:extLst>
+              <a:ext uri="{28A0092B-C50C-407E-A947-70E740481C1C}">
+                <a14:useLocalDpi xmlns:a14="http://schemas.microsoft.com/office/drawing/2010/main" val="0"/>
+              </a:ext>
+            </a:extLst>
+          </a:blip>
+          <a:stretch>
+            <a:fillRect/>
+          </a:stretch>
+        </p:blipFill>
+        <p:spPr>
+          <a:xfrm>
+            <a:off x="10233834" y="426017"/>
+            <a:ext cx="702157" cy="1404313"/>
+          </a:xfrm>
+          <a:prstGeom prst="rect">
+            <a:avLst/>
+          </a:prstGeom>
+        </p:spPr>
+      </p:pic>
+    </p:spTree>
+    <p:extLst>
+      <p:ext uri="{BB962C8B-B14F-4D97-AF65-F5344CB8AC3E}">
+        <p14:creationId xmlns:p14="http://schemas.microsoft.com/office/powerpoint/2010/main" val="2485847217"/>
+      </p:ext>
+    </p:extLst>
+  </p:cSld>
+  <p:clrMapOvr>
+    <a:masterClrMapping/>
+  </p:clrMapOvr>
+  <p:timing>
+    <p:tnLst>
+      <p:par>
+        <p:cTn id="1" dur="indefinite" restart="never" nodeType="tmRoot"/>
+      </p:par>
+    </p:tnLst>
+  </p:timing>
+</p:sld>
+</file>
+
+<file path=ppt/slides/slide25.xml><?xml version="1.0" encoding="utf-8"?>
+<p:sld xmlns:a="http://schemas.openxmlformats.org/drawingml/2006/main" xmlns:r="http://schemas.openxmlformats.org/officeDocument/2006/relationships" xmlns:p="http://schemas.openxmlformats.org/presentationml/2006/main">
+  <p:cSld>
+    <p:spTree>
+      <p:nvGrpSpPr>
+        <p:cNvPr id="1" name=""/>
+        <p:cNvGrpSpPr/>
+        <p:nvPr/>
+      </p:nvGrpSpPr>
+      <p:grpSpPr>
+        <a:xfrm>
+          <a:off x="0" y="0"/>
+          <a:ext cx="0" cy="0"/>
+          <a:chOff x="0" y="0"/>
+          <a:chExt cx="0" cy="0"/>
+        </a:xfrm>
+      </p:grpSpPr>
+      <p:sp>
+        <p:nvSpPr>
+          <p:cNvPr id="2" name="Title 1"/>
+          <p:cNvSpPr>
+            <a:spLocks noGrp="1"/>
+          </p:cNvSpPr>
+          <p:nvPr>
+            <p:ph type="title"/>
+          </p:nvPr>
+        </p:nvSpPr>
+        <p:spPr>
+          <a:xfrm>
+            <a:off x="69313" y="64221"/>
+            <a:ext cx="10515600" cy="1325563"/>
+          </a:xfrm>
+        </p:spPr>
+        <p:txBody>
+          <a:bodyPr/>
+          <a:lstStyle/>
+          <a:p>
+            <a:r>
+              <a:rPr lang="en-US" dirty="0" smtClean="0"/>
+              <a:t>Monolithic </a:t>
+            </a:r>
+            <a:r>
+              <a:rPr lang="en-US" dirty="0" smtClean="0"/>
+              <a:t>Challenges</a:t>
+            </a:r>
+            <a:endParaRPr lang="en-US" dirty="0"/>
+          </a:p>
+        </p:txBody>
+      </p:sp>
+      <p:sp>
+        <p:nvSpPr>
+          <p:cNvPr id="34" name="TextBox 33"/>
+          <p:cNvSpPr txBox="1"/>
+          <p:nvPr/>
+        </p:nvSpPr>
+        <p:spPr>
+          <a:xfrm>
+            <a:off x="501650" y="1128174"/>
+            <a:ext cx="7359650" cy="523220"/>
+          </a:xfrm>
+          <a:prstGeom prst="rect">
+            <a:avLst/>
+          </a:prstGeom>
+          <a:noFill/>
+        </p:spPr>
+        <p:txBody>
+          <a:bodyPr wrap="square" rtlCol="0">
+            <a:spAutoFit/>
+          </a:bodyPr>
+          <a:lstStyle/>
+          <a:p>
+            <a:r>
+              <a:rPr lang="en-US" sz="2800" b="1" dirty="0" smtClean="0"/>
+              <a:t>What about Performance?</a:t>
+            </a:r>
+            <a:endParaRPr lang="en-US" sz="2800" b="1" dirty="0"/>
+          </a:p>
+        </p:txBody>
+      </p:sp>
+      <p:sp>
+        <p:nvSpPr>
+          <p:cNvPr id="3" name="TextBox 2"/>
+          <p:cNvSpPr txBox="1"/>
+          <p:nvPr/>
+        </p:nvSpPr>
+        <p:spPr>
+          <a:xfrm>
+            <a:off x="889686" y="2310714"/>
+            <a:ext cx="10429103" cy="3416320"/>
+          </a:xfrm>
+          <a:prstGeom prst="rect">
+            <a:avLst/>
+          </a:prstGeom>
+          <a:noFill/>
+        </p:spPr>
+        <p:txBody>
+          <a:bodyPr wrap="square" rtlCol="0">
+            <a:spAutoFit/>
+          </a:bodyPr>
+          <a:lstStyle/>
+          <a:p>
+            <a:pPr marL="285750" indent="-285750">
+              <a:buFont typeface="Arial" panose="020B0604020202020204" pitchFamily="34" charset="0"/>
+              <a:buChar char="•"/>
+            </a:pPr>
+            <a:r>
+              <a:rPr lang="en-US" sz="2400" dirty="0" smtClean="0"/>
+              <a:t>Serving JSPs to clients is very inefficient</a:t>
+            </a:r>
+          </a:p>
+          <a:p>
+            <a:pPr marL="742950" lvl="1" indent="-285750">
+              <a:buFont typeface="Arial" panose="020B0604020202020204" pitchFamily="34" charset="0"/>
+              <a:buChar char="•"/>
+            </a:pPr>
+            <a:r>
+              <a:rPr lang="en-US" sz="2400" dirty="0" smtClean="0"/>
+              <a:t>Generation takes up valuable Java EE server resources. Resources that are ought to be prioritized for number crunching, data processing etc.</a:t>
+            </a:r>
+          </a:p>
+          <a:p>
+            <a:pPr marL="742950" lvl="1" indent="-285750">
+              <a:buFont typeface="Arial" panose="020B0604020202020204" pitchFamily="34" charset="0"/>
+              <a:buChar char="•"/>
+            </a:pPr>
+            <a:r>
+              <a:rPr lang="en-US" sz="2400" dirty="0" smtClean="0"/>
+              <a:t>Limiting a Service’s responsibility of client view management leads to better design and facilitates development of neutral client agnostic </a:t>
+            </a:r>
+            <a:r>
+              <a:rPr lang="en-US" sz="2400" dirty="0" err="1" smtClean="0"/>
+              <a:t>apis</a:t>
+            </a:r>
+            <a:r>
+              <a:rPr lang="en-US" sz="2400" dirty="0" smtClean="0"/>
+              <a:t>.</a:t>
+            </a:r>
+          </a:p>
+          <a:p>
+            <a:pPr marL="742950" lvl="1" indent="-285750">
+              <a:buFont typeface="Arial" panose="020B0604020202020204" pitchFamily="34" charset="0"/>
+              <a:buChar char="•"/>
+            </a:pPr>
+            <a:r>
+              <a:rPr lang="en-US" sz="2400" dirty="0" smtClean="0"/>
+              <a:t>Data transfer between Service to client is huge – when transferring a </a:t>
+            </a:r>
+            <a:r>
+              <a:rPr lang="en-US" sz="2400" dirty="0" err="1" smtClean="0"/>
+              <a:t>jsp</a:t>
+            </a:r>
+            <a:r>
+              <a:rPr lang="en-US" sz="2400" dirty="0" smtClean="0"/>
+              <a:t> to client as opposed to something lightweight (</a:t>
+            </a:r>
+            <a:r>
+              <a:rPr lang="en-US" sz="2400" dirty="0" err="1" smtClean="0"/>
+              <a:t>json</a:t>
+            </a:r>
+            <a:r>
+              <a:rPr lang="en-US" sz="2400" dirty="0" smtClean="0"/>
+              <a:t>)</a:t>
+            </a:r>
+          </a:p>
+          <a:p>
+            <a:pPr marL="1200150" lvl="2" indent="-285750">
+              <a:buFont typeface="Arial" panose="020B0604020202020204" pitchFamily="34" charset="0"/>
+              <a:buChar char="•"/>
+            </a:pPr>
+            <a:r>
+              <a:rPr lang="en-US" sz="2400" dirty="0" smtClean="0"/>
+              <a:t>And this happens again and again as the user navigates from one page to another till the end of the session</a:t>
+            </a:r>
+          </a:p>
+        </p:txBody>
+      </p:sp>
+    </p:spTree>
+    <p:extLst>
+      <p:ext uri="{BB962C8B-B14F-4D97-AF65-F5344CB8AC3E}">
+        <p14:creationId xmlns:p14="http://schemas.microsoft.com/office/powerpoint/2010/main" val="3546589318"/>
+      </p:ext>
+    </p:extLst>
+  </p:cSld>
+  <p:clrMapOvr>
+    <a:masterClrMapping/>
+  </p:clrMapOvr>
+  <p:timing>
+    <p:tnLst>
+      <p:par>
+        <p:cTn id="1" dur="indefinite" restart="never" nodeType="tmRoot"/>
+      </p:par>
+    </p:tnLst>
+  </p:timing>
+</p:sld>
+</file>
+
+<file path=ppt/slides/slide26.xml><?xml version="1.0" encoding="utf-8"?>
+<p:sld xmlns:a="http://schemas.openxmlformats.org/drawingml/2006/main" xmlns:r="http://schemas.openxmlformats.org/officeDocument/2006/relationships" xmlns:p="http://schemas.openxmlformats.org/presentationml/2006/main">
+  <p:cSld>
+    <p:spTree>
+      <p:nvGrpSpPr>
+        <p:cNvPr id="1" name=""/>
+        <p:cNvGrpSpPr/>
+        <p:nvPr/>
+      </p:nvGrpSpPr>
+      <p:grpSpPr>
+        <a:xfrm>
+          <a:off x="0" y="0"/>
+          <a:ext cx="0" cy="0"/>
+          <a:chOff x="0" y="0"/>
+          <a:chExt cx="0" cy="0"/>
+        </a:xfrm>
+      </p:grpSpPr>
+      <p:sp>
+        <p:nvSpPr>
           <p:cNvPr id="7" name="Rectangle 6"/>
           <p:cNvSpPr/>
           <p:nvPr/>
@@ -11602,7 +13093,7 @@
           <a:p>
             <a:r>
               <a:rPr lang="en-US" dirty="0" smtClean="0"/>
-              <a:t>Monolithic nightmares </a:t>
+              <a:t>Can we improve on this?</a:t>
             </a:r>
             <a:endParaRPr lang="en-US" dirty="0"/>
           </a:p>
@@ -11610,14 +13101,14 @@
       </p:sp>
       <p:sp>
         <p:nvSpPr>
-          <p:cNvPr id="6" name="TextBox 5"/>
+          <p:cNvPr id="35" name="TextBox 34"/>
           <p:cNvSpPr txBox="1"/>
           <p:nvPr/>
         </p:nvSpPr>
         <p:spPr>
           <a:xfrm>
-            <a:off x="438150" y="1416934"/>
-            <a:ext cx="5219700" cy="523220"/>
+            <a:off x="1278987" y="2137746"/>
+            <a:ext cx="10200439" cy="2677656"/>
           </a:xfrm>
           <a:prstGeom prst="rect">
             <a:avLst/>
@@ -11632,106 +13123,29 @@
           <a:p>
             <a:r>
               <a:rPr lang="en-US" sz="2800" b="1" dirty="0" smtClean="0"/>
-              <a:t>How Scalable is this architecture?</a:t>
-            </a:r>
+              <a:t>Yes!</a:t>
+            </a:r>
+          </a:p>
+          <a:p>
             <a:endParaRPr lang="en-US" sz="2800" b="1" dirty="0"/>
           </a:p>
-        </p:txBody>
-      </p:sp>
-      <p:sp>
-        <p:nvSpPr>
-          <p:cNvPr id="34" name="TextBox 33"/>
-          <p:cNvSpPr txBox="1"/>
-          <p:nvPr/>
-        </p:nvSpPr>
-        <p:spPr>
-          <a:xfrm>
-            <a:off x="463550" y="2299497"/>
-            <a:ext cx="7359650" cy="523220"/>
-          </a:xfrm>
-          <a:prstGeom prst="rect">
-            <a:avLst/>
-          </a:prstGeom>
-          <a:noFill/>
-        </p:spPr>
-        <p:txBody>
-          <a:bodyPr wrap="square" rtlCol="0">
-            <a:spAutoFit/>
-          </a:bodyPr>
-          <a:lstStyle/>
-          <a:p>
-            <a:r>
-              <a:rPr lang="en-US" sz="2800" b="1" dirty="0" smtClean="0"/>
-              <a:t>What if I want to support mobile clients?</a:t>
-            </a:r>
-            <a:endParaRPr lang="en-US" sz="2800" b="1" dirty="0"/>
-          </a:p>
-        </p:txBody>
-      </p:sp>
-      <p:sp>
-        <p:nvSpPr>
-          <p:cNvPr id="35" name="TextBox 34"/>
-          <p:cNvSpPr txBox="1"/>
-          <p:nvPr/>
-        </p:nvSpPr>
-        <p:spPr>
-          <a:xfrm>
-            <a:off x="501650" y="3311638"/>
-            <a:ext cx="8096250" cy="523220"/>
-          </a:xfrm>
-          <a:prstGeom prst="rect">
-            <a:avLst/>
-          </a:prstGeom>
-          <a:noFill/>
-        </p:spPr>
-        <p:txBody>
-          <a:bodyPr wrap="square" rtlCol="0">
-            <a:spAutoFit/>
-          </a:bodyPr>
-          <a:lstStyle/>
-          <a:p>
-            <a:r>
-              <a:rPr lang="en-US" sz="2800" b="1" dirty="0" smtClean="0"/>
-              <a:t>How can third party apps/services talk to my app?</a:t>
-            </a:r>
-            <a:endParaRPr lang="en-US" sz="2800" b="1" dirty="0"/>
-          </a:p>
-        </p:txBody>
-      </p:sp>
-      <p:sp>
-        <p:nvSpPr>
-          <p:cNvPr id="36" name="TextBox 35"/>
-          <p:cNvSpPr txBox="1"/>
-          <p:nvPr/>
-        </p:nvSpPr>
-        <p:spPr>
-          <a:xfrm>
-            <a:off x="501650" y="4336327"/>
-            <a:ext cx="9480550" cy="523220"/>
-          </a:xfrm>
-          <a:prstGeom prst="rect">
-            <a:avLst/>
-          </a:prstGeom>
-          <a:noFill/>
-        </p:spPr>
-        <p:txBody>
-          <a:bodyPr wrap="square" rtlCol="0">
-            <a:spAutoFit/>
-          </a:bodyPr>
-          <a:lstStyle/>
-          <a:p>
-            <a:r>
-              <a:rPr lang="en-US" sz="2800" b="1" dirty="0" smtClean="0"/>
-              <a:t>What about performance and efficiency?</a:t>
-            </a:r>
-            <a:endParaRPr lang="en-US" sz="2800" b="1" dirty="0"/>
+          <a:p>
+            <a:r>
+              <a:rPr lang="en-US" sz="2800" b="1" i="1" dirty="0" smtClean="0"/>
+              <a:t>Usual legal stuff: There’s no silver bullet when choosing an architecture for a distributed network application. Design choices vary significantly based on underlying design goals and long term vision of the intended </a:t>
+            </a:r>
+            <a:r>
+              <a:rPr lang="en-US" sz="2800" b="1" i="1" smtClean="0"/>
+              <a:t>application.</a:t>
+            </a:r>
+            <a:endParaRPr lang="en-US" sz="2800" b="1" i="1" dirty="0" smtClean="0"/>
           </a:p>
         </p:txBody>
       </p:sp>
     </p:spTree>
     <p:extLst>
       <p:ext uri="{BB962C8B-B14F-4D97-AF65-F5344CB8AC3E}">
-        <p14:creationId xmlns:p14="http://schemas.microsoft.com/office/powerpoint/2010/main" val="2419001591"/>
+        <p14:creationId xmlns:p14="http://schemas.microsoft.com/office/powerpoint/2010/main" val="2959478468"/>
       </p:ext>
     </p:extLst>
   </p:cSld>
@@ -11748,7 +13162,7 @@
 </p:sld>
 </file>
 
-<file path=ppt/slides/slide24.xml><?xml version="1.0" encoding="utf-8"?>
+<file path=ppt/slides/slide27.xml><?xml version="1.0" encoding="utf-8"?>
 <p:sld xmlns:a="http://schemas.openxmlformats.org/drawingml/2006/main" xmlns:r="http://schemas.openxmlformats.org/officeDocument/2006/relationships" xmlns:p="http://schemas.openxmlformats.org/presentationml/2006/main">
   <p:cSld>
     <p:spTree>
@@ -13355,6 +14769,74 @@
           </a:p>
         </p:txBody>
       </p:sp>
+      <p:cxnSp>
+        <p:nvCxnSpPr>
+          <p:cNvPr id="5" name="Straight Arrow Connector 4"/>
+          <p:cNvCxnSpPr/>
+          <p:nvPr/>
+        </p:nvCxnSpPr>
+        <p:spPr>
+          <a:xfrm>
+            <a:off x="4108040" y="4407490"/>
+            <a:ext cx="3284199" cy="867948"/>
+          </a:xfrm>
+          <a:prstGeom prst="straightConnector1">
+            <a:avLst/>
+          </a:prstGeom>
+          <a:ln>
+            <a:solidFill>
+              <a:schemeClr val="accent1"/>
+            </a:solidFill>
+            <a:prstDash val="dash"/>
+            <a:headEnd type="triangle"/>
+            <a:tailEnd type="triangle"/>
+          </a:ln>
+        </p:spPr>
+        <p:style>
+          <a:lnRef idx="1">
+            <a:schemeClr val="accent1"/>
+          </a:lnRef>
+          <a:fillRef idx="0">
+            <a:schemeClr val="accent1"/>
+          </a:fillRef>
+          <a:effectRef idx="0">
+            <a:schemeClr val="accent1"/>
+          </a:effectRef>
+          <a:fontRef idx="minor">
+            <a:schemeClr val="tx1"/>
+          </a:fontRef>
+        </p:style>
+      </p:cxnSp>
+      <p:sp>
+        <p:nvSpPr>
+          <p:cNvPr id="58" name="TextBox 57"/>
+          <p:cNvSpPr txBox="1"/>
+          <p:nvPr/>
+        </p:nvSpPr>
+        <p:spPr>
+          <a:xfrm rot="767492">
+            <a:off x="5367303" y="4523580"/>
+            <a:ext cx="1854940" cy="307777"/>
+          </a:xfrm>
+          <a:prstGeom prst="rect">
+            <a:avLst/>
+          </a:prstGeom>
+          <a:noFill/>
+        </p:spPr>
+        <p:txBody>
+          <a:bodyPr wrap="square" rtlCol="0">
+            <a:spAutoFit/>
+          </a:bodyPr>
+          <a:lstStyle/>
+          <a:p>
+            <a:r>
+              <a:rPr lang="en-US" sz="1400" dirty="0" smtClean="0"/>
+              <a:t>(subsequent requests)</a:t>
+            </a:r>
+            <a:endParaRPr lang="en-US" sz="1400" dirty="0"/>
+          </a:p>
+        </p:txBody>
+      </p:sp>
     </p:spTree>
     <p:extLst>
       <p:ext uri="{BB962C8B-B14F-4D97-AF65-F5344CB8AC3E}">
@@ -13375,7 +14857,7 @@
 </p:sld>
 </file>
 
-<file path=ppt/slides/slide25.xml><?xml version="1.0" encoding="utf-8"?>
+<file path=ppt/slides/slide28.xml><?xml version="1.0" encoding="utf-8"?>
 <p:sld xmlns:a="http://schemas.openxmlformats.org/drawingml/2006/main" xmlns:r="http://schemas.openxmlformats.org/officeDocument/2006/relationships" xmlns:p="http://schemas.openxmlformats.org/presentationml/2006/main">
   <p:cSld>
     <p:spTree>
@@ -13530,21 +15012,13 @@
           <a:p>
             <a:r>
               <a:rPr lang="en-US" dirty="0" smtClean="0"/>
-              <a:t>Spring </a:t>
-            </a:r>
+              <a:t>Spring Framework</a:t>
+            </a:r>
+          </a:p>
+          <a:p>
             <a:r>
               <a:rPr lang="en-US" dirty="0" smtClean="0"/>
-              <a:t>Framework</a:t>
-            </a:r>
-          </a:p>
-          <a:p>
-            <a:r>
-              <a:rPr lang="en-US" dirty="0" smtClean="0"/>
-              <a:t>Introduction to Spring </a:t>
-            </a:r>
-            <a:r>
-              <a:rPr lang="en-US" dirty="0" smtClean="0"/>
-              <a:t>Boot</a:t>
+              <a:t>Introduction to Spring Boot</a:t>
             </a:r>
           </a:p>
           <a:p>
@@ -13571,9 +15045,6 @@
               <a:rPr lang="en-US" dirty="0" smtClean="0"/>
               <a:t>Demo</a:t>
             </a:r>
-          </a:p>
-          <a:p>
-            <a:pPr lvl="1"/>
             <a:endParaRPr lang="en-US" dirty="0"/>
           </a:p>
           <a:p>
@@ -13587,7 +15058,6 @@
               <a:rPr lang="en-US" dirty="0" smtClean="0"/>
               <a:t>Micro-services</a:t>
             </a:r>
-            <a:endParaRPr lang="en-US" dirty="0" smtClean="0"/>
           </a:p>
           <a:p>
             <a:r>
@@ -14211,13 +15681,9 @@
           <a:p>
             <a:r>
               <a:rPr lang="en-US" dirty="0" smtClean="0"/>
-              <a:t>Hello world </a:t>
-            </a:r>
-            <a:r>
-              <a:rPr lang="en-US" smtClean="0"/>
-              <a:t>with Spring Boot</a:t>
-            </a:r>
-            <a:endParaRPr lang="en-US"/>
+              <a:t>Spring Boot – Live Demo</a:t>
+            </a:r>
+            <a:endParaRPr lang="en-US" dirty="0"/>
           </a:p>
         </p:txBody>
       </p:sp>
@@ -14236,7 +15702,79 @@
           <a:bodyPr/>
           <a:lstStyle/>
           <a:p>
-            <a:endParaRPr lang="en-US" dirty="0"/>
+            <a:r>
+              <a:rPr lang="en-US" dirty="0" smtClean="0"/>
+              <a:t>What are we going to build now?</a:t>
+            </a:r>
+          </a:p>
+          <a:p>
+            <a:pPr lvl="1"/>
+            <a:r>
+              <a:rPr lang="en-US" dirty="0"/>
+              <a:t>A simple Bookmark app with JPA  and an Embedded </a:t>
+            </a:r>
+            <a:r>
+              <a:rPr lang="en-US" dirty="0" smtClean="0"/>
+              <a:t>database</a:t>
+            </a:r>
+          </a:p>
+          <a:p>
+            <a:r>
+              <a:rPr lang="en-US" dirty="0" smtClean="0"/>
+              <a:t>Environment: </a:t>
+            </a:r>
+            <a:r>
+              <a:rPr lang="en-US" dirty="0" smtClean="0"/>
+              <a:t>Eclipse IDE /w Spring Suite installed (or STS).</a:t>
+            </a:r>
+          </a:p>
+        </p:txBody>
+      </p:sp>
+      <p:sp>
+        <p:nvSpPr>
+          <p:cNvPr id="4" name="TextBox 3"/>
+          <p:cNvSpPr txBox="1"/>
+          <p:nvPr/>
+        </p:nvSpPr>
+        <p:spPr>
+          <a:xfrm>
+            <a:off x="914400" y="6284889"/>
+            <a:ext cx="3515932" cy="276999"/>
+          </a:xfrm>
+          <a:prstGeom prst="rect">
+            <a:avLst/>
+          </a:prstGeom>
+          <a:noFill/>
+        </p:spPr>
+        <p:txBody>
+          <a:bodyPr wrap="square" rtlCol="0">
+            <a:spAutoFit/>
+          </a:bodyPr>
+          <a:lstStyle/>
+          <a:p>
+            <a:r>
+              <a:rPr lang="en-US" sz="1200" i="1" dirty="0" smtClean="0"/>
+              <a:t>Ref</a:t>
+            </a:r>
+            <a:r>
+              <a:rPr lang="en-US" sz="1200" i="1" dirty="0" smtClean="0">
+                <a:hlinkClick r:id="rId2"/>
+              </a:rPr>
+              <a:t>: </a:t>
+            </a:r>
+            <a:r>
+              <a:rPr lang="en-US" sz="1200" b="1" dirty="0">
+                <a:hlinkClick r:id="rId3"/>
+              </a:rPr>
+              <a:t>Building REST services with </a:t>
+            </a:r>
+            <a:r>
+              <a:rPr lang="en-US" sz="1200" b="1" dirty="0" smtClean="0">
+                <a:hlinkClick r:id="rId3"/>
+              </a:rPr>
+              <a:t>Spring</a:t>
+            </a:r>
+            <a:endParaRPr lang="en-US" sz="1200" b="1" dirty="0"/>
           </a:p>
         </p:txBody>
       </p:sp>
@@ -14310,8 +15848,43 @@
           <a:p>
             <a:r>
               <a:rPr lang="en-US" dirty="0" smtClean="0"/>
-              <a:t>Spring IO guides</a:t>
-            </a:r>
+              <a:t>Spring IO </a:t>
+            </a:r>
+            <a:r>
+              <a:rPr lang="en-US" dirty="0" smtClean="0"/>
+              <a:t>guides</a:t>
+            </a:r>
+          </a:p>
+          <a:p>
+            <a:pPr lvl="1"/>
+            <a:r>
+              <a:rPr lang="en-US" dirty="0">
+                <a:hlinkClick r:id="rId2"/>
+              </a:rPr>
+              <a:t>http://start.spring.io</a:t>
+            </a:r>
+            <a:r>
+              <a:rPr lang="en-US" dirty="0" smtClean="0">
+                <a:hlinkClick r:id="rId2"/>
+              </a:rPr>
+              <a:t>/</a:t>
+            </a:r>
+            <a:r>
+              <a:rPr lang="en-US" dirty="0" smtClean="0"/>
+              <a:t> or through Eclipse with Spring plugin/STS</a:t>
+            </a:r>
+          </a:p>
+          <a:p>
+            <a:pPr lvl="1"/>
+            <a:r>
+              <a:rPr lang="en-US" dirty="0" smtClean="0"/>
+              <a:t>Getting </a:t>
+            </a:r>
+            <a:r>
+              <a:rPr lang="en-US" dirty="0"/>
+              <a:t>started guides: https://spring.io/guides</a:t>
+            </a:r>
+            <a:endParaRPr lang="en-US" dirty="0" smtClean="0"/>
           </a:p>
           <a:p>
             <a:r>
@@ -14326,7 +15899,7 @@
             </a:r>
             <a:r>
               <a:rPr lang="en-US" dirty="0" smtClean="0">
-                <a:hlinkClick r:id="rId2"/>
+                <a:hlinkClick r:id="rId3"/>
               </a:rPr>
               <a:t>Stackoverflow</a:t>
             </a:r>

</xml_diff>

<commit_message>
PPT updates - refactoring
</commit_message>
<xml_diff>
--- a/Spring Boot.pptx
+++ b/Spring Boot.pptx
@@ -5,10 +5,10 @@
     <p:sldMasterId id="2147483648" r:id="rId1"/>
   </p:sldMasterIdLst>
   <p:notesMasterIdLst>
-    <p:notesMasterId r:id="rId30"/>
+    <p:notesMasterId r:id="rId31"/>
   </p:notesMasterIdLst>
   <p:handoutMasterIdLst>
-    <p:handoutMasterId r:id="rId31"/>
+    <p:handoutMasterId r:id="rId32"/>
   </p:handoutMasterIdLst>
   <p:sldIdLst>
     <p:sldId id="256" r:id="rId2"/>
@@ -38,7 +38,8 @@
     <p:sldId id="285" r:id="rId26"/>
     <p:sldId id="282" r:id="rId27"/>
     <p:sldId id="274" r:id="rId28"/>
-    <p:sldId id="280" r:id="rId29"/>
+    <p:sldId id="286" r:id="rId29"/>
+    <p:sldId id="280" r:id="rId30"/>
   </p:sldIdLst>
   <p:sldSz cx="12192000" cy="6858000"/>
   <p:notesSz cx="6858000" cy="9144000"/>
@@ -1971,6 +1972,90 @@
     <p:extLst>
       <p:ext uri="{BB962C8B-B14F-4D97-AF65-F5344CB8AC3E}">
         <p14:creationId xmlns:p14="http://schemas.microsoft.com/office/powerpoint/2010/main" val="1357648832"/>
+      </p:ext>
+    </p:extLst>
+  </p:cSld>
+  <p:clrMapOvr>
+    <a:masterClrMapping/>
+  </p:clrMapOvr>
+</p:notes>
+</file>
+
+<file path=ppt/notesSlides/notesSlide22.xml><?xml version="1.0" encoding="utf-8"?>
+<p:notes xmlns:a="http://schemas.openxmlformats.org/drawingml/2006/main" xmlns:r="http://schemas.openxmlformats.org/officeDocument/2006/relationships" xmlns:p="http://schemas.openxmlformats.org/presentationml/2006/main">
+  <p:cSld>
+    <p:spTree>
+      <p:nvGrpSpPr>
+        <p:cNvPr id="1" name=""/>
+        <p:cNvGrpSpPr/>
+        <p:nvPr/>
+      </p:nvGrpSpPr>
+      <p:grpSpPr>
+        <a:xfrm>
+          <a:off x="0" y="0"/>
+          <a:ext cx="0" cy="0"/>
+          <a:chOff x="0" y="0"/>
+          <a:chExt cx="0" cy="0"/>
+        </a:xfrm>
+      </p:grpSpPr>
+      <p:sp>
+        <p:nvSpPr>
+          <p:cNvPr id="2" name="Slide Image Placeholder 1"/>
+          <p:cNvSpPr>
+            <a:spLocks noGrp="1" noRot="1" noChangeAspect="1"/>
+          </p:cNvSpPr>
+          <p:nvPr>
+            <p:ph type="sldImg"/>
+          </p:nvPr>
+        </p:nvSpPr>
+        <p:spPr/>
+      </p:sp>
+      <p:sp>
+        <p:nvSpPr>
+          <p:cNvPr id="3" name="Notes Placeholder 2"/>
+          <p:cNvSpPr>
+            <a:spLocks noGrp="1"/>
+          </p:cNvSpPr>
+          <p:nvPr>
+            <p:ph type="body" idx="1"/>
+          </p:nvPr>
+        </p:nvSpPr>
+        <p:spPr/>
+        <p:txBody>
+          <a:bodyPr/>
+          <a:lstStyle/>
+          <a:p>
+            <a:endParaRPr lang="en-US" dirty="0"/>
+          </a:p>
+        </p:txBody>
+      </p:sp>
+      <p:sp>
+        <p:nvSpPr>
+          <p:cNvPr id="4" name="Slide Number Placeholder 3"/>
+          <p:cNvSpPr>
+            <a:spLocks noGrp="1"/>
+          </p:cNvSpPr>
+          <p:nvPr>
+            <p:ph type="sldNum" sz="quarter" idx="10"/>
+          </p:nvPr>
+        </p:nvSpPr>
+        <p:spPr/>
+        <p:txBody>
+          <a:bodyPr/>
+          <a:lstStyle/>
+          <a:p>
+            <a:fld id="{9F9FB9DD-7CF9-4A0C-8C7F-91FD9EF34B36}" type="slidenum">
+              <a:rPr lang="en-US" smtClean="0"/>
+              <a:t>28</a:t>
+            </a:fld>
+            <a:endParaRPr lang="en-US" dirty="0"/>
+          </a:p>
+        </p:txBody>
+      </p:sp>
+    </p:spTree>
+    <p:extLst>
+      <p:ext uri="{BB962C8B-B14F-4D97-AF65-F5344CB8AC3E}">
+        <p14:creationId xmlns:p14="http://schemas.microsoft.com/office/powerpoint/2010/main" val="1105293897"/>
       </p:ext>
     </p:extLst>
   </p:cSld>
@@ -5724,6 +5809,13 @@
   <p:clrMapOvr>
     <a:masterClrMapping/>
   </p:clrMapOvr>
+  <p:timing>
+    <p:tnLst>
+      <p:par>
+        <p:cTn id="1" dur="indefinite" restart="never" nodeType="tmRoot"/>
+      </p:par>
+    </p:tnLst>
+  </p:timing>
 </p:sld>
 </file>
 
@@ -5948,6 +6040,13 @@
   <p:clrMapOvr>
     <a:masterClrMapping/>
   </p:clrMapOvr>
+  <p:timing>
+    <p:tnLst>
+      <p:par>
+        <p:cTn id="1" dur="indefinite" restart="never" nodeType="tmRoot"/>
+      </p:par>
+    </p:tnLst>
+  </p:timing>
 </p:sld>
 </file>
 
@@ -6044,48 +6143,68 @@
           <a:p>
             <a:r>
               <a:rPr lang="en-US" dirty="0" smtClean="0"/>
-              <a:t>Introduced </a:t>
+              <a:t>Introduced by Roy </a:t>
             </a:r>
             <a:r>
               <a:rPr lang="en-US" dirty="0" smtClean="0"/>
-              <a:t>by Roy Fielding’s in </a:t>
-            </a:r>
+              <a:t>Fielding.</a:t>
+            </a:r>
+            <a:endParaRPr lang="en-US" dirty="0"/>
+          </a:p>
+          <a:p>
             <a:r>
               <a:rPr lang="en-US" dirty="0" smtClean="0"/>
-              <a:t>dissertation submitted to UC, Irvine in 2000</a:t>
-            </a:r>
-          </a:p>
-          <a:p>
+              <a:t>It’s </a:t>
+            </a:r>
             <a:r>
               <a:rPr lang="en-US" dirty="0" smtClean="0"/>
-              <a:t>It’s an </a:t>
+              <a:t>an </a:t>
             </a:r>
             <a:r>
               <a:rPr lang="en-US" dirty="0"/>
-              <a:t>architecture style for designing networked applications</a:t>
+              <a:t>architecture </a:t>
             </a:r>
             <a:r>
               <a:rPr lang="en-US" dirty="0" smtClean="0"/>
-              <a:t>. It’s not a protocol, standard or a framework</a:t>
-            </a:r>
-          </a:p>
-          <a:p>
+              <a:t>style. It’s </a:t>
+            </a:r>
             <a:r>
               <a:rPr lang="en-US" dirty="0" smtClean="0"/>
-              <a:t>Resource-based – REST API is all about “things” or “resources” as opposed to “actions” (as verbs/methods/actions  in SOAP)</a:t>
+              <a:t>not a protocol, standard or a framework</a:t>
             </a:r>
           </a:p>
           <a:p>
             <a:r>
               <a:rPr lang="en-US" dirty="0" smtClean="0"/>
-              <a:t>Representations – Typically JSON/XML or could be anything that represents a part or the whole of the resource state</a:t>
-            </a:r>
+              <a:t>Resource-based – REST API is all about “things” or “resources” as opposed to “actions” </a:t>
+            </a:r>
+            <a:endParaRPr lang="en-US" dirty="0" smtClean="0"/>
           </a:p>
           <a:p>
             <a:r>
               <a:rPr lang="en-US" dirty="0" smtClean="0"/>
-              <a:t>Not tied to HTTP, but most commonly associated with it</a:t>
-            </a:r>
+              <a:t>Representations </a:t>
+            </a:r>
+            <a:r>
+              <a:rPr lang="en-US" dirty="0" smtClean="0"/>
+              <a:t>– Typically JSON/XML </a:t>
+            </a:r>
+            <a:endParaRPr lang="en-US" dirty="0" smtClean="0"/>
+          </a:p>
+          <a:p>
+            <a:r>
+              <a:rPr lang="en-US" dirty="0" smtClean="0"/>
+              <a:t>Not </a:t>
+            </a:r>
+            <a:r>
+              <a:rPr lang="en-US" dirty="0" smtClean="0"/>
+              <a:t>tied to </a:t>
+            </a:r>
+            <a:r>
+              <a:rPr lang="en-US" dirty="0" smtClean="0"/>
+              <a:t>HTTP</a:t>
+            </a:r>
+            <a:endParaRPr lang="en-US" dirty="0" smtClean="0"/>
           </a:p>
         </p:txBody>
       </p:sp>
@@ -6147,6 +6266,13 @@
   <p:clrMapOvr>
     <a:masterClrMapping/>
   </p:clrMapOvr>
+  <p:timing>
+    <p:tnLst>
+      <p:par>
+        <p:cTn id="1" dur="indefinite" restart="never" nodeType="tmRoot"/>
+      </p:par>
+    </p:tnLst>
+  </p:timing>
 </p:sld>
 </file>
 
@@ -6219,49 +6345,53 @@
             <a:pPr lvl="1"/>
             <a:r>
               <a:rPr lang="en-US" dirty="0" smtClean="0"/>
-              <a:t>Service (API) providers cannot make any assumptions about the client platforms. </a:t>
+              <a:t>Services (API) have to be client agnostic</a:t>
             </a:r>
           </a:p>
           <a:p>
             <a:pPr lvl="1"/>
             <a:r>
-              <a:rPr lang="en-US" dirty="0"/>
-              <a:t>The client could be a browser, a mobile device running any OS, </a:t>
-            </a:r>
-            <a:r>
               <a:rPr lang="en-US" dirty="0" smtClean="0"/>
-              <a:t>a GPS navigator, automotive system or anything else</a:t>
+              <a:t>Mobile explosion: Client could be a GPS device, automotive, mobile etc.</a:t>
             </a:r>
           </a:p>
           <a:p>
             <a:pPr lvl="1"/>
             <a:r>
               <a:rPr lang="en-US" dirty="0" smtClean="0"/>
-              <a:t>Clients and Services need to evolve independently. </a:t>
+              <a:t>Clients </a:t>
+            </a:r>
+            <a:r>
+              <a:rPr lang="en-US" dirty="0" smtClean="0"/>
+              <a:t>and Services need to evolve independently. </a:t>
             </a:r>
           </a:p>
           <a:p>
             <a:pPr lvl="1"/>
             <a:r>
               <a:rPr lang="en-US" dirty="0" smtClean="0"/>
-              <a:t>Each Client could be running a unique native OS and could be deployed at varied times independent of the Service</a:t>
-            </a:r>
+              <a:t>Latency </a:t>
+            </a:r>
+            <a:r>
+              <a:rPr lang="en-US" dirty="0" smtClean="0"/>
+              <a:t>issues, </a:t>
+            </a:r>
+            <a:r>
+              <a:rPr lang="en-US" dirty="0" smtClean="0"/>
+              <a:t>performance and reliability</a:t>
+            </a:r>
+            <a:endParaRPr lang="en-US" dirty="0" smtClean="0"/>
           </a:p>
           <a:p>
             <a:pPr lvl="1"/>
             <a:r>
               <a:rPr lang="en-US" dirty="0" smtClean="0"/>
-              <a:t>Latency issues, performance, reliability are major issues for Mobile platforms</a:t>
-            </a:r>
-          </a:p>
-          <a:p>
-            <a:pPr lvl="1"/>
+              <a:t>Horizontal </a:t>
+            </a:r>
             <a:r>
               <a:rPr lang="en-US" dirty="0" smtClean="0"/>
-              <a:t>Horizontal Scalability – It is critical to build a scalable architecture in order to take advantage of a scalable infrastructure</a:t>
-            </a:r>
-          </a:p>
-          <a:p>
+              <a:t>Scalability</a:t>
+            </a:r>
             <a:endParaRPr lang="en-US" dirty="0"/>
           </a:p>
         </p:txBody>
@@ -6318,6 +6448,13 @@
   <p:clrMapOvr>
     <a:masterClrMapping/>
   </p:clrMapOvr>
+  <p:timing>
+    <p:tnLst>
+      <p:par>
+        <p:cTn id="1" dur="indefinite" restart="never" nodeType="tmRoot"/>
+      </p:par>
+    </p:tnLst>
+  </p:timing>
 </p:sld>
 </file>
 
@@ -6488,6 +6625,13 @@
   <p:clrMapOvr>
     <a:masterClrMapping/>
   </p:clrMapOvr>
+  <p:timing>
+    <p:tnLst>
+      <p:par>
+        <p:cTn id="1" dur="indefinite" restart="never" nodeType="tmRoot"/>
+      </p:par>
+    </p:tnLst>
+  </p:timing>
 </p:sld>
 </file>
 
@@ -6547,13 +6691,13 @@
         </p:nvSpPr>
         <p:spPr>
           <a:xfrm>
-            <a:off x="838199" y="1287886"/>
-            <a:ext cx="11353801" cy="5228823"/>
+            <a:off x="838199" y="1250991"/>
+            <a:ext cx="11353801" cy="5033898"/>
           </a:xfrm>
         </p:spPr>
         <p:txBody>
           <a:bodyPr>
-            <a:normAutofit fontScale="92500" lnSpcReduction="10000"/>
+            <a:normAutofit fontScale="92500" lnSpcReduction="20000"/>
           </a:bodyPr>
           <a:lstStyle/>
           <a:p>
@@ -6795,6 +6939,13 @@
   <p:clrMapOvr>
     <a:masterClrMapping/>
   </p:clrMapOvr>
+  <p:timing>
+    <p:tnLst>
+      <p:par>
+        <p:cTn id="1" dur="indefinite" restart="never" nodeType="tmRoot"/>
+      </p:par>
+    </p:tnLst>
+  </p:timing>
 </p:sld>
 </file>
 
@@ -7423,13 +7574,7 @@
               <a:rPr lang="en-US" sz="1200" i="1" dirty="0" smtClean="0">
                 <a:hlinkClick r:id="rId6"/>
               </a:rPr>
-              <a:t>– </a:t>
-            </a:r>
-            <a:r>
-              <a:rPr lang="en-US" sz="1200" i="1" dirty="0" smtClean="0">
-                <a:hlinkClick r:id="rId6"/>
-              </a:rPr>
-              <a:t>Roy Fielding</a:t>
+              <a:t>– Roy Fielding</a:t>
             </a:r>
             <a:endParaRPr lang="en-US" sz="1200" i="1" dirty="0"/>
           </a:p>
@@ -7482,16 +7627,34 @@
             <p:ph type="title"/>
           </p:nvPr>
         </p:nvSpPr>
-        <p:spPr/>
-        <p:txBody>
-          <a:bodyPr/>
-          <a:lstStyle/>
-          <a:p>
-            <a:r>
-              <a:rPr lang="en-US" smtClean="0"/>
-              <a:t>REST</a:t>
-            </a:r>
-            <a:endParaRPr lang="en-US" dirty="0"/>
+        <p:spPr>
+          <a:xfrm>
+            <a:off x="103031" y="365125"/>
+            <a:ext cx="12909584" cy="1325563"/>
+          </a:xfrm>
+        </p:spPr>
+        <p:txBody>
+          <a:bodyPr>
+            <a:normAutofit/>
+          </a:bodyPr>
+          <a:lstStyle/>
+          <a:p>
+            <a:r>
+              <a:rPr lang="en-US" sz="4000" b="1" dirty="0"/>
+              <a:t>Hypermedia as the engine of application state </a:t>
+            </a:r>
+            <a:r>
+              <a:rPr lang="en-US" sz="4000" dirty="0"/>
+              <a:t>(</a:t>
+            </a:r>
+            <a:r>
+              <a:rPr lang="en-US" sz="4000" b="1" dirty="0"/>
+              <a:t>HATEOAS</a:t>
+            </a:r>
+            <a:r>
+              <a:rPr lang="en-US" sz="4000" dirty="0"/>
+              <a:t>)</a:t>
+            </a:r>
           </a:p>
         </p:txBody>
       </p:sp>
@@ -7517,42 +7680,13 @@
           </a:bodyPr>
           <a:lstStyle/>
           <a:p>
-            <a:pPr marL="0" indent="0">
-              <a:buNone/>
-            </a:pPr>
-            <a:r>
-              <a:rPr lang="en-US" b="1" dirty="0" smtClean="0"/>
-              <a:t>Hypermedia </a:t>
-            </a:r>
-            <a:r>
-              <a:rPr lang="en-US" b="1" dirty="0"/>
-              <a:t>as the </a:t>
-            </a:r>
-            <a:r>
-              <a:rPr lang="en-US" b="1" dirty="0" smtClean="0"/>
-              <a:t>engine </a:t>
-            </a:r>
-            <a:r>
-              <a:rPr lang="en-US" b="1" dirty="0"/>
-              <a:t>of application state </a:t>
-            </a:r>
             <a:r>
               <a:rPr lang="en-US" dirty="0" smtClean="0"/>
-              <a:t>(</a:t>
-            </a:r>
-            <a:r>
-              <a:rPr lang="en-US" b="1" dirty="0" smtClean="0"/>
-              <a:t>HATEOAS</a:t>
+              <a:t>Help </a:t>
             </a:r>
             <a:r>
               <a:rPr lang="en-US" dirty="0" smtClean="0"/>
-              <a:t>)</a:t>
-            </a:r>
-          </a:p>
-          <a:p>
-            <a:r>
-              <a:rPr lang="en-US" dirty="0" smtClean="0"/>
-              <a:t>Help client navigate the Service API by providing necessary information dynamically in the response using media types and link relations</a:t>
+              <a:t>client navigate the Service API by providing necessary information dynamically in the response using media types and link relations</a:t>
             </a:r>
             <a:endParaRPr lang="en-US" dirty="0"/>
           </a:p>
@@ -7803,6 +7937,13 @@
   <p:clrMapOvr>
     <a:masterClrMapping/>
   </p:clrMapOvr>
+  <p:timing>
+    <p:tnLst>
+      <p:par>
+        <p:cTn id="1" dur="indefinite" restart="never" nodeType="tmRoot"/>
+      </p:par>
+    </p:tnLst>
+  </p:timing>
 </p:sld>
 </file>
 
@@ -9078,6 +9219,13 @@
   <p:clrMapOvr>
     <a:masterClrMapping/>
   </p:clrMapOvr>
+  <p:timing>
+    <p:tnLst>
+      <p:par>
+        <p:cTn id="1" dur="indefinite" restart="never" nodeType="tmRoot"/>
+      </p:par>
+    </p:tnLst>
+  </p:timing>
 </p:sld>
 </file>
 
@@ -10003,6 +10151,13 @@
   <p:clrMapOvr>
     <a:masterClrMapping/>
   </p:clrMapOvr>
+  <p:timing>
+    <p:tnLst>
+      <p:par>
+        <p:cTn id="1" dur="indefinite" restart="never" nodeType="tmRoot"/>
+      </p:par>
+    </p:tnLst>
+  </p:timing>
 </p:sld>
 </file>
 
@@ -10062,7 +10217,7 @@
         <p:spPr>
           <a:xfrm>
             <a:off x="726510" y="1578280"/>
-            <a:ext cx="10647123" cy="1569660"/>
+            <a:ext cx="10647123" cy="2308324"/>
           </a:xfrm>
           <a:prstGeom prst="rect">
             <a:avLst/>
@@ -10099,8 +10254,27 @@
             </a:pPr>
             <a:r>
               <a:rPr lang="en-US" sz="2400" dirty="0" smtClean="0"/>
-              <a:t>Big fan of Open source software and it’s philosophy</a:t>
-            </a:r>
+              <a:t>Big fan of Open source software and it’s </a:t>
+            </a:r>
+            <a:r>
+              <a:rPr lang="en-US" sz="2400" dirty="0" smtClean="0"/>
+              <a:t>philosophy</a:t>
+            </a:r>
+          </a:p>
+          <a:p>
+            <a:pPr marL="285750" indent="-285750">
+              <a:buFont typeface="Arial" panose="020B0604020202020204" pitchFamily="34" charset="0"/>
+              <a:buChar char="•"/>
+            </a:pPr>
+            <a:r>
+              <a:rPr lang="en-US" sz="2400" dirty="0" smtClean="0"/>
+              <a:t>Slides/Sources of this presentation </a:t>
+            </a:r>
+            <a:r>
+              <a:rPr lang="en-US" sz="2400" dirty="0"/>
+              <a:t>are available at https://github.com/batchu/spring-boot-ujug</a:t>
+            </a:r>
+            <a:endParaRPr lang="en-US" sz="2400" dirty="0" smtClean="0"/>
           </a:p>
           <a:p>
             <a:pPr marL="285750" indent="-285750">
@@ -10128,11 +10302,11 @@
   <p:clrMapOvr>
     <a:masterClrMapping/>
   </p:clrMapOvr>
-  <mc:AlternateContent xmlns:mc="http://schemas.openxmlformats.org/markup-compatibility/2006">
-    <mc:Choice xmlns:p14="http://schemas.microsoft.com/office/powerpoint/2010/main" Requires="p14">
+  <mc:AlternateContent xmlns:mc="http://schemas.openxmlformats.org/markup-compatibility/2006" xmlns:p14="http://schemas.microsoft.com/office/powerpoint/2010/main">
+    <mc:Choice Requires="p14">
       <p:transition spd="slow" p14:dur="2000"/>
     </mc:Choice>
-    <mc:Fallback>
+    <mc:Fallback xmlns="">
       <p:transition spd="slow"/>
     </mc:Fallback>
   </mc:AlternateContent>
@@ -10341,6 +10515,13 @@
   <p:clrMapOvr>
     <a:masterClrMapping/>
   </p:clrMapOvr>
+  <p:timing>
+    <p:tnLst>
+      <p:par>
+        <p:cTn id="1" dur="indefinite" restart="never" nodeType="tmRoot"/>
+      </p:par>
+    </p:tnLst>
+  </p:timing>
 </p:sld>
 </file>
 
@@ -11839,11 +12020,7 @@
           <a:p>
             <a:r>
               <a:rPr lang="en-US" dirty="0" smtClean="0"/>
-              <a:t>Monolithic </a:t>
-            </a:r>
-            <a:r>
-              <a:rPr lang="en-US" dirty="0" smtClean="0"/>
-              <a:t>challenges</a:t>
+              <a:t>Monolithic challenges</a:t>
             </a:r>
             <a:endParaRPr lang="en-US" dirty="0"/>
           </a:p>
@@ -11873,11 +12050,7 @@
           <a:p>
             <a:r>
               <a:rPr lang="en-US" sz="2800" b="1" dirty="0" smtClean="0"/>
-              <a:t>How Scalable is this architecture</a:t>
-            </a:r>
-            <a:r>
-              <a:rPr lang="en-US" sz="2800" b="1" dirty="0" smtClean="0"/>
-              <a:t>? (Horizontal)</a:t>
+              <a:t>How Scalable is this architecture? (Horizontal)</a:t>
             </a:r>
             <a:endParaRPr lang="en-US" sz="2800" b="1" dirty="0"/>
           </a:p>
@@ -12280,11 +12453,7 @@
               </a:r>
               <a:r>
                 <a:rPr lang="en-US" b="1" dirty="0" smtClean="0"/>
-                <a:t> Party </a:t>
-              </a:r>
-              <a:r>
-                <a:rPr lang="en-US" b="1" dirty="0" smtClean="0"/>
-                <a:t>Integration</a:t>
+                <a:t> Party Integration</a:t>
               </a:r>
             </a:p>
             <a:p>
@@ -12585,11 +12754,7 @@
           <a:p>
             <a:r>
               <a:rPr lang="en-US" dirty="0" smtClean="0"/>
-              <a:t>Monolithic </a:t>
-            </a:r>
-            <a:r>
-              <a:rPr lang="en-US" dirty="0" smtClean="0"/>
-              <a:t>Challenges</a:t>
+              <a:t>Monolithic Challenges</a:t>
             </a:r>
             <a:endParaRPr lang="en-US" dirty="0"/>
           </a:p>
@@ -12843,11 +13008,7 @@
           <a:p>
             <a:r>
               <a:rPr lang="en-US" dirty="0" smtClean="0"/>
-              <a:t>Monolithic </a:t>
-            </a:r>
-            <a:r>
-              <a:rPr lang="en-US" dirty="0" smtClean="0"/>
-              <a:t>Challenges</a:t>
+              <a:t>Monolithic Challenges</a:t>
             </a:r>
             <a:endParaRPr lang="en-US" dirty="0"/>
           </a:p>
@@ -13132,13 +13293,8 @@
           <a:p>
             <a:r>
               <a:rPr lang="en-US" sz="2800" b="1" i="1" dirty="0" smtClean="0"/>
-              <a:t>Usual legal stuff: There’s no silver bullet when choosing an architecture for a distributed network application. Design choices vary significantly based on underlying design goals and long term vision of the intended </a:t>
-            </a:r>
-            <a:r>
-              <a:rPr lang="en-US" sz="2800" b="1" i="1" smtClean="0"/>
-              <a:t>application.</a:t>
-            </a:r>
-            <a:endParaRPr lang="en-US" sz="2800" b="1" i="1" dirty="0" smtClean="0"/>
+              <a:t>Usual legal stuff: There’s no silver bullet when choosing an architecture for a distributed network application. Design choices vary significantly based on underlying design goals and long term vision of the intended application.</a:t>
+            </a:r>
           </a:p>
         </p:txBody>
       </p:sp>
@@ -13192,7 +13348,7 @@
         <p:spPr>
           <a:xfrm>
             <a:off x="183802" y="1952477"/>
-            <a:ext cx="2067029" cy="720385"/>
+            <a:ext cx="3013071" cy="720385"/>
           </a:xfrm>
         </p:spPr>
         <p:txBody>
@@ -13203,10 +13359,10 @@
           <a:p>
             <a:pPr algn="ctr"/>
             <a:r>
-              <a:rPr lang="en-US" sz="1800" b="1" dirty="0" smtClean="0"/>
+              <a:rPr lang="en-US" sz="2400" b="1" dirty="0" smtClean="0"/>
               <a:t>Scalable Micro Service Architecture</a:t>
             </a:r>
-            <a:endParaRPr lang="en-US" sz="1800" b="1" dirty="0"/>
+            <a:endParaRPr lang="en-US" sz="2400" b="1" dirty="0"/>
           </a:p>
         </p:txBody>
       </p:sp>
@@ -14884,6 +15040,134 @@
             <p:ph type="title"/>
           </p:nvPr>
         </p:nvSpPr>
+        <p:spPr>
+          <a:xfrm>
+            <a:off x="455650" y="173104"/>
+            <a:ext cx="7465031" cy="720385"/>
+          </a:xfrm>
+        </p:spPr>
+        <p:txBody>
+          <a:bodyPr>
+            <a:noAutofit/>
+          </a:bodyPr>
+          <a:lstStyle/>
+          <a:p>
+            <a:pPr algn="ctr"/>
+            <a:r>
+              <a:rPr lang="en-US" sz="2400" b="1" dirty="0" smtClean="0"/>
+              <a:t>Tying Micro Services, REST style and Spring Boot together</a:t>
+            </a:r>
+            <a:endParaRPr lang="en-US" sz="2400" b="1" dirty="0"/>
+          </a:p>
+        </p:txBody>
+      </p:sp>
+      <p:sp>
+        <p:nvSpPr>
+          <p:cNvPr id="4" name="TextBox 3"/>
+          <p:cNvSpPr txBox="1"/>
+          <p:nvPr/>
+        </p:nvSpPr>
+        <p:spPr>
+          <a:xfrm>
+            <a:off x="455650" y="1113692"/>
+            <a:ext cx="11537058" cy="1200329"/>
+          </a:xfrm>
+          <a:prstGeom prst="rect">
+            <a:avLst/>
+          </a:prstGeom>
+          <a:noFill/>
+        </p:spPr>
+        <p:txBody>
+          <a:bodyPr wrap="square" rtlCol="0">
+            <a:spAutoFit/>
+          </a:bodyPr>
+          <a:lstStyle/>
+          <a:p>
+            <a:r>
+              <a:rPr lang="en-US" dirty="0" smtClean="0"/>
+              <a:t>Spring Boot:</a:t>
+            </a:r>
+          </a:p>
+          <a:p>
+            <a:pPr marL="285750" indent="-285750">
+              <a:buFont typeface="Arial" panose="020B0604020202020204" pitchFamily="34" charset="0"/>
+              <a:buChar char="•"/>
+            </a:pPr>
+            <a:r>
+              <a:rPr lang="en-US" dirty="0" smtClean="0"/>
+              <a:t>Rapid development of Micro Services and REST endpoints</a:t>
+            </a:r>
+          </a:p>
+          <a:p>
+            <a:pPr marL="285750" indent="-285750">
+              <a:buFont typeface="Arial" panose="020B0604020202020204" pitchFamily="34" charset="0"/>
+              <a:buChar char="•"/>
+            </a:pPr>
+            <a:r>
+              <a:rPr lang="en-US" dirty="0" smtClean="0"/>
+              <a:t>Feature rich functionality with support for </a:t>
+            </a:r>
+            <a:r>
+              <a:rPr lang="en-US" smtClean="0"/>
+              <a:t>most Enterprise </a:t>
+            </a:r>
+            <a:r>
+              <a:rPr lang="en-US" dirty="0" smtClean="0"/>
+              <a:t>standard technologies</a:t>
+            </a:r>
+          </a:p>
+          <a:p>
+            <a:endParaRPr lang="en-US" dirty="0"/>
+          </a:p>
+        </p:txBody>
+      </p:sp>
+    </p:spTree>
+    <p:extLst>
+      <p:ext uri="{BB962C8B-B14F-4D97-AF65-F5344CB8AC3E}">
+        <p14:creationId xmlns:p14="http://schemas.microsoft.com/office/powerpoint/2010/main" val="3750162919"/>
+      </p:ext>
+    </p:extLst>
+  </p:cSld>
+  <p:clrMapOvr>
+    <a:masterClrMapping/>
+  </p:clrMapOvr>
+  <p:timing>
+    <p:tnLst>
+      <p:par>
+        <p:cTn id="1" dur="indefinite" restart="never" nodeType="tmRoot"/>
+      </p:par>
+    </p:tnLst>
+  </p:timing>
+</p:sld>
+</file>
+
+<file path=ppt/slides/slide29.xml><?xml version="1.0" encoding="utf-8"?>
+<p:sld xmlns:a="http://schemas.openxmlformats.org/drawingml/2006/main" xmlns:r="http://schemas.openxmlformats.org/officeDocument/2006/relationships" xmlns:p="http://schemas.openxmlformats.org/presentationml/2006/main">
+  <p:cSld>
+    <p:spTree>
+      <p:nvGrpSpPr>
+        <p:cNvPr id="1" name=""/>
+        <p:cNvGrpSpPr/>
+        <p:nvPr/>
+      </p:nvGrpSpPr>
+      <p:grpSpPr>
+        <a:xfrm>
+          <a:off x="0" y="0"/>
+          <a:ext cx="0" cy="0"/>
+          <a:chOff x="0" y="0"/>
+          <a:chExt cx="0" cy="0"/>
+        </a:xfrm>
+      </p:grpSpPr>
+      <p:sp>
+        <p:nvSpPr>
+          <p:cNvPr id="2" name="Title 1"/>
+          <p:cNvSpPr>
+            <a:spLocks noGrp="1"/>
+          </p:cNvSpPr>
+          <p:nvPr>
+            <p:ph type="title"/>
+          </p:nvPr>
+        </p:nvSpPr>
         <p:spPr/>
         <p:txBody>
           <a:bodyPr/>
@@ -14950,6 +15234,13 @@
   <p:clrMapOvr>
     <a:masterClrMapping/>
   </p:clrMapOvr>
+  <p:timing>
+    <p:tnLst>
+      <p:par>
+        <p:cTn id="1" dur="indefinite" restart="never" nodeType="tmRoot"/>
+      </p:par>
+    </p:tnLst>
+  </p:timing>
 </p:sld>
 </file>
 
@@ -15012,13 +15303,11 @@
           <a:p>
             <a:r>
               <a:rPr lang="en-US" dirty="0" smtClean="0"/>
-              <a:t>Spring Framework</a:t>
-            </a:r>
-          </a:p>
-          <a:p>
+              <a:t>Introduction </a:t>
+            </a:r>
             <a:r>
               <a:rPr lang="en-US" dirty="0" smtClean="0"/>
-              <a:t>Introduction to Spring Boot</a:t>
+              <a:t>to Spring Boot</a:t>
             </a:r>
           </a:p>
           <a:p>
@@ -15039,11 +15328,7 @@
             <a:pPr lvl="1"/>
             <a:r>
               <a:rPr lang="en-US" dirty="0" smtClean="0"/>
-              <a:t>Live </a:t>
-            </a:r>
-            <a:r>
-              <a:rPr lang="en-US" dirty="0" smtClean="0"/>
-              <a:t>Demo</a:t>
+              <a:t>Live Demo</a:t>
             </a:r>
             <a:endParaRPr lang="en-US" dirty="0"/>
           </a:p>
@@ -15390,6 +15675,13 @@
   <p:clrMapOvr>
     <a:masterClrMapping/>
   </p:clrMapOvr>
+  <p:timing>
+    <p:tnLst>
+      <p:par>
+        <p:cTn id="1" dur="indefinite" restart="never" nodeType="tmRoot"/>
+      </p:par>
+    </p:tnLst>
+  </p:timing>
 </p:sld>
 </file>
 
@@ -15508,6 +15800,13 @@
   <p:clrMapOvr>
     <a:masterClrMapping/>
   </p:clrMapOvr>
+  <p:timing>
+    <p:tnLst>
+      <p:par>
+        <p:cTn id="1" dur="indefinite" restart="never" nodeType="tmRoot"/>
+      </p:par>
+    </p:tnLst>
+  </p:timing>
 </p:sld>
 </file>
 
@@ -15644,6 +15943,13 @@
   <p:clrMapOvr>
     <a:masterClrMapping/>
   </p:clrMapOvr>
+  <p:timing>
+    <p:tnLst>
+      <p:par>
+        <p:cTn id="1" dur="indefinite" restart="never" nodeType="tmRoot"/>
+      </p:par>
+    </p:tnLst>
+  </p:timing>
 </p:sld>
 </file>
 
@@ -15721,12 +16027,88 @@
           <a:p>
             <a:r>
               <a:rPr lang="en-US" dirty="0" smtClean="0"/>
-              <a:t>Environment: </a:t>
+              <a:t>Environment: Eclipse IDE /w Spring Suite installed (or STS</a:t>
             </a:r>
             <a:r>
               <a:rPr lang="en-US" dirty="0" smtClean="0"/>
-              <a:t>Eclipse IDE /w Spring Suite installed (or STS).</a:t>
-            </a:r>
+              <a:t>).</a:t>
+            </a:r>
+          </a:p>
+          <a:p>
+            <a:r>
+              <a:rPr lang="en-US" dirty="0" smtClean="0"/>
+              <a:t>Steps:</a:t>
+            </a:r>
+          </a:p>
+          <a:p>
+            <a:pPr lvl="1"/>
+            <a:r>
+              <a:rPr lang="en-US" dirty="0" smtClean="0"/>
+              <a:t>Download a Spring starter project</a:t>
+            </a:r>
+          </a:p>
+          <a:p>
+            <a:pPr lvl="1"/>
+            <a:r>
+              <a:rPr lang="en-US" dirty="0" smtClean="0"/>
+              <a:t>Create a simple Endpoint for Hello</a:t>
+            </a:r>
+          </a:p>
+          <a:p>
+            <a:pPr lvl="1"/>
+            <a:r>
+              <a:rPr lang="en-US" dirty="0" smtClean="0"/>
+              <a:t>Create a Booking entity</a:t>
+            </a:r>
+          </a:p>
+          <a:p>
+            <a:pPr lvl="1"/>
+            <a:r>
+              <a:rPr lang="en-US" dirty="0" smtClean="0"/>
+              <a:t>Create a </a:t>
+            </a:r>
+            <a:r>
+              <a:rPr lang="en-US" dirty="0" err="1" smtClean="0"/>
+              <a:t>JpaRepository</a:t>
+            </a:r>
+            <a:r>
+              <a:rPr lang="en-US" dirty="0" smtClean="0"/>
+              <a:t> for Booking</a:t>
+            </a:r>
+          </a:p>
+          <a:p>
+            <a:pPr lvl="1"/>
+            <a:r>
+              <a:rPr lang="en-US" dirty="0" smtClean="0"/>
+              <a:t>Create a </a:t>
+            </a:r>
+            <a:r>
+              <a:rPr lang="en-US" dirty="0" err="1" smtClean="0"/>
+              <a:t>db</a:t>
+            </a:r>
+            <a:r>
+              <a:rPr lang="en-US" dirty="0" smtClean="0"/>
+              <a:t> </a:t>
+            </a:r>
+            <a:r>
+              <a:rPr lang="en-US" dirty="0" err="1" smtClean="0"/>
+              <a:t>init</a:t>
+            </a:r>
+            <a:r>
+              <a:rPr lang="en-US" dirty="0" smtClean="0"/>
+              <a:t> script</a:t>
+            </a:r>
+          </a:p>
+          <a:p>
+            <a:pPr lvl="1"/>
+            <a:r>
+              <a:rPr lang="en-US" dirty="0" smtClean="0"/>
+              <a:t>Expose an endpoint that serves the data</a:t>
+            </a:r>
+          </a:p>
+          <a:p>
+            <a:pPr lvl="1"/>
+            <a:endParaRPr lang="en-US" dirty="0"/>
           </a:p>
         </p:txBody>
       </p:sp>
@@ -15788,6 +16170,13 @@
   <p:clrMapOvr>
     <a:masterClrMapping/>
   </p:clrMapOvr>
+  <p:timing>
+    <p:tnLst>
+      <p:par>
+        <p:cTn id="1" dur="indefinite" restart="never" nodeType="tmRoot"/>
+      </p:par>
+    </p:tnLst>
+  </p:timing>
 </p:sld>
 </file>
 
@@ -15848,11 +16237,7 @@
           <a:p>
             <a:r>
               <a:rPr lang="en-US" dirty="0" smtClean="0"/>
-              <a:t>Spring IO </a:t>
-            </a:r>
-            <a:r>
-              <a:rPr lang="en-US" dirty="0" smtClean="0"/>
-              <a:t>guides</a:t>
+              <a:t>Spring IO guides</a:t>
             </a:r>
           </a:p>
           <a:p>
@@ -15917,6 +16302,13 @@
   <p:clrMapOvr>
     <a:masterClrMapping/>
   </p:clrMapOvr>
+  <p:timing>
+    <p:tnLst>
+      <p:par>
+        <p:cTn id="1" dur="indefinite" restart="never" nodeType="tmRoot"/>
+      </p:par>
+    </p:tnLst>
+  </p:timing>
 </p:sld>
 </file>
 

</xml_diff>

<commit_message>
Few more final revisions
</commit_message>
<xml_diff>
--- a/Spring Boot.pptx
+++ b/Spring Boot.pptx
@@ -6040,7 +6040,7 @@
         </p:nvSpPr>
         <p:spPr>
           <a:xfrm>
-            <a:off x="4668032" y="4484318"/>
+            <a:off x="4870195" y="5925514"/>
             <a:ext cx="2855935" cy="461665"/>
           </a:xfrm>
           <a:prstGeom prst="rect">
@@ -6086,6 +6086,47 @@
           </a:prstGeom>
         </p:spPr>
       </p:pic>
+      <p:sp>
+        <p:nvSpPr>
+          <p:cNvPr id="3" name="Rectangle 2"/>
+          <p:cNvSpPr/>
+          <p:nvPr/>
+        </p:nvSpPr>
+        <p:spPr>
+          <a:xfrm>
+            <a:off x="3334347" y="4463449"/>
+            <a:ext cx="6113020" cy="369332"/>
+          </a:xfrm>
+          <a:prstGeom prst="rect">
+            <a:avLst/>
+          </a:prstGeom>
+        </p:spPr>
+        <p:txBody>
+          <a:bodyPr wrap="none">
+            <a:spAutoFit/>
+          </a:bodyPr>
+          <a:lstStyle/>
+          <a:p>
+            <a:r>
+              <a:rPr lang="en-US" b="1" dirty="0"/>
+              <a:t>How they complement each </a:t>
+            </a:r>
+            <a:r>
+              <a:rPr lang="en-US" b="1" dirty="0" smtClean="0"/>
+              <a:t>other to create a ‘</a:t>
+            </a:r>
+            <a:r>
+              <a:rPr lang="en-US" b="1" dirty="0" err="1" smtClean="0"/>
+              <a:t>bootiful</a:t>
+            </a:r>
+            <a:r>
+              <a:rPr lang="en-US" b="1" dirty="0" smtClean="0"/>
+              <a:t>’ design</a:t>
+            </a:r>
+            <a:endParaRPr lang="en-US" b="1" dirty="0"/>
+          </a:p>
+        </p:txBody>
+      </p:sp>
     </p:spTree>
     <p:extLst>
       <p:ext uri="{BB962C8B-B14F-4D97-AF65-F5344CB8AC3E}">
@@ -10683,7 +10724,6 @@
               <a:rPr lang="en-US" sz="2400" dirty="0" smtClean="0"/>
               <a:t>Introduced to C by an amazing teacher in high school. Knew what I was going to make a career out of very soon. </a:t>
             </a:r>
-            <a:endParaRPr lang="en-US" sz="2400" dirty="0" smtClean="0"/>
           </a:p>
           <a:p>
             <a:pPr marL="285750" indent="-285750">
@@ -10692,11 +10732,7 @@
             </a:pPr>
             <a:r>
               <a:rPr lang="en-US" sz="2400" dirty="0" smtClean="0"/>
-              <a:t>Big </a:t>
-            </a:r>
-            <a:r>
-              <a:rPr lang="en-US" sz="2400" dirty="0" smtClean="0"/>
-              <a:t>fan of Open source software and it’s philosophy.</a:t>
+              <a:t>Big fan of Open source software and it’s philosophy.</a:t>
             </a:r>
           </a:p>
           <a:p>
@@ -10706,8 +10742,17 @@
             </a:pPr>
             <a:r>
               <a:rPr lang="en-US" sz="2400" dirty="0" smtClean="0"/>
-              <a:t>Always humbled and excited to be part of this very dynamic Software Industry that is always on the edge.</a:t>
-            </a:r>
+              <a:t>Always humbled and excited to be part of this very dynamic Software Industry that is always on the </a:t>
+            </a:r>
+            <a:r>
+              <a:rPr lang="en-US" sz="2400" dirty="0" smtClean="0"/>
+              <a:t>edge and is </a:t>
+            </a:r>
+            <a:r>
+              <a:rPr lang="en-US" sz="2400" smtClean="0"/>
+              <a:t>always advancing.</a:t>
+            </a:r>
+            <a:endParaRPr lang="en-US" sz="2400" dirty="0" smtClean="0"/>
           </a:p>
           <a:p>
             <a:pPr marL="285750" indent="-285750">
@@ -11038,26 +11083,17 @@
           <a:p>
             <a:r>
               <a:rPr lang="en-US" b="1" dirty="0" smtClean="0"/>
-              <a:t>Products not </a:t>
-            </a:r>
-            <a:r>
-              <a:rPr lang="en-US" b="1" dirty="0" smtClean="0"/>
-              <a:t>Projects – </a:t>
+              <a:t>Products not Projects – </a:t>
             </a:r>
             <a:r>
               <a:rPr lang="en-US" dirty="0" smtClean="0"/>
               <a:t>You build it, you own it</a:t>
             </a:r>
-            <a:endParaRPr lang="en-US" dirty="0" smtClean="0"/>
           </a:p>
           <a:p>
             <a:r>
               <a:rPr lang="en-US" b="1" dirty="0" smtClean="0"/>
-              <a:t>Smart endpoints and dumb </a:t>
-            </a:r>
-            <a:r>
-              <a:rPr lang="en-US" b="1" dirty="0" smtClean="0"/>
-              <a:t>pipes – </a:t>
+              <a:t>Smart endpoints and dumb pipes – </a:t>
             </a:r>
             <a:r>
               <a:rPr lang="en-US" dirty="0" smtClean="0"/>
@@ -11073,11 +11109,7 @@
           <a:p>
             <a:r>
               <a:rPr lang="en-US" b="1" dirty="0" smtClean="0"/>
-              <a:t>Decentralized </a:t>
-            </a:r>
-            <a:r>
-              <a:rPr lang="en-US" b="1" dirty="0" smtClean="0"/>
-              <a:t>Data Management</a:t>
+              <a:t>Decentralized Data Management</a:t>
             </a:r>
           </a:p>
           <a:p>
@@ -11119,15 +11151,7 @@
             </a:pPr>
             <a:r>
               <a:rPr lang="en-US" i="1" dirty="0" smtClean="0"/>
-              <a:t>Ref: </a:t>
-            </a:r>
-            <a:r>
-              <a:rPr lang="en-US" i="1" dirty="0" smtClean="0"/>
-              <a:t>http://</a:t>
-            </a:r>
-            <a:r>
-              <a:rPr lang="en-US" i="1" dirty="0" smtClean="0"/>
-              <a:t>martinfowler.com/articles/microservices.htmlc</a:t>
+              <a:t>Ref: http://martinfowler.com/articles/microservices.htmlc</a:t>
             </a:r>
             <a:endParaRPr lang="en-US" i="1" dirty="0"/>
           </a:p>
@@ -11187,11 +11211,7 @@
           <a:p>
             <a:r>
               <a:rPr lang="en-US" dirty="0" smtClean="0"/>
-              <a:t>Micro-services </a:t>
-            </a:r>
-            <a:r>
-              <a:rPr lang="en-US" dirty="0" smtClean="0"/>
-              <a:t>- Characteristics</a:t>
+              <a:t>Micro-services - Characteristics</a:t>
             </a:r>
             <a:endParaRPr lang="en-US" dirty="0"/>
           </a:p>
@@ -11224,15 +11244,7 @@
             </a:pPr>
             <a:r>
               <a:rPr lang="en-US" b="1" dirty="0" smtClean="0"/>
-              <a:t>Componentization </a:t>
-            </a:r>
-            <a:r>
-              <a:rPr lang="en-US" b="1" dirty="0" smtClean="0"/>
-              <a:t>via </a:t>
-            </a:r>
-            <a:r>
-              <a:rPr lang="en-US" b="1" dirty="0" smtClean="0"/>
-              <a:t>Services</a:t>
+              <a:t>Componentization via Services</a:t>
             </a:r>
           </a:p>
           <a:p>
@@ -11370,11 +11382,7 @@
           <a:p>
             <a:r>
               <a:rPr lang="en-US" dirty="0" smtClean="0"/>
-              <a:t>Micro-services </a:t>
-            </a:r>
-            <a:r>
-              <a:rPr lang="en-US" dirty="0" smtClean="0"/>
-              <a:t>- Characteristics</a:t>
+              <a:t>Micro-services - Characteristics</a:t>
             </a:r>
             <a:endParaRPr lang="en-US" dirty="0"/>
           </a:p>
@@ -11402,15 +11410,7 @@
             </a:pPr>
             <a:r>
               <a:rPr lang="en-US" b="1" dirty="0" smtClean="0"/>
-              <a:t>Products </a:t>
-            </a:r>
-            <a:r>
-              <a:rPr lang="en-US" b="1" dirty="0" smtClean="0"/>
-              <a:t>not </a:t>
-            </a:r>
-            <a:r>
-              <a:rPr lang="en-US" b="1" dirty="0" smtClean="0"/>
-              <a:t>Projects – </a:t>
+              <a:t>Products not Projects – </a:t>
             </a:r>
             <a:r>
               <a:rPr lang="en-US" dirty="0" smtClean="0"/>
@@ -11463,7 +11463,6 @@
               <a:rPr lang="en-US" dirty="0" smtClean="0"/>
               <a:t>Each component should have a purpose, meet specific business need(s)</a:t>
             </a:r>
-            <a:endParaRPr lang="en-US" dirty="0" smtClean="0"/>
           </a:p>
           <a:p>
             <a:pPr marL="0" indent="0">
@@ -11565,11 +11564,7 @@
           <a:p>
             <a:r>
               <a:rPr lang="en-US" dirty="0" smtClean="0"/>
-              <a:t>Micro-services </a:t>
-            </a:r>
-            <a:r>
-              <a:rPr lang="en-US" dirty="0" smtClean="0"/>
-              <a:t>- Characteristics</a:t>
+              <a:t>Micro-services - Characteristics</a:t>
             </a:r>
             <a:endParaRPr lang="en-US" dirty="0"/>
           </a:p>
@@ -11588,7 +11583,7 @@
         <p:spPr/>
         <p:txBody>
           <a:bodyPr>
-            <a:normAutofit fontScale="92500" lnSpcReduction="10000"/>
+            <a:normAutofit fontScale="92500" lnSpcReduction="20000"/>
           </a:bodyPr>
           <a:lstStyle/>
           <a:p>
@@ -11617,16 +11612,19 @@
             </a:r>
             <a:r>
               <a:rPr lang="en-US" dirty="0" smtClean="0"/>
-              <a:t>: Use single threaded node.js stack for a Micro  </a:t>
+              <a:t>: Use single threaded node.js stack for a Micro  Service that serves as the entry point/arbitrator of incoming requests</a:t>
             </a:r>
             <a:r>
               <a:rPr lang="en-US" dirty="0" smtClean="0"/>
-              <a:t>Service </a:t>
-            </a:r>
+              <a:t>.</a:t>
+            </a:r>
+          </a:p>
+          <a:p>
             <a:r>
               <a:rPr lang="en-US" dirty="0" smtClean="0"/>
-              <a:t>that serves as the entry point/arbitrator of incoming requests.</a:t>
-            </a:r>
+              <a:t>Contrasts SOA architecture</a:t>
+            </a:r>
+            <a:endParaRPr lang="en-US" dirty="0" smtClean="0"/>
           </a:p>
           <a:p>
             <a:endParaRPr lang="en-US" dirty="0" smtClean="0"/>
@@ -11637,15 +11635,7 @@
             </a:pPr>
             <a:r>
               <a:rPr lang="en-US" b="1" dirty="0" smtClean="0"/>
-              <a:t>Decentralized </a:t>
-            </a:r>
-            <a:r>
-              <a:rPr lang="en-US" b="1" dirty="0" smtClean="0"/>
-              <a:t>Data </a:t>
-            </a:r>
-            <a:r>
-              <a:rPr lang="en-US" b="1" dirty="0" smtClean="0"/>
-              <a:t>Management</a:t>
+              <a:t>Decentralized Data Management</a:t>
             </a:r>
           </a:p>
           <a:p>
@@ -11659,7 +11649,6 @@
               <a:rPr lang="en-US" dirty="0" smtClean="0"/>
               <a:t>Splitting Monoliths into Micro Services lets you decentralize data storage decisions to each individual component when appropriate</a:t>
             </a:r>
-            <a:endParaRPr lang="en-US" dirty="0" smtClean="0"/>
           </a:p>
           <a:p>
             <a:endParaRPr lang="en-US" b="1" dirty="0" smtClean="0"/>
@@ -11769,11 +11758,7 @@
           <a:p>
             <a:r>
               <a:rPr lang="en-US" dirty="0" smtClean="0"/>
-              <a:t>Micro-services </a:t>
-            </a:r>
-            <a:r>
-              <a:rPr lang="en-US" dirty="0" smtClean="0"/>
-              <a:t>- Characteristics</a:t>
+              <a:t>Micro-services - Characteristics</a:t>
             </a:r>
             <a:endParaRPr lang="en-US" dirty="0"/>
           </a:p>
@@ -11988,11 +11973,7 @@
           <a:p>
             <a:r>
               <a:rPr lang="en-US" dirty="0" smtClean="0"/>
-              <a:t>Micro-services </a:t>
-            </a:r>
-            <a:r>
-              <a:rPr lang="en-US" dirty="0" smtClean="0"/>
-              <a:t>- Characteristics</a:t>
+              <a:t>Micro-services - Characteristics</a:t>
             </a:r>
             <a:endParaRPr lang="en-US" dirty="0"/>
           </a:p>
@@ -12025,15 +12006,7 @@
             </a:pPr>
             <a:r>
               <a:rPr lang="en-US" b="1" dirty="0" smtClean="0"/>
-              <a:t>Design </a:t>
-            </a:r>
-            <a:r>
-              <a:rPr lang="en-US" b="1" dirty="0" smtClean="0"/>
-              <a:t>for </a:t>
-            </a:r>
-            <a:r>
-              <a:rPr lang="en-US" b="1" dirty="0" smtClean="0"/>
-              <a:t>failure</a:t>
+              <a:t>Design for failure</a:t>
             </a:r>
           </a:p>
           <a:p>
@@ -12079,7 +12052,6 @@
               <a:rPr lang="en-US" dirty="0" smtClean="0"/>
               <a:t> that induces failures of services and even datacenters during the working day</a:t>
             </a:r>
-            <a:endParaRPr lang="en-US" dirty="0" smtClean="0"/>
           </a:p>
           <a:p>
             <a:pPr marL="0" indent="0">
@@ -14487,7 +14459,7 @@
         <p:spPr/>
         <p:txBody>
           <a:bodyPr>
-            <a:normAutofit/>
+            <a:normAutofit fontScale="92500" lnSpcReduction="20000"/>
           </a:bodyPr>
           <a:lstStyle/>
           <a:p>
@@ -14533,6 +14505,13 @@
           <a:p>
             <a:r>
               <a:rPr lang="en-US" dirty="0" smtClean="0"/>
+              <a:t>How they complement each other</a:t>
+            </a:r>
+            <a:endParaRPr lang="en-US" dirty="0" smtClean="0"/>
+          </a:p>
+          <a:p>
+            <a:r>
+              <a:rPr lang="en-US" dirty="0" smtClean="0"/>
               <a:t>Q&amp;A</a:t>
             </a:r>
           </a:p>
@@ -14540,6 +14519,18 @@
             <a:endParaRPr lang="en-US" dirty="0" smtClean="0"/>
           </a:p>
           <a:p>
+            <a:r>
+              <a:rPr lang="en-US" dirty="0" smtClean="0"/>
+              <a:t>Note: Slides and the source code are available on </a:t>
+            </a:r>
+            <a:r>
+              <a:rPr lang="en-US" dirty="0" err="1" smtClean="0"/>
+              <a:t>Github</a:t>
+            </a:r>
+            <a:r>
+              <a:rPr lang="en-US" dirty="0"/>
+              <a:t> - https://github.com/batchu/spring-boot-ujug</a:t>
+            </a:r>
             <a:endParaRPr lang="en-US" dirty="0"/>
           </a:p>
         </p:txBody>
@@ -16650,15 +16641,7 @@
             <a:pPr algn="ctr"/>
             <a:r>
               <a:rPr lang="en-US" sz="2400" b="1" dirty="0" smtClean="0"/>
-              <a:t>How Micro </a:t>
-            </a:r>
-            <a:r>
-              <a:rPr lang="en-US" sz="2400" b="1" dirty="0" smtClean="0"/>
-              <a:t>Services, REST style and Spring Boot </a:t>
-            </a:r>
-            <a:r>
-              <a:rPr lang="en-US" sz="2400" b="1" dirty="0" smtClean="0"/>
-              <a:t>complement each together</a:t>
+              <a:t>How Micro Services, REST style and Spring Boot complement each together</a:t>
             </a:r>
             <a:endParaRPr lang="en-US" sz="2400" b="1" dirty="0"/>
           </a:p>
@@ -16672,8 +16655,8 @@
         </p:nvSpPr>
         <p:spPr>
           <a:xfrm>
-            <a:off x="455650" y="1113692"/>
-            <a:ext cx="11537058" cy="4524315"/>
+            <a:off x="455650" y="687807"/>
+            <a:ext cx="11537058" cy="7048083"/>
           </a:xfrm>
           <a:prstGeom prst="rect">
             <a:avLst/>
@@ -16687,8 +16670,8 @@
           <a:lstStyle/>
           <a:p>
             <a:r>
-              <a:rPr lang="en-US" dirty="0" smtClean="0"/>
-              <a:t>Spring Boot:</a:t>
+              <a:rPr lang="en-US" sz="2000" b="1" dirty="0" smtClean="0"/>
+              <a:t>Spring Boot</a:t>
             </a:r>
           </a:p>
           <a:p>
@@ -16697,8 +16680,12 @@
               <a:buChar char="•"/>
             </a:pPr>
             <a:r>
-              <a:rPr lang="en-US" dirty="0" smtClean="0"/>
-              <a:t>Rapid development of Micro Services and REST endpoints</a:t>
+              <a:rPr lang="en-US" sz="2000" dirty="0" smtClean="0"/>
+              <a:t>Rapid </a:t>
+            </a:r>
+            <a:r>
+              <a:rPr lang="en-US" sz="2000" dirty="0" smtClean="0"/>
+              <a:t>development of Micro Services and REST endpoints</a:t>
             </a:r>
           </a:p>
           <a:p>
@@ -16707,12 +16694,8 @@
               <a:buChar char="•"/>
             </a:pPr>
             <a:r>
-              <a:rPr lang="en-US" dirty="0" smtClean="0"/>
-              <a:t>Feature rich functionality with support for most Enterprise standard </a:t>
-            </a:r>
-            <a:r>
-              <a:rPr lang="en-US" dirty="0" smtClean="0"/>
-              <a:t>technologies</a:t>
+              <a:rPr lang="en-US" sz="2000" dirty="0" smtClean="0"/>
+              <a:t>Embraces and facilitates the creation of RESTful Services</a:t>
             </a:r>
           </a:p>
           <a:p>
@@ -16720,12 +16703,9 @@
               <a:buFont typeface="Arial" panose="020B0604020202020204" pitchFamily="34" charset="0"/>
               <a:buChar char="•"/>
             </a:pPr>
-            <a:endParaRPr lang="en-US" dirty="0" smtClean="0"/>
-          </a:p>
-          <a:p>
-            <a:r>
-              <a:rPr lang="en-US" dirty="0" smtClean="0"/>
-              <a:t>REST</a:t>
+            <a:r>
+              <a:rPr lang="en-US" sz="2000" dirty="0" smtClean="0"/>
+              <a:t>Actuator – Prod ready Monitoring features (as in “Design for failure” – Micro Services principle)</a:t>
             </a:r>
           </a:p>
           <a:p>
@@ -16734,28 +16714,24 @@
               <a:buChar char="•"/>
             </a:pPr>
             <a:r>
-              <a:rPr lang="en-US" dirty="0" smtClean="0"/>
-              <a:t>Confirming to REST constraints such as Caching, Separation of Concerns, Reliability, Statelessness facilitates the creation of richer, client agnostic and very powerful services</a:t>
-            </a:r>
+              <a:rPr lang="en-US" sz="2000" dirty="0" smtClean="0"/>
+              <a:t>Enables Infrastructure automation (Another Micro Service principle)</a:t>
+            </a:r>
+            <a:endParaRPr lang="en-US" sz="2000" dirty="0" smtClean="0"/>
           </a:p>
           <a:p>
             <a:pPr marL="285750" indent="-285750">
               <a:buFont typeface="Arial" panose="020B0604020202020204" pitchFamily="34" charset="0"/>
               <a:buChar char="•"/>
             </a:pPr>
-            <a:r>
-              <a:rPr lang="en-US" dirty="0" smtClean="0"/>
-              <a:t>It’s just a cleaner and a natural architectural style embracing simplicity and uniformity</a:t>
-            </a:r>
-          </a:p>
-          <a:p>
-            <a:endParaRPr lang="en-US" dirty="0" smtClean="0"/>
-          </a:p>
-          <a:p>
-            <a:r>
-              <a:rPr lang="en-US" dirty="0" smtClean="0"/>
-              <a:t>Micro Services</a:t>
-            </a:r>
+            <a:endParaRPr lang="en-US" sz="2000" dirty="0" smtClean="0"/>
+          </a:p>
+          <a:p>
+            <a:r>
+              <a:rPr lang="en-US" sz="2000" b="1" dirty="0" smtClean="0"/>
+              <a:t>REST architectural style</a:t>
+            </a:r>
+            <a:endParaRPr lang="en-US" sz="2000" b="1" dirty="0" smtClean="0"/>
           </a:p>
           <a:p>
             <a:pPr marL="285750" indent="-285750">
@@ -16763,9 +16739,14 @@
               <a:buChar char="•"/>
             </a:pPr>
             <a:r>
-              <a:rPr lang="en-US" dirty="0" smtClean="0"/>
-              <a:t>Infrastructure automation, Independent evolution of components, Design for failure</a:t>
-            </a:r>
+              <a:rPr lang="en-US" sz="2000" dirty="0" smtClean="0"/>
+              <a:t>Confirming to REST constraints such as Caching, Separation of Concerns, Reliability, Statelessness facilitates the creation of richer, client agnostic and very powerful </a:t>
+            </a:r>
+            <a:r>
+              <a:rPr lang="en-US" sz="2000" dirty="0" smtClean="0"/>
+              <a:t>services with HATEOAS</a:t>
+            </a:r>
+            <a:endParaRPr lang="en-US" sz="2000" dirty="0" smtClean="0"/>
           </a:p>
           <a:p>
             <a:pPr marL="285750" indent="-285750">
@@ -16773,9 +16754,83 @@
               <a:buChar char="•"/>
             </a:pPr>
             <a:r>
-              <a:rPr lang="en-US" dirty="0" smtClean="0"/>
-              <a:t>Unbounded Scalability</a:t>
-            </a:r>
+              <a:rPr lang="en-US" sz="2000" dirty="0" smtClean="0"/>
+              <a:t>It’s just a cleaner and a natural architectural style embracing simplicity and </a:t>
+            </a:r>
+            <a:r>
+              <a:rPr lang="en-US" sz="2000" dirty="0" smtClean="0"/>
+              <a:t>uniformity</a:t>
+            </a:r>
+          </a:p>
+          <a:p>
+            <a:pPr marL="285750" indent="-285750">
+              <a:buFont typeface="Arial" panose="020B0604020202020204" pitchFamily="34" charset="0"/>
+              <a:buChar char="•"/>
+            </a:pPr>
+            <a:r>
+              <a:rPr lang="en-US" sz="2000" dirty="0" smtClean="0"/>
+              <a:t>Aides when dealing with the additional API documentation needs when you have multiple running Micro Services with the adoption of HATEOAS</a:t>
+            </a:r>
+            <a:endParaRPr lang="en-US" sz="2000" dirty="0" smtClean="0"/>
+          </a:p>
+          <a:p>
+            <a:endParaRPr lang="en-US" sz="2000" dirty="0" smtClean="0"/>
+          </a:p>
+          <a:p>
+            <a:r>
+              <a:rPr lang="en-US" sz="2000" b="1" dirty="0" smtClean="0"/>
+              <a:t>Micro Services</a:t>
+            </a:r>
+          </a:p>
+          <a:p>
+            <a:pPr marL="285750" indent="-285750">
+              <a:buFont typeface="Arial" panose="020B0604020202020204" pitchFamily="34" charset="0"/>
+              <a:buChar char="•"/>
+            </a:pPr>
+            <a:r>
+              <a:rPr lang="en-US" sz="2000" dirty="0" smtClean="0"/>
+              <a:t>Infrastructure automation, Independent evolution of components, Design for </a:t>
+            </a:r>
+            <a:r>
+              <a:rPr lang="en-US" sz="2000" dirty="0" smtClean="0"/>
+              <a:t>failure</a:t>
+            </a:r>
+          </a:p>
+          <a:p>
+            <a:pPr marL="285750" indent="-285750">
+              <a:buFont typeface="Arial" panose="020B0604020202020204" pitchFamily="34" charset="0"/>
+              <a:buChar char="•"/>
+            </a:pPr>
+            <a:r>
+              <a:rPr lang="en-US" sz="2000" dirty="0" smtClean="0"/>
+              <a:t>Can be designed to fully complement REST constraints (Layered approach, Uniform Interface, Scalability, Client/Server and stateless)</a:t>
+            </a:r>
+            <a:endParaRPr lang="en-US" sz="2000" dirty="0" smtClean="0"/>
+          </a:p>
+          <a:p>
+            <a:pPr marL="285750" indent="-285750">
+              <a:buFont typeface="Arial" panose="020B0604020202020204" pitchFamily="34" charset="0"/>
+              <a:buChar char="•"/>
+            </a:pPr>
+            <a:r>
+              <a:rPr lang="en-US" sz="2000" dirty="0" smtClean="0"/>
+              <a:t>Unbounded </a:t>
+            </a:r>
+            <a:r>
+              <a:rPr lang="en-US" sz="2000" dirty="0" smtClean="0"/>
+              <a:t> horizontal Scalability and support for Elastic Infrastructure</a:t>
+            </a:r>
+          </a:p>
+          <a:p>
+            <a:pPr marL="285750" indent="-285750">
+              <a:buFont typeface="Arial" panose="020B0604020202020204" pitchFamily="34" charset="0"/>
+              <a:buChar char="•"/>
+            </a:pPr>
+            <a:r>
+              <a:rPr lang="en-US" sz="2000" dirty="0" smtClean="0"/>
+              <a:t>Improved manageability of Products, cleaner design principles and </a:t>
+            </a:r>
+            <a:endParaRPr lang="en-US" sz="2000" dirty="0" smtClean="0"/>
           </a:p>
           <a:p>
             <a:pPr marL="285750" indent="-285750">
@@ -17820,13 +17875,7 @@
               <a:rPr lang="en-US" dirty="0" smtClean="0">
                 <a:hlinkClick r:id="rId3"/>
               </a:rPr>
-              <a:t>Spring Boot </a:t>
-            </a:r>
-            <a:r>
-              <a:rPr lang="en-US" dirty="0" smtClean="0">
-                <a:hlinkClick r:id="rId3"/>
-              </a:rPr>
-              <a:t>Reference Guide</a:t>
+              <a:t>Spring Boot Reference Guide</a:t>
             </a:r>
             <a:endParaRPr lang="en-US" dirty="0" smtClean="0"/>
           </a:p>

</xml_diff>